<commit_message>
stakeholders meeting ppt updated
</commit_message>
<xml_diff>
--- a/docs/StakeholderM_CV.pptx
+++ b/docs/StakeholderM_CV.pptx
@@ -211,7 +211,7 @@
           <a:p>
             <a:fld id="{DEEF499D-5D06-4C0A-93C1-4EFBC05226AC}" type="datetimeFigureOut">
               <a:rPr lang="LID4096" smtClean="0"/>
-              <a:t>11/08/2023</a:t>
+              <a:t>11/27/2023</a:t>
             </a:fld>
             <a:endParaRPr lang="LID4096"/>
           </a:p>
@@ -699,7 +699,7 @@
           <a:p>
             <a:fld id="{72520918-6668-4200-834B-DD6D224E903E}" type="datetimeFigureOut">
               <a:rPr lang="LID4096" smtClean="0"/>
-              <a:t>11/08/2023</a:t>
+              <a:t>11/27/2023</a:t>
             </a:fld>
             <a:endParaRPr lang="LID4096"/>
           </a:p>
@@ -869,7 +869,7 @@
           <a:p>
             <a:fld id="{72520918-6668-4200-834B-DD6D224E903E}" type="datetimeFigureOut">
               <a:rPr lang="LID4096" smtClean="0"/>
-              <a:t>11/08/2023</a:t>
+              <a:t>11/27/2023</a:t>
             </a:fld>
             <a:endParaRPr lang="LID4096"/>
           </a:p>
@@ -1049,7 +1049,7 @@
           <a:p>
             <a:fld id="{72520918-6668-4200-834B-DD6D224E903E}" type="datetimeFigureOut">
               <a:rPr lang="LID4096" smtClean="0"/>
-              <a:t>11/08/2023</a:t>
+              <a:t>11/27/2023</a:t>
             </a:fld>
             <a:endParaRPr lang="LID4096"/>
           </a:p>
@@ -1641,7 +1641,7 @@
           <a:p>
             <a:fld id="{72520918-6668-4200-834B-DD6D224E903E}" type="datetimeFigureOut">
               <a:rPr lang="LID4096" smtClean="0"/>
-              <a:t>11/08/2023</a:t>
+              <a:t>11/27/2023</a:t>
             </a:fld>
             <a:endParaRPr lang="LID4096"/>
           </a:p>
@@ -1887,7 +1887,7 @@
           <a:p>
             <a:fld id="{72520918-6668-4200-834B-DD6D224E903E}" type="datetimeFigureOut">
               <a:rPr lang="LID4096" smtClean="0"/>
-              <a:t>11/08/2023</a:t>
+              <a:t>11/27/2023</a:t>
             </a:fld>
             <a:endParaRPr lang="LID4096"/>
           </a:p>
@@ -2119,7 +2119,7 @@
           <a:p>
             <a:fld id="{72520918-6668-4200-834B-DD6D224E903E}" type="datetimeFigureOut">
               <a:rPr lang="LID4096" smtClean="0"/>
-              <a:t>11/08/2023</a:t>
+              <a:t>11/27/2023</a:t>
             </a:fld>
             <a:endParaRPr lang="LID4096"/>
           </a:p>
@@ -2486,7 +2486,7 @@
           <a:p>
             <a:fld id="{72520918-6668-4200-834B-DD6D224E903E}" type="datetimeFigureOut">
               <a:rPr lang="LID4096" smtClean="0"/>
-              <a:t>11/08/2023</a:t>
+              <a:t>11/27/2023</a:t>
             </a:fld>
             <a:endParaRPr lang="LID4096"/>
           </a:p>
@@ -2604,7 +2604,7 @@
           <a:p>
             <a:fld id="{72520918-6668-4200-834B-DD6D224E903E}" type="datetimeFigureOut">
               <a:rPr lang="LID4096" smtClean="0"/>
-              <a:t>11/08/2023</a:t>
+              <a:t>11/27/2023</a:t>
             </a:fld>
             <a:endParaRPr lang="LID4096"/>
           </a:p>
@@ -2699,7 +2699,7 @@
           <a:p>
             <a:fld id="{72520918-6668-4200-834B-DD6D224E903E}" type="datetimeFigureOut">
               <a:rPr lang="LID4096" smtClean="0"/>
-              <a:t>11/08/2023</a:t>
+              <a:t>11/27/2023</a:t>
             </a:fld>
             <a:endParaRPr lang="LID4096"/>
           </a:p>
@@ -2976,7 +2976,7 @@
           <a:p>
             <a:fld id="{72520918-6668-4200-834B-DD6D224E903E}" type="datetimeFigureOut">
               <a:rPr lang="LID4096" smtClean="0"/>
-              <a:t>11/08/2023</a:t>
+              <a:t>11/27/2023</a:t>
             </a:fld>
             <a:endParaRPr lang="LID4096"/>
           </a:p>
@@ -3233,7 +3233,7 @@
           <a:p>
             <a:fld id="{72520918-6668-4200-834B-DD6D224E903E}" type="datetimeFigureOut">
               <a:rPr lang="LID4096" smtClean="0"/>
-              <a:t>11/08/2023</a:t>
+              <a:t>11/27/2023</a:t>
             </a:fld>
             <a:endParaRPr lang="LID4096"/>
           </a:p>
@@ -3446,7 +3446,7 @@
           <a:p>
             <a:fld id="{72520918-6668-4200-834B-DD6D224E903E}" type="datetimeFigureOut">
               <a:rPr lang="LID4096" smtClean="0"/>
-              <a:t>11/08/2023</a:t>
+              <a:t>11/27/2023</a:t>
             </a:fld>
             <a:endParaRPr lang="LID4096"/>
           </a:p>
@@ -5740,7 +5740,7 @@
                 </a:solidFill>
                 <a:latin typeface="Avenir Next" panose="020B0503020202020204" pitchFamily="34" charset="0"/>
               </a:rPr>
-              <a:t>Use case:  Running Yolo</a:t>
+              <a:t>Demo:  Running Yolo</a:t>
             </a:r>
             <a:endParaRPr lang="en-NL" sz="1800" b="1" dirty="0">
               <a:solidFill>
@@ -5976,7 +5976,7 @@
         </p:blipFill>
         <p:spPr>
           <a:xfrm>
-            <a:off x="5221083" y="0"/>
+            <a:off x="5257800" y="50451"/>
             <a:ext cx="7763080" cy="1098957"/>
           </a:xfrm>
           <a:prstGeom prst="rect">
@@ -5998,7 +5998,7 @@
         </p:nvSpPr>
         <p:spPr>
           <a:xfrm>
-            <a:off x="1259512" y="3890652"/>
+            <a:off x="1414701" y="4460124"/>
             <a:ext cx="1904300" cy="1629562"/>
           </a:xfrm>
           <a:prstGeom prst="flowChartConnector">
@@ -6059,7 +6059,7 @@
         </p:nvSpPr>
         <p:spPr>
           <a:xfrm>
-            <a:off x="5221083" y="3890652"/>
+            <a:off x="5376272" y="4460124"/>
             <a:ext cx="1904300" cy="1629562"/>
           </a:xfrm>
           <a:prstGeom prst="flowChartConnector">
@@ -6123,7 +6123,7 @@
         </p:nvCxnSpPr>
         <p:spPr>
           <a:xfrm>
-            <a:off x="3163812" y="4705433"/>
+            <a:off x="3319001" y="5274905"/>
             <a:ext cx="2057271" cy="0"/>
           </a:xfrm>
           <a:prstGeom prst="straightConnector1">
@@ -6162,7 +6162,7 @@
         </p:nvSpPr>
         <p:spPr>
           <a:xfrm>
-            <a:off x="9182654" y="3890652"/>
+            <a:off x="9337843" y="4460124"/>
             <a:ext cx="1904300" cy="1629562"/>
           </a:xfrm>
           <a:prstGeom prst="flowChartConnector">
@@ -6223,7 +6223,7 @@
         </p:nvCxnSpPr>
         <p:spPr>
           <a:xfrm>
-            <a:off x="7125383" y="4705433"/>
+            <a:off x="7280572" y="5274905"/>
             <a:ext cx="2057271" cy="0"/>
           </a:xfrm>
           <a:prstGeom prst="straightConnector1">
@@ -6270,7 +6270,7 @@
         </p:blipFill>
         <p:spPr>
           <a:xfrm>
-            <a:off x="87340" y="1370266"/>
+            <a:off x="242529" y="1939738"/>
             <a:ext cx="1520176" cy="1617049"/>
           </a:xfrm>
           <a:prstGeom prst="rect">
@@ -6294,7 +6294,7 @@
         </p:nvCxnSpPr>
         <p:spPr>
           <a:xfrm>
-            <a:off x="847428" y="2967349"/>
+            <a:off x="1002617" y="3536821"/>
             <a:ext cx="824168" cy="1056346"/>
           </a:xfrm>
           <a:prstGeom prst="line">
@@ -6341,7 +6341,7 @@
         </p:blipFill>
         <p:spPr>
           <a:xfrm>
-            <a:off x="1888856" y="1337786"/>
+            <a:off x="2044045" y="1907258"/>
             <a:ext cx="1663956" cy="1241500"/>
           </a:xfrm>
           <a:prstGeom prst="rect">
@@ -6367,7 +6367,7 @@
         </p:nvCxnSpPr>
         <p:spPr>
           <a:xfrm flipH="1">
-            <a:off x="2211662" y="2579286"/>
+            <a:off x="2366851" y="3148758"/>
             <a:ext cx="509172" cy="1311366"/>
           </a:xfrm>
           <a:prstGeom prst="line">
@@ -6414,7 +6414,7 @@
         </p:blipFill>
         <p:spPr>
           <a:xfrm>
-            <a:off x="3875618" y="1304975"/>
+            <a:off x="4030807" y="1874447"/>
             <a:ext cx="2383314" cy="1682339"/>
           </a:xfrm>
           <a:prstGeom prst="rect">
@@ -6438,7 +6438,7 @@
         </p:nvCxnSpPr>
         <p:spPr>
           <a:xfrm flipH="1">
-            <a:off x="2909226" y="2783301"/>
+            <a:off x="3064415" y="3352773"/>
             <a:ext cx="1283221" cy="1374971"/>
           </a:xfrm>
           <a:prstGeom prst="line">
@@ -6517,7 +6517,7 @@
                 </a:solidFill>
                 <a:latin typeface="Avenir Next" panose="020B0503020202020204" pitchFamily="34" charset="0"/>
               </a:rPr>
-              <a:t>Use case:  Running Yolo</a:t>
+              <a:t>Demo:  Running Yolo</a:t>
             </a:r>
             <a:endParaRPr lang="en-NL" sz="1800" b="1" dirty="0">
               <a:solidFill>
@@ -6525,6 +6525,118 @@
               </a:solidFill>
               <a:latin typeface="Avenir Next" panose="020B0503020202020204" pitchFamily="34" charset="0"/>
             </a:endParaRPr>
+          </a:p>
+        </p:txBody>
+      </p:sp>
+      <p:sp>
+        <p:nvSpPr>
+          <p:cNvPr id="2" name="TextBox 1">
+            <a:extLst>
+              <a:ext uri="{FF2B5EF4-FFF2-40B4-BE49-F238E27FC236}">
+                <a16:creationId xmlns:a16="http://schemas.microsoft.com/office/drawing/2014/main" id="{02FC44BD-8F4F-5B96-4F91-FFECE247160C}"/>
+              </a:ext>
+            </a:extLst>
+          </p:cNvPr>
+          <p:cNvSpPr txBox="1"/>
+          <p:nvPr/>
+        </p:nvSpPr>
+        <p:spPr>
+          <a:xfrm>
+            <a:off x="8040745" y="4997906"/>
+            <a:ext cx="1634835" cy="276999"/>
+          </a:xfrm>
+          <a:prstGeom prst="rect">
+            <a:avLst/>
+          </a:prstGeom>
+          <a:noFill/>
+        </p:spPr>
+        <p:txBody>
+          <a:bodyPr wrap="square" rtlCol="0">
+            <a:spAutoFit/>
+          </a:bodyPr>
+          <a:lstStyle/>
+          <a:p>
+            <a:r>
+              <a:rPr lang="en-US" sz="1200" dirty="0"/>
+              <a:t>push</a:t>
+            </a:r>
+            <a:endParaRPr lang="LID4096" sz="1200" dirty="0"/>
+          </a:p>
+        </p:txBody>
+      </p:sp>
+      <p:sp>
+        <p:nvSpPr>
+          <p:cNvPr id="4" name="TextBox 3">
+            <a:extLst>
+              <a:ext uri="{FF2B5EF4-FFF2-40B4-BE49-F238E27FC236}">
+                <a16:creationId xmlns:a16="http://schemas.microsoft.com/office/drawing/2014/main" id="{D5C7E749-0119-EB50-03E1-2EDA05B6B4E0}"/>
+              </a:ext>
+            </a:extLst>
+          </p:cNvPr>
+          <p:cNvSpPr txBox="1"/>
+          <p:nvPr/>
+        </p:nvSpPr>
+        <p:spPr>
+          <a:xfrm>
+            <a:off x="3965810" y="4993216"/>
+            <a:ext cx="1634835" cy="276999"/>
+          </a:xfrm>
+          <a:prstGeom prst="rect">
+            <a:avLst/>
+          </a:prstGeom>
+          <a:noFill/>
+        </p:spPr>
+        <p:txBody>
+          <a:bodyPr wrap="square" rtlCol="0">
+            <a:spAutoFit/>
+          </a:bodyPr>
+          <a:lstStyle/>
+          <a:p>
+            <a:r>
+              <a:rPr lang="en-US" sz="1200" dirty="0"/>
+              <a:t>build</a:t>
+            </a:r>
+            <a:endParaRPr lang="LID4096" sz="1200" dirty="0"/>
+          </a:p>
+        </p:txBody>
+      </p:sp>
+      <p:sp>
+        <p:nvSpPr>
+          <p:cNvPr id="5" name="TextBox 4">
+            <a:extLst>
+              <a:ext uri="{FF2B5EF4-FFF2-40B4-BE49-F238E27FC236}">
+                <a16:creationId xmlns:a16="http://schemas.microsoft.com/office/drawing/2014/main" id="{4B743BE6-686E-FCC2-E35D-B4C995A57D0E}"/>
+              </a:ext>
+            </a:extLst>
+          </p:cNvPr>
+          <p:cNvSpPr txBox="1"/>
+          <p:nvPr/>
+        </p:nvSpPr>
+        <p:spPr>
+          <a:xfrm>
+            <a:off x="87340" y="827576"/>
+            <a:ext cx="5063500" cy="646331"/>
+          </a:xfrm>
+          <a:prstGeom prst="rect">
+            <a:avLst/>
+          </a:prstGeom>
+          <a:noFill/>
+        </p:spPr>
+        <p:txBody>
+          <a:bodyPr wrap="square" rtlCol="0">
+            <a:spAutoFit/>
+          </a:bodyPr>
+          <a:lstStyle/>
+          <a:p>
+            <a:pPr marL="285750" indent="-285750">
+              <a:buFont typeface="Wingdings" panose="05000000000000000000" pitchFamily="2" charset="2"/>
+              <a:buChar char="ü"/>
+            </a:pPr>
+            <a:r>
+              <a:rPr lang="en-US" dirty="0"/>
+              <a:t>First, prepare an image by following the following steps</a:t>
+            </a:r>
+            <a:endParaRPr lang="LID4096" dirty="0"/>
           </a:p>
         </p:txBody>
       </p:sp>
@@ -6538,13 +6650,13 @@
   <p:clrMapOvr>
     <a:masterClrMapping/>
   </p:clrMapOvr>
-  <mc:AlternateContent xmlns:mc="http://schemas.openxmlformats.org/markup-compatibility/2006">
-    <mc:Choice xmlns:p14="http://schemas.microsoft.com/office/powerpoint/2010/main" Requires="p14">
+  <mc:AlternateContent xmlns:mc="http://schemas.openxmlformats.org/markup-compatibility/2006" xmlns:p14="http://schemas.microsoft.com/office/powerpoint/2010/main">
+    <mc:Choice Requires="p14">
       <p:transition spd="med" p14:dur="700">
         <p:fade/>
       </p:transition>
     </mc:Choice>
-    <mc:Fallback>
+    <mc:Fallback xmlns="">
       <p:transition spd="med">
         <p:fade/>
       </p:transition>
@@ -7519,7 +7631,7 @@
         </p:nvSpPr>
         <p:spPr>
           <a:xfrm rot="5400000">
-            <a:off x="9537249" y="1949126"/>
+            <a:off x="9537248" y="2154551"/>
             <a:ext cx="1245454" cy="216244"/>
           </a:xfrm>
           <a:prstGeom prst="rightArrow">
@@ -7771,7 +7883,7 @@
                 </a:solidFill>
                 <a:latin typeface="Avenir Next" panose="020B0503020202020204" pitchFamily="34" charset="0"/>
               </a:rPr>
-              <a:t>Use case:  Running Yolo</a:t>
+              <a:t>Demo:  Running Yolo via UI</a:t>
             </a:r>
             <a:endParaRPr lang="en-NL" sz="1800" b="1" dirty="0">
               <a:solidFill>
@@ -7792,13 +7904,13 @@
   <p:clrMapOvr>
     <a:masterClrMapping/>
   </p:clrMapOvr>
-  <mc:AlternateContent xmlns:mc="http://schemas.openxmlformats.org/markup-compatibility/2006">
-    <mc:Choice xmlns:p14="http://schemas.microsoft.com/office/powerpoint/2010/main" Requires="p14">
+  <mc:AlternateContent xmlns:mc="http://schemas.openxmlformats.org/markup-compatibility/2006" xmlns:p14="http://schemas.microsoft.com/office/powerpoint/2010/main">
+    <mc:Choice Requires="p14">
       <p:transition spd="med" p14:dur="700">
         <p:fade/>
       </p:transition>
     </mc:Choice>
-    <mc:Fallback>
+    <mc:Fallback xmlns="">
       <p:transition spd="med">
         <p:fade/>
       </p:transition>
@@ -8514,13 +8626,13 @@
   <p:clrMapOvr>
     <a:masterClrMapping/>
   </p:clrMapOvr>
-  <mc:AlternateContent xmlns:mc="http://schemas.openxmlformats.org/markup-compatibility/2006">
-    <mc:Choice xmlns:p14="http://schemas.microsoft.com/office/powerpoint/2010/main" Requires="p14">
+  <mc:AlternateContent xmlns:mc="http://schemas.openxmlformats.org/markup-compatibility/2006" xmlns:p14="http://schemas.microsoft.com/office/powerpoint/2010/main">
+    <mc:Choice Requires="p14">
       <p:transition spd="med" p14:dur="700">
         <p:fade/>
       </p:transition>
     </mc:Choice>
-    <mc:Fallback>
+    <mc:Fallback xmlns="">
       <p:transition spd="med">
         <p:fade/>
       </p:transition>

</xml_diff>

<commit_message>
stakeholder slides final version
</commit_message>
<xml_diff>
--- a/docs/StakeholderM_CV.pptx
+++ b/docs/StakeholderM_CV.pptx
@@ -5,12 +5,12 @@
     <p:sldMasterId id="2147483661" r:id="rId1"/>
   </p:sldMasterIdLst>
   <p:notesMasterIdLst>
-    <p:notesMasterId r:id="rId19"/>
+    <p:notesMasterId r:id="rId20"/>
   </p:notesMasterIdLst>
   <p:sldIdLst>
     <p:sldId id="259" r:id="rId2"/>
     <p:sldId id="564" r:id="rId3"/>
-    <p:sldId id="565" r:id="rId4"/>
+    <p:sldId id="589" r:id="rId4"/>
     <p:sldId id="573" r:id="rId5"/>
     <p:sldId id="574" r:id="rId6"/>
     <p:sldId id="578" r:id="rId7"/>
@@ -20,11 +20,12 @@
     <p:sldId id="587" r:id="rId11"/>
     <p:sldId id="569" r:id="rId12"/>
     <p:sldId id="584" r:id="rId13"/>
-    <p:sldId id="567" r:id="rId14"/>
-    <p:sldId id="581" r:id="rId15"/>
-    <p:sldId id="580" r:id="rId16"/>
-    <p:sldId id="568" r:id="rId17"/>
-    <p:sldId id="582" r:id="rId18"/>
+    <p:sldId id="582" r:id="rId14"/>
+    <p:sldId id="567" r:id="rId15"/>
+    <p:sldId id="581" r:id="rId16"/>
+    <p:sldId id="580" r:id="rId17"/>
+    <p:sldId id="568" r:id="rId18"/>
+    <p:sldId id="590" r:id="rId19"/>
   </p:sldIdLst>
   <p:sldSz cx="12984163" cy="6858000"/>
   <p:notesSz cx="6858000" cy="9144000"/>
@@ -3934,17 +3935,19 @@
         </p:nvSpPr>
         <p:spPr>
           <a:xfrm>
-            <a:off x="-2" y="4540452"/>
-            <a:ext cx="12479227" cy="890408"/>
-          </a:xfrm>
-        </p:spPr>
-        <p:txBody>
-          <a:bodyPr/>
+            <a:off x="0" y="4486217"/>
+            <a:ext cx="12984159" cy="890408"/>
+          </a:xfrm>
+        </p:spPr>
+        <p:txBody>
+          <a:bodyPr>
+            <a:normAutofit fontScale="70000" lnSpcReduction="20000"/>
+          </a:bodyPr>
           <a:lstStyle/>
           <a:p>
             <a:r>
               <a:rPr lang="nl-NL" dirty="0"/>
-              <a:t>                                                                                                                                Haftom Hailu</a:t>
+              <a:t>                                                                                                                            Haftom Hailu</a:t>
             </a:r>
           </a:p>
           <a:p>
@@ -3965,6 +3968,12 @@
               <a:t>PiCas</a:t>
             </a:r>
             <a:endParaRPr lang="nl-NL" dirty="0"/>
+          </a:p>
+          <a:p>
+            <a:r>
+              <a:rPr lang="nl-NL" dirty="0"/>
+              <a:t>                                                                                                                            Nov 30, 2023</a:t>
+            </a:r>
           </a:p>
         </p:txBody>
       </p:sp>
@@ -4085,7 +4094,10 @@
             <a:br>
               <a:rPr lang="nl-NL" dirty="0"/>
             </a:br>
-            <a:endParaRPr lang="nl-NL" dirty="0"/>
+            <a:r>
+              <a:rPr lang="nl-NL" dirty="0"/>
+              <a:t>   </a:t>
+            </a:r>
           </a:p>
         </p:txBody>
       </p:sp>
@@ -4105,8 +4117,8 @@
         </p:nvSpPr>
         <p:spPr>
           <a:xfrm>
-            <a:off x="-3" y="5485097"/>
-            <a:ext cx="12677603" cy="173484"/>
+            <a:off x="0" y="5376625"/>
+            <a:ext cx="12984159" cy="395586"/>
           </a:xfrm>
           <a:prstGeom prst="rect">
             <a:avLst/>
@@ -4843,7 +4855,7 @@
         <p:spPr>
           <a:xfrm>
             <a:off x="863166" y="3515620"/>
-            <a:ext cx="7807843" cy="1334981"/>
+            <a:ext cx="7807843" cy="1363450"/>
           </a:xfrm>
           <a:prstGeom prst="rect">
             <a:avLst/>
@@ -4857,7 +4869,7 @@
           <a:lstStyle/>
           <a:p>
             <a:r>
-              <a:rPr lang="en-US" sz="1615" dirty="0"/>
+              <a:rPr lang="en-US" b="1" dirty="0"/>
               <a:t>Drawbacks</a:t>
             </a:r>
           </a:p>
@@ -4892,7 +4904,7 @@
             </a:r>
           </a:p>
           <a:p>
-            <a:pPr marL="954279" lvl="1" indent="-329698">
+            <a:pPr marL="1411479" lvl="2" indent="-329698">
               <a:buFont typeface="Arial" panose="020B0604020202020204" pitchFamily="34" charset="0"/>
               <a:buChar char="•"/>
             </a:pPr>
@@ -5051,7 +5063,7 @@
         </p:nvSpPr>
         <p:spPr>
           <a:xfrm>
-            <a:off x="1882627" y="4940597"/>
+            <a:off x="2635688" y="4899414"/>
             <a:ext cx="1422636" cy="1678318"/>
           </a:xfrm>
           <a:prstGeom prst="rect">
@@ -5098,7 +5110,7 @@
         </p:nvSpPr>
         <p:spPr>
           <a:xfrm>
-            <a:off x="5739332" y="5145701"/>
+            <a:off x="6492393" y="5104518"/>
             <a:ext cx="1196333" cy="1507650"/>
           </a:xfrm>
           <a:prstGeom prst="rect">
@@ -5145,7 +5157,7 @@
         </p:nvSpPr>
         <p:spPr>
           <a:xfrm>
-            <a:off x="3855443" y="5016699"/>
+            <a:off x="4608504" y="4975516"/>
             <a:ext cx="1346447" cy="276999"/>
           </a:xfrm>
           <a:prstGeom prst="rect">
@@ -5181,7 +5193,7 @@
         </p:nvSpPr>
         <p:spPr>
           <a:xfrm>
-            <a:off x="2042716" y="5092997"/>
+            <a:off x="2795777" y="5051814"/>
             <a:ext cx="1139504" cy="189549"/>
           </a:xfrm>
           <a:prstGeom prst="rect">
@@ -5240,7 +5252,7 @@
         </p:nvSpPr>
         <p:spPr>
           <a:xfrm>
-            <a:off x="2042716" y="5434946"/>
+            <a:off x="2795777" y="5393763"/>
             <a:ext cx="1139504" cy="189549"/>
           </a:xfrm>
           <a:prstGeom prst="rect">
@@ -5301,7 +5313,7 @@
         </p:nvCxnSpPr>
         <p:spPr>
           <a:xfrm>
-            <a:off x="3367337" y="5292333"/>
+            <a:off x="4120398" y="5251150"/>
             <a:ext cx="2175641" cy="0"/>
           </a:xfrm>
           <a:prstGeom prst="straightConnector1">
@@ -5342,7 +5354,7 @@
         </p:nvCxnSpPr>
         <p:spPr>
           <a:xfrm flipH="1">
-            <a:off x="3436039" y="6344686"/>
+            <a:off x="4189100" y="6303503"/>
             <a:ext cx="1982554" cy="21439"/>
           </a:xfrm>
           <a:prstGeom prst="straightConnector1">
@@ -5381,7 +5393,7 @@
         </p:nvSpPr>
         <p:spPr>
           <a:xfrm>
-            <a:off x="3816569" y="5870058"/>
+            <a:off x="4569630" y="5828875"/>
             <a:ext cx="1346447" cy="461665"/>
           </a:xfrm>
           <a:prstGeom prst="rect">
@@ -5417,7 +5429,7 @@
         </p:nvSpPr>
         <p:spPr>
           <a:xfrm>
-            <a:off x="2042715" y="6193901"/>
+            <a:off x="2795776" y="6152718"/>
             <a:ext cx="1139504" cy="189549"/>
           </a:xfrm>
           <a:prstGeom prst="rect">
@@ -5476,7 +5488,7 @@
         </p:nvSpPr>
         <p:spPr>
           <a:xfrm>
-            <a:off x="5970122" y="4807147"/>
+            <a:off x="6723183" y="4765964"/>
             <a:ext cx="884211" cy="338554"/>
           </a:xfrm>
           <a:prstGeom prst="rect">
@@ -5512,7 +5524,7 @@
         </p:nvSpPr>
         <p:spPr>
           <a:xfrm>
-            <a:off x="2508996" y="5529720"/>
+            <a:off x="3262057" y="5488537"/>
             <a:ext cx="1346447" cy="400110"/>
           </a:xfrm>
           <a:prstGeom prst="rect">
@@ -5548,7 +5560,7 @@
         </p:nvSpPr>
         <p:spPr>
           <a:xfrm>
-            <a:off x="2508996" y="5738978"/>
+            <a:off x="3262057" y="5697795"/>
             <a:ext cx="1346447" cy="400110"/>
           </a:xfrm>
           <a:prstGeom prst="rect">
@@ -5599,7 +5611,7 @@
         </p:blipFill>
         <p:spPr bwMode="auto">
           <a:xfrm>
-            <a:off x="5887010" y="5283177"/>
+            <a:off x="6640071" y="5241994"/>
             <a:ext cx="884212" cy="1191876"/>
           </a:xfrm>
           <a:prstGeom prst="rect">
@@ -5647,9 +5659,6 @@
                     <p:cTn id="3" fill="hold">
                       <p:stCondLst>
                         <p:cond delay="indefinite"/>
-                        <p:cond evt="onBegin" delay="0">
-                          <p:tn val="2"/>
-                        </p:cond>
                       </p:stCondLst>
                       <p:childTnLst>
                         <p:par>
@@ -5659,7 +5668,7 @@
                             </p:stCondLst>
                             <p:childTnLst>
                               <p:par>
-                                <p:cTn id="5" presetID="1" presetClass="entr" presetSubtype="0" fill="hold" nodeType="withEffect">
+                                <p:cTn id="5" presetID="1" presetClass="entr" presetSubtype="0" fill="hold" grpId="0" nodeType="clickEffect">
                                   <p:stCondLst>
                                     <p:cond delay="0"/>
                                   </p:stCondLst>
@@ -5672,7 +5681,7 @@
                                           </p:stCondLst>
                                         </p:cTn>
                                         <p:tgtEl>
-                                          <p:spTgt spid="27"/>
+                                          <p:spTgt spid="7"/>
                                         </p:tgtEl>
                                         <p:attrNameLst>
                                           <p:attrName>style.visibility</p:attrName>
@@ -5685,26 +5694,35 @@
                                   </p:childTnLst>
                                 </p:cTn>
                               </p:par>
-                            </p:childTnLst>
-                          </p:cTn>
-                        </p:par>
-                      </p:childTnLst>
-                    </p:cTn>
-                  </p:par>
-                  <p:par>
-                    <p:cTn id="7" fill="hold">
-                      <p:stCondLst>
-                        <p:cond delay="indefinite"/>
-                      </p:stCondLst>
-                      <p:childTnLst>
-                        <p:par>
-                          <p:cTn id="8" fill="hold">
-                            <p:stCondLst>
-                              <p:cond delay="0"/>
-                            </p:stCondLst>
-                            <p:childTnLst>
                               <p:par>
-                                <p:cTn id="9" presetID="1" presetClass="entr" presetSubtype="0" fill="hold" grpId="0" nodeType="clickEffect">
+                                <p:cTn id="7" presetID="1" presetClass="entr" presetSubtype="0" fill="hold" grpId="0" nodeType="withEffect">
+                                  <p:stCondLst>
+                                    <p:cond delay="0"/>
+                                  </p:stCondLst>
+                                  <p:childTnLst>
+                                    <p:set>
+                                      <p:cBhvr>
+                                        <p:cTn id="8" dur="1" fill="hold">
+                                          <p:stCondLst>
+                                            <p:cond delay="0"/>
+                                          </p:stCondLst>
+                                        </p:cTn>
+                                        <p:tgtEl>
+                                          <p:spTgt spid="10"/>
+                                        </p:tgtEl>
+                                        <p:attrNameLst>
+                                          <p:attrName>style.visibility</p:attrName>
+                                        </p:attrNameLst>
+                                      </p:cBhvr>
+                                      <p:to>
+                                        <p:strVal val="visible"/>
+                                      </p:to>
+                                    </p:set>
+                                  </p:childTnLst>
+                                </p:cTn>
+                              </p:par>
+                              <p:par>
+                                <p:cTn id="9" presetID="1" presetClass="entr" presetSubtype="0" fill="hold" grpId="0" nodeType="withEffect">
                                   <p:stCondLst>
                                     <p:cond delay="0"/>
                                   </p:stCondLst>
@@ -5717,7 +5735,7 @@
                                           </p:stCondLst>
                                         </p:cTn>
                                         <p:tgtEl>
-                                          <p:spTgt spid="51"/>
+                                          <p:spTgt spid="11"/>
                                         </p:tgtEl>
                                         <p:attrNameLst>
                                           <p:attrName>style.visibility</p:attrName>
@@ -5730,26 +5748,35 @@
                                   </p:childTnLst>
                                 </p:cTn>
                               </p:par>
-                            </p:childTnLst>
-                          </p:cTn>
-                        </p:par>
-                      </p:childTnLst>
-                    </p:cTn>
-                  </p:par>
-                  <p:par>
-                    <p:cTn id="11" fill="hold">
-                      <p:stCondLst>
-                        <p:cond delay="indefinite"/>
-                      </p:stCondLst>
-                      <p:childTnLst>
-                        <p:par>
-                          <p:cTn id="12" fill="hold">
-                            <p:stCondLst>
-                              <p:cond delay="0"/>
-                            </p:stCondLst>
-                            <p:childTnLst>
                               <p:par>
-                                <p:cTn id="13" presetID="1" presetClass="entr" presetSubtype="0" fill="hold" nodeType="clickEffect">
+                                <p:cTn id="11" presetID="1" presetClass="entr" presetSubtype="0" fill="hold" nodeType="withEffect">
+                                  <p:stCondLst>
+                                    <p:cond delay="0"/>
+                                  </p:stCondLst>
+                                  <p:childTnLst>
+                                    <p:set>
+                                      <p:cBhvr>
+                                        <p:cTn id="12" dur="1" fill="hold">
+                                          <p:stCondLst>
+                                            <p:cond delay="0"/>
+                                          </p:stCondLst>
+                                        </p:cTn>
+                                        <p:tgtEl>
+                                          <p:spTgt spid="12"/>
+                                        </p:tgtEl>
+                                        <p:attrNameLst>
+                                          <p:attrName>style.visibility</p:attrName>
+                                        </p:attrNameLst>
+                                      </p:cBhvr>
+                                      <p:to>
+                                        <p:strVal val="visible"/>
+                                      </p:to>
+                                    </p:set>
+                                  </p:childTnLst>
+                                </p:cTn>
+                              </p:par>
+                              <p:par>
+                                <p:cTn id="13" presetID="1" presetClass="entr" presetSubtype="0" fill="hold" nodeType="withEffect">
                                   <p:stCondLst>
                                     <p:cond delay="0"/>
                                   </p:stCondLst>
@@ -5762,7 +5789,7 @@
                                           </p:stCondLst>
                                         </p:cTn>
                                         <p:tgtEl>
-                                          <p:spTgt spid="28"/>
+                                          <p:spTgt spid="13"/>
                                         </p:tgtEl>
                                         <p:attrNameLst>
                                           <p:attrName>style.visibility</p:attrName>
@@ -5789,7 +5816,7 @@
                                           </p:stCondLst>
                                         </p:cTn>
                                         <p:tgtEl>
-                                          <p:spTgt spid="17"/>
+                                          <p:spTgt spid="15"/>
                                         </p:tgtEl>
                                         <p:attrNameLst>
                                           <p:attrName>style.visibility</p:attrName>
@@ -5816,7 +5843,7 @@
                                           </p:stCondLst>
                                         </p:cTn>
                                         <p:tgtEl>
-                                          <p:spTgt spid="6"/>
+                                          <p:spTgt spid="16"/>
                                         </p:tgtEl>
                                         <p:attrNameLst>
                                           <p:attrName>style.visibility</p:attrName>
@@ -5830,7 +5857,7 @@
                                 </p:cTn>
                               </p:par>
                               <p:par>
-                                <p:cTn id="19" presetID="1" presetClass="entr" presetSubtype="0" fill="hold" nodeType="withEffect">
+                                <p:cTn id="19" presetID="1" presetClass="entr" presetSubtype="0" fill="hold" grpId="0" nodeType="withEffect">
                                   <p:stCondLst>
                                     <p:cond delay="0"/>
                                   </p:stCondLst>
@@ -5843,7 +5870,7 @@
                                           </p:stCondLst>
                                         </p:cTn>
                                         <p:tgtEl>
-                                          <p:spTgt spid="12"/>
+                                          <p:spTgt spid="17"/>
                                         </p:tgtEl>
                                         <p:attrNameLst>
                                           <p:attrName>style.visibility</p:attrName>
@@ -5870,7 +5897,7 @@
                                           </p:stCondLst>
                                         </p:cTn>
                                         <p:tgtEl>
-                                          <p:spTgt spid="7"/>
+                                          <p:spTgt spid="19"/>
                                         </p:tgtEl>
                                         <p:attrNameLst>
                                           <p:attrName>style.visibility</p:attrName>
@@ -5897,7 +5924,7 @@
                                           </p:stCondLst>
                                         </p:cTn>
                                         <p:tgtEl>
-                                          <p:spTgt spid="15"/>
+                                          <p:spTgt spid="20"/>
                                         </p:tgtEl>
                                         <p:attrNameLst>
                                           <p:attrName>style.visibility</p:attrName>
@@ -5924,7 +5951,7 @@
                                           </p:stCondLst>
                                         </p:cTn>
                                         <p:tgtEl>
-                                          <p:spTgt spid="13"/>
+                                          <p:spTgt spid="28"/>
                                         </p:tgtEl>
                                         <p:attrNameLst>
                                           <p:attrName>style.visibility</p:attrName>
@@ -5978,88 +6005,7 @@
                                           </p:stCondLst>
                                         </p:cTn>
                                         <p:tgtEl>
-                                          <p:spTgt spid="16"/>
-                                        </p:tgtEl>
-                                        <p:attrNameLst>
-                                          <p:attrName>style.visibility</p:attrName>
-                                        </p:attrNameLst>
-                                      </p:cBhvr>
-                                      <p:to>
-                                        <p:strVal val="visible"/>
-                                      </p:to>
-                                    </p:set>
-                                  </p:childTnLst>
-                                </p:cTn>
-                              </p:par>
-                              <p:par>
-                                <p:cTn id="31" presetID="1" presetClass="entr" presetSubtype="0" fill="hold" grpId="0" nodeType="withEffect">
-                                  <p:stCondLst>
-                                    <p:cond delay="0"/>
-                                  </p:stCondLst>
-                                  <p:childTnLst>
-                                    <p:set>
-                                      <p:cBhvr>
-                                        <p:cTn id="32" dur="1" fill="hold">
-                                          <p:stCondLst>
-                                            <p:cond delay="0"/>
-                                          </p:stCondLst>
-                                        </p:cTn>
-                                        <p:tgtEl>
-                                          <p:spTgt spid="20"/>
-                                        </p:tgtEl>
-                                        <p:attrNameLst>
-                                          <p:attrName>style.visibility</p:attrName>
-                                        </p:attrNameLst>
-                                      </p:cBhvr>
-                                      <p:to>
-                                        <p:strVal val="visible"/>
-                                      </p:to>
-                                    </p:set>
-                                  </p:childTnLst>
-                                </p:cTn>
-                              </p:par>
-                              <p:par>
-                                <p:cTn id="33" presetID="1" presetClass="entr" presetSubtype="0" fill="hold" grpId="0" nodeType="withEffect">
-                                  <p:stCondLst>
-                                    <p:cond delay="0"/>
-                                  </p:stCondLst>
-                                  <p:childTnLst>
-                                    <p:set>
-                                      <p:cBhvr>
-                                        <p:cTn id="34" dur="1" fill="hold">
-                                          <p:stCondLst>
-                                            <p:cond delay="0"/>
-                                          </p:stCondLst>
-                                        </p:cTn>
-                                        <p:tgtEl>
-                                          <p:spTgt spid="11"/>
-                                        </p:tgtEl>
-                                        <p:attrNameLst>
-                                          <p:attrName>style.visibility</p:attrName>
-                                        </p:attrNameLst>
-                                      </p:cBhvr>
-                                      <p:to>
-                                        <p:strVal val="visible"/>
-                                      </p:to>
-                                    </p:set>
-                                  </p:childTnLst>
-                                </p:cTn>
-                              </p:par>
-                              <p:par>
-                                <p:cTn id="35" presetID="1" presetClass="entr" presetSubtype="0" fill="hold" grpId="0" nodeType="withEffect">
-                                  <p:stCondLst>
-                                    <p:cond delay="0"/>
-                                  </p:stCondLst>
-                                  <p:childTnLst>
-                                    <p:set>
-                                      <p:cBhvr>
-                                        <p:cTn id="36" dur="1" fill="hold">
-                                          <p:stCondLst>
-                                            <p:cond delay="0"/>
-                                          </p:stCondLst>
-                                        </p:cTn>
-                                        <p:tgtEl>
-                                          <p:spTgt spid="10"/>
+                                          <p:spTgt spid="6"/>
                                         </p:tgtEl>
                                         <p:attrNameLst>
                                           <p:attrName>style.visibility</p:attrName>
@@ -6100,7 +6046,6 @@
       </p:par>
     </p:tnLst>
     <p:bldLst>
-      <p:bldP spid="51" grpId="0"/>
       <p:bldP spid="5" grpId="0" animBg="1"/>
       <p:bldP spid="6" grpId="0" animBg="1"/>
       <p:bldP spid="7" grpId="0"/>
@@ -6109,6 +6054,7 @@
       <p:bldP spid="15" grpId="0"/>
       <p:bldP spid="16" grpId="0" animBg="1"/>
       <p:bldP spid="17" grpId="0"/>
+      <p:bldP spid="19" grpId="0"/>
       <p:bldP spid="20" grpId="0"/>
     </p:bldLst>
   </p:timing>
@@ -6200,7 +6146,7 @@
         </p:nvSpPr>
         <p:spPr>
           <a:xfrm>
-            <a:off x="2560572" y="2918107"/>
+            <a:off x="3852477" y="3246020"/>
             <a:ext cx="1717808" cy="1568741"/>
           </a:xfrm>
           <a:prstGeom prst="rect">
@@ -6247,7 +6193,7 @@
         </p:nvSpPr>
         <p:spPr>
           <a:xfrm>
-            <a:off x="9137009" y="2679737"/>
+            <a:off x="10428914" y="3007650"/>
             <a:ext cx="1677872" cy="2414029"/>
           </a:xfrm>
           <a:prstGeom prst="rect">
@@ -6294,7 +6240,7 @@
         </p:nvSpPr>
         <p:spPr>
           <a:xfrm>
-            <a:off x="6097443" y="2849014"/>
+            <a:off x="7389348" y="3176927"/>
             <a:ext cx="1249118" cy="1674888"/>
           </a:xfrm>
           <a:prstGeom prst="flowChartMagneticDisk">
@@ -6346,7 +6292,7 @@
         </p:nvCxnSpPr>
         <p:spPr>
           <a:xfrm>
-            <a:off x="4278384" y="3264967"/>
+            <a:off x="5570289" y="3592880"/>
             <a:ext cx="1804751" cy="0"/>
           </a:xfrm>
           <a:prstGeom prst="straightConnector1">
@@ -6387,7 +6333,7 @@
         </p:nvCxnSpPr>
         <p:spPr>
           <a:xfrm>
-            <a:off x="7332255" y="3357246"/>
+            <a:off x="8624160" y="3685159"/>
             <a:ext cx="1804751" cy="0"/>
           </a:xfrm>
           <a:prstGeom prst="straightConnector1">
@@ -6426,7 +6372,7 @@
         </p:nvSpPr>
         <p:spPr>
           <a:xfrm>
-            <a:off x="9492969" y="2679737"/>
+            <a:off x="10784874" y="3007650"/>
             <a:ext cx="884211" cy="338554"/>
           </a:xfrm>
           <a:prstGeom prst="rect">
@@ -6464,7 +6410,7 @@
         </p:nvCxnSpPr>
         <p:spPr>
           <a:xfrm flipH="1" flipV="1">
-            <a:off x="4278381" y="4145959"/>
+            <a:off x="5570286" y="4473872"/>
             <a:ext cx="1804751" cy="1"/>
           </a:xfrm>
           <a:prstGeom prst="straightConnector1">
@@ -6503,7 +6449,7 @@
         </p:nvSpPr>
         <p:spPr>
           <a:xfrm>
-            <a:off x="4626397" y="2946023"/>
+            <a:off x="5918302" y="3273936"/>
             <a:ext cx="1346447" cy="276999"/>
           </a:xfrm>
           <a:prstGeom prst="rect">
@@ -6541,7 +6487,7 @@
         </p:nvCxnSpPr>
         <p:spPr>
           <a:xfrm flipH="1" flipV="1">
-            <a:off x="7332255" y="4145960"/>
+            <a:off x="8624160" y="4473873"/>
             <a:ext cx="1804751" cy="1"/>
           </a:xfrm>
           <a:prstGeom prst="straightConnector1">
@@ -6580,7 +6526,7 @@
         </p:nvSpPr>
         <p:spPr>
           <a:xfrm>
-            <a:off x="7688214" y="2864403"/>
+            <a:off x="8980119" y="3192316"/>
             <a:ext cx="1346447" cy="523220"/>
           </a:xfrm>
           <a:prstGeom prst="rect">
@@ -6616,7 +6562,7 @@
         </p:nvSpPr>
         <p:spPr>
           <a:xfrm>
-            <a:off x="4557310" y="3702478"/>
+            <a:off x="5849215" y="4030391"/>
             <a:ext cx="1346447" cy="461665"/>
           </a:xfrm>
           <a:prstGeom prst="rect">
@@ -6652,7 +6598,7 @@
         </p:nvSpPr>
         <p:spPr>
           <a:xfrm>
-            <a:off x="7665963" y="3640923"/>
+            <a:off x="8957868" y="3968836"/>
             <a:ext cx="1346447" cy="523220"/>
           </a:xfrm>
           <a:prstGeom prst="rect">
@@ -6688,8 +6634,8 @@
         </p:nvSpPr>
         <p:spPr>
           <a:xfrm>
-            <a:off x="2906920" y="3373856"/>
-            <a:ext cx="1178518" cy="338554"/>
+            <a:off x="3906803" y="3316534"/>
+            <a:ext cx="1754251" cy="338554"/>
           </a:xfrm>
           <a:prstGeom prst="rect">
             <a:avLst/>
@@ -6704,7 +6650,7 @@
           <a:p>
             <a:r>
               <a:rPr lang="en-US" sz="1600" dirty="0"/>
-              <a:t>Web App</a:t>
+              <a:t>Web Application</a:t>
             </a:r>
             <a:endParaRPr lang="LID4096" sz="1600" dirty="0"/>
           </a:p>
@@ -6769,7 +6715,7 @@
         </p:blipFill>
         <p:spPr bwMode="auto">
           <a:xfrm>
-            <a:off x="9792716" y="5901305"/>
+            <a:off x="11084621" y="6229218"/>
             <a:ext cx="578331" cy="578331"/>
           </a:xfrm>
           <a:prstGeom prst="rect">
@@ -6803,7 +6749,7 @@
         </p:nvCxnSpPr>
         <p:spPr>
           <a:xfrm>
-            <a:off x="9985800" y="5093766"/>
+            <a:off x="11277705" y="5421679"/>
             <a:ext cx="0" cy="807539"/>
           </a:xfrm>
           <a:prstGeom prst="straightConnector1">
@@ -6845,7 +6791,7 @@
         </p:nvCxnSpPr>
         <p:spPr>
           <a:xfrm>
-            <a:off x="9985800" y="1725845"/>
+            <a:off x="11277705" y="2053758"/>
             <a:ext cx="1168" cy="923892"/>
           </a:xfrm>
           <a:prstGeom prst="straightConnector1">
@@ -6899,7 +6845,7 @@
         </p:blipFill>
         <p:spPr bwMode="auto">
           <a:xfrm>
-            <a:off x="9376314" y="3157898"/>
+            <a:off x="10668219" y="3485811"/>
             <a:ext cx="1243976" cy="1796260"/>
           </a:xfrm>
           <a:prstGeom prst="rect">
@@ -6939,7 +6885,7 @@
         </p:blipFill>
         <p:spPr>
           <a:xfrm>
-            <a:off x="9376314" y="522593"/>
+            <a:off x="10668219" y="850506"/>
             <a:ext cx="1155024" cy="1220317"/>
           </a:xfrm>
           <a:prstGeom prst="rect">
@@ -6978,7 +6924,7 @@
         </p:blipFill>
         <p:spPr>
           <a:xfrm>
-            <a:off x="430633" y="2156376"/>
+            <a:off x="1722538" y="2484289"/>
             <a:ext cx="368710" cy="368710"/>
           </a:xfrm>
           <a:prstGeom prst="rect">
@@ -7002,7 +6948,7 @@
         </p:nvCxnSpPr>
         <p:spPr>
           <a:xfrm>
-            <a:off x="799343" y="2340731"/>
+            <a:off x="2091248" y="2668644"/>
             <a:ext cx="1761229" cy="924236"/>
           </a:xfrm>
           <a:prstGeom prst="straightConnector1">
@@ -7058,7 +7004,7 @@
         </p:blipFill>
         <p:spPr>
           <a:xfrm>
-            <a:off x="414646" y="2587464"/>
+            <a:off x="1706551" y="2915377"/>
             <a:ext cx="368710" cy="368710"/>
           </a:xfrm>
           <a:prstGeom prst="rect">
@@ -7082,7 +7028,7 @@
         </p:nvCxnSpPr>
         <p:spPr>
           <a:xfrm>
-            <a:off x="783356" y="2771819"/>
+            <a:off x="2075261" y="3099732"/>
             <a:ext cx="1761229" cy="924236"/>
           </a:xfrm>
           <a:prstGeom prst="straightConnector1">
@@ -7138,7 +7084,7 @@
         </p:blipFill>
         <p:spPr>
           <a:xfrm>
-            <a:off x="430633" y="4523902"/>
+            <a:off x="1722538" y="4851815"/>
             <a:ext cx="368710" cy="368710"/>
           </a:xfrm>
           <a:prstGeom prst="rect">
@@ -7163,7 +7109,7 @@
         </p:nvCxnSpPr>
         <p:spPr>
           <a:xfrm flipV="1">
-            <a:off x="799343" y="3880410"/>
+            <a:off x="2091248" y="4208323"/>
             <a:ext cx="1761229" cy="827847"/>
           </a:xfrm>
           <a:prstGeom prst="straightConnector1">
@@ -7190,10 +7136,10 @@
       </p:cxnSp>
       <p:sp>
         <p:nvSpPr>
-          <p:cNvPr id="31" name="TextBox 30">
-            <a:extLst>
-              <a:ext uri="{FF2B5EF4-FFF2-40B4-BE49-F238E27FC236}">
-                <a16:creationId xmlns:a16="http://schemas.microsoft.com/office/drawing/2014/main" id="{8C27333D-89B4-174C-663F-3CF98092F4EB}"/>
+          <p:cNvPr id="32" name="TextBox 31">
+            <a:extLst>
+              <a:ext uri="{FF2B5EF4-FFF2-40B4-BE49-F238E27FC236}">
+                <a16:creationId xmlns:a16="http://schemas.microsoft.com/office/drawing/2014/main" id="{2B49C915-109C-F08F-5D63-C5D38665680F}"/>
               </a:ext>
             </a:extLst>
           </p:cNvPr>
@@ -7202,7 +7148,7 @@
         </p:nvSpPr>
         <p:spPr>
           <a:xfrm>
-            <a:off x="460663" y="2972327"/>
+            <a:off x="1755463" y="3504699"/>
             <a:ext cx="280846" cy="523220"/>
           </a:xfrm>
           <a:prstGeom prst="rect">
@@ -7226,10 +7172,10 @@
       </p:sp>
       <p:sp>
         <p:nvSpPr>
-          <p:cNvPr id="32" name="TextBox 31">
-            <a:extLst>
-              <a:ext uri="{FF2B5EF4-FFF2-40B4-BE49-F238E27FC236}">
-                <a16:creationId xmlns:a16="http://schemas.microsoft.com/office/drawing/2014/main" id="{2B49C915-109C-F08F-5D63-C5D38665680F}"/>
+          <p:cNvPr id="35" name="TextBox 34">
+            <a:extLst>
+              <a:ext uri="{FF2B5EF4-FFF2-40B4-BE49-F238E27FC236}">
+                <a16:creationId xmlns:a16="http://schemas.microsoft.com/office/drawing/2014/main" id="{3B4A5EB1-4F74-4019-BF72-EB10B5C3C67B}"/>
               </a:ext>
             </a:extLst>
           </p:cNvPr>
@@ -7238,7 +7184,7 @@
         </p:nvSpPr>
         <p:spPr>
           <a:xfrm>
-            <a:off x="463558" y="3176786"/>
+            <a:off x="1771450" y="3725311"/>
             <a:ext cx="280846" cy="523220"/>
           </a:xfrm>
           <a:prstGeom prst="rect">
@@ -7262,10 +7208,10 @@
       </p:sp>
       <p:sp>
         <p:nvSpPr>
-          <p:cNvPr id="35" name="TextBox 34">
-            <a:extLst>
-              <a:ext uri="{FF2B5EF4-FFF2-40B4-BE49-F238E27FC236}">
-                <a16:creationId xmlns:a16="http://schemas.microsoft.com/office/drawing/2014/main" id="{3B4A5EB1-4F74-4019-BF72-EB10B5C3C67B}"/>
+          <p:cNvPr id="6" name="TextBox 5">
+            <a:extLst>
+              <a:ext uri="{FF2B5EF4-FFF2-40B4-BE49-F238E27FC236}">
+                <a16:creationId xmlns:a16="http://schemas.microsoft.com/office/drawing/2014/main" id="{80374B8F-CC24-FB5C-46C9-E52111CC2968}"/>
               </a:ext>
             </a:extLst>
           </p:cNvPr>
@@ -7274,8 +7220,8 @@
         </p:nvSpPr>
         <p:spPr>
           <a:xfrm>
-            <a:off x="479545" y="3397398"/>
-            <a:ext cx="280846" cy="523220"/>
+            <a:off x="119376" y="681785"/>
+            <a:ext cx="784189" cy="369332"/>
           </a:xfrm>
           <a:prstGeom prst="rect">
             <a:avLst/>
@@ -7289,13 +7235,104 @@
           <a:lstStyle/>
           <a:p>
             <a:r>
-              <a:rPr lang="en-US" sz="2800" b="1" dirty="0"/>
-              <a:t>.</a:t>
-            </a:r>
-            <a:endParaRPr lang="LID4096" sz="2800" b="1" dirty="0"/>
-          </a:p>
-        </p:txBody>
-      </p:sp>
+              <a:rPr lang="en-US" dirty="0"/>
+              <a:t>Goal:  </a:t>
+            </a:r>
+            <a:endParaRPr lang="LID4096" dirty="0"/>
+          </a:p>
+        </p:txBody>
+      </p:sp>
+      <p:sp>
+        <p:nvSpPr>
+          <p:cNvPr id="14" name="TextBox 13">
+            <a:extLst>
+              <a:ext uri="{FF2B5EF4-FFF2-40B4-BE49-F238E27FC236}">
+                <a16:creationId xmlns:a16="http://schemas.microsoft.com/office/drawing/2014/main" id="{D4F114D1-2821-EC63-469D-6A5E5969835F}"/>
+              </a:ext>
+            </a:extLst>
+          </p:cNvPr>
+          <p:cNvSpPr txBox="1"/>
+          <p:nvPr/>
+        </p:nvSpPr>
+        <p:spPr>
+          <a:xfrm>
+            <a:off x="583438" y="976561"/>
+            <a:ext cx="5945358" cy="923330"/>
+          </a:xfrm>
+          <a:prstGeom prst="rect">
+            <a:avLst/>
+          </a:prstGeom>
+          <a:noFill/>
+        </p:spPr>
+        <p:txBody>
+          <a:bodyPr wrap="square" rtlCol="0">
+            <a:spAutoFit/>
+          </a:bodyPr>
+          <a:lstStyle/>
+          <a:p>
+            <a:pPr marL="285750" indent="-285750">
+              <a:buFont typeface="Wingdings" panose="05000000000000000000" pitchFamily="2" charset="2"/>
+              <a:buChar char="ü"/>
+            </a:pPr>
+            <a:r>
+              <a:rPr lang="en-US" dirty="0"/>
+              <a:t>Facilitate a seamless experience for user when working with the pipeline</a:t>
+            </a:r>
+          </a:p>
+          <a:p>
+            <a:pPr marL="742950" lvl="1" indent="-285750">
+              <a:buFont typeface="Arial" panose="020B0604020202020204" pitchFamily="34" charset="0"/>
+              <a:buChar char="•"/>
+            </a:pPr>
+            <a:r>
+              <a:rPr lang="en-US" dirty="0"/>
+              <a:t>Hide internal implementation details of the pipeline</a:t>
+            </a:r>
+            <a:endParaRPr lang="LID4096" dirty="0"/>
+          </a:p>
+        </p:txBody>
+      </p:sp>
+      <p:cxnSp>
+        <p:nvCxnSpPr>
+          <p:cNvPr id="30" name="Straight Connector 29">
+            <a:extLst>
+              <a:ext uri="{FF2B5EF4-FFF2-40B4-BE49-F238E27FC236}">
+                <a16:creationId xmlns:a16="http://schemas.microsoft.com/office/drawing/2014/main" id="{93455165-5982-A671-EC96-FAA8C8BB6376}"/>
+              </a:ext>
+            </a:extLst>
+          </p:cNvPr>
+          <p:cNvCxnSpPr>
+            <a:cxnSpLocks/>
+          </p:cNvCxnSpPr>
+          <p:nvPr/>
+        </p:nvCxnSpPr>
+        <p:spPr>
+          <a:xfrm>
+            <a:off x="7170495" y="662450"/>
+            <a:ext cx="0" cy="6106172"/>
+          </a:xfrm>
+          <a:prstGeom prst="line">
+            <a:avLst/>
+          </a:prstGeom>
+          <a:ln w="28575">
+            <a:prstDash val="lgDashDot"/>
+          </a:ln>
+        </p:spPr>
+        <p:style>
+          <a:lnRef idx="1">
+            <a:schemeClr val="accent1"/>
+          </a:lnRef>
+          <a:fillRef idx="0">
+            <a:schemeClr val="accent1"/>
+          </a:fillRef>
+          <a:effectRef idx="0">
+            <a:schemeClr val="accent1"/>
+          </a:effectRef>
+          <a:fontRef idx="minor">
+            <a:schemeClr val="tx1"/>
+          </a:fontRef>
+        </p:style>
+      </p:cxnSp>
     </p:spTree>
     <p:extLst>
       <p:ext uri="{BB962C8B-B14F-4D97-AF65-F5344CB8AC3E}">
@@ -7381,10 +7418,15 @@
                                 </p:cTn>
                               </p:par>
                               <p:par>
-                                <p:cTn id="9" presetID="1" presetClass="entr" presetSubtype="0" fill="hold" grpId="0" nodeType="withEffect">
+                                <p:cTn id="9" presetID="1" presetClass="entr" presetSubtype="0" fill="hold" grpId="0" nodeType="withEffect" nodePh="1">
                                   <p:stCondLst>
                                     <p:cond delay="0"/>
                                   </p:stCondLst>
+                                  <p:endCondLst>
+                                    <p:cond evt="begin" delay="0">
+                                      <p:tn val="9"/>
+                                    </p:cond>
+                                  </p:endCondLst>
                                   <p:childTnLst>
                                     <p:set>
                                       <p:cBhvr>
@@ -7408,10 +7450,15 @@
                                 </p:cTn>
                               </p:par>
                               <p:par>
-                                <p:cTn id="11" presetID="1" presetClass="entr" presetSubtype="0" fill="hold" grpId="0" nodeType="withEffect">
+                                <p:cTn id="11" presetID="1" presetClass="entr" presetSubtype="0" fill="hold" grpId="0" nodeType="withEffect" nodePh="1">
                                   <p:stCondLst>
                                     <p:cond delay="0"/>
                                   </p:stCondLst>
+                                  <p:endCondLst>
+                                    <p:cond evt="begin" delay="0">
+                                      <p:tn val="11"/>
+                                    </p:cond>
+                                  </p:endCondLst>
                                   <p:childTnLst>
                                     <p:set>
                                       <p:cBhvr>
@@ -8088,6 +8135,51 @@
                       </p:childTnLst>
                     </p:cTn>
                   </p:par>
+                  <p:par>
+                    <p:cTn id="63" fill="hold">
+                      <p:stCondLst>
+                        <p:cond delay="indefinite"/>
+                      </p:stCondLst>
+                      <p:childTnLst>
+                        <p:par>
+                          <p:cTn id="64" fill="hold">
+                            <p:stCondLst>
+                              <p:cond delay="0"/>
+                            </p:stCondLst>
+                            <p:childTnLst>
+                              <p:par>
+                                <p:cTn id="65" presetID="1" presetClass="entr" presetSubtype="0" fill="hold" nodeType="clickEffect">
+                                  <p:stCondLst>
+                                    <p:cond delay="0"/>
+                                  </p:stCondLst>
+                                  <p:childTnLst>
+                                    <p:set>
+                                      <p:cBhvr>
+                                        <p:cTn id="66" dur="1" fill="hold">
+                                          <p:stCondLst>
+                                            <p:cond delay="0"/>
+                                          </p:stCondLst>
+                                        </p:cTn>
+                                        <p:tgtEl>
+                                          <p:spTgt spid="30"/>
+                                        </p:tgtEl>
+                                        <p:attrNameLst>
+                                          <p:attrName>style.visibility</p:attrName>
+                                        </p:attrNameLst>
+                                      </p:cBhvr>
+                                      <p:to>
+                                        <p:strVal val="visible"/>
+                                      </p:to>
+                                    </p:set>
+                                  </p:childTnLst>
+                                </p:cTn>
+                              </p:par>
+                            </p:childTnLst>
+                          </p:cTn>
+                        </p:par>
+                      </p:childTnLst>
+                    </p:cTn>
+                  </p:par>
                 </p:childTnLst>
               </p:cTn>
               <p:prevCondLst>
@@ -9114,6 +9206,189 @@
       </p:sp>
       <p:sp>
         <p:nvSpPr>
+          <p:cNvPr id="4" name="Title 1">
+            <a:extLst>
+              <a:ext uri="{FF2B5EF4-FFF2-40B4-BE49-F238E27FC236}">
+                <a16:creationId xmlns:a16="http://schemas.microsoft.com/office/drawing/2014/main" id="{4E1AA088-AFD5-BA5E-E2B5-9C3125594E30}"/>
+              </a:ext>
+            </a:extLst>
+          </p:cNvPr>
+          <p:cNvSpPr>
+            <a:spLocks noGrp="1"/>
+          </p:cNvSpPr>
+          <p:nvPr>
+            <p:ph type="title"/>
+          </p:nvPr>
+        </p:nvSpPr>
+        <p:spPr>
+          <a:xfrm>
+            <a:off x="3866981" y="2789880"/>
+            <a:ext cx="3934780" cy="1000439"/>
+          </a:xfrm>
+        </p:spPr>
+        <p:txBody>
+          <a:bodyPr>
+            <a:noAutofit/>
+          </a:bodyPr>
+          <a:lstStyle/>
+          <a:p>
+            <a:r>
+              <a:rPr lang="en-US" sz="2800" b="1" dirty="0">
+                <a:solidFill>
+                  <a:schemeClr val="accent1"/>
+                </a:solidFill>
+                <a:latin typeface="Avenir Next" panose="020B0503020202020204" pitchFamily="34" charset="0"/>
+              </a:rPr>
+              <a:t>Demo</a:t>
+            </a:r>
+            <a:r>
+              <a:rPr lang="en-US" sz="2800" dirty="0">
+                <a:solidFill>
+                  <a:schemeClr val="accent1"/>
+                </a:solidFill>
+                <a:latin typeface="Avenir Next" panose="020B0503020202020204" pitchFamily="34" charset="0"/>
+              </a:rPr>
+              <a:t>:  Running yolo on surf</a:t>
+            </a:r>
+            <a:endParaRPr lang="en-NL" sz="2800" dirty="0">
+              <a:solidFill>
+                <a:schemeClr val="accent1"/>
+              </a:solidFill>
+              <a:latin typeface="Avenir Next" panose="020B0503020202020204" pitchFamily="34" charset="0"/>
+            </a:endParaRPr>
+          </a:p>
+        </p:txBody>
+      </p:sp>
+    </p:spTree>
+    <p:extLst>
+      <p:ext uri="{BB962C8B-B14F-4D97-AF65-F5344CB8AC3E}">
+        <p14:creationId xmlns:p14="http://schemas.microsoft.com/office/powerpoint/2010/main" val="1122341232"/>
+      </p:ext>
+    </p:extLst>
+  </p:cSld>
+  <p:clrMapOvr>
+    <a:masterClrMapping/>
+  </p:clrMapOvr>
+  <mc:AlternateContent xmlns:mc="http://schemas.openxmlformats.org/markup-compatibility/2006" xmlns:p14="http://schemas.microsoft.com/office/powerpoint/2010/main">
+    <mc:Choice Requires="p14">
+      <p:transition spd="med" p14:dur="700">
+        <p:fade/>
+      </p:transition>
+    </mc:Choice>
+    <mc:Fallback xmlns="">
+      <p:transition spd="med">
+        <p:fade/>
+      </p:transition>
+    </mc:Fallback>
+  </mc:AlternateContent>
+</p:sld>
+</file>
+
+<file path=ppt/slides/slide14.xml><?xml version="1.0" encoding="utf-8"?>
+<p:sld xmlns:a="http://schemas.openxmlformats.org/drawingml/2006/main" xmlns:r="http://schemas.openxmlformats.org/officeDocument/2006/relationships" xmlns:p="http://schemas.openxmlformats.org/presentationml/2006/main">
+  <p:cSld>
+    <p:spTree>
+      <p:nvGrpSpPr>
+        <p:cNvPr id="1" name=""/>
+        <p:cNvGrpSpPr/>
+        <p:nvPr/>
+      </p:nvGrpSpPr>
+      <p:grpSpPr>
+        <a:xfrm>
+          <a:off x="0" y="0"/>
+          <a:ext cx="0" cy="0"/>
+          <a:chOff x="0" y="0"/>
+          <a:chExt cx="0" cy="0"/>
+        </a:xfrm>
+      </p:grpSpPr>
+      <p:pic>
+        <p:nvPicPr>
+          <p:cNvPr id="37" name="Content Placeholder 5">
+            <a:extLst>
+              <a:ext uri="{FF2B5EF4-FFF2-40B4-BE49-F238E27FC236}">
+                <a16:creationId xmlns:a16="http://schemas.microsoft.com/office/drawing/2014/main" id="{699EBC18-2E81-B250-63C4-C4BD32D949A2}"/>
+              </a:ext>
+            </a:extLst>
+          </p:cNvPr>
+          <p:cNvPicPr>
+            <a:picLocks noChangeAspect="1"/>
+          </p:cNvPicPr>
+          <p:nvPr/>
+        </p:nvPicPr>
+        <p:blipFill>
+          <a:blip r:embed="rId2"/>
+          <a:stretch>
+            <a:fillRect/>
+          </a:stretch>
+        </p:blipFill>
+        <p:spPr>
+          <a:xfrm>
+            <a:off x="12179100" y="6320245"/>
+            <a:ext cx="643777" cy="487304"/>
+          </a:xfrm>
+          <a:prstGeom prst="rect">
+            <a:avLst/>
+          </a:prstGeom>
+        </p:spPr>
+      </p:pic>
+      <p:sp>
+        <p:nvSpPr>
+          <p:cNvPr id="3" name="Title 1">
+            <a:extLst>
+              <a:ext uri="{FF2B5EF4-FFF2-40B4-BE49-F238E27FC236}">
+                <a16:creationId xmlns:a16="http://schemas.microsoft.com/office/drawing/2014/main" id="{E977A5A5-2ED2-4078-A33C-811E1CFCCBAE}"/>
+              </a:ext>
+            </a:extLst>
+          </p:cNvPr>
+          <p:cNvSpPr txBox="1">
+            <a:spLocks/>
+          </p:cNvSpPr>
+          <p:nvPr/>
+        </p:nvSpPr>
+        <p:spPr>
+          <a:xfrm>
+            <a:off x="470252" y="126472"/>
+            <a:ext cx="9874044" cy="443000"/>
+          </a:xfrm>
+          <a:prstGeom prst="rect">
+            <a:avLst/>
+          </a:prstGeom>
+        </p:spPr>
+        <p:txBody>
+          <a:bodyPr vert="horz" lIns="0" tIns="0" rIns="0" bIns="0" rtlCol="0" anchor="t" anchorCtr="0">
+            <a:normAutofit/>
+          </a:bodyPr>
+          <a:lstStyle>
+            <a:lvl1pPr algn="l" defTabSz="514350" rtl="0" eaLnBrk="1" latinLnBrk="0" hangingPunct="1">
+              <a:lnSpc>
+                <a:spcPts val="2700"/>
+              </a:lnSpc>
+              <a:spcBef>
+                <a:spcPct val="0"/>
+              </a:spcBef>
+              <a:buNone/>
+              <a:defRPr sz="2700" b="1" kern="1200">
+                <a:solidFill>
+                  <a:schemeClr val="bg2"/>
+                </a:solidFill>
+                <a:latin typeface="+mj-lt"/>
+                <a:ea typeface="+mj-ea"/>
+                <a:cs typeface="+mj-cs"/>
+              </a:defRPr>
+            </a:lvl1pPr>
+          </a:lstStyle>
+          <a:p>
+            <a:endParaRPr lang="en-NL" sz="1314" dirty="0">
+              <a:solidFill>
+                <a:schemeClr val="accent1"/>
+              </a:solidFill>
+              <a:latin typeface="Avenir Next" panose="020B0503020202020204" pitchFamily="34" charset="0"/>
+            </a:endParaRPr>
+          </a:p>
+        </p:txBody>
+      </p:sp>
+      <p:sp>
+        <p:nvSpPr>
           <p:cNvPr id="2" name="TextBox 1">
             <a:extLst>
               <a:ext uri="{FF2B5EF4-FFF2-40B4-BE49-F238E27FC236}">
@@ -9335,7 +9610,7 @@
         </p:nvSpPr>
         <p:spPr>
           <a:xfrm>
-            <a:off x="5063451" y="3394312"/>
+            <a:off x="4560111" y="3352498"/>
             <a:ext cx="2226582" cy="1015663"/>
           </a:xfrm>
           <a:prstGeom prst="rect">
@@ -9645,7 +9920,7 @@
 </p:sld>
 </file>
 
-<file path=ppt/slides/slide14.xml><?xml version="1.0" encoding="utf-8"?>
+<file path=ppt/slides/slide15.xml><?xml version="1.0" encoding="utf-8"?>
 <p:sld xmlns:a="http://schemas.openxmlformats.org/drawingml/2006/main" xmlns:r="http://schemas.openxmlformats.org/officeDocument/2006/relationships" xmlns:p="http://schemas.openxmlformats.org/presentationml/2006/main">
   <p:cSld>
     <p:spTree>
@@ -9792,7 +10067,7 @@
         </p:nvSpPr>
         <p:spPr>
           <a:xfrm>
-            <a:off x="1414701" y="4460124"/>
+            <a:off x="1779026" y="4555598"/>
             <a:ext cx="1904300" cy="1629562"/>
           </a:xfrm>
           <a:prstGeom prst="flowChartConnector">
@@ -9853,7 +10128,7 @@
         </p:nvSpPr>
         <p:spPr>
           <a:xfrm>
-            <a:off x="5376272" y="4460124"/>
+            <a:off x="6122892" y="4560288"/>
             <a:ext cx="1904300" cy="1629562"/>
           </a:xfrm>
           <a:prstGeom prst="flowChartConnector">
@@ -9917,8 +10192,8 @@
         </p:nvCxnSpPr>
         <p:spPr>
           <a:xfrm>
-            <a:off x="3319001" y="5274905"/>
-            <a:ext cx="2057271" cy="0"/>
+            <a:off x="3683326" y="5370379"/>
+            <a:ext cx="2439566" cy="4690"/>
           </a:xfrm>
           <a:prstGeom prst="straightConnector1">
             <a:avLst/>
@@ -9956,7 +10231,7 @@
         </p:nvSpPr>
         <p:spPr>
           <a:xfrm>
-            <a:off x="9337843" y="4460124"/>
+            <a:off x="10084463" y="4560288"/>
             <a:ext cx="1904300" cy="1629562"/>
           </a:xfrm>
           <a:prstGeom prst="flowChartConnector">
@@ -10017,7 +10292,7 @@
         </p:nvCxnSpPr>
         <p:spPr>
           <a:xfrm>
-            <a:off x="7280572" y="5274905"/>
+            <a:off x="8027192" y="5375069"/>
             <a:ext cx="2057271" cy="0"/>
           </a:xfrm>
           <a:prstGeom prst="straightConnector1">
@@ -10042,36 +10317,6 @@
           </a:fontRef>
         </p:style>
       </p:cxnSp>
-      <p:pic>
-        <p:nvPicPr>
-          <p:cNvPr id="28" name="Picture 27">
-            <a:extLst>
-              <a:ext uri="{FF2B5EF4-FFF2-40B4-BE49-F238E27FC236}">
-                <a16:creationId xmlns:a16="http://schemas.microsoft.com/office/drawing/2014/main" id="{8ECC4F42-D1F4-41D4-5B39-2290D9DC988F}"/>
-              </a:ext>
-            </a:extLst>
-          </p:cNvPr>
-          <p:cNvPicPr>
-            <a:picLocks noChangeAspect="1"/>
-          </p:cNvPicPr>
-          <p:nvPr/>
-        </p:nvPicPr>
-        <p:blipFill>
-          <a:blip r:embed="rId4"/>
-          <a:stretch>
-            <a:fillRect/>
-          </a:stretch>
-        </p:blipFill>
-        <p:spPr>
-          <a:xfrm>
-            <a:off x="242529" y="1939738"/>
-            <a:ext cx="1520176" cy="1617049"/>
-          </a:xfrm>
-          <a:prstGeom prst="rect">
-            <a:avLst/>
-          </a:prstGeom>
-        </p:spPr>
-      </p:pic>
       <p:cxnSp>
         <p:nvCxnSpPr>
           <p:cNvPr id="30" name="Straight Connector 29">
@@ -10083,13 +10328,14 @@
           </p:cNvPr>
           <p:cNvCxnSpPr>
             <a:cxnSpLocks/>
+            <a:endCxn id="16" idx="1"/>
           </p:cNvCxnSpPr>
           <p:nvPr/>
         </p:nvCxnSpPr>
         <p:spPr>
           <a:xfrm>
-            <a:off x="1002617" y="3536821"/>
-            <a:ext cx="824168" cy="1056346"/>
+            <a:off x="911082" y="3627743"/>
+            <a:ext cx="1146822" cy="1166499"/>
           </a:xfrm>
           <a:prstGeom prst="line">
             <a:avLst/>
@@ -10113,36 +10359,6 @@
           </a:fontRef>
         </p:style>
       </p:cxnSp>
-      <p:pic>
-        <p:nvPicPr>
-          <p:cNvPr id="35" name="Picture 34">
-            <a:extLst>
-              <a:ext uri="{FF2B5EF4-FFF2-40B4-BE49-F238E27FC236}">
-                <a16:creationId xmlns:a16="http://schemas.microsoft.com/office/drawing/2014/main" id="{FBF8E4DF-6D1E-BF36-F0AB-D2C39B9A2201}"/>
-              </a:ext>
-            </a:extLst>
-          </p:cNvPr>
-          <p:cNvPicPr>
-            <a:picLocks noChangeAspect="1"/>
-          </p:cNvPicPr>
-          <p:nvPr/>
-        </p:nvPicPr>
-        <p:blipFill>
-          <a:blip r:embed="rId5"/>
-          <a:stretch>
-            <a:fillRect/>
-          </a:stretch>
-        </p:blipFill>
-        <p:spPr>
-          <a:xfrm>
-            <a:off x="2044045" y="1907258"/>
-            <a:ext cx="1663956" cy="1241500"/>
-          </a:xfrm>
-          <a:prstGeom prst="rect">
-            <a:avLst/>
-          </a:prstGeom>
-        </p:spPr>
-      </p:pic>
       <p:cxnSp>
         <p:nvCxnSpPr>
           <p:cNvPr id="36" name="Straight Connector 35">
@@ -10154,15 +10370,14 @@
           </p:cNvPr>
           <p:cNvCxnSpPr>
             <a:cxnSpLocks/>
-            <a:stCxn id="35" idx="2"/>
             <a:endCxn id="16" idx="0"/>
           </p:cNvCxnSpPr>
           <p:nvPr/>
         </p:nvCxnSpPr>
         <p:spPr>
           <a:xfrm flipH="1">
-            <a:off x="2366851" y="3148758"/>
-            <a:ext cx="509172" cy="1311366"/>
+            <a:off x="2731176" y="3548866"/>
+            <a:ext cx="448316" cy="1006732"/>
           </a:xfrm>
           <a:prstGeom prst="line">
             <a:avLst/>
@@ -10186,36 +10401,6 @@
           </a:fontRef>
         </p:style>
       </p:cxnSp>
-      <p:pic>
-        <p:nvPicPr>
-          <p:cNvPr id="41" name="Picture 40">
-            <a:extLst>
-              <a:ext uri="{FF2B5EF4-FFF2-40B4-BE49-F238E27FC236}">
-                <a16:creationId xmlns:a16="http://schemas.microsoft.com/office/drawing/2014/main" id="{A1E8F2CA-CA76-32C5-FEC3-28E41BB50CFA}"/>
-              </a:ext>
-            </a:extLst>
-          </p:cNvPr>
-          <p:cNvPicPr>
-            <a:picLocks noChangeAspect="1"/>
-          </p:cNvPicPr>
-          <p:nvPr/>
-        </p:nvPicPr>
-        <p:blipFill>
-          <a:blip r:embed="rId6"/>
-          <a:stretch>
-            <a:fillRect/>
-          </a:stretch>
-        </p:blipFill>
-        <p:spPr>
-          <a:xfrm>
-            <a:off x="4030807" y="1874447"/>
-            <a:ext cx="2383314" cy="1682339"/>
-          </a:xfrm>
-          <a:prstGeom prst="rect">
-            <a:avLst/>
-          </a:prstGeom>
-        </p:spPr>
-      </p:pic>
       <p:cxnSp>
         <p:nvCxnSpPr>
           <p:cNvPr id="42" name="Straight Connector 41">
@@ -10227,13 +10412,14 @@
           </p:cNvPr>
           <p:cNvCxnSpPr>
             <a:cxnSpLocks/>
+            <a:endCxn id="16" idx="7"/>
           </p:cNvCxnSpPr>
           <p:nvPr/>
         </p:nvCxnSpPr>
         <p:spPr>
           <a:xfrm flipH="1">
-            <a:off x="3064415" y="3352773"/>
-            <a:ext cx="1283221" cy="1374971"/>
+            <a:off x="3404448" y="3392508"/>
+            <a:ext cx="1813902" cy="1401734"/>
           </a:xfrm>
           <a:prstGeom prst="line">
             <a:avLst/>
@@ -10336,7 +10522,7 @@
         </p:nvSpPr>
         <p:spPr>
           <a:xfrm>
-            <a:off x="8040745" y="4997906"/>
+            <a:off x="8787365" y="5098070"/>
             <a:ext cx="1634835" cy="276999"/>
           </a:xfrm>
           <a:prstGeom prst="rect">
@@ -10372,7 +10558,7 @@
         </p:nvSpPr>
         <p:spPr>
           <a:xfrm>
-            <a:off x="3965810" y="4993216"/>
+            <a:off x="4712430" y="5093380"/>
             <a:ext cx="1634835" cy="276999"/>
           </a:xfrm>
           <a:prstGeom prst="rect">
@@ -10409,7 +10595,7 @@
         <p:spPr>
           <a:xfrm>
             <a:off x="87340" y="827576"/>
-            <a:ext cx="5063500" cy="646331"/>
+            <a:ext cx="5063500" cy="369332"/>
           </a:xfrm>
           <a:prstGeom prst="rect">
             <a:avLst/>
@@ -10428,12 +10614,153 @@
             </a:pPr>
             <a:r>
               <a:rPr lang="en-US" dirty="0"/>
-              <a:t>First, prepare an image by following the following steps</a:t>
+              <a:t>First,  create an image by following these steps: </a:t>
             </a:r>
             <a:endParaRPr lang="LID4096" dirty="0"/>
           </a:p>
         </p:txBody>
       </p:sp>
+      <p:pic>
+        <p:nvPicPr>
+          <p:cNvPr id="1036" name="Picture 12">
+            <a:extLst>
+              <a:ext uri="{FF2B5EF4-FFF2-40B4-BE49-F238E27FC236}">
+                <a16:creationId xmlns:a16="http://schemas.microsoft.com/office/drawing/2014/main" id="{E8394C7C-A543-0A23-4351-2817D2670D34}"/>
+              </a:ext>
+            </a:extLst>
+          </p:cNvPr>
+          <p:cNvPicPr>
+            <a:picLocks noChangeAspect="1" noChangeArrowheads="1"/>
+          </p:cNvPicPr>
+          <p:nvPr/>
+        </p:nvPicPr>
+        <p:blipFill>
+          <a:blip r:embed="rId4">
+            <a:extLst>
+              <a:ext uri="{28A0092B-C50C-407E-A947-70E740481C1C}">
+                <a14:useLocalDpi xmlns:a14="http://schemas.microsoft.com/office/drawing/2010/main" val="0"/>
+              </a:ext>
+            </a:extLst>
+          </a:blip>
+          <a:srcRect/>
+          <a:stretch>
+            <a:fillRect/>
+          </a:stretch>
+        </p:blipFill>
+        <p:spPr bwMode="auto">
+          <a:xfrm>
+            <a:off x="4887397" y="1322642"/>
+            <a:ext cx="2205239" cy="2137501"/>
+          </a:xfrm>
+          <a:prstGeom prst="rect">
+            <a:avLst/>
+          </a:prstGeom>
+          <a:noFill/>
+          <a:extLst>
+            <a:ext uri="{909E8E84-426E-40DD-AFC4-6F175D3DCCD1}">
+              <a14:hiddenFill xmlns:a14="http://schemas.microsoft.com/office/drawing/2010/main">
+                <a:solidFill>
+                  <a:srgbClr val="FFFFFF"/>
+                </a:solidFill>
+              </a14:hiddenFill>
+            </a:ext>
+          </a:extLst>
+        </p:spPr>
+      </p:pic>
+      <p:pic>
+        <p:nvPicPr>
+          <p:cNvPr id="1038" name="Picture 14">
+            <a:extLst>
+              <a:ext uri="{FF2B5EF4-FFF2-40B4-BE49-F238E27FC236}">
+                <a16:creationId xmlns:a16="http://schemas.microsoft.com/office/drawing/2014/main" id="{5C2360A6-D969-932D-0BCD-B53BA07EF919}"/>
+              </a:ext>
+            </a:extLst>
+          </p:cNvPr>
+          <p:cNvPicPr>
+            <a:picLocks noChangeAspect="1" noChangeArrowheads="1"/>
+          </p:cNvPicPr>
+          <p:nvPr/>
+        </p:nvPicPr>
+        <p:blipFill>
+          <a:blip r:embed="rId5">
+            <a:extLst>
+              <a:ext uri="{28A0092B-C50C-407E-A947-70E740481C1C}">
+                <a14:useLocalDpi xmlns:a14="http://schemas.microsoft.com/office/drawing/2010/main" val="0"/>
+              </a:ext>
+            </a:extLst>
+          </a:blip>
+          <a:srcRect/>
+          <a:stretch>
+            <a:fillRect/>
+          </a:stretch>
+        </p:blipFill>
+        <p:spPr bwMode="auto">
+          <a:xfrm>
+            <a:off x="2457477" y="1270182"/>
+            <a:ext cx="2433577" cy="2358825"/>
+          </a:xfrm>
+          <a:prstGeom prst="rect">
+            <a:avLst/>
+          </a:prstGeom>
+          <a:noFill/>
+          <a:extLst>
+            <a:ext uri="{909E8E84-426E-40DD-AFC4-6F175D3DCCD1}">
+              <a14:hiddenFill xmlns:a14="http://schemas.microsoft.com/office/drawing/2010/main">
+                <a:solidFill>
+                  <a:srgbClr val="FFFFFF"/>
+                </a:solidFill>
+              </a14:hiddenFill>
+            </a:ext>
+          </a:extLst>
+        </p:spPr>
+      </p:pic>
+      <p:pic>
+        <p:nvPicPr>
+          <p:cNvPr id="1040" name="Picture 16">
+            <a:extLst>
+              <a:ext uri="{FF2B5EF4-FFF2-40B4-BE49-F238E27FC236}">
+                <a16:creationId xmlns:a16="http://schemas.microsoft.com/office/drawing/2014/main" id="{41AFF182-2F87-80DB-6ADD-77AB90B672B4}"/>
+              </a:ext>
+            </a:extLst>
+          </p:cNvPr>
+          <p:cNvPicPr>
+            <a:picLocks noChangeAspect="1" noChangeArrowheads="1"/>
+          </p:cNvPicPr>
+          <p:nvPr/>
+        </p:nvPicPr>
+        <p:blipFill>
+          <a:blip r:embed="rId6">
+            <a:extLst>
+              <a:ext uri="{28A0092B-C50C-407E-A947-70E740481C1C}">
+                <a14:useLocalDpi xmlns:a14="http://schemas.microsoft.com/office/drawing/2010/main" val="0"/>
+              </a:ext>
+            </a:extLst>
+          </a:blip>
+          <a:srcRect/>
+          <a:stretch>
+            <a:fillRect/>
+          </a:stretch>
+        </p:blipFill>
+        <p:spPr bwMode="auto">
+          <a:xfrm>
+            <a:off x="80364" y="1322642"/>
+            <a:ext cx="2201070" cy="2358826"/>
+          </a:xfrm>
+          <a:prstGeom prst="rect">
+            <a:avLst/>
+          </a:prstGeom>
+          <a:noFill/>
+          <a:extLst>
+            <a:ext uri="{909E8E84-426E-40DD-AFC4-6F175D3DCCD1}">
+              <a14:hiddenFill xmlns:a14="http://schemas.microsoft.com/office/drawing/2010/main">
+                <a:solidFill>
+                  <a:srgbClr val="FFFFFF"/>
+                </a:solidFill>
+              </a14:hiddenFill>
+            </a:ext>
+          </a:extLst>
+        </p:spPr>
+      </p:pic>
     </p:spTree>
     <p:extLst>
       <p:ext uri="{BB962C8B-B14F-4D97-AF65-F5344CB8AC3E}">
@@ -10490,51 +10817,6 @@
                                           </p:stCondLst>
                                         </p:cTn>
                                         <p:tgtEl>
-                                          <p:spTgt spid="5"/>
-                                        </p:tgtEl>
-                                        <p:attrNameLst>
-                                          <p:attrName>style.visibility</p:attrName>
-                                        </p:attrNameLst>
-                                      </p:cBhvr>
-                                      <p:to>
-                                        <p:strVal val="visible"/>
-                                      </p:to>
-                                    </p:set>
-                                  </p:childTnLst>
-                                </p:cTn>
-                              </p:par>
-                            </p:childTnLst>
-                          </p:cTn>
-                        </p:par>
-                      </p:childTnLst>
-                    </p:cTn>
-                  </p:par>
-                  <p:par>
-                    <p:cTn id="7" fill="hold">
-                      <p:stCondLst>
-                        <p:cond delay="indefinite"/>
-                      </p:stCondLst>
-                      <p:childTnLst>
-                        <p:par>
-                          <p:cTn id="8" fill="hold">
-                            <p:stCondLst>
-                              <p:cond delay="0"/>
-                            </p:stCondLst>
-                            <p:childTnLst>
-                              <p:par>
-                                <p:cTn id="9" presetID="1" presetClass="entr" presetSubtype="0" fill="hold" grpId="0" nodeType="clickEffect">
-                                  <p:stCondLst>
-                                    <p:cond delay="0"/>
-                                  </p:stCondLst>
-                                  <p:childTnLst>
-                                    <p:set>
-                                      <p:cBhvr>
-                                        <p:cTn id="10" dur="1" fill="hold">
-                                          <p:stCondLst>
-                                            <p:cond delay="0"/>
-                                          </p:stCondLst>
-                                        </p:cTn>
-                                        <p:tgtEl>
                                           <p:spTgt spid="16"/>
                                         </p:tgtEl>
                                         <p:attrNameLst>
@@ -10548,26 +10830,89 @@
                                   </p:childTnLst>
                                 </p:cTn>
                               </p:par>
-                            </p:childTnLst>
-                          </p:cTn>
-                        </p:par>
-                      </p:childTnLst>
-                    </p:cTn>
-                  </p:par>
-                  <p:par>
-                    <p:cTn id="11" fill="hold">
-                      <p:stCondLst>
-                        <p:cond delay="indefinite"/>
-                      </p:stCondLst>
-                      <p:childTnLst>
-                        <p:par>
-                          <p:cTn id="12" fill="hold">
-                            <p:stCondLst>
-                              <p:cond delay="0"/>
-                            </p:stCondLst>
-                            <p:childTnLst>
                               <p:par>
-                                <p:cTn id="13" presetID="1" presetClass="entr" presetSubtype="0" fill="hold" nodeType="clickEffect">
+                                <p:cTn id="7" presetID="1" presetClass="entr" presetSubtype="0" fill="hold" nodeType="withEffect">
+                                  <p:stCondLst>
+                                    <p:cond delay="0"/>
+                                  </p:stCondLst>
+                                  <p:childTnLst>
+                                    <p:set>
+                                      <p:cBhvr>
+                                        <p:cTn id="8" dur="1" fill="hold">
+                                          <p:stCondLst>
+                                            <p:cond delay="0"/>
+                                          </p:stCondLst>
+                                        </p:cTn>
+                                        <p:tgtEl>
+                                          <p:spTgt spid="42"/>
+                                        </p:tgtEl>
+                                        <p:attrNameLst>
+                                          <p:attrName>style.visibility</p:attrName>
+                                        </p:attrNameLst>
+                                      </p:cBhvr>
+                                      <p:to>
+                                        <p:strVal val="visible"/>
+                                      </p:to>
+                                    </p:set>
+                                  </p:childTnLst>
+                                </p:cTn>
+                              </p:par>
+                              <p:par>
+                                <p:cTn id="9" presetID="1" presetClass="entr" presetSubtype="0" fill="hold" nodeType="withEffect">
+                                  <p:stCondLst>
+                                    <p:cond delay="0"/>
+                                  </p:stCondLst>
+                                  <p:childTnLst>
+                                    <p:set>
+                                      <p:cBhvr>
+                                        <p:cTn id="10" dur="1" fill="hold">
+                                          <p:stCondLst>
+                                            <p:cond delay="0"/>
+                                          </p:stCondLst>
+                                        </p:cTn>
+                                        <p:tgtEl>
+                                          <p:spTgt spid="1036"/>
+                                        </p:tgtEl>
+                                        <p:attrNameLst>
+                                          <p:attrName>style.visibility</p:attrName>
+                                        </p:attrNameLst>
+                                      </p:cBhvr>
+                                      <p:to>
+                                        <p:strVal val="visible"/>
+                                      </p:to>
+                                    </p:set>
+                                  </p:childTnLst>
+                                </p:cTn>
+                              </p:par>
+                              <p:par>
+                                <p:cTn id="11" presetID="1" presetClass="entr" presetSubtype="0" fill="hold" nodeType="withEffect">
+                                  <p:stCondLst>
+                                    <p:cond delay="0"/>
+                                  </p:stCondLst>
+                                  <p:childTnLst>
+                                    <p:set>
+                                      <p:cBhvr>
+                                        <p:cTn id="12" dur="1" fill="hold">
+                                          <p:stCondLst>
+                                            <p:cond delay="0"/>
+                                          </p:stCondLst>
+                                        </p:cTn>
+                                        <p:tgtEl>
+                                          <p:spTgt spid="1038"/>
+                                        </p:tgtEl>
+                                        <p:attrNameLst>
+                                          <p:attrName>style.visibility</p:attrName>
+                                        </p:attrNameLst>
+                                      </p:cBhvr>
+                                      <p:to>
+                                        <p:strVal val="visible"/>
+                                      </p:to>
+                                    </p:set>
+                                  </p:childTnLst>
+                                </p:cTn>
+                              </p:par>
+                              <p:par>
+                                <p:cTn id="13" presetID="1" presetClass="entr" presetSubtype="0" fill="hold" nodeType="withEffect">
                                   <p:stCondLst>
                                     <p:cond delay="0"/>
                                   </p:stCondLst>
@@ -10580,7 +10925,7 @@
                                           </p:stCondLst>
                                         </p:cTn>
                                         <p:tgtEl>
-                                          <p:spTgt spid="30"/>
+                                          <p:spTgt spid="36"/>
                                         </p:tgtEl>
                                         <p:attrNameLst>
                                           <p:attrName>style.visibility</p:attrName>
@@ -10607,7 +10952,7 @@
                                           </p:stCondLst>
                                         </p:cTn>
                                         <p:tgtEl>
-                                          <p:spTgt spid="36"/>
+                                          <p:spTgt spid="30"/>
                                         </p:tgtEl>
                                         <p:attrNameLst>
                                           <p:attrName>style.visibility</p:attrName>
@@ -10634,88 +10979,7 @@
                                           </p:stCondLst>
                                         </p:cTn>
                                         <p:tgtEl>
-                                          <p:spTgt spid="42"/>
-                                        </p:tgtEl>
-                                        <p:attrNameLst>
-                                          <p:attrName>style.visibility</p:attrName>
-                                        </p:attrNameLst>
-                                      </p:cBhvr>
-                                      <p:to>
-                                        <p:strVal val="visible"/>
-                                      </p:to>
-                                    </p:set>
-                                  </p:childTnLst>
-                                </p:cTn>
-                              </p:par>
-                              <p:par>
-                                <p:cTn id="19" presetID="1" presetClass="entr" presetSubtype="0" fill="hold" nodeType="withEffect">
-                                  <p:stCondLst>
-                                    <p:cond delay="0"/>
-                                  </p:stCondLst>
-                                  <p:childTnLst>
-                                    <p:set>
-                                      <p:cBhvr>
-                                        <p:cTn id="20" dur="1" fill="hold">
-                                          <p:stCondLst>
-                                            <p:cond delay="0"/>
-                                          </p:stCondLst>
-                                        </p:cTn>
-                                        <p:tgtEl>
-                                          <p:spTgt spid="41"/>
-                                        </p:tgtEl>
-                                        <p:attrNameLst>
-                                          <p:attrName>style.visibility</p:attrName>
-                                        </p:attrNameLst>
-                                      </p:cBhvr>
-                                      <p:to>
-                                        <p:strVal val="visible"/>
-                                      </p:to>
-                                    </p:set>
-                                  </p:childTnLst>
-                                </p:cTn>
-                              </p:par>
-                              <p:par>
-                                <p:cTn id="21" presetID="1" presetClass="entr" presetSubtype="0" fill="hold" nodeType="withEffect">
-                                  <p:stCondLst>
-                                    <p:cond delay="0"/>
-                                  </p:stCondLst>
-                                  <p:childTnLst>
-                                    <p:set>
-                                      <p:cBhvr>
-                                        <p:cTn id="22" dur="1" fill="hold">
-                                          <p:stCondLst>
-                                            <p:cond delay="0"/>
-                                          </p:stCondLst>
-                                        </p:cTn>
-                                        <p:tgtEl>
-                                          <p:spTgt spid="35"/>
-                                        </p:tgtEl>
-                                        <p:attrNameLst>
-                                          <p:attrName>style.visibility</p:attrName>
-                                        </p:attrNameLst>
-                                      </p:cBhvr>
-                                      <p:to>
-                                        <p:strVal val="visible"/>
-                                      </p:to>
-                                    </p:set>
-                                  </p:childTnLst>
-                                </p:cTn>
-                              </p:par>
-                              <p:par>
-                                <p:cTn id="23" presetID="1" presetClass="entr" presetSubtype="0" fill="hold" nodeType="withEffect">
-                                  <p:stCondLst>
-                                    <p:cond delay="0"/>
-                                  </p:stCondLst>
-                                  <p:childTnLst>
-                                    <p:set>
-                                      <p:cBhvr>
-                                        <p:cTn id="24" dur="1" fill="hold">
-                                          <p:stCondLst>
-                                            <p:cond delay="0"/>
-                                          </p:stCondLst>
-                                        </p:cTn>
-                                        <p:tgtEl>
-                                          <p:spTgt spid="28"/>
+                                          <p:spTgt spid="1040"/>
                                         </p:tgtEl>
                                         <p:attrNameLst>
                                           <p:attrName>style.visibility</p:attrName>
@@ -10735,26 +10999,26 @@
                     </p:cTn>
                   </p:par>
                   <p:par>
-                    <p:cTn id="25" fill="hold">
+                    <p:cTn id="19" fill="hold">
                       <p:stCondLst>
                         <p:cond delay="indefinite"/>
                       </p:stCondLst>
                       <p:childTnLst>
                         <p:par>
-                          <p:cTn id="26" fill="hold">
+                          <p:cTn id="20" fill="hold">
                             <p:stCondLst>
                               <p:cond delay="0"/>
                             </p:stCondLst>
                             <p:childTnLst>
                               <p:par>
-                                <p:cTn id="27" presetID="1" presetClass="entr" presetSubtype="0" fill="hold" nodeType="clickEffect">
+                                <p:cTn id="21" presetID="1" presetClass="entr" presetSubtype="0" fill="hold" nodeType="clickEffect">
                                   <p:stCondLst>
                                     <p:cond delay="0"/>
                                   </p:stCondLst>
                                   <p:childTnLst>
                                     <p:set>
                                       <p:cBhvr>
-                                        <p:cTn id="28" dur="1" fill="hold">
+                                        <p:cTn id="22" dur="1" fill="hold">
                                           <p:stCondLst>
                                             <p:cond delay="0"/>
                                           </p:stCondLst>
@@ -10774,7 +11038,79 @@
                                 </p:cTn>
                               </p:par>
                               <p:par>
-                                <p:cTn id="29" presetID="1" presetClass="entr" presetSubtype="0" fill="hold" grpId="0" nodeType="withEffect">
+                                <p:cTn id="23" presetID="1" presetClass="entr" presetSubtype="0" fill="hold" grpId="0" nodeType="withEffect">
+                                  <p:stCondLst>
+                                    <p:cond delay="0"/>
+                                  </p:stCondLst>
+                                  <p:childTnLst>
+                                    <p:set>
+                                      <p:cBhvr>
+                                        <p:cTn id="24" dur="1" fill="hold">
+                                          <p:stCondLst>
+                                            <p:cond delay="0"/>
+                                          </p:stCondLst>
+                                        </p:cTn>
+                                        <p:tgtEl>
+                                          <p:spTgt spid="4"/>
+                                        </p:tgtEl>
+                                        <p:attrNameLst>
+                                          <p:attrName>style.visibility</p:attrName>
+                                        </p:attrNameLst>
+                                      </p:cBhvr>
+                                      <p:to>
+                                        <p:strVal val="visible"/>
+                                      </p:to>
+                                    </p:set>
+                                  </p:childTnLst>
+                                </p:cTn>
+                              </p:par>
+                              <p:par>
+                                <p:cTn id="25" presetID="1" presetClass="entr" presetSubtype="0" fill="hold" grpId="0" nodeType="withEffect">
+                                  <p:stCondLst>
+                                    <p:cond delay="0"/>
+                                  </p:stCondLst>
+                                  <p:childTnLst>
+                                    <p:set>
+                                      <p:cBhvr>
+                                        <p:cTn id="26" dur="1" fill="hold">
+                                          <p:stCondLst>
+                                            <p:cond delay="0"/>
+                                          </p:stCondLst>
+                                        </p:cTn>
+                                        <p:tgtEl>
+                                          <p:spTgt spid="17"/>
+                                        </p:tgtEl>
+                                        <p:attrNameLst>
+                                          <p:attrName>style.visibility</p:attrName>
+                                        </p:attrNameLst>
+                                      </p:cBhvr>
+                                      <p:to>
+                                        <p:strVal val="visible"/>
+                                      </p:to>
+                                    </p:set>
+                                  </p:childTnLst>
+                                </p:cTn>
+                              </p:par>
+                            </p:childTnLst>
+                          </p:cTn>
+                        </p:par>
+                      </p:childTnLst>
+                    </p:cTn>
+                  </p:par>
+                  <p:par>
+                    <p:cTn id="27" fill="hold">
+                      <p:stCondLst>
+                        <p:cond delay="indefinite"/>
+                      </p:stCondLst>
+                      <p:childTnLst>
+                        <p:par>
+                          <p:cTn id="28" fill="hold">
+                            <p:stCondLst>
+                              <p:cond delay="0"/>
+                            </p:stCondLst>
+                            <p:childTnLst>
+                              <p:par>
+                                <p:cTn id="29" presetID="1" presetClass="entr" presetSubtype="0" fill="hold" nodeType="clickEffect">
                                   <p:stCondLst>
                                     <p:cond delay="0"/>
                                   </p:stCondLst>
@@ -10787,7 +11123,7 @@
                                           </p:stCondLst>
                                         </p:cTn>
                                         <p:tgtEl>
-                                          <p:spTgt spid="4"/>
+                                          <p:spTgt spid="22"/>
                                         </p:tgtEl>
                                         <p:attrNameLst>
                                           <p:attrName>style.visibility</p:attrName>
@@ -10814,78 +11150,6 @@
                                           </p:stCondLst>
                                         </p:cTn>
                                         <p:tgtEl>
-                                          <p:spTgt spid="17"/>
-                                        </p:tgtEl>
-                                        <p:attrNameLst>
-                                          <p:attrName>style.visibility</p:attrName>
-                                        </p:attrNameLst>
-                                      </p:cBhvr>
-                                      <p:to>
-                                        <p:strVal val="visible"/>
-                                      </p:to>
-                                    </p:set>
-                                  </p:childTnLst>
-                                </p:cTn>
-                              </p:par>
-                            </p:childTnLst>
-                          </p:cTn>
-                        </p:par>
-                      </p:childTnLst>
-                    </p:cTn>
-                  </p:par>
-                  <p:par>
-                    <p:cTn id="33" fill="hold">
-                      <p:stCondLst>
-                        <p:cond delay="indefinite"/>
-                      </p:stCondLst>
-                      <p:childTnLst>
-                        <p:par>
-                          <p:cTn id="34" fill="hold">
-                            <p:stCondLst>
-                              <p:cond delay="0"/>
-                            </p:stCondLst>
-                            <p:childTnLst>
-                              <p:par>
-                                <p:cTn id="35" presetID="1" presetClass="entr" presetSubtype="0" fill="hold" nodeType="clickEffect">
-                                  <p:stCondLst>
-                                    <p:cond delay="0"/>
-                                  </p:stCondLst>
-                                  <p:childTnLst>
-                                    <p:set>
-                                      <p:cBhvr>
-                                        <p:cTn id="36" dur="1" fill="hold">
-                                          <p:stCondLst>
-                                            <p:cond delay="0"/>
-                                          </p:stCondLst>
-                                        </p:cTn>
-                                        <p:tgtEl>
-                                          <p:spTgt spid="22"/>
-                                        </p:tgtEl>
-                                        <p:attrNameLst>
-                                          <p:attrName>style.visibility</p:attrName>
-                                        </p:attrNameLst>
-                                      </p:cBhvr>
-                                      <p:to>
-                                        <p:strVal val="visible"/>
-                                      </p:to>
-                                    </p:set>
-                                  </p:childTnLst>
-                                </p:cTn>
-                              </p:par>
-                              <p:par>
-                                <p:cTn id="37" presetID="1" presetClass="entr" presetSubtype="0" fill="hold" grpId="0" nodeType="withEffect">
-                                  <p:stCondLst>
-                                    <p:cond delay="0"/>
-                                  </p:stCondLst>
-                                  <p:childTnLst>
-                                    <p:set>
-                                      <p:cBhvr>
-                                        <p:cTn id="38" dur="1" fill="hold">
-                                          <p:stCondLst>
-                                            <p:cond delay="0"/>
-                                          </p:stCondLst>
-                                        </p:cTn>
-                                        <p:tgtEl>
                                           <p:spTgt spid="2"/>
                                         </p:tgtEl>
                                         <p:attrNameLst>
@@ -10900,14 +11164,14 @@
                                 </p:cTn>
                               </p:par>
                               <p:par>
-                                <p:cTn id="39" presetID="1" presetClass="entr" presetSubtype="0" fill="hold" grpId="0" nodeType="withEffect">
+                                <p:cTn id="33" presetID="1" presetClass="entr" presetSubtype="0" fill="hold" grpId="0" nodeType="withEffect">
                                   <p:stCondLst>
                                     <p:cond delay="0"/>
                                   </p:stCondLst>
                                   <p:childTnLst>
                                     <p:set>
                                       <p:cBhvr>
-                                        <p:cTn id="40" dur="1" fill="hold">
+                                        <p:cTn id="34" dur="1" fill="hold">
                                           <p:stCondLst>
                                             <p:cond delay="0"/>
                                           </p:stCondLst>
@@ -10959,13 +11223,12 @@
       <p:bldP spid="21" grpId="0" animBg="1"/>
       <p:bldP spid="2" grpId="0"/>
       <p:bldP spid="4" grpId="0"/>
-      <p:bldP spid="5" grpId="0"/>
     </p:bldLst>
   </p:timing>
 </p:sld>
 </file>
 
-<file path=ppt/slides/slide15.xml><?xml version="1.0" encoding="utf-8"?>
+<file path=ppt/slides/slide16.xml><?xml version="1.0" encoding="utf-8"?>
 <p:sld xmlns:a="http://schemas.openxmlformats.org/drawingml/2006/main" xmlns:r="http://schemas.openxmlformats.org/officeDocument/2006/relationships" xmlns:p="http://schemas.openxmlformats.org/presentationml/2006/main">
   <p:cSld>
     <p:spTree>
@@ -11090,8 +11353,8 @@
         </p:blipFill>
         <p:spPr>
           <a:xfrm>
-            <a:off x="1259331" y="3071321"/>
-            <a:ext cx="1606181" cy="1423066"/>
+            <a:off x="322028" y="2650939"/>
+            <a:ext cx="2669033" cy="2364746"/>
           </a:xfrm>
           <a:prstGeom prst="rect">
             <a:avLst/>
@@ -11120,8 +11383,8 @@
         </p:blipFill>
         <p:spPr>
           <a:xfrm>
-            <a:off x="4376874" y="3071320"/>
-            <a:ext cx="1442919" cy="1352737"/>
+            <a:off x="4088317" y="2691377"/>
+            <a:ext cx="2522395" cy="2364746"/>
           </a:xfrm>
           <a:prstGeom prst="rect">
             <a:avLst/>
@@ -11142,8 +11405,8 @@
         </p:nvSpPr>
         <p:spPr>
           <a:xfrm>
-            <a:off x="7331155" y="3402393"/>
-            <a:ext cx="687898" cy="690589"/>
+            <a:off x="8116822" y="3203236"/>
+            <a:ext cx="687898" cy="1042038"/>
           </a:xfrm>
           <a:prstGeom prst="flowChartMagneticDisk">
             <a:avLst/>
@@ -11196,7 +11459,7 @@
         </p:blipFill>
         <p:spPr>
           <a:xfrm>
-            <a:off x="9530415" y="3126051"/>
+            <a:off x="10310831" y="3008866"/>
             <a:ext cx="1477236" cy="1495399"/>
           </a:xfrm>
           <a:prstGeom prst="rect">
@@ -11218,7 +11481,7 @@
         </p:nvSpPr>
         <p:spPr>
           <a:xfrm>
-            <a:off x="8186689" y="3655636"/>
+            <a:off x="8965822" y="3562832"/>
             <a:ext cx="1267704" cy="201861"/>
           </a:xfrm>
           <a:prstGeom prst="leftRightArrow">
@@ -11272,7 +11535,7 @@
         </p:blipFill>
         <p:spPr>
           <a:xfrm>
-            <a:off x="4153504" y="271414"/>
+            <a:off x="4862308" y="163291"/>
             <a:ext cx="1443493" cy="861175"/>
           </a:xfrm>
           <a:prstGeom prst="rect">
@@ -11302,7 +11565,7 @@
         </p:blipFill>
         <p:spPr>
           <a:xfrm>
-            <a:off x="7070921" y="271415"/>
+            <a:off x="7741271" y="243088"/>
             <a:ext cx="1167555" cy="861175"/>
           </a:xfrm>
           <a:prstGeom prst="rect">
@@ -11324,8 +11587,8 @@
         </p:nvSpPr>
         <p:spPr>
           <a:xfrm>
-            <a:off x="5990010" y="593879"/>
-            <a:ext cx="687898" cy="216244"/>
+            <a:off x="6678363" y="485757"/>
+            <a:ext cx="827782" cy="218114"/>
           </a:xfrm>
           <a:prstGeom prst="rightArrow">
             <a:avLst/>
@@ -11370,7 +11633,7 @@
         </p:nvSpPr>
         <p:spPr>
           <a:xfrm>
-            <a:off x="8491327" y="593879"/>
+            <a:off x="9080130" y="526664"/>
             <a:ext cx="1039087" cy="216244"/>
           </a:xfrm>
           <a:prstGeom prst="rightArrow">
@@ -11424,8 +11687,8 @@
         </p:blipFill>
         <p:spPr>
           <a:xfrm>
-            <a:off x="9679842" y="314057"/>
-            <a:ext cx="744023" cy="794752"/>
+            <a:off x="10515600" y="271414"/>
+            <a:ext cx="1039087" cy="1109934"/>
           </a:xfrm>
           <a:prstGeom prst="rect">
             <a:avLst/>
@@ -11446,7 +11709,7 @@
         </p:nvSpPr>
         <p:spPr>
           <a:xfrm rot="5400000">
-            <a:off x="9537248" y="2154551"/>
+            <a:off x="10442683" y="2145109"/>
             <a:ext cx="1245454" cy="216244"/>
           </a:xfrm>
           <a:prstGeom prst="rightArrow">
@@ -11492,7 +11755,7 @@
         </p:nvSpPr>
         <p:spPr>
           <a:xfrm rot="16200000">
-            <a:off x="9753907" y="5027519"/>
+            <a:off x="10551220" y="5033470"/>
             <a:ext cx="996459" cy="184322"/>
           </a:xfrm>
           <a:prstGeom prst="leftRightArrow">
@@ -11553,8 +11816,8 @@
         </p:blipFill>
         <p:spPr bwMode="auto">
           <a:xfrm>
-            <a:off x="9978932" y="5617910"/>
-            <a:ext cx="578331" cy="578331"/>
+            <a:off x="10779488" y="5746997"/>
+            <a:ext cx="724245" cy="724245"/>
           </a:xfrm>
           <a:prstGeom prst="rect">
             <a:avLst/>
@@ -11585,7 +11848,7 @@
         </p:nvSpPr>
         <p:spPr>
           <a:xfrm>
-            <a:off x="5889868" y="3655636"/>
+            <a:off x="6681526" y="3569518"/>
             <a:ext cx="1349831" cy="218114"/>
           </a:xfrm>
           <a:prstGeom prst="leftRightArrow">
@@ -11632,7 +11895,7 @@
         <p:spPr>
           <a:xfrm>
             <a:off x="2991061" y="3615198"/>
-            <a:ext cx="1219382" cy="218114"/>
+            <a:ext cx="1097256" cy="218114"/>
           </a:xfrm>
           <a:prstGeom prst="leftRightArrow">
             <a:avLst/>
@@ -11731,10 +11994,536 @@
       </p:transition>
     </mc:Fallback>
   </mc:AlternateContent>
+  <p:timing>
+    <p:tnLst>
+      <p:par>
+        <p:cTn id="1" dur="indefinite" restart="never" nodeType="tmRoot">
+          <p:childTnLst>
+            <p:seq concurrent="1" nextAc="seek">
+              <p:cTn id="2" dur="indefinite" nodeType="mainSeq">
+                <p:childTnLst>
+                  <p:par>
+                    <p:cTn id="3" fill="hold">
+                      <p:stCondLst>
+                        <p:cond delay="indefinite"/>
+                      </p:stCondLst>
+                      <p:childTnLst>
+                        <p:par>
+                          <p:cTn id="4" fill="hold">
+                            <p:stCondLst>
+                              <p:cond delay="0"/>
+                            </p:stCondLst>
+                            <p:childTnLst>
+                              <p:par>
+                                <p:cTn id="5" presetID="1" presetClass="entr" presetSubtype="0" fill="hold" grpId="0" nodeType="clickEffect">
+                                  <p:stCondLst>
+                                    <p:cond delay="0"/>
+                                  </p:stCondLst>
+                                  <p:childTnLst>
+                                    <p:set>
+                                      <p:cBhvr>
+                                        <p:cTn id="6" dur="1" fill="hold">
+                                          <p:stCondLst>
+                                            <p:cond delay="0"/>
+                                          </p:stCondLst>
+                                        </p:cTn>
+                                        <p:tgtEl>
+                                          <p:spTgt spid="39"/>
+                                        </p:tgtEl>
+                                        <p:attrNameLst>
+                                          <p:attrName>style.visibility</p:attrName>
+                                        </p:attrNameLst>
+                                      </p:cBhvr>
+                                      <p:to>
+                                        <p:strVal val="visible"/>
+                                      </p:to>
+                                    </p:set>
+                                  </p:childTnLst>
+                                </p:cTn>
+                              </p:par>
+                              <p:par>
+                                <p:cTn id="7" presetID="1" presetClass="entr" presetSubtype="0" fill="hold" nodeType="withEffect">
+                                  <p:stCondLst>
+                                    <p:cond delay="0"/>
+                                  </p:stCondLst>
+                                  <p:childTnLst>
+                                    <p:set>
+                                      <p:cBhvr>
+                                        <p:cTn id="8" dur="1" fill="hold">
+                                          <p:stCondLst>
+                                            <p:cond delay="0"/>
+                                          </p:stCondLst>
+                                        </p:cTn>
+                                        <p:tgtEl>
+                                          <p:spTgt spid="20"/>
+                                        </p:tgtEl>
+                                        <p:attrNameLst>
+                                          <p:attrName>style.visibility</p:attrName>
+                                        </p:attrNameLst>
+                                      </p:cBhvr>
+                                      <p:to>
+                                        <p:strVal val="visible"/>
+                                      </p:to>
+                                    </p:set>
+                                  </p:childTnLst>
+                                </p:cTn>
+                              </p:par>
+                            </p:childTnLst>
+                          </p:cTn>
+                        </p:par>
+                      </p:childTnLst>
+                    </p:cTn>
+                  </p:par>
+                  <p:par>
+                    <p:cTn id="9" fill="hold">
+                      <p:stCondLst>
+                        <p:cond delay="indefinite"/>
+                      </p:stCondLst>
+                      <p:childTnLst>
+                        <p:par>
+                          <p:cTn id="10" fill="hold">
+                            <p:stCondLst>
+                              <p:cond delay="0"/>
+                            </p:stCondLst>
+                            <p:childTnLst>
+                              <p:par>
+                                <p:cTn id="11" presetID="1" presetClass="entr" presetSubtype="0" fill="hold" grpId="0" nodeType="clickEffect">
+                                  <p:stCondLst>
+                                    <p:cond delay="0"/>
+                                  </p:stCondLst>
+                                  <p:childTnLst>
+                                    <p:set>
+                                      <p:cBhvr>
+                                        <p:cTn id="12" dur="1" fill="hold">
+                                          <p:stCondLst>
+                                            <p:cond delay="0"/>
+                                          </p:stCondLst>
+                                        </p:cTn>
+                                        <p:tgtEl>
+                                          <p:spTgt spid="38"/>
+                                        </p:tgtEl>
+                                        <p:attrNameLst>
+                                          <p:attrName>style.visibility</p:attrName>
+                                        </p:attrNameLst>
+                                      </p:cBhvr>
+                                      <p:to>
+                                        <p:strVal val="visible"/>
+                                      </p:to>
+                                    </p:set>
+                                  </p:childTnLst>
+                                </p:cTn>
+                              </p:par>
+                              <p:par>
+                                <p:cTn id="13" presetID="1" presetClass="entr" presetSubtype="0" fill="hold" grpId="0" nodeType="withEffect">
+                                  <p:stCondLst>
+                                    <p:cond delay="0"/>
+                                  </p:stCondLst>
+                                  <p:childTnLst>
+                                    <p:set>
+                                      <p:cBhvr>
+                                        <p:cTn id="14" dur="1" fill="hold">
+                                          <p:stCondLst>
+                                            <p:cond delay="0"/>
+                                          </p:stCondLst>
+                                        </p:cTn>
+                                        <p:tgtEl>
+                                          <p:spTgt spid="22"/>
+                                        </p:tgtEl>
+                                        <p:attrNameLst>
+                                          <p:attrName>style.visibility</p:attrName>
+                                        </p:attrNameLst>
+                                      </p:cBhvr>
+                                      <p:to>
+                                        <p:strVal val="visible"/>
+                                      </p:to>
+                                    </p:set>
+                                  </p:childTnLst>
+                                </p:cTn>
+                              </p:par>
+                            </p:childTnLst>
+                          </p:cTn>
+                        </p:par>
+                      </p:childTnLst>
+                    </p:cTn>
+                  </p:par>
+                  <p:par>
+                    <p:cTn id="15" fill="hold">
+                      <p:stCondLst>
+                        <p:cond delay="indefinite"/>
+                      </p:stCondLst>
+                      <p:childTnLst>
+                        <p:par>
+                          <p:cTn id="16" fill="hold">
+                            <p:stCondLst>
+                              <p:cond delay="0"/>
+                            </p:stCondLst>
+                            <p:childTnLst>
+                              <p:par>
+                                <p:cTn id="17" presetID="1" presetClass="entr" presetSubtype="0" fill="hold" grpId="0" nodeType="clickEffect">
+                                  <p:stCondLst>
+                                    <p:cond delay="0"/>
+                                  </p:stCondLst>
+                                  <p:childTnLst>
+                                    <p:set>
+                                      <p:cBhvr>
+                                        <p:cTn id="18" dur="1" fill="hold">
+                                          <p:stCondLst>
+                                            <p:cond delay="0"/>
+                                          </p:stCondLst>
+                                        </p:cTn>
+                                        <p:tgtEl>
+                                          <p:spTgt spid="25"/>
+                                        </p:tgtEl>
+                                        <p:attrNameLst>
+                                          <p:attrName>style.visibility</p:attrName>
+                                        </p:attrNameLst>
+                                      </p:cBhvr>
+                                      <p:to>
+                                        <p:strVal val="visible"/>
+                                      </p:to>
+                                    </p:set>
+                                  </p:childTnLst>
+                                </p:cTn>
+                              </p:par>
+                              <p:par>
+                                <p:cTn id="19" presetID="1" presetClass="entr" presetSubtype="0" fill="hold" nodeType="withEffect">
+                                  <p:stCondLst>
+                                    <p:cond delay="0"/>
+                                  </p:stCondLst>
+                                  <p:childTnLst>
+                                    <p:set>
+                                      <p:cBhvr>
+                                        <p:cTn id="20" dur="1" fill="hold">
+                                          <p:stCondLst>
+                                            <p:cond delay="0"/>
+                                          </p:stCondLst>
+                                        </p:cTn>
+                                        <p:tgtEl>
+                                          <p:spTgt spid="24"/>
+                                        </p:tgtEl>
+                                        <p:attrNameLst>
+                                          <p:attrName>style.visibility</p:attrName>
+                                        </p:attrNameLst>
+                                      </p:cBhvr>
+                                      <p:to>
+                                        <p:strVal val="visible"/>
+                                      </p:to>
+                                    </p:set>
+                                  </p:childTnLst>
+                                </p:cTn>
+                              </p:par>
+                            </p:childTnLst>
+                          </p:cTn>
+                        </p:par>
+                      </p:childTnLst>
+                    </p:cTn>
+                  </p:par>
+                  <p:par>
+                    <p:cTn id="21" fill="hold">
+                      <p:stCondLst>
+                        <p:cond delay="indefinite"/>
+                      </p:stCondLst>
+                      <p:childTnLst>
+                        <p:par>
+                          <p:cTn id="22" fill="hold">
+                            <p:stCondLst>
+                              <p:cond delay="0"/>
+                            </p:stCondLst>
+                            <p:childTnLst>
+                              <p:par>
+                                <p:cTn id="23" presetID="1" presetClass="entr" presetSubtype="0" fill="hold" grpId="0" nodeType="clickEffect">
+                                  <p:stCondLst>
+                                    <p:cond delay="0"/>
+                                  </p:stCondLst>
+                                  <p:childTnLst>
+                                    <p:set>
+                                      <p:cBhvr>
+                                        <p:cTn id="24" dur="1" fill="hold">
+                                          <p:stCondLst>
+                                            <p:cond delay="0"/>
+                                          </p:stCondLst>
+                                        </p:cTn>
+                                        <p:tgtEl>
+                                          <p:spTgt spid="34"/>
+                                        </p:tgtEl>
+                                        <p:attrNameLst>
+                                          <p:attrName>style.visibility</p:attrName>
+                                        </p:attrNameLst>
+                                      </p:cBhvr>
+                                      <p:to>
+                                        <p:strVal val="visible"/>
+                                      </p:to>
+                                    </p:set>
+                                  </p:childTnLst>
+                                </p:cTn>
+                              </p:par>
+                              <p:par>
+                                <p:cTn id="25" presetID="1" presetClass="entr" presetSubtype="0" fill="hold" nodeType="withEffect">
+                                  <p:stCondLst>
+                                    <p:cond delay="0"/>
+                                  </p:stCondLst>
+                                  <p:childTnLst>
+                                    <p:set>
+                                      <p:cBhvr>
+                                        <p:cTn id="26" dur="1" fill="hold">
+                                          <p:stCondLst>
+                                            <p:cond delay="0"/>
+                                          </p:stCondLst>
+                                        </p:cTn>
+                                        <p:tgtEl>
+                                          <p:spTgt spid="33"/>
+                                        </p:tgtEl>
+                                        <p:attrNameLst>
+                                          <p:attrName>style.visibility</p:attrName>
+                                        </p:attrNameLst>
+                                      </p:cBhvr>
+                                      <p:to>
+                                        <p:strVal val="visible"/>
+                                      </p:to>
+                                    </p:set>
+                                  </p:childTnLst>
+                                </p:cTn>
+                              </p:par>
+                            </p:childTnLst>
+                          </p:cTn>
+                        </p:par>
+                      </p:childTnLst>
+                    </p:cTn>
+                  </p:par>
+                  <p:par>
+                    <p:cTn id="27" fill="hold">
+                      <p:stCondLst>
+                        <p:cond delay="indefinite"/>
+                      </p:stCondLst>
+                      <p:childTnLst>
+                        <p:par>
+                          <p:cTn id="28" fill="hold">
+                            <p:stCondLst>
+                              <p:cond delay="0"/>
+                            </p:stCondLst>
+                            <p:childTnLst>
+                              <p:par>
+                                <p:cTn id="29" presetID="1" presetClass="entr" presetSubtype="0" fill="hold" nodeType="clickEffect">
+                                  <p:stCondLst>
+                                    <p:cond delay="0"/>
+                                  </p:stCondLst>
+                                  <p:childTnLst>
+                                    <p:set>
+                                      <p:cBhvr>
+                                        <p:cTn id="30" dur="1" fill="hold">
+                                          <p:stCondLst>
+                                            <p:cond delay="0"/>
+                                          </p:stCondLst>
+                                        </p:cTn>
+                                        <p:tgtEl>
+                                          <p:spTgt spid="27"/>
+                                        </p:tgtEl>
+                                        <p:attrNameLst>
+                                          <p:attrName>style.visibility</p:attrName>
+                                        </p:attrNameLst>
+                                      </p:cBhvr>
+                                      <p:to>
+                                        <p:strVal val="visible"/>
+                                      </p:to>
+                                    </p:set>
+                                  </p:childTnLst>
+                                </p:cTn>
+                              </p:par>
+                              <p:par>
+                                <p:cTn id="31" presetID="1" presetClass="entr" presetSubtype="0" fill="hold" grpId="0" nodeType="withEffect">
+                                  <p:stCondLst>
+                                    <p:cond delay="0"/>
+                                  </p:stCondLst>
+                                  <p:childTnLst>
+                                    <p:set>
+                                      <p:cBhvr>
+                                        <p:cTn id="32" dur="1" fill="hold">
+                                          <p:stCondLst>
+                                            <p:cond delay="0"/>
+                                          </p:stCondLst>
+                                        </p:cTn>
+                                        <p:tgtEl>
+                                          <p:spTgt spid="30"/>
+                                        </p:tgtEl>
+                                        <p:attrNameLst>
+                                          <p:attrName>style.visibility</p:attrName>
+                                        </p:attrNameLst>
+                                      </p:cBhvr>
+                                      <p:to>
+                                        <p:strVal val="visible"/>
+                                      </p:to>
+                                    </p:set>
+                                  </p:childTnLst>
+                                </p:cTn>
+                              </p:par>
+                              <p:par>
+                                <p:cTn id="33" presetID="1" presetClass="entr" presetSubtype="0" fill="hold" nodeType="withEffect">
+                                  <p:stCondLst>
+                                    <p:cond delay="0"/>
+                                  </p:stCondLst>
+                                  <p:childTnLst>
+                                    <p:set>
+                                      <p:cBhvr>
+                                        <p:cTn id="34" dur="1" fill="hold">
+                                          <p:stCondLst>
+                                            <p:cond delay="0"/>
+                                          </p:stCondLst>
+                                        </p:cTn>
+                                        <p:tgtEl>
+                                          <p:spTgt spid="29"/>
+                                        </p:tgtEl>
+                                        <p:attrNameLst>
+                                          <p:attrName>style.visibility</p:attrName>
+                                        </p:attrNameLst>
+                                      </p:cBhvr>
+                                      <p:to>
+                                        <p:strVal val="visible"/>
+                                      </p:to>
+                                    </p:set>
+                                  </p:childTnLst>
+                                </p:cTn>
+                              </p:par>
+                              <p:par>
+                                <p:cTn id="35" presetID="1" presetClass="entr" presetSubtype="0" fill="hold" grpId="0" nodeType="withEffect">
+                                  <p:stCondLst>
+                                    <p:cond delay="0"/>
+                                  </p:stCondLst>
+                                  <p:childTnLst>
+                                    <p:set>
+                                      <p:cBhvr>
+                                        <p:cTn id="36" dur="1" fill="hold">
+                                          <p:stCondLst>
+                                            <p:cond delay="0"/>
+                                          </p:stCondLst>
+                                        </p:cTn>
+                                        <p:tgtEl>
+                                          <p:spTgt spid="31"/>
+                                        </p:tgtEl>
+                                        <p:attrNameLst>
+                                          <p:attrName>style.visibility</p:attrName>
+                                        </p:attrNameLst>
+                                      </p:cBhvr>
+                                      <p:to>
+                                        <p:strVal val="visible"/>
+                                      </p:to>
+                                    </p:set>
+                                  </p:childTnLst>
+                                </p:cTn>
+                              </p:par>
+                            </p:childTnLst>
+                          </p:cTn>
+                        </p:par>
+                      </p:childTnLst>
+                    </p:cTn>
+                  </p:par>
+                  <p:par>
+                    <p:cTn id="37" fill="hold">
+                      <p:stCondLst>
+                        <p:cond delay="indefinite"/>
+                      </p:stCondLst>
+                      <p:childTnLst>
+                        <p:par>
+                          <p:cTn id="38" fill="hold">
+                            <p:stCondLst>
+                              <p:cond delay="0"/>
+                            </p:stCondLst>
+                            <p:childTnLst>
+                              <p:par>
+                                <p:cTn id="39" presetID="1" presetClass="entr" presetSubtype="0" fill="hold" grpId="0" nodeType="clickEffect">
+                                  <p:stCondLst>
+                                    <p:cond delay="0"/>
+                                  </p:stCondLst>
+                                  <p:childTnLst>
+                                    <p:set>
+                                      <p:cBhvr>
+                                        <p:cTn id="40" dur="1" fill="hold">
+                                          <p:stCondLst>
+                                            <p:cond delay="0"/>
+                                          </p:stCondLst>
+                                        </p:cTn>
+                                        <p:tgtEl>
+                                          <p:spTgt spid="35"/>
+                                        </p:tgtEl>
+                                        <p:attrNameLst>
+                                          <p:attrName>style.visibility</p:attrName>
+                                        </p:attrNameLst>
+                                      </p:cBhvr>
+                                      <p:to>
+                                        <p:strVal val="visible"/>
+                                      </p:to>
+                                    </p:set>
+                                  </p:childTnLst>
+                                </p:cTn>
+                              </p:par>
+                              <p:par>
+                                <p:cTn id="41" presetID="1" presetClass="entr" presetSubtype="0" fill="hold" nodeType="withEffect">
+                                  <p:stCondLst>
+                                    <p:cond delay="0"/>
+                                  </p:stCondLst>
+                                  <p:childTnLst>
+                                    <p:set>
+                                      <p:cBhvr>
+                                        <p:cTn id="42" dur="1" fill="hold">
+                                          <p:stCondLst>
+                                            <p:cond delay="0"/>
+                                          </p:stCondLst>
+                                        </p:cTn>
+                                        <p:tgtEl>
+                                          <p:spTgt spid="36"/>
+                                        </p:tgtEl>
+                                        <p:attrNameLst>
+                                          <p:attrName>style.visibility</p:attrName>
+                                        </p:attrNameLst>
+                                      </p:cBhvr>
+                                      <p:to>
+                                        <p:strVal val="visible"/>
+                                      </p:to>
+                                    </p:set>
+                                  </p:childTnLst>
+                                </p:cTn>
+                              </p:par>
+                            </p:childTnLst>
+                          </p:cTn>
+                        </p:par>
+                      </p:childTnLst>
+                    </p:cTn>
+                  </p:par>
+                </p:childTnLst>
+              </p:cTn>
+              <p:prevCondLst>
+                <p:cond evt="onPrev" delay="0">
+                  <p:tgtEl>
+                    <p:sldTgt/>
+                  </p:tgtEl>
+                </p:cond>
+              </p:prevCondLst>
+              <p:nextCondLst>
+                <p:cond evt="onNext" delay="0">
+                  <p:tgtEl>
+                    <p:sldTgt/>
+                  </p:tgtEl>
+                </p:cond>
+              </p:nextCondLst>
+            </p:seq>
+          </p:childTnLst>
+        </p:cTn>
+      </p:par>
+    </p:tnLst>
+    <p:bldLst>
+      <p:bldP spid="22" grpId="0" animBg="1"/>
+      <p:bldP spid="25" grpId="0" animBg="1"/>
+      <p:bldP spid="30" grpId="0" animBg="1"/>
+      <p:bldP spid="31" grpId="0" animBg="1"/>
+      <p:bldP spid="34" grpId="0" animBg="1"/>
+      <p:bldP spid="35" grpId="0" animBg="1"/>
+      <p:bldP spid="38" grpId="0" animBg="1"/>
+      <p:bldP spid="39" grpId="0" animBg="1"/>
+    </p:bldLst>
+  </p:timing>
 </p:sld>
 </file>
 
-<file path=ppt/slides/slide16.xml><?xml version="1.0" encoding="utf-8"?>
+<file path=ppt/slides/slide17.xml><?xml version="1.0" encoding="utf-8"?>
 <p:sld xmlns:a="http://schemas.openxmlformats.org/drawingml/2006/main" xmlns:r="http://schemas.openxmlformats.org/officeDocument/2006/relationships" xmlns:p="http://schemas.openxmlformats.org/presentationml/2006/main">
   <p:cSld>
     <p:spTree>
@@ -12301,7 +13090,7 @@
 </p:sld>
 </file>
 
-<file path=ppt/slides/slide17.xml><?xml version="1.0" encoding="utf-8"?>
+<file path=ppt/slides/slide18.xml><?xml version="1.0" encoding="utf-8"?>
 <p:sld xmlns:a="http://schemas.openxmlformats.org/drawingml/2006/main" xmlns:r="http://schemas.openxmlformats.org/officeDocument/2006/relationships" xmlns:p="http://schemas.openxmlformats.org/presentationml/2006/main">
   <p:cSld>
     <p:spTree>
@@ -12453,20 +13242,20 @@
     </p:spTree>
     <p:extLst>
       <p:ext uri="{BB962C8B-B14F-4D97-AF65-F5344CB8AC3E}">
-        <p14:creationId xmlns:p14="http://schemas.microsoft.com/office/powerpoint/2010/main" val="1122341232"/>
+        <p14:creationId xmlns:p14="http://schemas.microsoft.com/office/powerpoint/2010/main" val="3776055017"/>
       </p:ext>
     </p:extLst>
   </p:cSld>
   <p:clrMapOvr>
     <a:masterClrMapping/>
   </p:clrMapOvr>
-  <mc:AlternateContent xmlns:mc="http://schemas.openxmlformats.org/markup-compatibility/2006" xmlns:p14="http://schemas.microsoft.com/office/powerpoint/2010/main">
-    <mc:Choice Requires="p14">
+  <mc:AlternateContent xmlns:mc="http://schemas.openxmlformats.org/markup-compatibility/2006">
+    <mc:Choice xmlns:p14="http://schemas.microsoft.com/office/powerpoint/2010/main" Requires="p14">
       <p:transition spd="med" p14:dur="700">
         <p:fade/>
       </p:transition>
     </mc:Choice>
-    <mc:Fallback xmlns="">
+    <mc:Fallback>
       <p:transition spd="med">
         <p:fade/>
       </p:transition>
@@ -12515,7 +13304,7 @@
         <p:spPr>
           <a:xfrm>
             <a:off x="545938" y="1233182"/>
-            <a:ext cx="2809872" cy="1754326"/>
+            <a:ext cx="2326471" cy="1477328"/>
           </a:xfrm>
           <a:prstGeom prst="rect">
             <a:avLst/>
@@ -12554,7 +13343,7 @@
             </a:pPr>
             <a:r>
               <a:rPr lang="en-US" dirty="0"/>
-              <a:t>Requirements </a:t>
+              <a:t>Demo</a:t>
             </a:r>
           </a:p>
           <a:p>
@@ -12564,17 +13353,7 @@
             </a:pPr>
             <a:r>
               <a:rPr lang="en-US" dirty="0"/>
-              <a:t>Milestones and roadmap</a:t>
-            </a:r>
-          </a:p>
-          <a:p>
-            <a:pPr marL="285750" indent="-285750">
-              <a:buFont typeface="Arial" panose="020B0604020202020204" pitchFamily="34" charset="0"/>
-              <a:buChar char="•"/>
-            </a:pPr>
-            <a:r>
-              <a:rPr lang="en-US" dirty="0"/>
-              <a:t>Demo</a:t>
+              <a:t>Requirements</a:t>
             </a:r>
           </a:p>
           <a:p>
@@ -12767,7 +13546,7 @@
         </p:nvSpPr>
         <p:spPr>
           <a:xfrm>
-            <a:off x="260712" y="753211"/>
+            <a:off x="344602" y="1382031"/>
             <a:ext cx="9629908" cy="589392"/>
           </a:xfrm>
           <a:prstGeom prst="rect">
@@ -12787,7 +13566,7 @@
             </a:pPr>
             <a:r>
               <a:rPr lang="en-US" sz="1615" dirty="0"/>
-              <a:t>Let’s say we have a model that we want to run and deploy</a:t>
+              <a:t>Let’s say we have a model that we want to run </a:t>
             </a:r>
           </a:p>
           <a:p>
@@ -12828,8 +13607,8 @@
         </p:blipFill>
         <p:spPr bwMode="auto">
           <a:xfrm>
-            <a:off x="32790" y="1577741"/>
-            <a:ext cx="2925359" cy="1832591"/>
+            <a:off x="629828" y="2202555"/>
+            <a:ext cx="2605139" cy="1631989"/>
           </a:xfrm>
           <a:prstGeom prst="rect">
             <a:avLst/>
@@ -12875,8 +13654,8 @@
         </p:blipFill>
         <p:spPr bwMode="auto">
           <a:xfrm>
-            <a:off x="3144832" y="2014612"/>
-            <a:ext cx="702436" cy="757720"/>
+            <a:off x="3328819" y="2395455"/>
+            <a:ext cx="625545" cy="674777"/>
           </a:xfrm>
           <a:prstGeom prst="rect">
             <a:avLst/>
@@ -12907,8 +13686,8 @@
         </p:nvSpPr>
         <p:spPr>
           <a:xfrm>
-            <a:off x="3216184" y="2778100"/>
-            <a:ext cx="702436" cy="230832"/>
+            <a:off x="3328819" y="3254545"/>
+            <a:ext cx="625545" cy="369332"/>
           </a:xfrm>
           <a:prstGeom prst="rect">
             <a:avLst/>
@@ -12916,7 +13695,7 @@
           <a:noFill/>
         </p:spPr>
         <p:txBody>
-          <a:bodyPr wrap="none" rtlCol="0">
+          <a:bodyPr wrap="square" rtlCol="0">
             <a:spAutoFit/>
           </a:bodyPr>
           <a:lstStyle/>
@@ -13003,8 +13782,8 @@
         </p:blipFill>
         <p:spPr bwMode="auto">
           <a:xfrm>
-            <a:off x="4363338" y="2074916"/>
-            <a:ext cx="1239064" cy="697416"/>
+            <a:off x="4793710" y="2655064"/>
+            <a:ext cx="1103432" cy="621075"/>
           </a:xfrm>
           <a:prstGeom prst="rect">
             <a:avLst/>
@@ -13050,8 +13829,8 @@
         </p:blipFill>
         <p:spPr bwMode="auto">
           <a:xfrm>
-            <a:off x="2551966" y="4363963"/>
-            <a:ext cx="1811372" cy="1956282"/>
+            <a:off x="2935713" y="4795547"/>
+            <a:ext cx="1267172" cy="1368546"/>
           </a:xfrm>
           <a:prstGeom prst="rect">
             <a:avLst/>
@@ -13097,8 +13876,8 @@
         </p:blipFill>
         <p:spPr bwMode="auto">
           <a:xfrm>
-            <a:off x="3216184" y="3617459"/>
-            <a:ext cx="471863" cy="471863"/>
+            <a:off x="3328819" y="3876474"/>
+            <a:ext cx="420211" cy="420211"/>
           </a:xfrm>
           <a:prstGeom prst="rect">
             <a:avLst/>
@@ -13180,10 +13959,82 @@
           </a:p>
         </p:txBody>
       </p:sp>
+      <p:sp>
+        <p:nvSpPr>
+          <p:cNvPr id="2" name="TextBox 1">
+            <a:extLst>
+              <a:ext uri="{FF2B5EF4-FFF2-40B4-BE49-F238E27FC236}">
+                <a16:creationId xmlns:a16="http://schemas.microsoft.com/office/drawing/2014/main" id="{FE801446-09B5-B1F8-5ADF-3B2F1E2AAC89}"/>
+              </a:ext>
+            </a:extLst>
+          </p:cNvPr>
+          <p:cNvSpPr txBox="1"/>
+          <p:nvPr/>
+        </p:nvSpPr>
+        <p:spPr>
+          <a:xfrm>
+            <a:off x="344602" y="733907"/>
+            <a:ext cx="9629908" cy="369332"/>
+          </a:xfrm>
+          <a:prstGeom prst="rect">
+            <a:avLst/>
+          </a:prstGeom>
+          <a:noFill/>
+        </p:spPr>
+        <p:txBody>
+          <a:bodyPr wrap="square" rtlCol="0">
+            <a:spAutoFit/>
+          </a:bodyPr>
+          <a:lstStyle/>
+          <a:p>
+            <a:r>
+              <a:rPr lang="en-US" dirty="0"/>
+              <a:t>Goal:   Portable machine/deep learning environment</a:t>
+            </a:r>
+            <a:endParaRPr lang="en-US" sz="1615" dirty="0"/>
+          </a:p>
+        </p:txBody>
+      </p:sp>
+      <p:sp>
+        <p:nvSpPr>
+          <p:cNvPr id="3" name="TextBox 2">
+            <a:extLst>
+              <a:ext uri="{FF2B5EF4-FFF2-40B4-BE49-F238E27FC236}">
+                <a16:creationId xmlns:a16="http://schemas.microsoft.com/office/drawing/2014/main" id="{493CE0D5-8A68-F9CD-883C-27420396CD27}"/>
+              </a:ext>
+            </a:extLst>
+          </p:cNvPr>
+          <p:cNvSpPr txBox="1"/>
+          <p:nvPr/>
+        </p:nvSpPr>
+        <p:spPr>
+          <a:xfrm>
+            <a:off x="3145226" y="6194565"/>
+            <a:ext cx="787395" cy="369332"/>
+          </a:xfrm>
+          <a:prstGeom prst="rect">
+            <a:avLst/>
+          </a:prstGeom>
+          <a:noFill/>
+        </p:spPr>
+        <p:txBody>
+          <a:bodyPr wrap="none" rtlCol="0">
+            <a:spAutoFit/>
+          </a:bodyPr>
+          <a:lstStyle/>
+          <a:p>
+            <a:r>
+              <a:rPr lang="en-US" dirty="0"/>
+              <a:t>User 1</a:t>
+            </a:r>
+            <a:endParaRPr lang="LID4096" dirty="0"/>
+          </a:p>
+        </p:txBody>
+      </p:sp>
     </p:spTree>
     <p:extLst>
       <p:ext uri="{BB962C8B-B14F-4D97-AF65-F5344CB8AC3E}">
-        <p14:creationId xmlns:p14="http://schemas.microsoft.com/office/powerpoint/2010/main" val="2363492993"/>
+        <p14:creationId xmlns:p14="http://schemas.microsoft.com/office/powerpoint/2010/main" val="730439582"/>
       </p:ext>
     </p:extLst>
   </p:cSld>
@@ -14137,6 +14988,78 @@
           </a:p>
         </p:txBody>
       </p:sp>
+      <p:sp>
+        <p:nvSpPr>
+          <p:cNvPr id="2" name="TextBox 1">
+            <a:extLst>
+              <a:ext uri="{FF2B5EF4-FFF2-40B4-BE49-F238E27FC236}">
+                <a16:creationId xmlns:a16="http://schemas.microsoft.com/office/drawing/2014/main" id="{FFFCCEC0-0775-7E8E-3D7B-7736BEFF038F}"/>
+              </a:ext>
+            </a:extLst>
+          </p:cNvPr>
+          <p:cNvSpPr txBox="1"/>
+          <p:nvPr/>
+        </p:nvSpPr>
+        <p:spPr>
+          <a:xfrm>
+            <a:off x="6580818" y="5950913"/>
+            <a:ext cx="787395" cy="369332"/>
+          </a:xfrm>
+          <a:prstGeom prst="rect">
+            <a:avLst/>
+          </a:prstGeom>
+          <a:noFill/>
+        </p:spPr>
+        <p:txBody>
+          <a:bodyPr wrap="none" rtlCol="0">
+            <a:spAutoFit/>
+          </a:bodyPr>
+          <a:lstStyle/>
+          <a:p>
+            <a:r>
+              <a:rPr lang="en-US" dirty="0"/>
+              <a:t>User 2</a:t>
+            </a:r>
+            <a:endParaRPr lang="LID4096" dirty="0"/>
+          </a:p>
+        </p:txBody>
+      </p:sp>
+      <p:sp>
+        <p:nvSpPr>
+          <p:cNvPr id="6" name="TextBox 5">
+            <a:extLst>
+              <a:ext uri="{FF2B5EF4-FFF2-40B4-BE49-F238E27FC236}">
+                <a16:creationId xmlns:a16="http://schemas.microsoft.com/office/drawing/2014/main" id="{F9BF8EBD-7701-8850-85DF-F1EE1E94DA34}"/>
+              </a:ext>
+            </a:extLst>
+          </p:cNvPr>
+          <p:cNvSpPr txBox="1"/>
+          <p:nvPr/>
+        </p:nvSpPr>
+        <p:spPr>
+          <a:xfrm>
+            <a:off x="11137683" y="5939729"/>
+            <a:ext cx="787395" cy="369332"/>
+          </a:xfrm>
+          <a:prstGeom prst="rect">
+            <a:avLst/>
+          </a:prstGeom>
+          <a:noFill/>
+        </p:spPr>
+        <p:txBody>
+          <a:bodyPr wrap="none" rtlCol="0">
+            <a:spAutoFit/>
+          </a:bodyPr>
+          <a:lstStyle/>
+          <a:p>
+            <a:r>
+              <a:rPr lang="en-US" dirty="0"/>
+              <a:t>User 3</a:t>
+            </a:r>
+            <a:endParaRPr lang="LID4096" dirty="0"/>
+          </a:p>
+        </p:txBody>
+      </p:sp>
     </p:spTree>
     <p:extLst>
       <p:ext uri="{BB962C8B-B14F-4D97-AF65-F5344CB8AC3E}">
@@ -14168,7 +15091,7 @@
                             </p:stCondLst>
                             <p:childTnLst>
                               <p:par>
-                                <p:cTn id="5" presetID="1" presetClass="entr" presetSubtype="0" fill="hold" grpId="0" nodeType="clickEffect">
+                                <p:cTn id="5" presetID="1" presetClass="entr" presetSubtype="0" fill="hold" nodeType="clickEffect">
                                   <p:stCondLst>
                                     <p:cond delay="0"/>
                                   </p:stCondLst>
@@ -14181,7 +15104,7 @@
                                           </p:stCondLst>
                                         </p:cTn>
                                         <p:tgtEl>
-                                          <p:spTgt spid="43"/>
+                                          <p:spTgt spid="9"/>
                                         </p:tgtEl>
                                         <p:attrNameLst>
                                           <p:attrName>style.visibility</p:attrName>
@@ -14208,7 +15131,7 @@
                                           </p:stCondLst>
                                         </p:cTn>
                                         <p:tgtEl>
-                                          <p:spTgt spid="42"/>
+                                          <p:spTgt spid="10"/>
                                         </p:tgtEl>
                                         <p:attrNameLst>
                                           <p:attrName>style.visibility</p:attrName>
@@ -14221,26 +15144,35 @@
                                   </p:childTnLst>
                                 </p:cTn>
                               </p:par>
-                            </p:childTnLst>
-                          </p:cTn>
-                        </p:par>
-                      </p:childTnLst>
-                    </p:cTn>
-                  </p:par>
-                  <p:par>
-                    <p:cTn id="9" fill="hold">
-                      <p:stCondLst>
-                        <p:cond delay="indefinite"/>
-                      </p:stCondLst>
-                      <p:childTnLst>
-                        <p:par>
-                          <p:cTn id="10" fill="hold">
-                            <p:stCondLst>
-                              <p:cond delay="0"/>
-                            </p:stCondLst>
-                            <p:childTnLst>
                               <p:par>
-                                <p:cTn id="11" presetID="1" presetClass="entr" presetSubtype="0" fill="hold" grpId="0" nodeType="clickEffect">
+                                <p:cTn id="9" presetID="1" presetClass="entr" presetSubtype="0" fill="hold" nodeType="withEffect">
+                                  <p:stCondLst>
+                                    <p:cond delay="0"/>
+                                  </p:stCondLst>
+                                  <p:childTnLst>
+                                    <p:set>
+                                      <p:cBhvr>
+                                        <p:cTn id="10" dur="1" fill="hold">
+                                          <p:stCondLst>
+                                            <p:cond delay="0"/>
+                                          </p:stCondLst>
+                                        </p:cTn>
+                                        <p:tgtEl>
+                                          <p:spTgt spid="11"/>
+                                        </p:tgtEl>
+                                        <p:attrNameLst>
+                                          <p:attrName>style.visibility</p:attrName>
+                                        </p:attrNameLst>
+                                      </p:cBhvr>
+                                      <p:to>
+                                        <p:strVal val="visible"/>
+                                      </p:to>
+                                    </p:set>
+                                  </p:childTnLst>
+                                </p:cTn>
+                              </p:par>
+                              <p:par>
+                                <p:cTn id="11" presetID="1" presetClass="entr" presetSubtype="0" fill="hold" nodeType="withEffect">
                                   <p:stCondLst>
                                     <p:cond delay="0"/>
                                   </p:stCondLst>
@@ -14253,7 +15185,7 @@
                                           </p:stCondLst>
                                         </p:cTn>
                                         <p:tgtEl>
-                                          <p:spTgt spid="41"/>
+                                          <p:spTgt spid="40"/>
                                         </p:tgtEl>
                                         <p:attrNameLst>
                                           <p:attrName>style.visibility</p:attrName>
@@ -14280,7 +15212,7 @@
                                           </p:stCondLst>
                                         </p:cTn>
                                         <p:tgtEl>
-                                          <p:spTgt spid="3078"/>
+                                          <p:spTgt spid="1060"/>
                                         </p:tgtEl>
                                         <p:attrNameLst>
                                           <p:attrName>style.visibility</p:attrName>
@@ -14293,26 +15225,35 @@
                                   </p:childTnLst>
                                 </p:cTn>
                               </p:par>
-                            </p:childTnLst>
-                          </p:cTn>
-                        </p:par>
-                      </p:childTnLst>
-                    </p:cTn>
-                  </p:par>
-                  <p:par>
-                    <p:cTn id="15" fill="hold">
-                      <p:stCondLst>
-                        <p:cond delay="indefinite"/>
-                      </p:stCondLst>
-                      <p:childTnLst>
-                        <p:par>
-                          <p:cTn id="16" fill="hold">
-                            <p:stCondLst>
-                              <p:cond delay="0"/>
-                            </p:stCondLst>
-                            <p:childTnLst>
                               <p:par>
-                                <p:cTn id="17" presetID="1" presetClass="entr" presetSubtype="0" fill="hold" nodeType="clickEffect">
+                                <p:cTn id="15" presetID="1" presetClass="entr" presetSubtype="0" fill="hold" grpId="0" nodeType="withEffect">
+                                  <p:stCondLst>
+                                    <p:cond delay="0"/>
+                                  </p:stCondLst>
+                                  <p:childTnLst>
+                                    <p:set>
+                                      <p:cBhvr>
+                                        <p:cTn id="16" dur="1" fill="hold">
+                                          <p:stCondLst>
+                                            <p:cond delay="0"/>
+                                          </p:stCondLst>
+                                        </p:cTn>
+                                        <p:tgtEl>
+                                          <p:spTgt spid="2"/>
+                                        </p:tgtEl>
+                                        <p:attrNameLst>
+                                          <p:attrName>style.visibility</p:attrName>
+                                        </p:attrNameLst>
+                                      </p:cBhvr>
+                                      <p:to>
+                                        <p:strVal val="visible"/>
+                                      </p:to>
+                                    </p:set>
+                                  </p:childTnLst>
+                                </p:cTn>
+                              </p:par>
+                              <p:par>
+                                <p:cTn id="17" presetID="1" presetClass="entr" presetSubtype="0" fill="hold" nodeType="withEffect">
                                   <p:stCondLst>
                                     <p:cond delay="0"/>
                                   </p:stCondLst>
@@ -14325,7 +15266,7 @@
                                           </p:stCondLst>
                                         </p:cTn>
                                         <p:tgtEl>
-                                          <p:spTgt spid="50"/>
+                                          <p:spTgt spid="1058"/>
                                         </p:tgtEl>
                                         <p:attrNameLst>
                                           <p:attrName>style.visibility</p:attrName>
@@ -14352,7 +15293,313 @@
                                           </p:stCondLst>
                                         </p:cTn>
                                         <p:tgtEl>
+                                          <p:spTgt spid="6"/>
+                                        </p:tgtEl>
+                                        <p:attrNameLst>
+                                          <p:attrName>style.visibility</p:attrName>
+                                        </p:attrNameLst>
+                                      </p:cBhvr>
+                                      <p:to>
+                                        <p:strVal val="visible"/>
+                                      </p:to>
+                                    </p:set>
+                                  </p:childTnLst>
+                                </p:cTn>
+                              </p:par>
+                              <p:par>
+                                <p:cTn id="21" presetID="1" presetClass="entr" presetSubtype="0" fill="hold" nodeType="withEffect">
+                                  <p:stCondLst>
+                                    <p:cond delay="0"/>
+                                  </p:stCondLst>
+                                  <p:childTnLst>
+                                    <p:set>
+                                      <p:cBhvr>
+                                        <p:cTn id="22" dur="1" fill="hold">
+                                          <p:stCondLst>
+                                            <p:cond delay="0"/>
+                                          </p:stCondLst>
+                                        </p:cTn>
+                                        <p:tgtEl>
+                                          <p:spTgt spid="3076"/>
+                                        </p:tgtEl>
+                                        <p:attrNameLst>
+                                          <p:attrName>style.visibility</p:attrName>
+                                        </p:attrNameLst>
+                                      </p:cBhvr>
+                                      <p:to>
+                                        <p:strVal val="visible"/>
+                                      </p:to>
+                                    </p:set>
+                                  </p:childTnLst>
+                                </p:cTn>
+                              </p:par>
+                              <p:par>
+                                <p:cTn id="23" presetID="1" presetClass="entr" presetSubtype="0" fill="hold" nodeType="withEffect">
+                                  <p:stCondLst>
+                                    <p:cond delay="0"/>
+                                  </p:stCondLst>
+                                  <p:childTnLst>
+                                    <p:set>
+                                      <p:cBhvr>
+                                        <p:cTn id="24" dur="1" fill="hold">
+                                          <p:stCondLst>
+                                            <p:cond delay="0"/>
+                                          </p:stCondLst>
+                                        </p:cTn>
+                                        <p:tgtEl>
+                                          <p:spTgt spid="3"/>
+                                        </p:tgtEl>
+                                        <p:attrNameLst>
+                                          <p:attrName>style.visibility</p:attrName>
+                                        </p:attrNameLst>
+                                      </p:cBhvr>
+                                      <p:to>
+                                        <p:strVal val="visible"/>
+                                      </p:to>
+                                    </p:set>
+                                  </p:childTnLst>
+                                </p:cTn>
+                              </p:par>
+                              <p:par>
+                                <p:cTn id="25" presetID="1" presetClass="entr" presetSubtype="0" fill="hold" nodeType="withEffect">
+                                  <p:stCondLst>
+                                    <p:cond delay="0"/>
+                                  </p:stCondLst>
+                                  <p:childTnLst>
+                                    <p:set>
+                                      <p:cBhvr>
+                                        <p:cTn id="26" dur="1" fill="hold">
+                                          <p:stCondLst>
+                                            <p:cond delay="0"/>
+                                          </p:stCondLst>
+                                        </p:cTn>
+                                        <p:tgtEl>
+                                          <p:spTgt spid="4"/>
+                                        </p:tgtEl>
+                                        <p:attrNameLst>
+                                          <p:attrName>style.visibility</p:attrName>
+                                        </p:attrNameLst>
+                                      </p:cBhvr>
+                                      <p:to>
+                                        <p:strVal val="visible"/>
+                                      </p:to>
+                                    </p:set>
+                                  </p:childTnLst>
+                                </p:cTn>
+                              </p:par>
+                              <p:par>
+                                <p:cTn id="27" presetID="1" presetClass="entr" presetSubtype="0" fill="hold" nodeType="withEffect">
+                                  <p:stCondLst>
+                                    <p:cond delay="0"/>
+                                  </p:stCondLst>
+                                  <p:childTnLst>
+                                    <p:set>
+                                      <p:cBhvr>
+                                        <p:cTn id="28" dur="1" fill="hold">
+                                          <p:stCondLst>
+                                            <p:cond delay="0"/>
+                                          </p:stCondLst>
+                                        </p:cTn>
+                                        <p:tgtEl>
+                                          <p:spTgt spid="5"/>
+                                        </p:tgtEl>
+                                        <p:attrNameLst>
+                                          <p:attrName>style.visibility</p:attrName>
+                                        </p:attrNameLst>
+                                      </p:cBhvr>
+                                      <p:to>
+                                        <p:strVal val="visible"/>
+                                      </p:to>
+                                    </p:set>
+                                  </p:childTnLst>
+                                </p:cTn>
+                              </p:par>
+                            </p:childTnLst>
+                          </p:cTn>
+                        </p:par>
+                      </p:childTnLst>
+                    </p:cTn>
+                  </p:par>
+                  <p:par>
+                    <p:cTn id="29" fill="hold">
+                      <p:stCondLst>
+                        <p:cond delay="indefinite"/>
+                      </p:stCondLst>
+                      <p:childTnLst>
+                        <p:par>
+                          <p:cTn id="30" fill="hold">
+                            <p:stCondLst>
+                              <p:cond delay="0"/>
+                            </p:stCondLst>
+                            <p:childTnLst>
+                              <p:par>
+                                <p:cTn id="31" presetID="1" presetClass="entr" presetSubtype="0" fill="hold" grpId="0" nodeType="clickEffect">
+                                  <p:stCondLst>
+                                    <p:cond delay="0"/>
+                                  </p:stCondLst>
+                                  <p:childTnLst>
+                                    <p:set>
+                                      <p:cBhvr>
+                                        <p:cTn id="32" dur="1" fill="hold">
+                                          <p:stCondLst>
+                                            <p:cond delay="0"/>
+                                          </p:stCondLst>
+                                        </p:cTn>
+                                        <p:tgtEl>
+                                          <p:spTgt spid="43"/>
+                                        </p:tgtEl>
+                                        <p:attrNameLst>
+                                          <p:attrName>style.visibility</p:attrName>
+                                        </p:attrNameLst>
+                                      </p:cBhvr>
+                                      <p:to>
+                                        <p:strVal val="visible"/>
+                                      </p:to>
+                                    </p:set>
+                                  </p:childTnLst>
+                                </p:cTn>
+                              </p:par>
+                              <p:par>
+                                <p:cTn id="33" presetID="1" presetClass="entr" presetSubtype="0" fill="hold" nodeType="withEffect">
+                                  <p:stCondLst>
+                                    <p:cond delay="0"/>
+                                  </p:stCondLst>
+                                  <p:childTnLst>
+                                    <p:set>
+                                      <p:cBhvr>
+                                        <p:cTn id="34" dur="1" fill="hold">
+                                          <p:stCondLst>
+                                            <p:cond delay="0"/>
+                                          </p:stCondLst>
+                                        </p:cTn>
+                                        <p:tgtEl>
+                                          <p:spTgt spid="42"/>
+                                        </p:tgtEl>
+                                        <p:attrNameLst>
+                                          <p:attrName>style.visibility</p:attrName>
+                                        </p:attrNameLst>
+                                      </p:cBhvr>
+                                      <p:to>
+                                        <p:strVal val="visible"/>
+                                      </p:to>
+                                    </p:set>
+                                  </p:childTnLst>
+                                </p:cTn>
+                              </p:par>
+                            </p:childTnLst>
+                          </p:cTn>
+                        </p:par>
+                      </p:childTnLst>
+                    </p:cTn>
+                  </p:par>
+                  <p:par>
+                    <p:cTn id="35" fill="hold">
+                      <p:stCondLst>
+                        <p:cond delay="indefinite"/>
+                      </p:stCondLst>
+                      <p:childTnLst>
+                        <p:par>
+                          <p:cTn id="36" fill="hold">
+                            <p:stCondLst>
+                              <p:cond delay="0"/>
+                            </p:stCondLst>
+                            <p:childTnLst>
+                              <p:par>
+                                <p:cTn id="37" presetID="1" presetClass="entr" presetSubtype="0" fill="hold" grpId="0" nodeType="clickEffect">
+                                  <p:stCondLst>
+                                    <p:cond delay="0"/>
+                                  </p:stCondLst>
+                                  <p:childTnLst>
+                                    <p:set>
+                                      <p:cBhvr>
+                                        <p:cTn id="38" dur="1" fill="hold">
+                                          <p:stCondLst>
+                                            <p:cond delay="0"/>
+                                          </p:stCondLst>
+                                        </p:cTn>
+                                        <p:tgtEl>
+                                          <p:spTgt spid="41"/>
+                                        </p:tgtEl>
+                                        <p:attrNameLst>
+                                          <p:attrName>style.visibility</p:attrName>
+                                        </p:attrNameLst>
+                                      </p:cBhvr>
+                                      <p:to>
+                                        <p:strVal val="visible"/>
+                                      </p:to>
+                                    </p:set>
+                                  </p:childTnLst>
+                                </p:cTn>
+                              </p:par>
+                              <p:par>
+                                <p:cTn id="39" presetID="1" presetClass="entr" presetSubtype="0" fill="hold" nodeType="withEffect">
+                                  <p:stCondLst>
+                                    <p:cond delay="0"/>
+                                  </p:stCondLst>
+                                  <p:childTnLst>
+                                    <p:set>
+                                      <p:cBhvr>
+                                        <p:cTn id="40" dur="1" fill="hold">
+                                          <p:stCondLst>
+                                            <p:cond delay="0"/>
+                                          </p:stCondLst>
+                                        </p:cTn>
+                                        <p:tgtEl>
+                                          <p:spTgt spid="3078"/>
+                                        </p:tgtEl>
+                                        <p:attrNameLst>
+                                          <p:attrName>style.visibility</p:attrName>
+                                        </p:attrNameLst>
+                                      </p:cBhvr>
+                                      <p:to>
+                                        <p:strVal val="visible"/>
+                                      </p:to>
+                                    </p:set>
+                                  </p:childTnLst>
+                                </p:cTn>
+                              </p:par>
+                              <p:par>
+                                <p:cTn id="41" presetID="1" presetClass="entr" presetSubtype="0" fill="hold" grpId="0" nodeType="withEffect">
+                                  <p:stCondLst>
+                                    <p:cond delay="0"/>
+                                  </p:stCondLst>
+                                  <p:childTnLst>
+                                    <p:set>
+                                      <p:cBhvr>
+                                        <p:cTn id="42" dur="1" fill="hold">
+                                          <p:stCondLst>
+                                            <p:cond delay="0"/>
+                                          </p:stCondLst>
+                                        </p:cTn>
+                                        <p:tgtEl>
                                           <p:spTgt spid="51"/>
+                                        </p:tgtEl>
+                                        <p:attrNameLst>
+                                          <p:attrName>style.visibility</p:attrName>
+                                        </p:attrNameLst>
+                                      </p:cBhvr>
+                                      <p:to>
+                                        <p:strVal val="visible"/>
+                                      </p:to>
+                                    </p:set>
+                                  </p:childTnLst>
+                                </p:cTn>
+                              </p:par>
+                              <p:par>
+                                <p:cTn id="43" presetID="1" presetClass="entr" presetSubtype="0" fill="hold" nodeType="withEffect">
+                                  <p:stCondLst>
+                                    <p:cond delay="0"/>
+                                  </p:stCondLst>
+                                  <p:childTnLst>
+                                    <p:set>
+                                      <p:cBhvr>
+                                        <p:cTn id="44" dur="1" fill="hold">
+                                          <p:stCondLst>
+                                            <p:cond delay="0"/>
+                                          </p:stCondLst>
+                                        </p:cTn>
+                                        <p:tgtEl>
+                                          <p:spTgt spid="50"/>
                                         </p:tgtEl>
                                         <p:attrNameLst>
                                           <p:attrName>style.visibility</p:attrName>
@@ -14396,6 +15643,8 @@
       <p:bldP spid="41" grpId="0"/>
       <p:bldP spid="43" grpId="0"/>
       <p:bldP spid="51" grpId="0"/>
+      <p:bldP spid="2" grpId="0"/>
+      <p:bldP spid="6" grpId="0"/>
     </p:bldLst>
   </p:timing>
 </p:sld>
@@ -15317,26 +16566,35 @@
                                   </p:childTnLst>
                                 </p:cTn>
                               </p:par>
-                            </p:childTnLst>
-                          </p:cTn>
-                        </p:par>
-                      </p:childTnLst>
-                    </p:cTn>
-                  </p:par>
-                  <p:par>
-                    <p:cTn id="23" fill="hold">
-                      <p:stCondLst>
-                        <p:cond delay="indefinite"/>
-                      </p:stCondLst>
-                      <p:childTnLst>
-                        <p:par>
-                          <p:cTn id="24" fill="hold">
-                            <p:stCondLst>
-                              <p:cond delay="0"/>
-                            </p:stCondLst>
-                            <p:childTnLst>
                               <p:par>
-                                <p:cTn id="25" presetID="1" presetClass="entr" presetSubtype="0" fill="hold" nodeType="clickEffect">
+                                <p:cTn id="23" presetID="1" presetClass="entr" presetSubtype="0" fill="hold" nodeType="withEffect">
+                                  <p:stCondLst>
+                                    <p:cond delay="0"/>
+                                  </p:stCondLst>
+                                  <p:childTnLst>
+                                    <p:set>
+                                      <p:cBhvr>
+                                        <p:cTn id="24" dur="1" fill="hold">
+                                          <p:stCondLst>
+                                            <p:cond delay="0"/>
+                                          </p:stCondLst>
+                                        </p:cTn>
+                                        <p:tgtEl>
+                                          <p:spTgt spid="4108"/>
+                                        </p:tgtEl>
+                                        <p:attrNameLst>
+                                          <p:attrName>style.visibility</p:attrName>
+                                        </p:attrNameLst>
+                                      </p:cBhvr>
+                                      <p:to>
+                                        <p:strVal val="visible"/>
+                                      </p:to>
+                                    </p:set>
+                                  </p:childTnLst>
+                                </p:cTn>
+                              </p:par>
+                              <p:par>
+                                <p:cTn id="25" presetID="1" presetClass="entr" presetSubtype="0" fill="hold" grpId="0" nodeType="withEffect">
                                   <p:stCondLst>
                                     <p:cond delay="0"/>
                                   </p:stCondLst>
@@ -15349,7 +16607,7 @@
                                           </p:stCondLst>
                                         </p:cTn>
                                         <p:tgtEl>
-                                          <p:spTgt spid="4108"/>
+                                          <p:spTgt spid="18"/>
                                         </p:tgtEl>
                                         <p:attrNameLst>
                                           <p:attrName>style.visibility</p:attrName>
@@ -15371,51 +16629,6 @@
                                     <p:set>
                                       <p:cBhvr>
                                         <p:cTn id="28" dur="1" fill="hold">
-                                          <p:stCondLst>
-                                            <p:cond delay="0"/>
-                                          </p:stCondLst>
-                                        </p:cTn>
-                                        <p:tgtEl>
-                                          <p:spTgt spid="18"/>
-                                        </p:tgtEl>
-                                        <p:attrNameLst>
-                                          <p:attrName>style.visibility</p:attrName>
-                                        </p:attrNameLst>
-                                      </p:cBhvr>
-                                      <p:to>
-                                        <p:strVal val="visible"/>
-                                      </p:to>
-                                    </p:set>
-                                  </p:childTnLst>
-                                </p:cTn>
-                              </p:par>
-                            </p:childTnLst>
-                          </p:cTn>
-                        </p:par>
-                      </p:childTnLst>
-                    </p:cTn>
-                  </p:par>
-                  <p:par>
-                    <p:cTn id="29" fill="hold">
-                      <p:stCondLst>
-                        <p:cond delay="indefinite"/>
-                      </p:stCondLst>
-                      <p:childTnLst>
-                        <p:par>
-                          <p:cTn id="30" fill="hold">
-                            <p:stCondLst>
-                              <p:cond delay="0"/>
-                            </p:stCondLst>
-                            <p:childTnLst>
-                              <p:par>
-                                <p:cTn id="31" presetID="1" presetClass="entr" presetSubtype="0" fill="hold" grpId="0" nodeType="clickEffect">
-                                  <p:stCondLst>
-                                    <p:cond delay="0"/>
-                                  </p:stCondLst>
-                                  <p:childTnLst>
-                                    <p:set>
-                                      <p:cBhvr>
-                                        <p:cTn id="32" dur="1" fill="hold">
                                           <p:stCondLst>
                                             <p:cond delay="0"/>
                                           </p:stCondLst>
@@ -16151,7 +17364,7 @@
                             </p:stCondLst>
                             <p:childTnLst>
                               <p:par>
-                                <p:cTn id="5" presetID="1" presetClass="entr" presetSubtype="0" fill="hold" nodeType="clickEffect">
+                                <p:cTn id="5" presetID="1" presetClass="entr" presetSubtype="0" fill="hold" grpId="0" nodeType="clickEffect">
                                   <p:stCondLst>
                                     <p:cond delay="0"/>
                                   </p:stCondLst>
@@ -16164,7 +17377,7 @@
                                           </p:stCondLst>
                                         </p:cTn>
                                         <p:tgtEl>
-                                          <p:spTgt spid="1062"/>
+                                          <p:spTgt spid="19"/>
                                         </p:tgtEl>
                                         <p:attrNameLst>
                                           <p:attrName>style.visibility</p:attrName>
@@ -16177,26 +17390,35 @@
                                   </p:childTnLst>
                                 </p:cTn>
                               </p:par>
-                            </p:childTnLst>
-                          </p:cTn>
-                        </p:par>
-                      </p:childTnLst>
-                    </p:cTn>
-                  </p:par>
-                  <p:par>
-                    <p:cTn id="7" fill="hold">
-                      <p:stCondLst>
-                        <p:cond delay="indefinite"/>
-                      </p:stCondLst>
-                      <p:childTnLst>
-                        <p:par>
-                          <p:cTn id="8" fill="hold">
-                            <p:stCondLst>
-                              <p:cond delay="0"/>
-                            </p:stCondLst>
-                            <p:childTnLst>
                               <p:par>
-                                <p:cTn id="9" presetID="1" presetClass="entr" presetSubtype="0" fill="hold" nodeType="clickEffect">
+                                <p:cTn id="7" presetID="1" presetClass="entr" presetSubtype="0" fill="hold" nodeType="withEffect">
+                                  <p:stCondLst>
+                                    <p:cond delay="0"/>
+                                  </p:stCondLst>
+                                  <p:childTnLst>
+                                    <p:set>
+                                      <p:cBhvr>
+                                        <p:cTn id="8" dur="1" fill="hold">
+                                          <p:stCondLst>
+                                            <p:cond delay="0"/>
+                                          </p:stCondLst>
+                                        </p:cTn>
+                                        <p:tgtEl>
+                                          <p:spTgt spid="18"/>
+                                        </p:tgtEl>
+                                        <p:attrNameLst>
+                                          <p:attrName>style.visibility</p:attrName>
+                                        </p:attrNameLst>
+                                      </p:cBhvr>
+                                      <p:to>
+                                        <p:strVal val="visible"/>
+                                      </p:to>
+                                    </p:set>
+                                  </p:childTnLst>
+                                </p:cTn>
+                              </p:par>
+                              <p:par>
+                                <p:cTn id="9" presetID="1" presetClass="entr" presetSubtype="0" fill="hold" nodeType="withEffect">
                                   <p:stCondLst>
                                     <p:cond delay="0"/>
                                   </p:stCondLst>
@@ -16209,7 +17431,7 @@
                                           </p:stCondLst>
                                         </p:cTn>
                                         <p:tgtEl>
-                                          <p:spTgt spid="7"/>
+                                          <p:spTgt spid="11"/>
                                         </p:tgtEl>
                                         <p:attrNameLst>
                                           <p:attrName>style.visibility</p:attrName>
@@ -16241,7 +17463,7 @@
                             </p:stCondLst>
                             <p:childTnLst>
                               <p:par>
-                                <p:cTn id="13" presetID="1" presetClass="entr" presetSubtype="0" fill="hold" nodeType="clickEffect">
+                                <p:cTn id="13" presetID="1" presetClass="entr" presetSubtype="0" fill="hold" grpId="0" nodeType="clickEffect">
                                   <p:stCondLst>
                                     <p:cond delay="0"/>
                                   </p:stCondLst>
@@ -16254,7 +17476,7 @@
                                           </p:stCondLst>
                                         </p:cTn>
                                         <p:tgtEl>
-                                          <p:spTgt spid="18"/>
+                                          <p:spTgt spid="33"/>
                                         </p:tgtEl>
                                         <p:attrNameLst>
                                           <p:attrName>style.visibility</p:attrName>
@@ -16268,7 +17490,7 @@
                                 </p:cTn>
                               </p:par>
                               <p:par>
-                                <p:cTn id="15" presetID="1" presetClass="entr" presetSubtype="0" fill="hold" grpId="0" nodeType="withEffect">
+                                <p:cTn id="15" presetID="1" presetClass="entr" presetSubtype="0" fill="hold" nodeType="withEffect">
                                   <p:stCondLst>
                                     <p:cond delay="0"/>
                                   </p:stCondLst>
@@ -16281,7 +17503,7 @@
                                           </p:stCondLst>
                                         </p:cTn>
                                         <p:tgtEl>
-                                          <p:spTgt spid="19"/>
+                                          <p:spTgt spid="22"/>
                                         </p:tgtEl>
                                         <p:attrNameLst>
                                           <p:attrName>style.visibility</p:attrName>
@@ -16294,26 +17516,35 @@
                                   </p:childTnLst>
                                 </p:cTn>
                               </p:par>
-                            </p:childTnLst>
-                          </p:cTn>
-                        </p:par>
-                      </p:childTnLst>
-                    </p:cTn>
-                  </p:par>
-                  <p:par>
-                    <p:cTn id="17" fill="hold">
-                      <p:stCondLst>
-                        <p:cond delay="indefinite"/>
-                      </p:stCondLst>
-                      <p:childTnLst>
-                        <p:par>
-                          <p:cTn id="18" fill="hold">
-                            <p:stCondLst>
-                              <p:cond delay="0"/>
-                            </p:stCondLst>
-                            <p:childTnLst>
                               <p:par>
-                                <p:cTn id="19" presetID="1" presetClass="entr" presetSubtype="0" fill="hold" nodeType="clickEffect">
+                                <p:cTn id="17" presetID="1" presetClass="entr" presetSubtype="0" fill="hold" nodeType="withEffect">
+                                  <p:stCondLst>
+                                    <p:cond delay="0"/>
+                                  </p:stCondLst>
+                                  <p:childTnLst>
+                                    <p:set>
+                                      <p:cBhvr>
+                                        <p:cTn id="18" dur="1" fill="hold">
+                                          <p:stCondLst>
+                                            <p:cond delay="0"/>
+                                          </p:stCondLst>
+                                        </p:cTn>
+                                        <p:tgtEl>
+                                          <p:spTgt spid="25"/>
+                                        </p:tgtEl>
+                                        <p:attrNameLst>
+                                          <p:attrName>style.visibility</p:attrName>
+                                        </p:attrNameLst>
+                                      </p:cBhvr>
+                                      <p:to>
+                                        <p:strVal val="visible"/>
+                                      </p:to>
+                                    </p:set>
+                                  </p:childTnLst>
+                                </p:cTn>
+                              </p:par>
+                              <p:par>
+                                <p:cTn id="19" presetID="1" presetClass="entr" presetSubtype="0" fill="hold" grpId="0" nodeType="withEffect">
                                   <p:stCondLst>
                                     <p:cond delay="0"/>
                                   </p:stCondLst>
@@ -16326,7 +17557,7 @@
                                           </p:stCondLst>
                                         </p:cTn>
                                         <p:tgtEl>
-                                          <p:spTgt spid="11"/>
+                                          <p:spTgt spid="35"/>
                                         </p:tgtEl>
                                         <p:attrNameLst>
                                           <p:attrName>style.visibility</p:attrName>
@@ -16339,33 +17570,15 @@
                                   </p:childTnLst>
                                 </p:cTn>
                               </p:par>
-                            </p:childTnLst>
-                          </p:cTn>
-                        </p:par>
-                      </p:childTnLst>
-                    </p:cTn>
-                  </p:par>
-                  <p:par>
-                    <p:cTn id="21" fill="hold">
-                      <p:stCondLst>
-                        <p:cond delay="indefinite"/>
-                      </p:stCondLst>
-                      <p:childTnLst>
-                        <p:par>
-                          <p:cTn id="22" fill="hold">
-                            <p:stCondLst>
-                              <p:cond delay="0"/>
-                            </p:stCondLst>
-                            <p:childTnLst>
                               <p:par>
-                                <p:cTn id="23" presetID="1" presetClass="entr" presetSubtype="0" fill="hold" nodeType="clickEffect">
+                                <p:cTn id="21" presetID="1" presetClass="entr" presetSubtype="0" fill="hold" nodeType="withEffect">
                                   <p:stCondLst>
                                     <p:cond delay="0"/>
                                   </p:stCondLst>
                                   <p:childTnLst>
                                     <p:set>
                                       <p:cBhvr>
-                                        <p:cTn id="24" dur="1" fill="hold">
+                                        <p:cTn id="22" dur="1" fill="hold">
                                           <p:stCondLst>
                                             <p:cond delay="0"/>
                                           </p:stCondLst>
@@ -16385,146 +17598,20 @@
                                 </p:cTn>
                               </p:par>
                               <p:par>
-                                <p:cTn id="25" presetID="1" presetClass="entr" presetSubtype="0" fill="hold" nodeType="withEffect">
+                                <p:cTn id="23" presetID="1" presetClass="entr" presetSubtype="0" fill="hold" nodeType="withEffect">
                                   <p:stCondLst>
                                     <p:cond delay="0"/>
                                   </p:stCondLst>
                                   <p:childTnLst>
                                     <p:set>
                                       <p:cBhvr>
-                                        <p:cTn id="26" dur="1" fill="hold">
+                                        <p:cTn id="24" dur="1" fill="hold">
                                           <p:stCondLst>
                                             <p:cond delay="0"/>
                                           </p:stCondLst>
                                         </p:cTn>
                                         <p:tgtEl>
                                           <p:spTgt spid="8"/>
-                                        </p:tgtEl>
-                                        <p:attrNameLst>
-                                          <p:attrName>style.visibility</p:attrName>
-                                        </p:attrNameLst>
-                                      </p:cBhvr>
-                                      <p:to>
-                                        <p:strVal val="visible"/>
-                                      </p:to>
-                                    </p:set>
-                                  </p:childTnLst>
-                                </p:cTn>
-                              </p:par>
-                            </p:childTnLst>
-                          </p:cTn>
-                        </p:par>
-                      </p:childTnLst>
-                    </p:cTn>
-                  </p:par>
-                  <p:par>
-                    <p:cTn id="27" fill="hold">
-                      <p:stCondLst>
-                        <p:cond delay="indefinite"/>
-                      </p:stCondLst>
-                      <p:childTnLst>
-                        <p:par>
-                          <p:cTn id="28" fill="hold">
-                            <p:stCondLst>
-                              <p:cond delay="0"/>
-                            </p:stCondLst>
-                            <p:childTnLst>
-                              <p:par>
-                                <p:cTn id="29" presetID="1" presetClass="entr" presetSubtype="0" fill="hold" nodeType="clickEffect">
-                                  <p:stCondLst>
-                                    <p:cond delay="0"/>
-                                  </p:stCondLst>
-                                  <p:childTnLst>
-                                    <p:set>
-                                      <p:cBhvr>
-                                        <p:cTn id="30" dur="1" fill="hold">
-                                          <p:stCondLst>
-                                            <p:cond delay="0"/>
-                                          </p:stCondLst>
-                                        </p:cTn>
-                                        <p:tgtEl>
-                                          <p:spTgt spid="22"/>
-                                        </p:tgtEl>
-                                        <p:attrNameLst>
-                                          <p:attrName>style.visibility</p:attrName>
-                                        </p:attrNameLst>
-                                      </p:cBhvr>
-                                      <p:to>
-                                        <p:strVal val="visible"/>
-                                      </p:to>
-                                    </p:set>
-                                  </p:childTnLst>
-                                </p:cTn>
-                              </p:par>
-                              <p:par>
-                                <p:cTn id="31" presetID="1" presetClass="entr" presetSubtype="0" fill="hold" grpId="0" nodeType="withEffect">
-                                  <p:stCondLst>
-                                    <p:cond delay="0"/>
-                                  </p:stCondLst>
-                                  <p:childTnLst>
-                                    <p:set>
-                                      <p:cBhvr>
-                                        <p:cTn id="32" dur="1" fill="hold">
-                                          <p:stCondLst>
-                                            <p:cond delay="0"/>
-                                          </p:stCondLst>
-                                        </p:cTn>
-                                        <p:tgtEl>
-                                          <p:spTgt spid="33"/>
-                                        </p:tgtEl>
-                                        <p:attrNameLst>
-                                          <p:attrName>style.visibility</p:attrName>
-                                        </p:attrNameLst>
-                                      </p:cBhvr>
-                                      <p:to>
-                                        <p:strVal val="visible"/>
-                                      </p:to>
-                                    </p:set>
-                                  </p:childTnLst>
-                                </p:cTn>
-                              </p:par>
-                              <p:par>
-                                <p:cTn id="33" presetID="1" presetClass="entr" presetSubtype="0" fill="hold" grpId="0" nodeType="withEffect">
-                                  <p:stCondLst>
-                                    <p:cond delay="0"/>
-                                  </p:stCondLst>
-                                  <p:childTnLst>
-                                    <p:set>
-                                      <p:cBhvr>
-                                        <p:cTn id="34" dur="1" fill="hold">
-                                          <p:stCondLst>
-                                            <p:cond delay="0"/>
-                                          </p:stCondLst>
-                                        </p:cTn>
-                                        <p:tgtEl>
-                                          <p:spTgt spid="35"/>
-                                        </p:tgtEl>
-                                        <p:attrNameLst>
-                                          <p:attrName>style.visibility</p:attrName>
-                                        </p:attrNameLst>
-                                      </p:cBhvr>
-                                      <p:to>
-                                        <p:strVal val="visible"/>
-                                      </p:to>
-                                    </p:set>
-                                  </p:childTnLst>
-                                </p:cTn>
-                              </p:par>
-                              <p:par>
-                                <p:cTn id="35" presetID="1" presetClass="entr" presetSubtype="0" fill="hold" nodeType="withEffect">
-                                  <p:stCondLst>
-                                    <p:cond delay="0"/>
-                                  </p:stCondLst>
-                                  <p:childTnLst>
-                                    <p:set>
-                                      <p:cBhvr>
-                                        <p:cTn id="36" dur="1" fill="hold">
-                                          <p:stCondLst>
-                                            <p:cond delay="0"/>
-                                          </p:stCondLst>
-                                        </p:cTn>
-                                        <p:tgtEl>
-                                          <p:spTgt spid="25"/>
                                         </p:tgtEl>
                                         <p:attrNameLst>
                                           <p:attrName>style.visibility</p:attrName>
@@ -18110,7 +19197,7 @@
         </p:blipFill>
         <p:spPr>
           <a:xfrm>
-            <a:off x="5542978" y="981891"/>
+            <a:off x="5722051" y="975581"/>
             <a:ext cx="682531" cy="555992"/>
           </a:xfrm>
           <a:prstGeom prst="ellipse">
@@ -18252,7 +19339,7 @@
           <a:p>
             <a:r>
               <a:rPr lang="en-US" sz="1154" dirty="0"/>
-              <a:t>Worker Nodes</a:t>
+              <a:t>Compute Nodes</a:t>
             </a:r>
             <a:endParaRPr lang="LID4096" sz="1154" dirty="0"/>
           </a:p>
@@ -18933,7 +20020,7 @@
         <p:spPr>
           <a:xfrm>
             <a:off x="863166" y="3515620"/>
-            <a:ext cx="5204758" cy="837922"/>
+            <a:ext cx="5204758" cy="866391"/>
           </a:xfrm>
           <a:prstGeom prst="rect">
             <a:avLst/>
@@ -18947,14 +20034,14 @@
           <a:lstStyle/>
           <a:p>
             <a:r>
-              <a:rPr lang="en-US" sz="1615" dirty="0"/>
+              <a:rPr lang="en-US" b="1" dirty="0"/>
               <a:t>Drawbacks</a:t>
             </a:r>
           </a:p>
           <a:p>
             <a:pPr marL="954279" lvl="1" indent="-329698">
-              <a:buFont typeface="Arial" panose="020B0604020202020204" pitchFamily="34" charset="0"/>
-              <a:buChar char="•"/>
+              <a:buFont typeface="Wingdings" panose="05000000000000000000" pitchFamily="2" charset="2"/>
+              <a:buChar char="ü"/>
             </a:pPr>
             <a:r>
               <a:rPr lang="en-US" sz="1615" dirty="0"/>
@@ -19325,9 +20412,6 @@
                     <p:cTn id="3" fill="hold">
                       <p:stCondLst>
                         <p:cond delay="indefinite"/>
-                        <p:cond evt="onBegin" delay="0">
-                          <p:tn val="2"/>
-                        </p:cond>
                       </p:stCondLst>
                       <p:childTnLst>
                         <p:par>
@@ -19337,7 +20421,7 @@
                             </p:stCondLst>
                             <p:childTnLst>
                               <p:par>
-                                <p:cTn id="5" presetID="1" presetClass="entr" presetSubtype="0" fill="hold" nodeType="withEffect">
+                                <p:cTn id="5" presetID="1" presetClass="entr" presetSubtype="0" fill="hold" grpId="0" nodeType="clickEffect">
                                   <p:stCondLst>
                                     <p:cond delay="0"/>
                                   </p:stCondLst>
@@ -19345,51 +20429,6 @@
                                     <p:set>
                                       <p:cBhvr>
                                         <p:cTn id="6" dur="1" fill="hold">
-                                          <p:stCondLst>
-                                            <p:cond delay="0"/>
-                                          </p:stCondLst>
-                                        </p:cTn>
-                                        <p:tgtEl>
-                                          <p:spTgt spid="27"/>
-                                        </p:tgtEl>
-                                        <p:attrNameLst>
-                                          <p:attrName>style.visibility</p:attrName>
-                                        </p:attrNameLst>
-                                      </p:cBhvr>
-                                      <p:to>
-                                        <p:strVal val="visible"/>
-                                      </p:to>
-                                    </p:set>
-                                  </p:childTnLst>
-                                </p:cTn>
-                              </p:par>
-                            </p:childTnLst>
-                          </p:cTn>
-                        </p:par>
-                      </p:childTnLst>
-                    </p:cTn>
-                  </p:par>
-                  <p:par>
-                    <p:cTn id="7" fill="hold">
-                      <p:stCondLst>
-                        <p:cond delay="indefinite"/>
-                      </p:stCondLst>
-                      <p:childTnLst>
-                        <p:par>
-                          <p:cTn id="8" fill="hold">
-                            <p:stCondLst>
-                              <p:cond delay="0"/>
-                            </p:stCondLst>
-                            <p:childTnLst>
-                              <p:par>
-                                <p:cTn id="9" presetID="1" presetClass="entr" presetSubtype="0" fill="hold" grpId="0" nodeType="clickEffect">
-                                  <p:stCondLst>
-                                    <p:cond delay="0"/>
-                                  </p:stCondLst>
-                                  <p:childTnLst>
-                                    <p:set>
-                                      <p:cBhvr>
-                                        <p:cTn id="10" dur="1" fill="hold">
                                           <p:stCondLst>
                                             <p:cond delay="0"/>
                                           </p:stCondLst>
@@ -19409,47 +20448,20 @@
                                 </p:cTn>
                               </p:par>
                               <p:par>
-                                <p:cTn id="11" presetID="1" presetClass="entr" presetSubtype="0" fill="hold" grpId="0" nodeType="withEffect">
+                                <p:cTn id="7" presetID="1" presetClass="entr" presetSubtype="0" fill="hold" grpId="0" nodeType="withEffect">
                                   <p:stCondLst>
                                     <p:cond delay="0"/>
                                   </p:stCondLst>
                                   <p:childTnLst>
                                     <p:set>
                                       <p:cBhvr>
-                                        <p:cTn id="12" dur="1" fill="hold">
+                                        <p:cTn id="8" dur="1" fill="hold">
                                           <p:stCondLst>
                                             <p:cond delay="0"/>
                                           </p:stCondLst>
                                         </p:cTn>
                                         <p:tgtEl>
                                           <p:spTgt spid="8"/>
-                                        </p:tgtEl>
-                                        <p:attrNameLst>
-                                          <p:attrName>style.visibility</p:attrName>
-                                        </p:attrNameLst>
-                                      </p:cBhvr>
-                                      <p:to>
-                                        <p:strVal val="visible"/>
-                                      </p:to>
-                                    </p:set>
-                                  </p:childTnLst>
-                                </p:cTn>
-                              </p:par>
-                              <p:par>
-                                <p:cTn id="13" presetID="1" presetClass="entr" presetSubtype="0" fill="hold" grpId="0" nodeType="withEffect">
-                                  <p:stCondLst>
-                                    <p:cond delay="0"/>
-                                  </p:stCondLst>
-                                  <p:childTnLst>
-                                    <p:set>
-                                      <p:cBhvr>
-                                        <p:cTn id="14" dur="1" fill="hold">
-                                          <p:stCondLst>
-                                            <p:cond delay="0"/>
-                                          </p:stCondLst>
-                                        </p:cTn>
-                                        <p:tgtEl>
-                                          <p:spTgt spid="51"/>
                                         </p:tgtEl>
                                         <p:attrNameLst>
                                           <p:attrName>style.visibility</p:attrName>
@@ -19490,7 +20502,6 @@
       </p:par>
     </p:tnLst>
     <p:bldLst>
-      <p:bldP spid="51" grpId="0"/>
       <p:bldP spid="8" grpId="0"/>
       <p:bldP spid="9" grpId="0" animBg="1"/>
     </p:bldLst>

</xml_diff>

<commit_message>
stakeholder_meeting ppt final version
</commit_message>
<xml_diff>
--- a/docs/StakeholderM_CV.pptx
+++ b/docs/StakeholderM_CV.pptx
@@ -17,7 +17,7 @@
     <p:sldId id="577" r:id="rId8"/>
     <p:sldId id="562" r:id="rId9"/>
     <p:sldId id="588" r:id="rId10"/>
-    <p:sldId id="587" r:id="rId11"/>
+    <p:sldId id="591" r:id="rId11"/>
     <p:sldId id="569" r:id="rId12"/>
     <p:sldId id="584" r:id="rId13"/>
     <p:sldId id="582" r:id="rId14"/>
@@ -214,7 +214,7 @@
           <a:p>
             <a:fld id="{DEEF499D-5D06-4C0A-93C1-4EFBC05226AC}" type="datetimeFigureOut">
               <a:rPr lang="LID4096" smtClean="0"/>
-              <a:t>11/28/2023</a:t>
+              <a:t>11/29/2023</a:t>
             </a:fld>
             <a:endParaRPr lang="LID4096"/>
           </a:p>
@@ -702,7 +702,7 @@
           <a:p>
             <a:fld id="{72520918-6668-4200-834B-DD6D224E903E}" type="datetimeFigureOut">
               <a:rPr lang="LID4096" smtClean="0"/>
-              <a:t>11/28/2023</a:t>
+              <a:t>11/29/2023</a:t>
             </a:fld>
             <a:endParaRPr lang="LID4096"/>
           </a:p>
@@ -872,7 +872,7 @@
           <a:p>
             <a:fld id="{72520918-6668-4200-834B-DD6D224E903E}" type="datetimeFigureOut">
               <a:rPr lang="LID4096" smtClean="0"/>
-              <a:t>11/28/2023</a:t>
+              <a:t>11/29/2023</a:t>
             </a:fld>
             <a:endParaRPr lang="LID4096"/>
           </a:p>
@@ -1052,7 +1052,7 @@
           <a:p>
             <a:fld id="{72520918-6668-4200-834B-DD6D224E903E}" type="datetimeFigureOut">
               <a:rPr lang="LID4096" smtClean="0"/>
-              <a:t>11/28/2023</a:t>
+              <a:t>11/29/2023</a:t>
             </a:fld>
             <a:endParaRPr lang="LID4096"/>
           </a:p>
@@ -1644,7 +1644,7 @@
           <a:p>
             <a:fld id="{72520918-6668-4200-834B-DD6D224E903E}" type="datetimeFigureOut">
               <a:rPr lang="LID4096" smtClean="0"/>
-              <a:t>11/28/2023</a:t>
+              <a:t>11/29/2023</a:t>
             </a:fld>
             <a:endParaRPr lang="LID4096"/>
           </a:p>
@@ -1890,7 +1890,7 @@
           <a:p>
             <a:fld id="{72520918-6668-4200-834B-DD6D224E903E}" type="datetimeFigureOut">
               <a:rPr lang="LID4096" smtClean="0"/>
-              <a:t>11/28/2023</a:t>
+              <a:t>11/29/2023</a:t>
             </a:fld>
             <a:endParaRPr lang="LID4096"/>
           </a:p>
@@ -2122,7 +2122,7 @@
           <a:p>
             <a:fld id="{72520918-6668-4200-834B-DD6D224E903E}" type="datetimeFigureOut">
               <a:rPr lang="LID4096" smtClean="0"/>
-              <a:t>11/28/2023</a:t>
+              <a:t>11/29/2023</a:t>
             </a:fld>
             <a:endParaRPr lang="LID4096"/>
           </a:p>
@@ -2489,7 +2489,7 @@
           <a:p>
             <a:fld id="{72520918-6668-4200-834B-DD6D224E903E}" type="datetimeFigureOut">
               <a:rPr lang="LID4096" smtClean="0"/>
-              <a:t>11/28/2023</a:t>
+              <a:t>11/29/2023</a:t>
             </a:fld>
             <a:endParaRPr lang="LID4096"/>
           </a:p>
@@ -2607,7 +2607,7 @@
           <a:p>
             <a:fld id="{72520918-6668-4200-834B-DD6D224E903E}" type="datetimeFigureOut">
               <a:rPr lang="LID4096" smtClean="0"/>
-              <a:t>11/28/2023</a:t>
+              <a:t>11/29/2023</a:t>
             </a:fld>
             <a:endParaRPr lang="LID4096"/>
           </a:p>
@@ -2702,7 +2702,7 @@
           <a:p>
             <a:fld id="{72520918-6668-4200-834B-DD6D224E903E}" type="datetimeFigureOut">
               <a:rPr lang="LID4096" smtClean="0"/>
-              <a:t>11/28/2023</a:t>
+              <a:t>11/29/2023</a:t>
             </a:fld>
             <a:endParaRPr lang="LID4096"/>
           </a:p>
@@ -2979,7 +2979,7 @@
           <a:p>
             <a:fld id="{72520918-6668-4200-834B-DD6D224E903E}" type="datetimeFigureOut">
               <a:rPr lang="LID4096" smtClean="0"/>
-              <a:t>11/28/2023</a:t>
+              <a:t>11/29/2023</a:t>
             </a:fld>
             <a:endParaRPr lang="LID4096"/>
           </a:p>
@@ -3236,7 +3236,7 @@
           <a:p>
             <a:fld id="{72520918-6668-4200-834B-DD6D224E903E}" type="datetimeFigureOut">
               <a:rPr lang="LID4096" smtClean="0"/>
-              <a:t>11/28/2023</a:t>
+              <a:t>11/29/2023</a:t>
             </a:fld>
             <a:endParaRPr lang="LID4096"/>
           </a:p>
@@ -3449,7 +3449,7 @@
           <a:p>
             <a:fld id="{72520918-6668-4200-834B-DD6D224E903E}" type="datetimeFigureOut">
               <a:rPr lang="LID4096" smtClean="0"/>
-              <a:t>11/28/2023</a:t>
+              <a:t>11/29/2023</a:t>
             </a:fld>
             <a:endParaRPr lang="LID4096"/>
           </a:p>
@@ -4349,6 +4349,14 @@
 <file path=ppt/slides/slide10.xml><?xml version="1.0" encoding="utf-8"?>
 <p:sld xmlns:a="http://schemas.openxmlformats.org/drawingml/2006/main" xmlns:r="http://schemas.openxmlformats.org/officeDocument/2006/relationships" xmlns:p="http://schemas.openxmlformats.org/presentationml/2006/main">
   <p:cSld>
+    <p:bg>
+      <p:bgPr>
+        <a:solidFill>
+          <a:schemeClr val="bg1"/>
+        </a:solidFill>
+        <a:effectLst/>
+      </p:bgPr>
+    </p:bg>
     <p:spTree>
       <p:nvGrpSpPr>
         <p:cNvPr id="1" name=""/>
@@ -4363,12 +4371,58 @@
           <a:chExt cx="0" cy="0"/>
         </a:xfrm>
       </p:grpSpPr>
+      <p:sp>
+        <p:nvSpPr>
+          <p:cNvPr id="2" name="Title 1">
+            <a:extLst>
+              <a:ext uri="{FF2B5EF4-FFF2-40B4-BE49-F238E27FC236}">
+                <a16:creationId xmlns:a16="http://schemas.microsoft.com/office/drawing/2014/main" id="{7873C3F7-2D10-37BA-7672-4E725788C6B7}"/>
+              </a:ext>
+            </a:extLst>
+          </p:cNvPr>
+          <p:cNvSpPr>
+            <a:spLocks noGrp="1"/>
+          </p:cNvSpPr>
+          <p:nvPr>
+            <p:ph type="title"/>
+          </p:nvPr>
+        </p:nvSpPr>
+        <p:spPr>
+          <a:xfrm>
+            <a:off x="119376" y="166793"/>
+            <a:ext cx="10515600" cy="471784"/>
+          </a:xfrm>
+        </p:spPr>
+        <p:txBody>
+          <a:bodyPr>
+            <a:normAutofit/>
+          </a:bodyPr>
+          <a:lstStyle/>
+          <a:p>
+            <a:r>
+              <a:rPr lang="en-US" sz="1800" b="1" dirty="0">
+                <a:solidFill>
+                  <a:schemeClr val="accent1"/>
+                </a:solidFill>
+                <a:latin typeface="Avenir Next" panose="020B0503020202020204" pitchFamily="34" charset="0"/>
+              </a:rPr>
+              <a:t>Our approach:   Job management framework  +  User Interface</a:t>
+            </a:r>
+            <a:endParaRPr lang="en-NL" sz="1800" b="1" dirty="0">
+              <a:solidFill>
+                <a:schemeClr val="accent1"/>
+              </a:solidFill>
+              <a:latin typeface="Avenir Next" panose="020B0503020202020204" pitchFamily="34" charset="0"/>
+            </a:endParaRPr>
+          </a:p>
+        </p:txBody>
+      </p:sp>
       <p:pic>
         <p:nvPicPr>
-          <p:cNvPr id="37" name="Content Placeholder 5">
-            <a:extLst>
-              <a:ext uri="{FF2B5EF4-FFF2-40B4-BE49-F238E27FC236}">
-                <a16:creationId xmlns:a16="http://schemas.microsoft.com/office/drawing/2014/main" id="{699EBC18-2E81-B250-63C4-C4BD32D949A2}"/>
+          <p:cNvPr id="34" name="Content Placeholder 5">
+            <a:extLst>
+              <a:ext uri="{FF2B5EF4-FFF2-40B4-BE49-F238E27FC236}">
+                <a16:creationId xmlns:a16="http://schemas.microsoft.com/office/drawing/2014/main" id="{834140F9-45E8-3374-3EEB-6DCE8BEA0261}"/>
               </a:ext>
             </a:extLst>
           </p:cNvPr>
@@ -4395,244 +4449,266 @@
       </p:pic>
       <p:sp>
         <p:nvSpPr>
-          <p:cNvPr id="14" name="Rectangle 13">
-            <a:extLst>
-              <a:ext uri="{FF2B5EF4-FFF2-40B4-BE49-F238E27FC236}">
-                <a16:creationId xmlns:a16="http://schemas.microsoft.com/office/drawing/2014/main" id="{2D6135E0-79A8-6B14-4D36-DD3EBD018E32}"/>
-              </a:ext>
-            </a:extLst>
-          </p:cNvPr>
-          <p:cNvSpPr/>
-          <p:nvPr/>
-        </p:nvSpPr>
-        <p:spPr>
-          <a:xfrm>
-            <a:off x="4290085" y="734388"/>
-            <a:ext cx="5337568" cy="2069913"/>
+          <p:cNvPr id="6" name="TextBox 5">
+            <a:extLst>
+              <a:ext uri="{FF2B5EF4-FFF2-40B4-BE49-F238E27FC236}">
+                <a16:creationId xmlns:a16="http://schemas.microsoft.com/office/drawing/2014/main" id="{A66FB154-7F5B-16DC-CAC1-9D43F59AE500}"/>
+              </a:ext>
+            </a:extLst>
+          </p:cNvPr>
+          <p:cNvSpPr txBox="1"/>
+          <p:nvPr/>
+        </p:nvSpPr>
+        <p:spPr>
+          <a:xfrm>
+            <a:off x="499581" y="2351534"/>
+            <a:ext cx="7864141" cy="1384995"/>
           </a:xfrm>
           <a:prstGeom prst="rect">
             <a:avLst/>
           </a:prstGeom>
-          <a:solidFill>
-            <a:schemeClr val="bg1"/>
-          </a:solidFill>
-          <a:ln>
-            <a:solidFill>
-              <a:schemeClr val="bg1">
-                <a:lumMod val="85000"/>
-              </a:schemeClr>
-            </a:solidFill>
-            <a:prstDash val="lgDash"/>
-          </a:ln>
-        </p:spPr>
-        <p:style>
-          <a:lnRef idx="2">
-            <a:schemeClr val="accent1">
-              <a:shade val="15000"/>
-            </a:schemeClr>
-          </a:lnRef>
-          <a:fillRef idx="1">
-            <a:schemeClr val="accent1"/>
-          </a:fillRef>
-          <a:effectRef idx="0">
-            <a:schemeClr val="accent1"/>
-          </a:effectRef>
-          <a:fontRef idx="minor">
-            <a:schemeClr val="lt1"/>
-          </a:fontRef>
-        </p:style>
-        <p:txBody>
-          <a:bodyPr rtlCol="0" anchor="ctr"/>
+          <a:noFill/>
+        </p:spPr>
+        <p:txBody>
+          <a:bodyPr wrap="none" rtlCol="0">
+            <a:spAutoFit/>
+          </a:bodyPr>
           <a:lstStyle/>
           <a:p>
-            <a:pPr algn="ctr"/>
-            <a:endParaRPr lang="LID4096" sz="2077" dirty="0"/>
-          </a:p>
-        </p:txBody>
-      </p:sp>
-      <p:cxnSp>
-        <p:nvCxnSpPr>
-          <p:cNvPr id="18" name="Straight Arrow Connector 17">
-            <a:extLst>
-              <a:ext uri="{FF2B5EF4-FFF2-40B4-BE49-F238E27FC236}">
-                <a16:creationId xmlns:a16="http://schemas.microsoft.com/office/drawing/2014/main" id="{76184190-2354-4872-B1EF-E985A5E5E8C3}"/>
-              </a:ext>
-            </a:extLst>
-          </p:cNvPr>
-          <p:cNvCxnSpPr>
-            <a:cxnSpLocks/>
-          </p:cNvCxnSpPr>
-          <p:nvPr/>
-        </p:nvCxnSpPr>
-        <p:spPr>
-          <a:xfrm flipH="1">
-            <a:off x="5042696" y="1461595"/>
-            <a:ext cx="1980786" cy="0"/>
-          </a:xfrm>
-          <a:prstGeom prst="straightConnector1">
-            <a:avLst/>
-          </a:prstGeom>
-          <a:ln w="57150">
-            <a:headEnd type="triangle"/>
-            <a:tailEnd type="triangle"/>
-          </a:ln>
-        </p:spPr>
-        <p:style>
-          <a:lnRef idx="1">
-            <a:schemeClr val="accent1"/>
-          </a:lnRef>
-          <a:fillRef idx="0">
-            <a:schemeClr val="accent1"/>
-          </a:fillRef>
-          <a:effectRef idx="0">
-            <a:schemeClr val="accent1"/>
-          </a:effectRef>
-          <a:fontRef idx="minor">
-            <a:schemeClr val="tx1"/>
-          </a:fontRef>
-        </p:style>
-      </p:cxnSp>
-      <p:sp>
-        <p:nvSpPr>
-          <p:cNvPr id="21" name="Rectangle 20">
-            <a:extLst>
-              <a:ext uri="{FF2B5EF4-FFF2-40B4-BE49-F238E27FC236}">
-                <a16:creationId xmlns:a16="http://schemas.microsoft.com/office/drawing/2014/main" id="{00CFA7AD-2410-1FEB-8C7C-6E0961031B9D}"/>
-              </a:ext>
-            </a:extLst>
-          </p:cNvPr>
-          <p:cNvSpPr/>
-          <p:nvPr/>
-        </p:nvSpPr>
-        <p:spPr>
-          <a:xfrm>
-            <a:off x="7162969" y="942890"/>
-            <a:ext cx="1282952" cy="1356333"/>
+            <a:r>
+              <a:rPr lang="en-US" b="1" i="0" dirty="0">
+                <a:solidFill>
+                  <a:srgbClr val="1F2328"/>
+                </a:solidFill>
+                <a:effectLst/>
+                <a:latin typeface="-apple-system"/>
+              </a:rPr>
+              <a:t>Why job management framework?</a:t>
+            </a:r>
+          </a:p>
+          <a:p>
+            <a:endParaRPr lang="en-US" b="1" i="0" dirty="0">
+              <a:solidFill>
+                <a:srgbClr val="1F2328"/>
+              </a:solidFill>
+              <a:effectLst/>
+              <a:latin typeface="-apple-system"/>
+            </a:endParaRPr>
+          </a:p>
+          <a:p>
+            <a:pPr marL="827075" lvl="1" indent="-285750">
+              <a:buFont typeface="Wingdings" panose="05000000000000000000" pitchFamily="2" charset="2"/>
+              <a:buChar char="ü"/>
+            </a:pPr>
+            <a:r>
+              <a:rPr lang="en-US" sz="1600" b="0" i="0" dirty="0">
+                <a:solidFill>
+                  <a:srgbClr val="1F2328"/>
+                </a:solidFill>
+                <a:effectLst/>
+                <a:latin typeface="-apple-system"/>
+              </a:rPr>
+              <a:t>To manage large amount of jobs</a:t>
+            </a:r>
+          </a:p>
+          <a:p>
+            <a:pPr marL="827075" lvl="1" indent="-285750">
+              <a:buFont typeface="Wingdings" panose="05000000000000000000" pitchFamily="2" charset="2"/>
+              <a:buChar char="ü"/>
+            </a:pPr>
+            <a:r>
+              <a:rPr lang="en-US" sz="1600" b="0" i="0" dirty="0">
+                <a:solidFill>
+                  <a:srgbClr val="1F2328"/>
+                </a:solidFill>
+                <a:effectLst/>
+                <a:latin typeface="-apple-system"/>
+              </a:rPr>
+              <a:t>The Pitch-Catch System (</a:t>
+            </a:r>
+            <a:r>
+              <a:rPr lang="en-US" sz="1600" b="1" i="0" dirty="0" err="1">
+                <a:solidFill>
+                  <a:srgbClr val="1F2328"/>
+                </a:solidFill>
+                <a:effectLst/>
+                <a:latin typeface="-apple-system"/>
+              </a:rPr>
+              <a:t>PiCaS</a:t>
+            </a:r>
+            <a:r>
+              <a:rPr lang="en-US" sz="1600" b="0" i="0" dirty="0">
+                <a:solidFill>
+                  <a:srgbClr val="1F2328"/>
+                </a:solidFill>
+                <a:effectLst/>
+                <a:latin typeface="-apple-system"/>
+              </a:rPr>
+              <a:t>) framework</a:t>
+            </a:r>
+            <a:r>
+              <a:rPr lang="en-US" sz="1600" dirty="0">
+                <a:solidFill>
+                  <a:srgbClr val="1F2328"/>
+                </a:solidFill>
+                <a:latin typeface="-apple-system"/>
+              </a:rPr>
+              <a:t> is used as job management framework</a:t>
+            </a:r>
+            <a:r>
+              <a:rPr lang="en-US" sz="1600" b="0" i="0" dirty="0">
+                <a:solidFill>
+                  <a:srgbClr val="1F2328"/>
+                </a:solidFill>
+                <a:effectLst/>
+                <a:latin typeface="-apple-system"/>
+              </a:rPr>
+              <a:t> </a:t>
+            </a:r>
+          </a:p>
+          <a:p>
+            <a:pPr marL="1284275" lvl="2" indent="-285750">
+              <a:buFont typeface="Arial" panose="020B0604020202020204" pitchFamily="34" charset="0"/>
+              <a:buChar char="•"/>
+            </a:pPr>
+            <a:r>
+              <a:rPr lang="en-US" sz="1600" dirty="0">
+                <a:solidFill>
+                  <a:srgbClr val="1F2328"/>
+                </a:solidFill>
+                <a:latin typeface="-apple-system"/>
+              </a:rPr>
+              <a:t>Has a database</a:t>
+            </a:r>
+            <a:endParaRPr lang="en-US" sz="1600" b="0" i="0" dirty="0">
+              <a:solidFill>
+                <a:srgbClr val="1F2328"/>
+              </a:solidFill>
+              <a:effectLst/>
+              <a:latin typeface="-apple-system"/>
+            </a:endParaRPr>
+          </a:p>
+        </p:txBody>
+      </p:sp>
+      <p:sp>
+        <p:nvSpPr>
+          <p:cNvPr id="14" name="TextBox 13">
+            <a:extLst>
+              <a:ext uri="{FF2B5EF4-FFF2-40B4-BE49-F238E27FC236}">
+                <a16:creationId xmlns:a16="http://schemas.microsoft.com/office/drawing/2014/main" id="{4D4916D7-70BE-607B-CBC0-BEB090007482}"/>
+              </a:ext>
+            </a:extLst>
+          </p:cNvPr>
+          <p:cNvSpPr txBox="1"/>
+          <p:nvPr/>
+        </p:nvSpPr>
+        <p:spPr>
+          <a:xfrm>
+            <a:off x="499581" y="4147404"/>
+            <a:ext cx="5265993" cy="1138773"/>
           </a:xfrm>
           <a:prstGeom prst="rect">
             <a:avLst/>
           </a:prstGeom>
-          <a:solidFill>
-            <a:schemeClr val="bg1"/>
-          </a:solidFill>
-        </p:spPr>
-        <p:style>
-          <a:lnRef idx="2">
-            <a:schemeClr val="accent1">
-              <a:shade val="15000"/>
-            </a:schemeClr>
-          </a:lnRef>
-          <a:fillRef idx="1">
-            <a:schemeClr val="accent1"/>
-          </a:fillRef>
-          <a:effectRef idx="0">
-            <a:schemeClr val="accent1"/>
-          </a:effectRef>
-          <a:fontRef idx="minor">
-            <a:schemeClr val="lt1"/>
-          </a:fontRef>
-        </p:style>
-        <p:txBody>
-          <a:bodyPr rtlCol="0" anchor="ctr"/>
+          <a:noFill/>
+        </p:spPr>
+        <p:txBody>
+          <a:bodyPr wrap="none" rtlCol="0">
+            <a:spAutoFit/>
+          </a:bodyPr>
           <a:lstStyle/>
           <a:p>
-            <a:pPr algn="ctr"/>
-            <a:endParaRPr lang="LID4096"/>
-          </a:p>
-        </p:txBody>
-      </p:sp>
-      <p:pic>
-        <p:nvPicPr>
-          <p:cNvPr id="22" name="Picture 6" descr="High Performance Computing (HPC)">
-            <a:extLst>
-              <a:ext uri="{FF2B5EF4-FFF2-40B4-BE49-F238E27FC236}">
-                <a16:creationId xmlns:a16="http://schemas.microsoft.com/office/drawing/2014/main" id="{DC311BA8-16D0-1B85-EA70-B0BE682C285D}"/>
-              </a:ext>
-            </a:extLst>
-          </p:cNvPr>
-          <p:cNvPicPr>
-            <a:picLocks noChangeAspect="1" noChangeArrowheads="1"/>
-          </p:cNvPicPr>
-          <p:nvPr/>
-        </p:nvPicPr>
-        <p:blipFill>
-          <a:blip r:embed="rId3">
-            <a:extLst>
-              <a:ext uri="{28A0092B-C50C-407E-A947-70E740481C1C}">
-                <a14:useLocalDpi xmlns:a14="http://schemas.microsoft.com/office/drawing/2010/main" val="0"/>
-              </a:ext>
-            </a:extLst>
-          </a:blip>
-          <a:srcRect/>
-          <a:stretch>
-            <a:fillRect/>
-          </a:stretch>
-        </p:blipFill>
-        <p:spPr bwMode="auto">
-          <a:xfrm>
-            <a:off x="7360121" y="1037218"/>
-            <a:ext cx="869713" cy="1151415"/>
-          </a:xfrm>
-          <a:prstGeom prst="rect">
-            <a:avLst/>
-          </a:prstGeom>
-          <a:noFill/>
-          <a:extLst>
-            <a:ext uri="{909E8E84-426E-40DD-AFC4-6F175D3DCCD1}">
-              <a14:hiddenFill xmlns:a14="http://schemas.microsoft.com/office/drawing/2010/main">
+            <a:r>
+              <a:rPr lang="en-US" b="1" i="0" dirty="0">
                 <a:solidFill>
-                  <a:srgbClr val="FFFFFF"/>
+                  <a:srgbClr val="1F2328"/>
                 </a:solidFill>
-              </a14:hiddenFill>
-            </a:ext>
-          </a:extLst>
-        </p:spPr>
-      </p:pic>
-      <p:pic>
-        <p:nvPicPr>
-          <p:cNvPr id="23" name="Graphic 22" descr="User with solid fill">
-            <a:extLst>
-              <a:ext uri="{FF2B5EF4-FFF2-40B4-BE49-F238E27FC236}">
-                <a16:creationId xmlns:a16="http://schemas.microsoft.com/office/drawing/2014/main" id="{8A054787-F308-CBF3-F737-67D76A2E2957}"/>
-              </a:ext>
-            </a:extLst>
-          </p:cNvPr>
-          <p:cNvPicPr>
-            <a:picLocks noChangeAspect="1"/>
-          </p:cNvPicPr>
-          <p:nvPr/>
-        </p:nvPicPr>
-        <p:blipFill>
-          <a:blip r:embed="rId4">
-            <a:extLst>
-              <a:ext uri="{28A0092B-C50C-407E-A947-70E740481C1C}">
-                <a14:useLocalDpi xmlns:a14="http://schemas.microsoft.com/office/drawing/2010/main" val="0"/>
-              </a:ext>
-              <a:ext uri="{96DAC541-7B7A-43D3-8B79-37D633B846F1}">
-                <asvg:svgBlip xmlns:asvg="http://schemas.microsoft.com/office/drawing/2016/SVG/main" r:embed="rId5"/>
-              </a:ext>
-            </a:extLst>
-          </a:blip>
-          <a:stretch>
-            <a:fillRect/>
-          </a:stretch>
-        </p:blipFill>
-        <p:spPr>
-          <a:xfrm>
-            <a:off x="2512926" y="1125946"/>
-            <a:ext cx="603353" cy="470604"/>
-          </a:xfrm>
-          <a:prstGeom prst="rect">
-            <a:avLst/>
-          </a:prstGeom>
-        </p:spPr>
-      </p:pic>
-      <p:sp>
-        <p:nvSpPr>
-          <p:cNvPr id="26" name="TextBox 25">
-            <a:extLst>
-              <a:ext uri="{FF2B5EF4-FFF2-40B4-BE49-F238E27FC236}">
-                <a16:creationId xmlns:a16="http://schemas.microsoft.com/office/drawing/2014/main" id="{B57777C5-D63B-CAA1-BF52-19AEE0108B52}"/>
+                <a:effectLst/>
+                <a:latin typeface="-apple-system"/>
+              </a:rPr>
+              <a:t>Why user </a:t>
+            </a:r>
+            <a:r>
+              <a:rPr lang="en-US" b="1" dirty="0">
+                <a:solidFill>
+                  <a:srgbClr val="1F2328"/>
+                </a:solidFill>
+                <a:latin typeface="-apple-system"/>
+              </a:rPr>
+              <a:t>i</a:t>
+            </a:r>
+            <a:r>
+              <a:rPr lang="en-US" b="1" i="0" dirty="0">
+                <a:solidFill>
+                  <a:srgbClr val="1F2328"/>
+                </a:solidFill>
+                <a:effectLst/>
+                <a:latin typeface="-apple-system"/>
+              </a:rPr>
+              <a:t>nterface?</a:t>
+            </a:r>
+          </a:p>
+          <a:p>
+            <a:endParaRPr lang="en-US" b="1" i="0" dirty="0">
+              <a:solidFill>
+                <a:srgbClr val="1F2328"/>
+              </a:solidFill>
+              <a:effectLst/>
+              <a:latin typeface="-apple-system"/>
+            </a:endParaRPr>
+          </a:p>
+          <a:p>
+            <a:pPr marL="827075" lvl="1" indent="-285750">
+              <a:buFont typeface="Arial" panose="020B0604020202020204" pitchFamily="34" charset="0"/>
+              <a:buChar char="•"/>
+            </a:pPr>
+            <a:r>
+              <a:rPr lang="en-US" sz="1600" dirty="0">
+                <a:solidFill>
+                  <a:srgbClr val="1F2328"/>
+                </a:solidFill>
+                <a:latin typeface="-apple-system"/>
+              </a:rPr>
+              <a:t>To efficiently interact with the cluster and pipelines</a:t>
+            </a:r>
+            <a:endParaRPr lang="en-US" sz="1600" b="0" i="0" dirty="0">
+              <a:solidFill>
+                <a:srgbClr val="1F2328"/>
+              </a:solidFill>
+              <a:effectLst/>
+              <a:latin typeface="-apple-system"/>
+            </a:endParaRPr>
+          </a:p>
+          <a:p>
+            <a:pPr marL="827075" lvl="1" indent="-285750">
+              <a:buFont typeface="Arial" panose="020B0604020202020204" pitchFamily="34" charset="0"/>
+              <a:buChar char="•"/>
+            </a:pPr>
+            <a:r>
+              <a:rPr lang="en-US" sz="1600" dirty="0">
+                <a:solidFill>
+                  <a:srgbClr val="1F2328"/>
+                </a:solidFill>
+                <a:latin typeface="-apple-system"/>
+              </a:rPr>
+              <a:t>Hide unnecessary technical details</a:t>
+            </a:r>
+            <a:endParaRPr lang="en-US" sz="1600" b="0" i="0" dirty="0">
+              <a:solidFill>
+                <a:srgbClr val="1F2328"/>
+              </a:solidFill>
+              <a:effectLst/>
+              <a:latin typeface="-apple-system"/>
+            </a:endParaRPr>
+          </a:p>
+        </p:txBody>
+      </p:sp>
+      <p:sp>
+        <p:nvSpPr>
+          <p:cNvPr id="19" name="TextBox 18">
+            <a:extLst>
+              <a:ext uri="{FF2B5EF4-FFF2-40B4-BE49-F238E27FC236}">
+                <a16:creationId xmlns:a16="http://schemas.microsoft.com/office/drawing/2014/main" id="{3BB3C723-FEC4-617D-E748-6612EB9ED92E}"/>
               </a:ext>
             </a:extLst>
           </p:cNvPr>
@@ -4641,8 +4717,8 @@
         </p:nvSpPr>
         <p:spPr>
           <a:xfrm>
-            <a:off x="2512925" y="1564317"/>
-            <a:ext cx="854412" cy="340863"/>
+            <a:off x="499581" y="1049452"/>
+            <a:ext cx="7573479" cy="646331"/>
           </a:xfrm>
           <a:prstGeom prst="rect">
             <a:avLst/>
@@ -4656,997 +4732,37 @@
           <a:lstStyle/>
           <a:p>
             <a:r>
-              <a:rPr lang="en-US" sz="1615" dirty="0"/>
-              <a:t>Users</a:t>
-            </a:r>
-            <a:endParaRPr lang="LID4096" sz="1615" dirty="0"/>
-          </a:p>
-        </p:txBody>
-      </p:sp>
-      <p:pic>
-        <p:nvPicPr>
-          <p:cNvPr id="27" name="Picture 2" descr="Login Icon Vector Art, Icons, and Graphics for Free Download">
-            <a:extLst>
-              <a:ext uri="{FF2B5EF4-FFF2-40B4-BE49-F238E27FC236}">
-                <a16:creationId xmlns:a16="http://schemas.microsoft.com/office/drawing/2014/main" id="{6BF41528-7BFD-D888-38F6-B49222B6AEEE}"/>
-              </a:ext>
-            </a:extLst>
-          </p:cNvPr>
-          <p:cNvPicPr>
-            <a:picLocks noChangeAspect="1" noChangeArrowheads="1"/>
-          </p:cNvPicPr>
-          <p:nvPr/>
-        </p:nvPicPr>
-        <p:blipFill>
-          <a:blip r:embed="rId6" cstate="print">
-            <a:extLst>
-              <a:ext uri="{28A0092B-C50C-407E-A947-70E740481C1C}">
-                <a14:useLocalDpi xmlns:a14="http://schemas.microsoft.com/office/drawing/2010/main" val="0"/>
-              </a:ext>
-            </a:extLst>
-          </a:blip>
-          <a:srcRect/>
-          <a:stretch>
-            <a:fillRect/>
-          </a:stretch>
-        </p:blipFill>
-        <p:spPr bwMode="auto">
-          <a:xfrm rot="10800000" flipH="1">
-            <a:off x="4427318" y="1108257"/>
-            <a:ext cx="592081" cy="642085"/>
-          </a:xfrm>
-          <a:prstGeom prst="rect">
-            <a:avLst/>
-          </a:prstGeom>
-          <a:noFill/>
-          <a:extLst>
-            <a:ext uri="{909E8E84-426E-40DD-AFC4-6F175D3DCCD1}">
-              <a14:hiddenFill xmlns:a14="http://schemas.microsoft.com/office/drawing/2010/main">
-                <a:solidFill>
-                  <a:srgbClr val="FFFFFF"/>
-                </a:solidFill>
-              </a14:hiddenFill>
-            </a:ext>
-          </a:extLst>
-        </p:spPr>
-      </p:pic>
-      <p:sp>
-        <p:nvSpPr>
-          <p:cNvPr id="29" name="Arrow: Right 28">
-            <a:extLst>
-              <a:ext uri="{FF2B5EF4-FFF2-40B4-BE49-F238E27FC236}">
-                <a16:creationId xmlns:a16="http://schemas.microsoft.com/office/drawing/2014/main" id="{CB873AC8-5CFC-4199-E2DD-BB36B59BFB3F}"/>
-              </a:ext>
-            </a:extLst>
-          </p:cNvPr>
-          <p:cNvSpPr/>
-          <p:nvPr/>
-        </p:nvSpPr>
-        <p:spPr>
-          <a:xfrm>
-            <a:off x="3145352" y="1377957"/>
-            <a:ext cx="1115660" cy="170840"/>
-          </a:xfrm>
-          <a:prstGeom prst="rightArrow">
-            <a:avLst/>
-          </a:prstGeom>
-        </p:spPr>
-        <p:style>
-          <a:lnRef idx="2">
-            <a:schemeClr val="accent1">
-              <a:shade val="15000"/>
-            </a:schemeClr>
-          </a:lnRef>
-          <a:fillRef idx="1">
-            <a:schemeClr val="accent1"/>
-          </a:fillRef>
-          <a:effectRef idx="0">
-            <a:schemeClr val="accent1"/>
-          </a:effectRef>
-          <a:fontRef idx="minor">
-            <a:schemeClr val="lt1"/>
-          </a:fontRef>
-        </p:style>
-        <p:txBody>
-          <a:bodyPr rtlCol="0" anchor="ctr"/>
-          <a:lstStyle/>
-          <a:p>
-            <a:pPr algn="ctr"/>
-            <a:endParaRPr lang="LID4096" sz="2077"/>
-          </a:p>
-        </p:txBody>
-      </p:sp>
-      <p:sp>
-        <p:nvSpPr>
-          <p:cNvPr id="35" name="TextBox 34">
-            <a:extLst>
-              <a:ext uri="{FF2B5EF4-FFF2-40B4-BE49-F238E27FC236}">
-                <a16:creationId xmlns:a16="http://schemas.microsoft.com/office/drawing/2014/main" id="{1CE08124-0C77-3AA3-F792-F3D8AB4BD917}"/>
-              </a:ext>
-            </a:extLst>
-          </p:cNvPr>
-          <p:cNvSpPr txBox="1"/>
-          <p:nvPr/>
-        </p:nvSpPr>
-        <p:spPr>
-          <a:xfrm>
-            <a:off x="4266790" y="2484686"/>
-            <a:ext cx="736740" cy="305468"/>
-          </a:xfrm>
-          <a:prstGeom prst="rect">
-            <a:avLst/>
-          </a:prstGeom>
-          <a:noFill/>
-        </p:spPr>
-        <p:txBody>
-          <a:bodyPr wrap="none" rtlCol="0">
-            <a:spAutoFit/>
-          </a:bodyPr>
-          <a:lstStyle/>
-          <a:p>
-            <a:r>
-              <a:rPr lang="en-US" sz="1385" b="1" dirty="0">
-                <a:solidFill>
-                  <a:schemeClr val="bg1">
-                    <a:lumMod val="65000"/>
-                  </a:schemeClr>
-                </a:solidFill>
-              </a:rPr>
-              <a:t>Cluster </a:t>
-            </a:r>
-            <a:endParaRPr lang="LID4096" sz="1385" b="1" dirty="0">
-              <a:solidFill>
-                <a:schemeClr val="bg1">
-                  <a:lumMod val="65000"/>
-                </a:schemeClr>
-              </a:solidFill>
-            </a:endParaRPr>
-          </a:p>
-        </p:txBody>
-      </p:sp>
-      <p:pic>
-        <p:nvPicPr>
-          <p:cNvPr id="39" name="Picture 38">
-            <a:extLst>
-              <a:ext uri="{FF2B5EF4-FFF2-40B4-BE49-F238E27FC236}">
-                <a16:creationId xmlns:a16="http://schemas.microsoft.com/office/drawing/2014/main" id="{7161B2FB-E5F0-2A7E-E0BA-FD31A44F37C3}"/>
-              </a:ext>
-            </a:extLst>
-          </p:cNvPr>
-          <p:cNvPicPr>
-            <a:picLocks noChangeAspect="1"/>
-          </p:cNvPicPr>
-          <p:nvPr/>
-        </p:nvPicPr>
-        <p:blipFill>
-          <a:blip r:embed="rId7"/>
-          <a:stretch>
-            <a:fillRect/>
-          </a:stretch>
-        </p:blipFill>
-        <p:spPr>
-          <a:xfrm>
-            <a:off x="5542978" y="981891"/>
-            <a:ext cx="682531" cy="555992"/>
-          </a:xfrm>
-          <a:prstGeom prst="ellipse">
-            <a:avLst/>
-          </a:prstGeom>
-          <a:ln>
-            <a:noFill/>
-          </a:ln>
-          <a:effectLst>
-            <a:softEdge rad="112500"/>
-          </a:effectLst>
-        </p:spPr>
-      </p:pic>
-      <p:sp>
-        <p:nvSpPr>
-          <p:cNvPr id="51" name="TextBox 50">
-            <a:extLst>
-              <a:ext uri="{FF2B5EF4-FFF2-40B4-BE49-F238E27FC236}">
-                <a16:creationId xmlns:a16="http://schemas.microsoft.com/office/drawing/2014/main" id="{DF3876A2-C18D-3DC4-E1D0-BC0B62213086}"/>
-              </a:ext>
-            </a:extLst>
-          </p:cNvPr>
-          <p:cNvSpPr txBox="1"/>
-          <p:nvPr/>
-        </p:nvSpPr>
-        <p:spPr>
-          <a:xfrm>
-            <a:off x="863166" y="3515620"/>
-            <a:ext cx="7807843" cy="1363450"/>
-          </a:xfrm>
-          <a:prstGeom prst="rect">
-            <a:avLst/>
-          </a:prstGeom>
-          <a:noFill/>
-        </p:spPr>
-        <p:txBody>
-          <a:bodyPr wrap="none" rtlCol="0">
-            <a:spAutoFit/>
-          </a:bodyPr>
-          <a:lstStyle/>
-          <a:p>
-            <a:r>
               <a:rPr lang="en-US" b="1" dirty="0"/>
-              <a:t>Drawbacks</a:t>
-            </a:r>
-          </a:p>
-          <a:p>
-            <a:pPr marL="954279" lvl="1" indent="-329698">
-              <a:buFont typeface="Wingdings" panose="05000000000000000000" pitchFamily="2" charset="2"/>
-              <a:buChar char="ü"/>
-            </a:pPr>
-            <a:r>
-              <a:rPr lang="en-US" sz="1615" dirty="0"/>
-              <a:t>Let’s say we have 10s, 100s, or 1000s tasks that we want to execute on a cluster</a:t>
-            </a:r>
-          </a:p>
-          <a:p>
-            <a:pPr marL="1411479" lvl="2" indent="-329698">
+              <a:t>Goal:    </a:t>
+            </a:r>
+            <a:r>
+              <a:rPr lang="en-US" dirty="0"/>
+              <a:t>Facilitate a seamless experience for a user when working with a cluster</a:t>
+            </a:r>
+          </a:p>
+          <a:p>
+            <a:pPr marL="742950" lvl="1" indent="-285750">
               <a:buFont typeface="Arial" panose="020B0604020202020204" pitchFamily="34" charset="0"/>
               <a:buChar char="•"/>
             </a:pPr>
             <a:r>
-              <a:rPr lang="en-US" sz="1615" dirty="0"/>
-              <a:t>Hard to track and monitor tasks - no centralized DB</a:t>
-            </a:r>
-          </a:p>
-          <a:p>
-            <a:pPr marL="1411479" lvl="2" indent="-329698">
-              <a:buFont typeface="Arial" panose="020B0604020202020204" pitchFamily="34" charset="0"/>
-              <a:buChar char="•"/>
-            </a:pPr>
-            <a:r>
-              <a:rPr lang="en-US" sz="1615" dirty="0"/>
-              <a:t>Job submission overhead</a:t>
-            </a:r>
-          </a:p>
-          <a:p>
-            <a:pPr marL="1411479" lvl="2" indent="-329698">
-              <a:buFont typeface="Arial" panose="020B0604020202020204" pitchFamily="34" charset="0"/>
-              <a:buChar char="•"/>
-            </a:pPr>
-            <a:endParaRPr lang="en-US" sz="1615" dirty="0"/>
-          </a:p>
-        </p:txBody>
-      </p:sp>
-      <p:sp>
-        <p:nvSpPr>
-          <p:cNvPr id="2" name="TextBox 1">
-            <a:extLst>
-              <a:ext uri="{FF2B5EF4-FFF2-40B4-BE49-F238E27FC236}">
-                <a16:creationId xmlns:a16="http://schemas.microsoft.com/office/drawing/2014/main" id="{A3ACEA9E-3833-6E5E-07B7-F4A7DB152BD4}"/>
-              </a:ext>
-            </a:extLst>
-          </p:cNvPr>
-          <p:cNvSpPr txBox="1"/>
-          <p:nvPr/>
-        </p:nvSpPr>
-        <p:spPr>
-          <a:xfrm>
-            <a:off x="4427316" y="1596549"/>
-            <a:ext cx="854412" cy="447558"/>
-          </a:xfrm>
-          <a:prstGeom prst="rect">
-            <a:avLst/>
-          </a:prstGeom>
-          <a:noFill/>
-        </p:spPr>
-        <p:txBody>
-          <a:bodyPr wrap="square" rtlCol="0">
-            <a:spAutoFit/>
-          </a:bodyPr>
-          <a:lstStyle/>
-          <a:p>
-            <a:r>
-              <a:rPr lang="en-US" sz="1154" dirty="0"/>
-              <a:t>Login Nodes</a:t>
-            </a:r>
-            <a:endParaRPr lang="LID4096" sz="1154" dirty="0"/>
-          </a:p>
-        </p:txBody>
-      </p:sp>
-      <p:sp>
-        <p:nvSpPr>
-          <p:cNvPr id="3" name="TextBox 2">
-            <a:extLst>
-              <a:ext uri="{FF2B5EF4-FFF2-40B4-BE49-F238E27FC236}">
-                <a16:creationId xmlns:a16="http://schemas.microsoft.com/office/drawing/2014/main" id="{DCDF4523-049E-C4C9-AB2E-EAF1B40BF69B}"/>
-              </a:ext>
-            </a:extLst>
-          </p:cNvPr>
-          <p:cNvSpPr txBox="1"/>
-          <p:nvPr/>
-        </p:nvSpPr>
-        <p:spPr>
-          <a:xfrm>
-            <a:off x="7210452" y="2299223"/>
-            <a:ext cx="1156520" cy="269946"/>
-          </a:xfrm>
-          <a:prstGeom prst="rect">
-            <a:avLst/>
-          </a:prstGeom>
-          <a:noFill/>
-        </p:spPr>
-        <p:txBody>
-          <a:bodyPr wrap="square" rtlCol="0">
-            <a:spAutoFit/>
-          </a:bodyPr>
-          <a:lstStyle/>
-          <a:p>
-            <a:r>
-              <a:rPr lang="en-US" sz="1154" dirty="0"/>
-              <a:t>Worker Nodes</a:t>
-            </a:r>
-            <a:endParaRPr lang="LID4096" sz="1154" dirty="0"/>
-          </a:p>
-        </p:txBody>
-      </p:sp>
-      <p:sp>
-        <p:nvSpPr>
-          <p:cNvPr id="4" name="Title 1">
-            <a:extLst>
-              <a:ext uri="{FF2B5EF4-FFF2-40B4-BE49-F238E27FC236}">
-                <a16:creationId xmlns:a16="http://schemas.microsoft.com/office/drawing/2014/main" id="{74B71575-7E34-1101-687D-18F0C8CC5663}"/>
-              </a:ext>
-            </a:extLst>
-          </p:cNvPr>
-          <p:cNvSpPr txBox="1">
-            <a:spLocks/>
-          </p:cNvSpPr>
-          <p:nvPr/>
-        </p:nvSpPr>
-        <p:spPr>
-          <a:xfrm>
-            <a:off x="298448" y="112427"/>
-            <a:ext cx="10515600" cy="471784"/>
-          </a:xfrm>
-          <a:prstGeom prst="rect">
-            <a:avLst/>
-          </a:prstGeom>
-        </p:spPr>
-        <p:txBody>
-          <a:bodyPr vert="horz" lIns="91440" tIns="45720" rIns="91440" bIns="45720" rtlCol="0" anchor="ctr">
-            <a:normAutofit/>
-          </a:bodyPr>
-          <a:lstStyle>
-            <a:lvl1pPr algn="l" defTabSz="914400" rtl="0" eaLnBrk="1" latinLnBrk="0" hangingPunct="1">
-              <a:lnSpc>
-                <a:spcPct val="90000"/>
-              </a:lnSpc>
-              <a:spcBef>
-                <a:spcPct val="0"/>
-              </a:spcBef>
-              <a:buNone/>
-              <a:defRPr sz="4400" kern="1200">
-                <a:solidFill>
-                  <a:schemeClr val="tx1"/>
-                </a:solidFill>
-                <a:latin typeface="+mj-lt"/>
-                <a:ea typeface="+mj-ea"/>
-                <a:cs typeface="+mj-cs"/>
-              </a:defRPr>
-            </a:lvl1pPr>
-          </a:lstStyle>
-          <a:p>
-            <a:r>
-              <a:rPr lang="en-US" sz="1800" b="1" dirty="0">
-                <a:solidFill>
-                  <a:schemeClr val="accent1"/>
-                </a:solidFill>
-                <a:latin typeface="Avenir Next" panose="020B0503020202020204" pitchFamily="34" charset="0"/>
-              </a:rPr>
-              <a:t>Problem - 2</a:t>
-            </a:r>
-            <a:endParaRPr lang="en-NL" sz="1800" b="1" dirty="0">
-              <a:solidFill>
-                <a:schemeClr val="accent1"/>
-              </a:solidFill>
-              <a:latin typeface="Avenir Next" panose="020B0503020202020204" pitchFamily="34" charset="0"/>
-            </a:endParaRPr>
-          </a:p>
-        </p:txBody>
-      </p:sp>
-      <p:sp>
-        <p:nvSpPr>
-          <p:cNvPr id="5" name="Rectangle 4">
-            <a:extLst>
-              <a:ext uri="{FF2B5EF4-FFF2-40B4-BE49-F238E27FC236}">
-                <a16:creationId xmlns:a16="http://schemas.microsoft.com/office/drawing/2014/main" id="{00DFC813-7002-7449-1A17-0A452BF8E14B}"/>
-              </a:ext>
-            </a:extLst>
-          </p:cNvPr>
-          <p:cNvSpPr/>
-          <p:nvPr/>
-        </p:nvSpPr>
-        <p:spPr>
-          <a:xfrm>
-            <a:off x="2635688" y="4899414"/>
-            <a:ext cx="1422636" cy="1678318"/>
-          </a:xfrm>
-          <a:prstGeom prst="rect">
-            <a:avLst/>
-          </a:prstGeom>
-          <a:noFill/>
-        </p:spPr>
-        <p:style>
-          <a:lnRef idx="2">
-            <a:schemeClr val="accent1">
-              <a:shade val="15000"/>
-            </a:schemeClr>
-          </a:lnRef>
-          <a:fillRef idx="1">
-            <a:schemeClr val="accent1"/>
-          </a:fillRef>
-          <a:effectRef idx="0">
-            <a:schemeClr val="accent1"/>
-          </a:effectRef>
-          <a:fontRef idx="minor">
-            <a:schemeClr val="lt1"/>
-          </a:fontRef>
-        </p:style>
-        <p:txBody>
-          <a:bodyPr rtlCol="0" anchor="ctr"/>
-          <a:lstStyle/>
-          <a:p>
-            <a:pPr algn="ctr"/>
-            <a:endParaRPr lang="LID4096"/>
-          </a:p>
-        </p:txBody>
-      </p:sp>
-      <p:sp>
-        <p:nvSpPr>
-          <p:cNvPr id="6" name="Rectangle 5">
-            <a:extLst>
-              <a:ext uri="{FF2B5EF4-FFF2-40B4-BE49-F238E27FC236}">
-                <a16:creationId xmlns:a16="http://schemas.microsoft.com/office/drawing/2014/main" id="{B981F87C-F82A-6B1A-C19B-9992C738D18B}"/>
-              </a:ext>
-            </a:extLst>
-          </p:cNvPr>
-          <p:cNvSpPr/>
-          <p:nvPr/>
-        </p:nvSpPr>
-        <p:spPr>
-          <a:xfrm>
-            <a:off x="6492393" y="5104518"/>
-            <a:ext cx="1196333" cy="1507650"/>
-          </a:xfrm>
-          <a:prstGeom prst="rect">
-            <a:avLst/>
-          </a:prstGeom>
-          <a:noFill/>
-        </p:spPr>
-        <p:style>
-          <a:lnRef idx="2">
-            <a:schemeClr val="accent1">
-              <a:shade val="15000"/>
-            </a:schemeClr>
-          </a:lnRef>
-          <a:fillRef idx="1">
-            <a:schemeClr val="accent1"/>
-          </a:fillRef>
-          <a:effectRef idx="0">
-            <a:schemeClr val="accent1"/>
-          </a:effectRef>
-          <a:fontRef idx="minor">
-            <a:schemeClr val="lt1"/>
-          </a:fontRef>
-        </p:style>
-        <p:txBody>
-          <a:bodyPr rtlCol="0" anchor="ctr"/>
-          <a:lstStyle/>
-          <a:p>
-            <a:pPr algn="ctr"/>
-            <a:endParaRPr lang="LID4096"/>
-          </a:p>
-        </p:txBody>
-      </p:sp>
-      <p:sp>
-        <p:nvSpPr>
-          <p:cNvPr id="7" name="TextBox 6">
-            <a:extLst>
-              <a:ext uri="{FF2B5EF4-FFF2-40B4-BE49-F238E27FC236}">
-                <a16:creationId xmlns:a16="http://schemas.microsoft.com/office/drawing/2014/main" id="{77B2314C-5737-29EF-5591-3C7799C1846B}"/>
-              </a:ext>
-            </a:extLst>
-          </p:cNvPr>
-          <p:cNvSpPr txBox="1"/>
-          <p:nvPr/>
-        </p:nvSpPr>
-        <p:spPr>
-          <a:xfrm>
-            <a:off x="4608504" y="4975516"/>
-            <a:ext cx="1346447" cy="276999"/>
-          </a:xfrm>
-          <a:prstGeom prst="rect">
-            <a:avLst/>
-          </a:prstGeom>
-          <a:noFill/>
-        </p:spPr>
-        <p:txBody>
-          <a:bodyPr wrap="square" rtlCol="0">
-            <a:spAutoFit/>
-          </a:bodyPr>
-          <a:lstStyle/>
-          <a:p>
-            <a:r>
-              <a:rPr lang="en-US" sz="1200" dirty="0"/>
-              <a:t>Submit tasks</a:t>
-            </a:r>
-            <a:endParaRPr lang="LID4096" sz="1200" dirty="0"/>
-          </a:p>
-        </p:txBody>
-      </p:sp>
-      <p:sp>
-        <p:nvSpPr>
-          <p:cNvPr id="10" name="Rectangle 9">
-            <a:extLst>
-              <a:ext uri="{FF2B5EF4-FFF2-40B4-BE49-F238E27FC236}">
-                <a16:creationId xmlns:a16="http://schemas.microsoft.com/office/drawing/2014/main" id="{5ED8939B-A759-CFF6-CF19-BF3E05AB0D0A}"/>
-              </a:ext>
-            </a:extLst>
-          </p:cNvPr>
-          <p:cNvSpPr/>
-          <p:nvPr/>
-        </p:nvSpPr>
-        <p:spPr>
-          <a:xfrm>
-            <a:off x="2795777" y="5051814"/>
-            <a:ext cx="1139504" cy="189549"/>
-          </a:xfrm>
-          <a:prstGeom prst="rect">
-            <a:avLst/>
-          </a:prstGeom>
-          <a:noFill/>
-        </p:spPr>
-        <p:style>
-          <a:lnRef idx="2">
-            <a:schemeClr val="accent1">
-              <a:shade val="15000"/>
-            </a:schemeClr>
-          </a:lnRef>
-          <a:fillRef idx="1">
-            <a:schemeClr val="accent1"/>
-          </a:fillRef>
-          <a:effectRef idx="0">
-            <a:schemeClr val="accent1"/>
-          </a:effectRef>
-          <a:fontRef idx="minor">
-            <a:schemeClr val="lt1"/>
-          </a:fontRef>
-        </p:style>
-        <p:txBody>
-          <a:bodyPr rtlCol="0" anchor="ctr"/>
-          <a:lstStyle/>
-          <a:p>
-            <a:pPr algn="ctr"/>
-            <a:r>
-              <a:rPr lang="en-US" sz="1200" dirty="0">
-                <a:solidFill>
-                  <a:schemeClr val="tx1"/>
-                </a:solidFill>
-              </a:rPr>
-              <a:t>Job 1</a:t>
-            </a:r>
-            <a:endParaRPr lang="LID4096" sz="1200" dirty="0">
-              <a:solidFill>
-                <a:schemeClr val="tx1"/>
-              </a:solidFill>
-            </a:endParaRPr>
-          </a:p>
-        </p:txBody>
-      </p:sp>
-      <p:sp>
-        <p:nvSpPr>
-          <p:cNvPr id="11" name="Rectangle 10">
-            <a:extLst>
-              <a:ext uri="{FF2B5EF4-FFF2-40B4-BE49-F238E27FC236}">
-                <a16:creationId xmlns:a16="http://schemas.microsoft.com/office/drawing/2014/main" id="{63F7B2E9-AF01-5E2A-84B5-EC0A9733C32E}"/>
-              </a:ext>
-            </a:extLst>
-          </p:cNvPr>
-          <p:cNvSpPr/>
-          <p:nvPr/>
-        </p:nvSpPr>
-        <p:spPr>
-          <a:xfrm>
-            <a:off x="2795777" y="5393763"/>
-            <a:ext cx="1139504" cy="189549"/>
-          </a:xfrm>
-          <a:prstGeom prst="rect">
-            <a:avLst/>
-          </a:prstGeom>
-          <a:noFill/>
-        </p:spPr>
-        <p:style>
-          <a:lnRef idx="2">
-            <a:schemeClr val="accent1">
-              <a:shade val="15000"/>
-            </a:schemeClr>
-          </a:lnRef>
-          <a:fillRef idx="1">
-            <a:schemeClr val="accent1"/>
-          </a:fillRef>
-          <a:effectRef idx="0">
-            <a:schemeClr val="accent1"/>
-          </a:effectRef>
-          <a:fontRef idx="minor">
-            <a:schemeClr val="lt1"/>
-          </a:fontRef>
-        </p:style>
-        <p:txBody>
-          <a:bodyPr rtlCol="0" anchor="ctr"/>
-          <a:lstStyle/>
-          <a:p>
-            <a:pPr algn="ctr"/>
-            <a:r>
-              <a:rPr lang="en-US" sz="1200" dirty="0">
-                <a:solidFill>
-                  <a:schemeClr val="tx1"/>
-                </a:solidFill>
-              </a:rPr>
-              <a:t>Job 2</a:t>
-            </a:r>
-            <a:endParaRPr lang="LID4096" sz="1200" dirty="0">
-              <a:solidFill>
-                <a:schemeClr val="tx1"/>
-              </a:solidFill>
-            </a:endParaRPr>
-          </a:p>
-        </p:txBody>
-      </p:sp>
-      <p:cxnSp>
-        <p:nvCxnSpPr>
-          <p:cNvPr id="12" name="Straight Arrow Connector 11">
-            <a:extLst>
-              <a:ext uri="{FF2B5EF4-FFF2-40B4-BE49-F238E27FC236}">
-                <a16:creationId xmlns:a16="http://schemas.microsoft.com/office/drawing/2014/main" id="{5A37CE8D-8667-0AD9-9380-D6263740A6BF}"/>
-              </a:ext>
-            </a:extLst>
-          </p:cNvPr>
-          <p:cNvCxnSpPr>
-            <a:cxnSpLocks/>
-          </p:cNvCxnSpPr>
-          <p:nvPr/>
-        </p:nvCxnSpPr>
-        <p:spPr>
-          <a:xfrm>
-            <a:off x="4120398" y="5251150"/>
-            <a:ext cx="2175641" cy="0"/>
-          </a:xfrm>
-          <a:prstGeom prst="straightConnector1">
-            <a:avLst/>
-          </a:prstGeom>
-          <a:ln w="28575">
-            <a:tailEnd type="triangle"/>
-          </a:ln>
-        </p:spPr>
-        <p:style>
-          <a:lnRef idx="1">
-            <a:schemeClr val="accent1"/>
-          </a:lnRef>
-          <a:fillRef idx="0">
-            <a:schemeClr val="accent1"/>
-          </a:fillRef>
-          <a:effectRef idx="0">
-            <a:schemeClr val="accent1"/>
-          </a:effectRef>
-          <a:fontRef idx="minor">
-            <a:schemeClr val="tx1"/>
-          </a:fontRef>
-        </p:style>
-      </p:cxnSp>
-      <p:cxnSp>
-        <p:nvCxnSpPr>
-          <p:cNvPr id="13" name="Straight Arrow Connector 12">
-            <a:extLst>
-              <a:ext uri="{FF2B5EF4-FFF2-40B4-BE49-F238E27FC236}">
-                <a16:creationId xmlns:a16="http://schemas.microsoft.com/office/drawing/2014/main" id="{6A0BDD1E-B62B-5E2A-F1AF-5835E1AA07E9}"/>
-              </a:ext>
-            </a:extLst>
-          </p:cNvPr>
-          <p:cNvCxnSpPr>
-            <a:cxnSpLocks/>
-          </p:cNvCxnSpPr>
-          <p:nvPr/>
-        </p:nvCxnSpPr>
-        <p:spPr>
-          <a:xfrm flipH="1">
-            <a:off x="4189100" y="6303503"/>
-            <a:ext cx="1982554" cy="21439"/>
-          </a:xfrm>
-          <a:prstGeom prst="straightConnector1">
-            <a:avLst/>
-          </a:prstGeom>
-          <a:ln w="28575">
-            <a:tailEnd type="triangle"/>
-          </a:ln>
-        </p:spPr>
-        <p:style>
-          <a:lnRef idx="1">
-            <a:schemeClr val="accent1"/>
-          </a:lnRef>
-          <a:fillRef idx="0">
-            <a:schemeClr val="accent1"/>
-          </a:fillRef>
-          <a:effectRef idx="0">
-            <a:schemeClr val="accent1"/>
-          </a:effectRef>
-          <a:fontRef idx="minor">
-            <a:schemeClr val="tx1"/>
-          </a:fontRef>
-        </p:style>
-      </p:cxnSp>
-      <p:sp>
-        <p:nvSpPr>
-          <p:cNvPr id="15" name="TextBox 14">
-            <a:extLst>
-              <a:ext uri="{FF2B5EF4-FFF2-40B4-BE49-F238E27FC236}">
-                <a16:creationId xmlns:a16="http://schemas.microsoft.com/office/drawing/2014/main" id="{2302FDDB-B180-8E54-DC79-F9F7DBB643FE}"/>
-              </a:ext>
-            </a:extLst>
-          </p:cNvPr>
-          <p:cNvSpPr txBox="1"/>
-          <p:nvPr/>
-        </p:nvSpPr>
-        <p:spPr>
-          <a:xfrm>
-            <a:off x="4569630" y="5828875"/>
-            <a:ext cx="1346447" cy="461665"/>
-          </a:xfrm>
-          <a:prstGeom prst="rect">
-            <a:avLst/>
-          </a:prstGeom>
-          <a:noFill/>
-        </p:spPr>
-        <p:txBody>
-          <a:bodyPr wrap="square" rtlCol="0">
-            <a:spAutoFit/>
-          </a:bodyPr>
-          <a:lstStyle/>
-          <a:p>
-            <a:r>
-              <a:rPr lang="en-US" sz="1200" dirty="0"/>
-              <a:t>Task status and output</a:t>
-            </a:r>
-            <a:endParaRPr lang="LID4096" sz="1200" dirty="0"/>
-          </a:p>
-        </p:txBody>
-      </p:sp>
-      <p:sp>
-        <p:nvSpPr>
-          <p:cNvPr id="16" name="Rectangle 15">
-            <a:extLst>
-              <a:ext uri="{FF2B5EF4-FFF2-40B4-BE49-F238E27FC236}">
-                <a16:creationId xmlns:a16="http://schemas.microsoft.com/office/drawing/2014/main" id="{94306390-2A62-3469-F8F8-5B22CFACC475}"/>
-              </a:ext>
-            </a:extLst>
-          </p:cNvPr>
-          <p:cNvSpPr/>
-          <p:nvPr/>
-        </p:nvSpPr>
-        <p:spPr>
-          <a:xfrm>
-            <a:off x="2795776" y="6152718"/>
-            <a:ext cx="1139504" cy="189549"/>
-          </a:xfrm>
-          <a:prstGeom prst="rect">
-            <a:avLst/>
-          </a:prstGeom>
-          <a:noFill/>
-        </p:spPr>
-        <p:style>
-          <a:lnRef idx="2">
-            <a:schemeClr val="accent1">
-              <a:shade val="15000"/>
-            </a:schemeClr>
-          </a:lnRef>
-          <a:fillRef idx="1">
-            <a:schemeClr val="accent1"/>
-          </a:fillRef>
-          <a:effectRef idx="0">
-            <a:schemeClr val="accent1"/>
-          </a:effectRef>
-          <a:fontRef idx="minor">
-            <a:schemeClr val="lt1"/>
-          </a:fontRef>
-        </p:style>
-        <p:txBody>
-          <a:bodyPr rtlCol="0" anchor="ctr"/>
-          <a:lstStyle/>
-          <a:p>
-            <a:pPr algn="ctr"/>
-            <a:r>
-              <a:rPr lang="en-US" sz="1200" dirty="0">
-                <a:solidFill>
-                  <a:schemeClr val="tx1"/>
-                </a:solidFill>
-              </a:rPr>
-              <a:t>Job n</a:t>
-            </a:r>
-            <a:endParaRPr lang="LID4096" sz="1200" dirty="0">
-              <a:solidFill>
-                <a:schemeClr val="tx1"/>
-              </a:solidFill>
-            </a:endParaRPr>
-          </a:p>
-        </p:txBody>
-      </p:sp>
-      <p:sp>
-        <p:nvSpPr>
-          <p:cNvPr id="17" name="TextBox 16">
-            <a:extLst>
-              <a:ext uri="{FF2B5EF4-FFF2-40B4-BE49-F238E27FC236}">
-                <a16:creationId xmlns:a16="http://schemas.microsoft.com/office/drawing/2014/main" id="{EDEB63D8-2AEC-373C-A350-EFEC5BE63BC3}"/>
-              </a:ext>
-            </a:extLst>
-          </p:cNvPr>
-          <p:cNvSpPr txBox="1"/>
-          <p:nvPr/>
-        </p:nvSpPr>
-        <p:spPr>
-          <a:xfrm>
-            <a:off x="6723183" y="4765964"/>
-            <a:ext cx="884211" cy="338554"/>
-          </a:xfrm>
-          <a:prstGeom prst="rect">
-            <a:avLst/>
-          </a:prstGeom>
-          <a:noFill/>
-        </p:spPr>
-        <p:txBody>
-          <a:bodyPr wrap="square" rtlCol="0">
-            <a:spAutoFit/>
-          </a:bodyPr>
-          <a:lstStyle/>
-          <a:p>
-            <a:r>
-              <a:rPr lang="en-US" sz="1600" dirty="0"/>
-              <a:t>Cluster</a:t>
-            </a:r>
-            <a:endParaRPr lang="LID4096" sz="1600" dirty="0"/>
-          </a:p>
-        </p:txBody>
-      </p:sp>
-      <p:sp>
-        <p:nvSpPr>
-          <p:cNvPr id="19" name="TextBox 18">
-            <a:extLst>
-              <a:ext uri="{FF2B5EF4-FFF2-40B4-BE49-F238E27FC236}">
-                <a16:creationId xmlns:a16="http://schemas.microsoft.com/office/drawing/2014/main" id="{F748B485-90C6-8EA4-6313-D1E2FF21680E}"/>
-              </a:ext>
-            </a:extLst>
-          </p:cNvPr>
-          <p:cNvSpPr txBox="1"/>
-          <p:nvPr/>
-        </p:nvSpPr>
-        <p:spPr>
-          <a:xfrm>
-            <a:off x="3262057" y="5488537"/>
-            <a:ext cx="1346447" cy="400110"/>
-          </a:xfrm>
-          <a:prstGeom prst="rect">
-            <a:avLst/>
-          </a:prstGeom>
-          <a:noFill/>
-        </p:spPr>
-        <p:txBody>
-          <a:bodyPr wrap="square" rtlCol="0">
-            <a:spAutoFit/>
-          </a:bodyPr>
-          <a:lstStyle/>
-          <a:p>
-            <a:r>
-              <a:rPr lang="en-US" sz="2000" b="1" dirty="0"/>
-              <a:t>.</a:t>
-            </a:r>
-            <a:endParaRPr lang="LID4096" sz="2000" b="1" dirty="0"/>
-          </a:p>
-        </p:txBody>
-      </p:sp>
-      <p:sp>
-        <p:nvSpPr>
-          <p:cNvPr id="20" name="TextBox 19">
-            <a:extLst>
-              <a:ext uri="{FF2B5EF4-FFF2-40B4-BE49-F238E27FC236}">
-                <a16:creationId xmlns:a16="http://schemas.microsoft.com/office/drawing/2014/main" id="{EF28E4D2-449B-84B0-51F5-3A337FC6E3D6}"/>
-              </a:ext>
-            </a:extLst>
-          </p:cNvPr>
-          <p:cNvSpPr txBox="1"/>
-          <p:nvPr/>
-        </p:nvSpPr>
-        <p:spPr>
-          <a:xfrm>
-            <a:off x="3262057" y="5697795"/>
-            <a:ext cx="1346447" cy="400110"/>
-          </a:xfrm>
-          <a:prstGeom prst="rect">
-            <a:avLst/>
-          </a:prstGeom>
-          <a:noFill/>
-        </p:spPr>
-        <p:txBody>
-          <a:bodyPr wrap="square" rtlCol="0">
-            <a:spAutoFit/>
-          </a:bodyPr>
-          <a:lstStyle/>
-          <a:p>
-            <a:r>
-              <a:rPr lang="en-US" sz="2000" b="1" dirty="0"/>
-              <a:t>.</a:t>
-            </a:r>
-            <a:endParaRPr lang="LID4096" sz="2000" b="1" dirty="0"/>
-          </a:p>
-        </p:txBody>
-      </p:sp>
-      <p:pic>
-        <p:nvPicPr>
-          <p:cNvPr id="28" name="Picture 27" descr="High Performance Computing (HPC)">
-            <a:extLst>
-              <a:ext uri="{FF2B5EF4-FFF2-40B4-BE49-F238E27FC236}">
-                <a16:creationId xmlns:a16="http://schemas.microsoft.com/office/drawing/2014/main" id="{83AF7F29-6EC0-4620-B419-745783C62A22}"/>
-              </a:ext>
-            </a:extLst>
-          </p:cNvPr>
-          <p:cNvPicPr>
-            <a:picLocks noChangeAspect="1" noChangeArrowheads="1"/>
-          </p:cNvPicPr>
-          <p:nvPr/>
-        </p:nvPicPr>
-        <p:blipFill>
-          <a:blip r:embed="rId3" cstate="print">
-            <a:extLst>
-              <a:ext uri="{28A0092B-C50C-407E-A947-70E740481C1C}">
-                <a14:useLocalDpi xmlns:a14="http://schemas.microsoft.com/office/drawing/2010/main" val="0"/>
-              </a:ext>
-            </a:extLst>
-          </a:blip>
-          <a:srcRect/>
-          <a:stretch>
-            <a:fillRect/>
-          </a:stretch>
-        </p:blipFill>
-        <p:spPr bwMode="auto">
-          <a:xfrm>
-            <a:off x="6640071" y="5241994"/>
-            <a:ext cx="884212" cy="1191876"/>
-          </a:xfrm>
-          <a:prstGeom prst="rect">
-            <a:avLst/>
-          </a:prstGeom>
-          <a:noFill/>
-          <a:extLst>
-            <a:ext uri="{909E8E84-426E-40DD-AFC4-6F175D3DCCD1}">
-              <a14:hiddenFill xmlns:a14="http://schemas.microsoft.com/office/drawing/2010/main">
-                <a:solidFill>
-                  <a:srgbClr val="FFFFFF"/>
-                </a:solidFill>
-              </a14:hiddenFill>
-            </a:ext>
-          </a:extLst>
-        </p:spPr>
-      </p:pic>
+              <a:rPr lang="en-US" dirty="0"/>
+              <a:t>Hide internal implementation details</a:t>
+            </a:r>
+            <a:endParaRPr lang="LID4096" dirty="0"/>
+          </a:p>
+        </p:txBody>
+      </p:sp>
     </p:spTree>
     <p:extLst>
       <p:ext uri="{BB962C8B-B14F-4D97-AF65-F5344CB8AC3E}">
-        <p14:creationId xmlns:p14="http://schemas.microsoft.com/office/powerpoint/2010/main" val="2263412496"/>
+        <p14:creationId xmlns:p14="http://schemas.microsoft.com/office/powerpoint/2010/main" val="1193947217"/>
       </p:ext>
     </p:extLst>
   </p:cSld>
   <p:clrMapOvr>
     <a:masterClrMapping/>
   </p:clrMapOvr>
-  <mc:AlternateContent xmlns:mc="http://schemas.openxmlformats.org/markup-compatibility/2006" xmlns:p14="http://schemas.microsoft.com/office/powerpoint/2010/main">
-    <mc:Choice Requires="p14">
-      <p:transition p14:dur="10"/>
-    </mc:Choice>
-    <mc:Fallback xmlns="">
-      <p:transition/>
-    </mc:Fallback>
-  </mc:AlternateContent>
   <p:timing>
     <p:tnLst>
       <p:par>
@@ -5681,222 +4797,6 @@
                                           </p:stCondLst>
                                         </p:cTn>
                                         <p:tgtEl>
-                                          <p:spTgt spid="7"/>
-                                        </p:tgtEl>
-                                        <p:attrNameLst>
-                                          <p:attrName>style.visibility</p:attrName>
-                                        </p:attrNameLst>
-                                      </p:cBhvr>
-                                      <p:to>
-                                        <p:strVal val="visible"/>
-                                      </p:to>
-                                    </p:set>
-                                  </p:childTnLst>
-                                </p:cTn>
-                              </p:par>
-                              <p:par>
-                                <p:cTn id="7" presetID="1" presetClass="entr" presetSubtype="0" fill="hold" grpId="0" nodeType="withEffect">
-                                  <p:stCondLst>
-                                    <p:cond delay="0"/>
-                                  </p:stCondLst>
-                                  <p:childTnLst>
-                                    <p:set>
-                                      <p:cBhvr>
-                                        <p:cTn id="8" dur="1" fill="hold">
-                                          <p:stCondLst>
-                                            <p:cond delay="0"/>
-                                          </p:stCondLst>
-                                        </p:cTn>
-                                        <p:tgtEl>
-                                          <p:spTgt spid="10"/>
-                                        </p:tgtEl>
-                                        <p:attrNameLst>
-                                          <p:attrName>style.visibility</p:attrName>
-                                        </p:attrNameLst>
-                                      </p:cBhvr>
-                                      <p:to>
-                                        <p:strVal val="visible"/>
-                                      </p:to>
-                                    </p:set>
-                                  </p:childTnLst>
-                                </p:cTn>
-                              </p:par>
-                              <p:par>
-                                <p:cTn id="9" presetID="1" presetClass="entr" presetSubtype="0" fill="hold" grpId="0" nodeType="withEffect">
-                                  <p:stCondLst>
-                                    <p:cond delay="0"/>
-                                  </p:stCondLst>
-                                  <p:childTnLst>
-                                    <p:set>
-                                      <p:cBhvr>
-                                        <p:cTn id="10" dur="1" fill="hold">
-                                          <p:stCondLst>
-                                            <p:cond delay="0"/>
-                                          </p:stCondLst>
-                                        </p:cTn>
-                                        <p:tgtEl>
-                                          <p:spTgt spid="11"/>
-                                        </p:tgtEl>
-                                        <p:attrNameLst>
-                                          <p:attrName>style.visibility</p:attrName>
-                                        </p:attrNameLst>
-                                      </p:cBhvr>
-                                      <p:to>
-                                        <p:strVal val="visible"/>
-                                      </p:to>
-                                    </p:set>
-                                  </p:childTnLst>
-                                </p:cTn>
-                              </p:par>
-                              <p:par>
-                                <p:cTn id="11" presetID="1" presetClass="entr" presetSubtype="0" fill="hold" nodeType="withEffect">
-                                  <p:stCondLst>
-                                    <p:cond delay="0"/>
-                                  </p:stCondLst>
-                                  <p:childTnLst>
-                                    <p:set>
-                                      <p:cBhvr>
-                                        <p:cTn id="12" dur="1" fill="hold">
-                                          <p:stCondLst>
-                                            <p:cond delay="0"/>
-                                          </p:stCondLst>
-                                        </p:cTn>
-                                        <p:tgtEl>
-                                          <p:spTgt spid="12"/>
-                                        </p:tgtEl>
-                                        <p:attrNameLst>
-                                          <p:attrName>style.visibility</p:attrName>
-                                        </p:attrNameLst>
-                                      </p:cBhvr>
-                                      <p:to>
-                                        <p:strVal val="visible"/>
-                                      </p:to>
-                                    </p:set>
-                                  </p:childTnLst>
-                                </p:cTn>
-                              </p:par>
-                              <p:par>
-                                <p:cTn id="13" presetID="1" presetClass="entr" presetSubtype="0" fill="hold" nodeType="withEffect">
-                                  <p:stCondLst>
-                                    <p:cond delay="0"/>
-                                  </p:stCondLst>
-                                  <p:childTnLst>
-                                    <p:set>
-                                      <p:cBhvr>
-                                        <p:cTn id="14" dur="1" fill="hold">
-                                          <p:stCondLst>
-                                            <p:cond delay="0"/>
-                                          </p:stCondLst>
-                                        </p:cTn>
-                                        <p:tgtEl>
-                                          <p:spTgt spid="13"/>
-                                        </p:tgtEl>
-                                        <p:attrNameLst>
-                                          <p:attrName>style.visibility</p:attrName>
-                                        </p:attrNameLst>
-                                      </p:cBhvr>
-                                      <p:to>
-                                        <p:strVal val="visible"/>
-                                      </p:to>
-                                    </p:set>
-                                  </p:childTnLst>
-                                </p:cTn>
-                              </p:par>
-                              <p:par>
-                                <p:cTn id="15" presetID="1" presetClass="entr" presetSubtype="0" fill="hold" grpId="0" nodeType="withEffect">
-                                  <p:stCondLst>
-                                    <p:cond delay="0"/>
-                                  </p:stCondLst>
-                                  <p:childTnLst>
-                                    <p:set>
-                                      <p:cBhvr>
-                                        <p:cTn id="16" dur="1" fill="hold">
-                                          <p:stCondLst>
-                                            <p:cond delay="0"/>
-                                          </p:stCondLst>
-                                        </p:cTn>
-                                        <p:tgtEl>
-                                          <p:spTgt spid="15"/>
-                                        </p:tgtEl>
-                                        <p:attrNameLst>
-                                          <p:attrName>style.visibility</p:attrName>
-                                        </p:attrNameLst>
-                                      </p:cBhvr>
-                                      <p:to>
-                                        <p:strVal val="visible"/>
-                                      </p:to>
-                                    </p:set>
-                                  </p:childTnLst>
-                                </p:cTn>
-                              </p:par>
-                              <p:par>
-                                <p:cTn id="17" presetID="1" presetClass="entr" presetSubtype="0" fill="hold" grpId="0" nodeType="withEffect">
-                                  <p:stCondLst>
-                                    <p:cond delay="0"/>
-                                  </p:stCondLst>
-                                  <p:childTnLst>
-                                    <p:set>
-                                      <p:cBhvr>
-                                        <p:cTn id="18" dur="1" fill="hold">
-                                          <p:stCondLst>
-                                            <p:cond delay="0"/>
-                                          </p:stCondLst>
-                                        </p:cTn>
-                                        <p:tgtEl>
-                                          <p:spTgt spid="16"/>
-                                        </p:tgtEl>
-                                        <p:attrNameLst>
-                                          <p:attrName>style.visibility</p:attrName>
-                                        </p:attrNameLst>
-                                      </p:cBhvr>
-                                      <p:to>
-                                        <p:strVal val="visible"/>
-                                      </p:to>
-                                    </p:set>
-                                  </p:childTnLst>
-                                </p:cTn>
-                              </p:par>
-                              <p:par>
-                                <p:cTn id="19" presetID="1" presetClass="entr" presetSubtype="0" fill="hold" grpId="0" nodeType="withEffect">
-                                  <p:stCondLst>
-                                    <p:cond delay="0"/>
-                                  </p:stCondLst>
-                                  <p:childTnLst>
-                                    <p:set>
-                                      <p:cBhvr>
-                                        <p:cTn id="20" dur="1" fill="hold">
-                                          <p:stCondLst>
-                                            <p:cond delay="0"/>
-                                          </p:stCondLst>
-                                        </p:cTn>
-                                        <p:tgtEl>
-                                          <p:spTgt spid="17"/>
-                                        </p:tgtEl>
-                                        <p:attrNameLst>
-                                          <p:attrName>style.visibility</p:attrName>
-                                        </p:attrNameLst>
-                                      </p:cBhvr>
-                                      <p:to>
-                                        <p:strVal val="visible"/>
-                                      </p:to>
-                                    </p:set>
-                                  </p:childTnLst>
-                                </p:cTn>
-                              </p:par>
-                              <p:par>
-                                <p:cTn id="21" presetID="1" presetClass="entr" presetSubtype="0" fill="hold" grpId="0" nodeType="withEffect">
-                                  <p:stCondLst>
-                                    <p:cond delay="0"/>
-                                  </p:stCondLst>
-                                  <p:childTnLst>
-                                    <p:set>
-                                      <p:cBhvr>
-                                        <p:cTn id="22" dur="1" fill="hold">
-                                          <p:stCondLst>
-                                            <p:cond delay="0"/>
-                                          </p:stCondLst>
-                                        </p:cTn>
-                                        <p:tgtEl>
                                           <p:spTgt spid="19"/>
                                         </p:tgtEl>
                                         <p:attrNameLst>
@@ -5910,21 +4810,39 @@
                                   </p:childTnLst>
                                 </p:cTn>
                               </p:par>
+                            </p:childTnLst>
+                          </p:cTn>
+                        </p:par>
+                      </p:childTnLst>
+                    </p:cTn>
+                  </p:par>
+                  <p:par>
+                    <p:cTn id="7" fill="hold">
+                      <p:stCondLst>
+                        <p:cond delay="indefinite"/>
+                      </p:stCondLst>
+                      <p:childTnLst>
+                        <p:par>
+                          <p:cTn id="8" fill="hold">
+                            <p:stCondLst>
+                              <p:cond delay="0"/>
+                            </p:stCondLst>
+                            <p:childTnLst>
                               <p:par>
-                                <p:cTn id="23" presetID="1" presetClass="entr" presetSubtype="0" fill="hold" grpId="0" nodeType="withEffect">
+                                <p:cTn id="9" presetID="1" presetClass="entr" presetSubtype="0" fill="hold" grpId="0" nodeType="clickEffect">
                                   <p:stCondLst>
                                     <p:cond delay="0"/>
                                   </p:stCondLst>
                                   <p:childTnLst>
                                     <p:set>
                                       <p:cBhvr>
-                                        <p:cTn id="24" dur="1" fill="hold">
+                                        <p:cTn id="10" dur="1" fill="hold">
                                           <p:stCondLst>
                                             <p:cond delay="0"/>
                                           </p:stCondLst>
                                         </p:cTn>
                                         <p:tgtEl>
-                                          <p:spTgt spid="20"/>
+                                          <p:spTgt spid="6"/>
                                         </p:tgtEl>
                                         <p:attrNameLst>
                                           <p:attrName>style.visibility</p:attrName>
@@ -5937,75 +4855,39 @@
                                   </p:childTnLst>
                                 </p:cTn>
                               </p:par>
+                            </p:childTnLst>
+                          </p:cTn>
+                        </p:par>
+                      </p:childTnLst>
+                    </p:cTn>
+                  </p:par>
+                  <p:par>
+                    <p:cTn id="11" fill="hold">
+                      <p:stCondLst>
+                        <p:cond delay="indefinite"/>
+                      </p:stCondLst>
+                      <p:childTnLst>
+                        <p:par>
+                          <p:cTn id="12" fill="hold">
+                            <p:stCondLst>
+                              <p:cond delay="0"/>
+                            </p:stCondLst>
+                            <p:childTnLst>
                               <p:par>
-                                <p:cTn id="25" presetID="1" presetClass="entr" presetSubtype="0" fill="hold" nodeType="withEffect">
+                                <p:cTn id="13" presetID="1" presetClass="entr" presetSubtype="0" fill="hold" grpId="0" nodeType="clickEffect">
                                   <p:stCondLst>
                                     <p:cond delay="0"/>
                                   </p:stCondLst>
                                   <p:childTnLst>
                                     <p:set>
                                       <p:cBhvr>
-                                        <p:cTn id="26" dur="1" fill="hold">
+                                        <p:cTn id="14" dur="1" fill="hold">
                                           <p:stCondLst>
                                             <p:cond delay="0"/>
                                           </p:stCondLst>
                                         </p:cTn>
                                         <p:tgtEl>
-                                          <p:spTgt spid="28"/>
-                                        </p:tgtEl>
-                                        <p:attrNameLst>
-                                          <p:attrName>style.visibility</p:attrName>
-                                        </p:attrNameLst>
-                                      </p:cBhvr>
-                                      <p:to>
-                                        <p:strVal val="visible"/>
-                                      </p:to>
-                                    </p:set>
-                                  </p:childTnLst>
-                                </p:cTn>
-                              </p:par>
-                              <p:par>
-                                <p:cTn id="27" presetID="1" presetClass="entr" presetSubtype="0" fill="hold" grpId="0" nodeType="withEffect">
-                                  <p:stCondLst>
-                                    <p:cond delay="0"/>
-                                  </p:stCondLst>
-                                  <p:childTnLst>
-                                    <p:set>
-                                      <p:cBhvr>
-                                        <p:cTn id="28" dur="1" fill="hold">
-                                          <p:stCondLst>
-                                            <p:cond delay="0"/>
-                                          </p:stCondLst>
-                                        </p:cTn>
-                                        <p:tgtEl>
-                                          <p:spTgt spid="5"/>
-                                        </p:tgtEl>
-                                        <p:attrNameLst>
-                                          <p:attrName>style.visibility</p:attrName>
-                                        </p:attrNameLst>
-                                      </p:cBhvr>
-                                      <p:to>
-                                        <p:strVal val="visible"/>
-                                      </p:to>
-                                    </p:set>
-                                  </p:childTnLst>
-                                </p:cTn>
-                              </p:par>
-                              <p:par>
-                                <p:cTn id="29" presetID="1" presetClass="entr" presetSubtype="0" fill="hold" grpId="0" nodeType="withEffect">
-                                  <p:stCondLst>
-                                    <p:cond delay="0"/>
-                                  </p:stCondLst>
-                                  <p:childTnLst>
-                                    <p:set>
-                                      <p:cBhvr>
-                                        <p:cTn id="30" dur="1" fill="hold">
-                                          <p:stCondLst>
-                                            <p:cond delay="0"/>
-                                          </p:stCondLst>
-                                        </p:cTn>
-                                        <p:tgtEl>
-                                          <p:spTgt spid="6"/>
+                                          <p:spTgt spid="14"/>
                                         </p:tgtEl>
                                         <p:attrNameLst>
                                           <p:attrName>style.visibility</p:attrName>
@@ -6046,16 +4928,9 @@
       </p:par>
     </p:tnLst>
     <p:bldLst>
-      <p:bldP spid="5" grpId="0" animBg="1"/>
-      <p:bldP spid="6" grpId="0" animBg="1"/>
-      <p:bldP spid="7" grpId="0"/>
-      <p:bldP spid="10" grpId="0" animBg="1"/>
-      <p:bldP spid="11" grpId="0" animBg="1"/>
-      <p:bldP spid="15" grpId="0"/>
-      <p:bldP spid="16" grpId="0" animBg="1"/>
-      <p:bldP spid="17" grpId="0"/>
+      <p:bldP spid="6" grpId="0"/>
+      <p:bldP spid="14" grpId="0"/>
       <p:bldP spid="19" grpId="0"/>
-      <p:bldP spid="20" grpId="0"/>
     </p:bldLst>
   </p:timing>
 </p:sld>
@@ -7203,92 +6078,6 @@
               <a:t>.</a:t>
             </a:r>
             <a:endParaRPr lang="LID4096" sz="2800" b="1" dirty="0"/>
-          </a:p>
-        </p:txBody>
-      </p:sp>
-      <p:sp>
-        <p:nvSpPr>
-          <p:cNvPr id="6" name="TextBox 5">
-            <a:extLst>
-              <a:ext uri="{FF2B5EF4-FFF2-40B4-BE49-F238E27FC236}">
-                <a16:creationId xmlns:a16="http://schemas.microsoft.com/office/drawing/2014/main" id="{80374B8F-CC24-FB5C-46C9-E52111CC2968}"/>
-              </a:ext>
-            </a:extLst>
-          </p:cNvPr>
-          <p:cNvSpPr txBox="1"/>
-          <p:nvPr/>
-        </p:nvSpPr>
-        <p:spPr>
-          <a:xfrm>
-            <a:off x="119376" y="681785"/>
-            <a:ext cx="784189" cy="369332"/>
-          </a:xfrm>
-          <a:prstGeom prst="rect">
-            <a:avLst/>
-          </a:prstGeom>
-          <a:noFill/>
-        </p:spPr>
-        <p:txBody>
-          <a:bodyPr wrap="none" rtlCol="0">
-            <a:spAutoFit/>
-          </a:bodyPr>
-          <a:lstStyle/>
-          <a:p>
-            <a:r>
-              <a:rPr lang="en-US" dirty="0"/>
-              <a:t>Goal:  </a:t>
-            </a:r>
-            <a:endParaRPr lang="LID4096" dirty="0"/>
-          </a:p>
-        </p:txBody>
-      </p:sp>
-      <p:sp>
-        <p:nvSpPr>
-          <p:cNvPr id="14" name="TextBox 13">
-            <a:extLst>
-              <a:ext uri="{FF2B5EF4-FFF2-40B4-BE49-F238E27FC236}">
-                <a16:creationId xmlns:a16="http://schemas.microsoft.com/office/drawing/2014/main" id="{D4F114D1-2821-EC63-469D-6A5E5969835F}"/>
-              </a:ext>
-            </a:extLst>
-          </p:cNvPr>
-          <p:cNvSpPr txBox="1"/>
-          <p:nvPr/>
-        </p:nvSpPr>
-        <p:spPr>
-          <a:xfrm>
-            <a:off x="583438" y="976561"/>
-            <a:ext cx="5945358" cy="923330"/>
-          </a:xfrm>
-          <a:prstGeom prst="rect">
-            <a:avLst/>
-          </a:prstGeom>
-          <a:noFill/>
-        </p:spPr>
-        <p:txBody>
-          <a:bodyPr wrap="square" rtlCol="0">
-            <a:spAutoFit/>
-          </a:bodyPr>
-          <a:lstStyle/>
-          <a:p>
-            <a:pPr marL="285750" indent="-285750">
-              <a:buFont typeface="Wingdings" panose="05000000000000000000" pitchFamily="2" charset="2"/>
-              <a:buChar char="ü"/>
-            </a:pPr>
-            <a:r>
-              <a:rPr lang="en-US" dirty="0"/>
-              <a:t>Facilitate a seamless experience for user when working with the pipeline</a:t>
-            </a:r>
-          </a:p>
-          <a:p>
-            <a:pPr marL="742950" lvl="1" indent="-285750">
-              <a:buFont typeface="Arial" panose="020B0604020202020204" pitchFamily="34" charset="0"/>
-              <a:buChar char="•"/>
-            </a:pPr>
-            <a:r>
-              <a:rPr lang="en-US" dirty="0"/>
-              <a:t>Hide internal implementation details of the pipeline</a:t>
-            </a:r>
-            <a:endParaRPr lang="LID4096" dirty="0"/>
           </a:p>
         </p:txBody>
       </p:sp>
@@ -13249,13 +12038,13 @@
   <p:clrMapOvr>
     <a:masterClrMapping/>
   </p:clrMapOvr>
-  <mc:AlternateContent xmlns:mc="http://schemas.openxmlformats.org/markup-compatibility/2006">
-    <mc:Choice xmlns:p14="http://schemas.microsoft.com/office/powerpoint/2010/main" Requires="p14">
+  <mc:AlternateContent xmlns:mc="http://schemas.openxmlformats.org/markup-compatibility/2006" xmlns:p14="http://schemas.microsoft.com/office/powerpoint/2010/main">
+    <mc:Choice Requires="p14">
       <p:transition spd="med" p14:dur="700">
         <p:fade/>
       </p:transition>
     </mc:Choice>
-    <mc:Fallback>
+    <mc:Fallback xmlns="">
       <p:transition spd="med">
         <p:fade/>
       </p:transition>
@@ -18778,7 +17567,7 @@
         </p:nvSpPr>
         <p:spPr>
           <a:xfrm>
-            <a:off x="4290085" y="734388"/>
+            <a:off x="3906328" y="1836847"/>
             <a:ext cx="5337568" cy="2069913"/>
           </a:xfrm>
           <a:prstGeom prst="rect">
@@ -18837,7 +17626,7 @@
         </p:nvCxnSpPr>
         <p:spPr>
           <a:xfrm flipH="1">
-            <a:off x="5042696" y="1461595"/>
+            <a:off x="4658939" y="2564054"/>
             <a:ext cx="1980786" cy="0"/>
           </a:xfrm>
           <a:prstGeom prst="straightConnector1">
@@ -18877,7 +17666,7 @@
         </p:nvSpPr>
         <p:spPr>
           <a:xfrm>
-            <a:off x="7162969" y="942890"/>
+            <a:off x="6779212" y="2045349"/>
             <a:ext cx="1282952" cy="1356333"/>
           </a:xfrm>
           <a:prstGeom prst="rect">
@@ -18941,7 +17730,7 @@
         </p:blipFill>
         <p:spPr bwMode="auto">
           <a:xfrm>
-            <a:off x="7360121" y="1037218"/>
+            <a:off x="6976364" y="2139677"/>
             <a:ext cx="869713" cy="1151415"/>
           </a:xfrm>
           <a:prstGeom prst="rect">
@@ -18990,7 +17779,7 @@
         </p:blipFill>
         <p:spPr>
           <a:xfrm>
-            <a:off x="2512926" y="1125946"/>
+            <a:off x="2129169" y="2228405"/>
             <a:ext cx="603353" cy="470604"/>
           </a:xfrm>
           <a:prstGeom prst="rect">
@@ -19012,7 +17801,7 @@
         </p:nvSpPr>
         <p:spPr>
           <a:xfrm>
-            <a:off x="2512925" y="1564317"/>
+            <a:off x="2129168" y="2666776"/>
             <a:ext cx="854412" cy="340863"/>
           </a:xfrm>
           <a:prstGeom prst="rect">
@@ -19063,7 +17852,7 @@
         </p:blipFill>
         <p:spPr bwMode="auto">
           <a:xfrm rot="10800000" flipH="1">
-            <a:off x="4427318" y="1108257"/>
+            <a:off x="4043561" y="2210716"/>
             <a:ext cx="592081" cy="642085"/>
           </a:xfrm>
           <a:prstGeom prst="rect">
@@ -19095,7 +17884,7 @@
         </p:nvSpPr>
         <p:spPr>
           <a:xfrm>
-            <a:off x="3145352" y="1377957"/>
+            <a:off x="2761595" y="2480416"/>
             <a:ext cx="1115660" cy="170840"/>
           </a:xfrm>
           <a:prstGeom prst="rightArrow">
@@ -19141,7 +17930,7 @@
         </p:nvSpPr>
         <p:spPr>
           <a:xfrm>
-            <a:off x="4266790" y="2484686"/>
+            <a:off x="3883033" y="3587145"/>
             <a:ext cx="736740" cy="305468"/>
           </a:xfrm>
           <a:prstGeom prst="rect">
@@ -19197,7 +17986,7 @@
         </p:blipFill>
         <p:spPr>
           <a:xfrm>
-            <a:off x="5722051" y="975581"/>
+            <a:off x="5338294" y="2078040"/>
             <a:ext cx="682531" cy="555992"/>
           </a:xfrm>
           <a:prstGeom prst="ellipse">
@@ -19225,7 +18014,7 @@
         </p:nvSpPr>
         <p:spPr>
           <a:xfrm>
-            <a:off x="863166" y="3515620"/>
+            <a:off x="714844" y="4369182"/>
             <a:ext cx="9418284" cy="1114921"/>
           </a:xfrm>
           <a:prstGeom prst="rect">
@@ -19261,7 +18050,7 @@
             </a:pPr>
             <a:r>
               <a:rPr lang="en-US" sz="1615" dirty="0"/>
-              <a:t>A system designed to handle complex computation tasks </a:t>
+              <a:t>Designed to handle complex computation tasks </a:t>
             </a:r>
           </a:p>
           <a:p>
@@ -19287,7 +18076,7 @@
         </p:nvSpPr>
         <p:spPr>
           <a:xfrm>
-            <a:off x="4427316" y="1596549"/>
+            <a:off x="4043559" y="2699008"/>
             <a:ext cx="854412" cy="447558"/>
           </a:xfrm>
           <a:prstGeom prst="rect">
@@ -19323,7 +18112,7 @@
         </p:nvSpPr>
         <p:spPr>
           <a:xfrm>
-            <a:off x="7210452" y="2299223"/>
+            <a:off x="6826695" y="3401682"/>
             <a:ext cx="1156520" cy="269946"/>
           </a:xfrm>
           <a:prstGeom prst="rect">
@@ -19424,7 +18213,7 @@
         </p:nvSpPr>
         <p:spPr>
           <a:xfrm>
-            <a:off x="863166" y="4723371"/>
+            <a:off x="714844" y="5557965"/>
             <a:ext cx="5214248" cy="1086451"/>
           </a:xfrm>
           <a:prstGeom prst="rect">
@@ -19483,6 +18272,55 @@
           </a:p>
           <a:p>
             <a:pPr marL="954279" lvl="1" indent="-329698">
+              <a:buFont typeface="Arial" panose="020B0604020202020204" pitchFamily="34" charset="0"/>
+              <a:buChar char="•"/>
+            </a:pPr>
+            <a:endParaRPr lang="en-US" sz="1615" dirty="0"/>
+          </a:p>
+        </p:txBody>
+      </p:sp>
+      <p:sp>
+        <p:nvSpPr>
+          <p:cNvPr id="7" name="TextBox 6">
+            <a:extLst>
+              <a:ext uri="{FF2B5EF4-FFF2-40B4-BE49-F238E27FC236}">
+                <a16:creationId xmlns:a16="http://schemas.microsoft.com/office/drawing/2014/main" id="{828C6F5B-A223-A174-714A-DD359B581FA6}"/>
+              </a:ext>
+            </a:extLst>
+          </p:cNvPr>
+          <p:cNvSpPr txBox="1"/>
+          <p:nvPr/>
+        </p:nvSpPr>
+        <p:spPr>
+          <a:xfrm>
+            <a:off x="-89852" y="508052"/>
+            <a:ext cx="6800964" cy="866391"/>
+          </a:xfrm>
+          <a:prstGeom prst="rect">
+            <a:avLst/>
+          </a:prstGeom>
+          <a:noFill/>
+        </p:spPr>
+        <p:txBody>
+          <a:bodyPr wrap="none" rtlCol="0">
+            <a:spAutoFit/>
+          </a:bodyPr>
+          <a:lstStyle/>
+          <a:p>
+            <a:endParaRPr lang="en-US" b="1" dirty="0"/>
+          </a:p>
+          <a:p>
+            <a:pPr marL="954279" lvl="1" indent="-329698">
+              <a:buFont typeface="Wingdings" panose="05000000000000000000" pitchFamily="2" charset="2"/>
+              <a:buChar char="ü"/>
+            </a:pPr>
+            <a:r>
+              <a:rPr lang="en-US" sz="1615" dirty="0"/>
+              <a:t>Let’s say we want to run a task(model) on a cluster/supercomputer  </a:t>
+            </a:r>
+          </a:p>
+          <a:p>
+            <a:pPr marL="1411479" lvl="2" indent="-329698">
               <a:buFont typeface="Arial" panose="020B0604020202020204" pitchFamily="34" charset="0"/>
               <a:buChar char="•"/>
             </a:pPr>
@@ -19508,6 +18346,479 @@
       <p:transition/>
     </mc:Fallback>
   </mc:AlternateContent>
+  <p:timing>
+    <p:tnLst>
+      <p:par>
+        <p:cTn id="1" dur="indefinite" restart="never" nodeType="tmRoot">
+          <p:childTnLst>
+            <p:seq concurrent="1" nextAc="seek">
+              <p:cTn id="2" dur="indefinite" nodeType="mainSeq">
+                <p:childTnLst>
+                  <p:par>
+                    <p:cTn id="3" fill="hold">
+                      <p:stCondLst>
+                        <p:cond delay="indefinite"/>
+                      </p:stCondLst>
+                      <p:childTnLst>
+                        <p:par>
+                          <p:cTn id="4" fill="hold">
+                            <p:stCondLst>
+                              <p:cond delay="0"/>
+                            </p:stCondLst>
+                            <p:childTnLst>
+                              <p:par>
+                                <p:cTn id="5" presetID="1" presetClass="entr" presetSubtype="0" fill="hold" grpId="0" nodeType="clickEffect">
+                                  <p:stCondLst>
+                                    <p:cond delay="0"/>
+                                  </p:stCondLst>
+                                  <p:childTnLst>
+                                    <p:set>
+                                      <p:cBhvr>
+                                        <p:cTn id="6" dur="1" fill="hold">
+                                          <p:stCondLst>
+                                            <p:cond delay="0"/>
+                                          </p:stCondLst>
+                                        </p:cTn>
+                                        <p:tgtEl>
+                                          <p:spTgt spid="14"/>
+                                        </p:tgtEl>
+                                        <p:attrNameLst>
+                                          <p:attrName>style.visibility</p:attrName>
+                                        </p:attrNameLst>
+                                      </p:cBhvr>
+                                      <p:to>
+                                        <p:strVal val="visible"/>
+                                      </p:to>
+                                    </p:set>
+                                  </p:childTnLst>
+                                </p:cTn>
+                              </p:par>
+                              <p:par>
+                                <p:cTn id="7" presetID="1" presetClass="entr" presetSubtype="0" fill="hold" nodeType="withEffect">
+                                  <p:stCondLst>
+                                    <p:cond delay="0"/>
+                                  </p:stCondLst>
+                                  <p:childTnLst>
+                                    <p:set>
+                                      <p:cBhvr>
+                                        <p:cTn id="8" dur="1" fill="hold">
+                                          <p:stCondLst>
+                                            <p:cond delay="0"/>
+                                          </p:stCondLst>
+                                        </p:cTn>
+                                        <p:tgtEl>
+                                          <p:spTgt spid="18"/>
+                                        </p:tgtEl>
+                                        <p:attrNameLst>
+                                          <p:attrName>style.visibility</p:attrName>
+                                        </p:attrNameLst>
+                                      </p:cBhvr>
+                                      <p:to>
+                                        <p:strVal val="visible"/>
+                                      </p:to>
+                                    </p:set>
+                                  </p:childTnLst>
+                                </p:cTn>
+                              </p:par>
+                              <p:par>
+                                <p:cTn id="9" presetID="1" presetClass="entr" presetSubtype="0" fill="hold" grpId="0" nodeType="withEffect">
+                                  <p:stCondLst>
+                                    <p:cond delay="0"/>
+                                  </p:stCondLst>
+                                  <p:childTnLst>
+                                    <p:set>
+                                      <p:cBhvr>
+                                        <p:cTn id="10" dur="1" fill="hold">
+                                          <p:stCondLst>
+                                            <p:cond delay="0"/>
+                                          </p:stCondLst>
+                                        </p:cTn>
+                                        <p:tgtEl>
+                                          <p:spTgt spid="21"/>
+                                        </p:tgtEl>
+                                        <p:attrNameLst>
+                                          <p:attrName>style.visibility</p:attrName>
+                                        </p:attrNameLst>
+                                      </p:cBhvr>
+                                      <p:to>
+                                        <p:strVal val="visible"/>
+                                      </p:to>
+                                    </p:set>
+                                  </p:childTnLst>
+                                </p:cTn>
+                              </p:par>
+                              <p:par>
+                                <p:cTn id="11" presetID="1" presetClass="entr" presetSubtype="0" fill="hold" nodeType="withEffect">
+                                  <p:stCondLst>
+                                    <p:cond delay="0"/>
+                                  </p:stCondLst>
+                                  <p:childTnLst>
+                                    <p:set>
+                                      <p:cBhvr>
+                                        <p:cTn id="12" dur="1" fill="hold">
+                                          <p:stCondLst>
+                                            <p:cond delay="0"/>
+                                          </p:stCondLst>
+                                        </p:cTn>
+                                        <p:tgtEl>
+                                          <p:spTgt spid="22"/>
+                                        </p:tgtEl>
+                                        <p:attrNameLst>
+                                          <p:attrName>style.visibility</p:attrName>
+                                        </p:attrNameLst>
+                                      </p:cBhvr>
+                                      <p:to>
+                                        <p:strVal val="visible"/>
+                                      </p:to>
+                                    </p:set>
+                                  </p:childTnLst>
+                                </p:cTn>
+                              </p:par>
+                              <p:par>
+                                <p:cTn id="13" presetID="1" presetClass="entr" presetSubtype="0" fill="hold" nodeType="withEffect">
+                                  <p:stCondLst>
+                                    <p:cond delay="0"/>
+                                  </p:stCondLst>
+                                  <p:childTnLst>
+                                    <p:set>
+                                      <p:cBhvr>
+                                        <p:cTn id="14" dur="1" fill="hold">
+                                          <p:stCondLst>
+                                            <p:cond delay="0"/>
+                                          </p:stCondLst>
+                                        </p:cTn>
+                                        <p:tgtEl>
+                                          <p:spTgt spid="23"/>
+                                        </p:tgtEl>
+                                        <p:attrNameLst>
+                                          <p:attrName>style.visibility</p:attrName>
+                                        </p:attrNameLst>
+                                      </p:cBhvr>
+                                      <p:to>
+                                        <p:strVal val="visible"/>
+                                      </p:to>
+                                    </p:set>
+                                  </p:childTnLst>
+                                </p:cTn>
+                              </p:par>
+                              <p:par>
+                                <p:cTn id="15" presetID="1" presetClass="entr" presetSubtype="0" fill="hold" grpId="0" nodeType="withEffect">
+                                  <p:stCondLst>
+                                    <p:cond delay="0"/>
+                                  </p:stCondLst>
+                                  <p:childTnLst>
+                                    <p:set>
+                                      <p:cBhvr>
+                                        <p:cTn id="16" dur="1" fill="hold">
+                                          <p:stCondLst>
+                                            <p:cond delay="0"/>
+                                          </p:stCondLst>
+                                        </p:cTn>
+                                        <p:tgtEl>
+                                          <p:spTgt spid="26"/>
+                                        </p:tgtEl>
+                                        <p:attrNameLst>
+                                          <p:attrName>style.visibility</p:attrName>
+                                        </p:attrNameLst>
+                                      </p:cBhvr>
+                                      <p:to>
+                                        <p:strVal val="visible"/>
+                                      </p:to>
+                                    </p:set>
+                                  </p:childTnLst>
+                                </p:cTn>
+                              </p:par>
+                              <p:par>
+                                <p:cTn id="17" presetID="1" presetClass="entr" presetSubtype="0" fill="hold" nodeType="withEffect">
+                                  <p:stCondLst>
+                                    <p:cond delay="0"/>
+                                  </p:stCondLst>
+                                  <p:childTnLst>
+                                    <p:set>
+                                      <p:cBhvr>
+                                        <p:cTn id="18" dur="1" fill="hold">
+                                          <p:stCondLst>
+                                            <p:cond delay="0"/>
+                                          </p:stCondLst>
+                                        </p:cTn>
+                                        <p:tgtEl>
+                                          <p:spTgt spid="27"/>
+                                        </p:tgtEl>
+                                        <p:attrNameLst>
+                                          <p:attrName>style.visibility</p:attrName>
+                                        </p:attrNameLst>
+                                      </p:cBhvr>
+                                      <p:to>
+                                        <p:strVal val="visible"/>
+                                      </p:to>
+                                    </p:set>
+                                  </p:childTnLst>
+                                </p:cTn>
+                              </p:par>
+                              <p:par>
+                                <p:cTn id="19" presetID="1" presetClass="entr" presetSubtype="0" fill="hold" grpId="0" nodeType="withEffect">
+                                  <p:stCondLst>
+                                    <p:cond delay="0"/>
+                                  </p:stCondLst>
+                                  <p:childTnLst>
+                                    <p:set>
+                                      <p:cBhvr>
+                                        <p:cTn id="20" dur="1" fill="hold">
+                                          <p:stCondLst>
+                                            <p:cond delay="0"/>
+                                          </p:stCondLst>
+                                        </p:cTn>
+                                        <p:tgtEl>
+                                          <p:spTgt spid="29"/>
+                                        </p:tgtEl>
+                                        <p:attrNameLst>
+                                          <p:attrName>style.visibility</p:attrName>
+                                        </p:attrNameLst>
+                                      </p:cBhvr>
+                                      <p:to>
+                                        <p:strVal val="visible"/>
+                                      </p:to>
+                                    </p:set>
+                                  </p:childTnLst>
+                                </p:cTn>
+                              </p:par>
+                              <p:par>
+                                <p:cTn id="21" presetID="1" presetClass="entr" presetSubtype="0" fill="hold" grpId="0" nodeType="withEffect">
+                                  <p:stCondLst>
+                                    <p:cond delay="0"/>
+                                  </p:stCondLst>
+                                  <p:childTnLst>
+                                    <p:set>
+                                      <p:cBhvr>
+                                        <p:cTn id="22" dur="1" fill="hold">
+                                          <p:stCondLst>
+                                            <p:cond delay="0"/>
+                                          </p:stCondLst>
+                                        </p:cTn>
+                                        <p:tgtEl>
+                                          <p:spTgt spid="35"/>
+                                        </p:tgtEl>
+                                        <p:attrNameLst>
+                                          <p:attrName>style.visibility</p:attrName>
+                                        </p:attrNameLst>
+                                      </p:cBhvr>
+                                      <p:to>
+                                        <p:strVal val="visible"/>
+                                      </p:to>
+                                    </p:set>
+                                  </p:childTnLst>
+                                </p:cTn>
+                              </p:par>
+                              <p:par>
+                                <p:cTn id="23" presetID="1" presetClass="entr" presetSubtype="0" fill="hold" nodeType="withEffect">
+                                  <p:stCondLst>
+                                    <p:cond delay="0"/>
+                                  </p:stCondLst>
+                                  <p:childTnLst>
+                                    <p:set>
+                                      <p:cBhvr>
+                                        <p:cTn id="24" dur="1" fill="hold">
+                                          <p:stCondLst>
+                                            <p:cond delay="0"/>
+                                          </p:stCondLst>
+                                        </p:cTn>
+                                        <p:tgtEl>
+                                          <p:spTgt spid="39"/>
+                                        </p:tgtEl>
+                                        <p:attrNameLst>
+                                          <p:attrName>style.visibility</p:attrName>
+                                        </p:attrNameLst>
+                                      </p:cBhvr>
+                                      <p:to>
+                                        <p:strVal val="visible"/>
+                                      </p:to>
+                                    </p:set>
+                                  </p:childTnLst>
+                                </p:cTn>
+                              </p:par>
+                              <p:par>
+                                <p:cTn id="25" presetID="1" presetClass="entr" presetSubtype="0" fill="hold" grpId="0" nodeType="withEffect">
+                                  <p:stCondLst>
+                                    <p:cond delay="0"/>
+                                  </p:stCondLst>
+                                  <p:childTnLst>
+                                    <p:set>
+                                      <p:cBhvr>
+                                        <p:cTn id="26" dur="1" fill="hold">
+                                          <p:stCondLst>
+                                            <p:cond delay="0"/>
+                                          </p:stCondLst>
+                                        </p:cTn>
+                                        <p:tgtEl>
+                                          <p:spTgt spid="2"/>
+                                        </p:tgtEl>
+                                        <p:attrNameLst>
+                                          <p:attrName>style.visibility</p:attrName>
+                                        </p:attrNameLst>
+                                      </p:cBhvr>
+                                      <p:to>
+                                        <p:strVal val="visible"/>
+                                      </p:to>
+                                    </p:set>
+                                  </p:childTnLst>
+                                </p:cTn>
+                              </p:par>
+                              <p:par>
+                                <p:cTn id="27" presetID="1" presetClass="entr" presetSubtype="0" fill="hold" grpId="0" nodeType="withEffect">
+                                  <p:stCondLst>
+                                    <p:cond delay="0"/>
+                                  </p:stCondLst>
+                                  <p:childTnLst>
+                                    <p:set>
+                                      <p:cBhvr>
+                                        <p:cTn id="28" dur="1" fill="hold">
+                                          <p:stCondLst>
+                                            <p:cond delay="0"/>
+                                          </p:stCondLst>
+                                        </p:cTn>
+                                        <p:tgtEl>
+                                          <p:spTgt spid="3"/>
+                                        </p:tgtEl>
+                                        <p:attrNameLst>
+                                          <p:attrName>style.visibility</p:attrName>
+                                        </p:attrNameLst>
+                                      </p:cBhvr>
+                                      <p:to>
+                                        <p:strVal val="visible"/>
+                                      </p:to>
+                                    </p:set>
+                                  </p:childTnLst>
+                                </p:cTn>
+                              </p:par>
+                            </p:childTnLst>
+                          </p:cTn>
+                        </p:par>
+                      </p:childTnLst>
+                    </p:cTn>
+                  </p:par>
+                  <p:par>
+                    <p:cTn id="29" fill="hold">
+                      <p:stCondLst>
+                        <p:cond delay="indefinite"/>
+                      </p:stCondLst>
+                      <p:childTnLst>
+                        <p:par>
+                          <p:cTn id="30" fill="hold">
+                            <p:stCondLst>
+                              <p:cond delay="0"/>
+                            </p:stCondLst>
+                            <p:childTnLst>
+                              <p:par>
+                                <p:cTn id="31" presetID="1" presetClass="entr" presetSubtype="0" fill="hold" grpId="0" nodeType="clickEffect">
+                                  <p:stCondLst>
+                                    <p:cond delay="0"/>
+                                  </p:stCondLst>
+                                  <p:childTnLst>
+                                    <p:set>
+                                      <p:cBhvr>
+                                        <p:cTn id="32" dur="1" fill="hold">
+                                          <p:stCondLst>
+                                            <p:cond delay="0"/>
+                                          </p:stCondLst>
+                                        </p:cTn>
+                                        <p:tgtEl>
+                                          <p:spTgt spid="51"/>
+                                        </p:tgtEl>
+                                        <p:attrNameLst>
+                                          <p:attrName>style.visibility</p:attrName>
+                                        </p:attrNameLst>
+                                      </p:cBhvr>
+                                      <p:to>
+                                        <p:strVal val="visible"/>
+                                      </p:to>
+                                    </p:set>
+                                  </p:childTnLst>
+                                </p:cTn>
+                              </p:par>
+                            </p:childTnLst>
+                          </p:cTn>
+                        </p:par>
+                      </p:childTnLst>
+                    </p:cTn>
+                  </p:par>
+                  <p:par>
+                    <p:cTn id="33" fill="hold">
+                      <p:stCondLst>
+                        <p:cond delay="indefinite"/>
+                      </p:stCondLst>
+                      <p:childTnLst>
+                        <p:par>
+                          <p:cTn id="34" fill="hold">
+                            <p:stCondLst>
+                              <p:cond delay="0"/>
+                            </p:stCondLst>
+                            <p:childTnLst>
+                              <p:par>
+                                <p:cTn id="35" presetID="1" presetClass="entr" presetSubtype="0" fill="hold" grpId="0" nodeType="clickEffect">
+                                  <p:stCondLst>
+                                    <p:cond delay="0"/>
+                                  </p:stCondLst>
+                                  <p:childTnLst>
+                                    <p:set>
+                                      <p:cBhvr>
+                                        <p:cTn id="36" dur="1" fill="hold">
+                                          <p:stCondLst>
+                                            <p:cond delay="0"/>
+                                          </p:stCondLst>
+                                        </p:cTn>
+                                        <p:tgtEl>
+                                          <p:spTgt spid="10"/>
+                                        </p:tgtEl>
+                                        <p:attrNameLst>
+                                          <p:attrName>style.visibility</p:attrName>
+                                        </p:attrNameLst>
+                                      </p:cBhvr>
+                                      <p:to>
+                                        <p:strVal val="visible"/>
+                                      </p:to>
+                                    </p:set>
+                                  </p:childTnLst>
+                                </p:cTn>
+                              </p:par>
+                            </p:childTnLst>
+                          </p:cTn>
+                        </p:par>
+                      </p:childTnLst>
+                    </p:cTn>
+                  </p:par>
+                </p:childTnLst>
+              </p:cTn>
+              <p:prevCondLst>
+                <p:cond evt="onPrev" delay="0">
+                  <p:tgtEl>
+                    <p:sldTgt/>
+                  </p:tgtEl>
+                </p:cond>
+              </p:prevCondLst>
+              <p:nextCondLst>
+                <p:cond evt="onNext" delay="0">
+                  <p:tgtEl>
+                    <p:sldTgt/>
+                  </p:tgtEl>
+                </p:cond>
+              </p:nextCondLst>
+            </p:seq>
+          </p:childTnLst>
+        </p:cTn>
+      </p:par>
+    </p:tnLst>
+    <p:bldLst>
+      <p:bldP spid="14" grpId="0" animBg="1"/>
+      <p:bldP spid="21" grpId="0" animBg="1"/>
+      <p:bldP spid="26" grpId="0"/>
+      <p:bldP spid="29" grpId="0" animBg="1"/>
+      <p:bldP spid="35" grpId="0"/>
+      <p:bldP spid="51" grpId="0"/>
+      <p:bldP spid="2" grpId="0"/>
+      <p:bldP spid="3" grpId="0"/>
+      <p:bldP spid="10" grpId="0"/>
+    </p:bldLst>
+  </p:timing>
 </p:sld>
 </file>
 
@@ -20213,7 +19524,7 @@
         </p:nvSpPr>
         <p:spPr>
           <a:xfrm>
-            <a:off x="2007945" y="4174869"/>
+            <a:off x="6555221" y="3494837"/>
             <a:ext cx="804900" cy="1323439"/>
           </a:xfrm>
           <a:prstGeom prst="rect">
@@ -20352,7 +19663,7 @@
         </p:nvSpPr>
         <p:spPr>
           <a:xfrm>
-            <a:off x="1857984" y="4109032"/>
+            <a:off x="6405260" y="3429000"/>
             <a:ext cx="299922" cy="1434998"/>
           </a:xfrm>
           <a:prstGeom prst="leftBrace">
@@ -20379,6 +19690,75 @@
           <a:p>
             <a:pPr algn="ctr"/>
             <a:endParaRPr lang="LID4096" dirty="0"/>
+          </a:p>
+        </p:txBody>
+      </p:sp>
+      <p:sp>
+        <p:nvSpPr>
+          <p:cNvPr id="5" name="TextBox 4">
+            <a:extLst>
+              <a:ext uri="{FF2B5EF4-FFF2-40B4-BE49-F238E27FC236}">
+                <a16:creationId xmlns:a16="http://schemas.microsoft.com/office/drawing/2014/main" id="{EF31BB90-A62D-871A-3375-AF917607A16B}"/>
+              </a:ext>
+            </a:extLst>
+          </p:cNvPr>
+          <p:cNvSpPr txBox="1"/>
+          <p:nvPr/>
+        </p:nvSpPr>
+        <p:spPr>
+          <a:xfrm>
+            <a:off x="731238" y="5138033"/>
+            <a:ext cx="6409832" cy="1363450"/>
+          </a:xfrm>
+          <a:prstGeom prst="rect">
+            <a:avLst/>
+          </a:prstGeom>
+          <a:noFill/>
+        </p:spPr>
+        <p:txBody>
+          <a:bodyPr wrap="none" rtlCol="0">
+            <a:spAutoFit/>
+          </a:bodyPr>
+          <a:lstStyle/>
+          <a:p>
+            <a:endParaRPr lang="en-US" b="1" dirty="0"/>
+          </a:p>
+          <a:p>
+            <a:pPr marL="954279" lvl="1" indent="-329698">
+              <a:buFont typeface="Wingdings" panose="05000000000000000000" pitchFamily="2" charset="2"/>
+              <a:buChar char="ü"/>
+            </a:pPr>
+            <a:r>
+              <a:rPr lang="en-US" sz="1615" dirty="0"/>
+              <a:t>What if we have 10s, 100s, or 1000s tasks that we want to run</a:t>
+            </a:r>
+          </a:p>
+          <a:p>
+            <a:pPr marL="1411479" lvl="2" indent="-329698">
+              <a:buFont typeface="Arial" panose="020B0604020202020204" pitchFamily="34" charset="0"/>
+              <a:buChar char="•"/>
+            </a:pPr>
+            <a:r>
+              <a:rPr lang="en-US" sz="1615" dirty="0"/>
+              <a:t>Hard to track and monitor tasks - no centralized DB</a:t>
+            </a:r>
+          </a:p>
+          <a:p>
+            <a:pPr marL="1411479" lvl="2" indent="-329698">
+              <a:buFont typeface="Arial" panose="020B0604020202020204" pitchFamily="34" charset="0"/>
+              <a:buChar char="•"/>
+            </a:pPr>
+            <a:r>
+              <a:rPr lang="en-US" sz="1615" dirty="0"/>
+              <a:t>Job submission overhead</a:t>
+            </a:r>
+          </a:p>
+          <a:p>
+            <a:pPr marL="1411479" lvl="2" indent="-329698">
+              <a:buFont typeface="Arial" panose="020B0604020202020204" pitchFamily="34" charset="0"/>
+              <a:buChar char="•"/>
+            </a:pPr>
+            <a:endParaRPr lang="en-US" sz="1615" dirty="0"/>
           </a:p>
         </p:txBody>
       </p:sp>
@@ -20480,6 +19860,51 @@
                       </p:childTnLst>
                     </p:cTn>
                   </p:par>
+                  <p:par>
+                    <p:cTn id="9" fill="hold">
+                      <p:stCondLst>
+                        <p:cond delay="indefinite"/>
+                      </p:stCondLst>
+                      <p:childTnLst>
+                        <p:par>
+                          <p:cTn id="10" fill="hold">
+                            <p:stCondLst>
+                              <p:cond delay="0"/>
+                            </p:stCondLst>
+                            <p:childTnLst>
+                              <p:par>
+                                <p:cTn id="11" presetID="1" presetClass="entr" presetSubtype="0" fill="hold" grpId="0" nodeType="clickEffect">
+                                  <p:stCondLst>
+                                    <p:cond delay="0"/>
+                                  </p:stCondLst>
+                                  <p:childTnLst>
+                                    <p:set>
+                                      <p:cBhvr>
+                                        <p:cTn id="12" dur="1" fill="hold">
+                                          <p:stCondLst>
+                                            <p:cond delay="0"/>
+                                          </p:stCondLst>
+                                        </p:cTn>
+                                        <p:tgtEl>
+                                          <p:spTgt spid="5"/>
+                                        </p:tgtEl>
+                                        <p:attrNameLst>
+                                          <p:attrName>style.visibility</p:attrName>
+                                        </p:attrNameLst>
+                                      </p:cBhvr>
+                                      <p:to>
+                                        <p:strVal val="visible"/>
+                                      </p:to>
+                                    </p:set>
+                                  </p:childTnLst>
+                                </p:cTn>
+                              </p:par>
+                            </p:childTnLst>
+                          </p:cTn>
+                        </p:par>
+                      </p:childTnLst>
+                    </p:cTn>
+                  </p:par>
                 </p:childTnLst>
               </p:cTn>
               <p:prevCondLst>
@@ -20504,6 +19929,7 @@
     <p:bldLst>
       <p:bldP spid="8" grpId="0"/>
       <p:bldP spid="9" grpId="0" animBg="1"/>
+      <p:bldP spid="5" grpId="0"/>
     </p:bldLst>
   </p:timing>
 </p:sld>

</xml_diff>

<commit_message>
stakeholder meeting ppt final version
</commit_message>
<xml_diff>
--- a/docs/StakeholderM_CV.pptx
+++ b/docs/StakeholderM_CV.pptx
@@ -214,7 +214,7 @@
           <a:p>
             <a:fld id="{DEEF499D-5D06-4C0A-93C1-4EFBC05226AC}" type="datetimeFigureOut">
               <a:rPr lang="LID4096" smtClean="0"/>
-              <a:t>11/29/2023</a:t>
+              <a:t>11/30/2023</a:t>
             </a:fld>
             <a:endParaRPr lang="LID4096"/>
           </a:p>
@@ -702,7 +702,7 @@
           <a:p>
             <a:fld id="{72520918-6668-4200-834B-DD6D224E903E}" type="datetimeFigureOut">
               <a:rPr lang="LID4096" smtClean="0"/>
-              <a:t>11/29/2023</a:t>
+              <a:t>11/30/2023</a:t>
             </a:fld>
             <a:endParaRPr lang="LID4096"/>
           </a:p>
@@ -872,7 +872,7 @@
           <a:p>
             <a:fld id="{72520918-6668-4200-834B-DD6D224E903E}" type="datetimeFigureOut">
               <a:rPr lang="LID4096" smtClean="0"/>
-              <a:t>11/29/2023</a:t>
+              <a:t>11/30/2023</a:t>
             </a:fld>
             <a:endParaRPr lang="LID4096"/>
           </a:p>
@@ -1052,7 +1052,7 @@
           <a:p>
             <a:fld id="{72520918-6668-4200-834B-DD6D224E903E}" type="datetimeFigureOut">
               <a:rPr lang="LID4096" smtClean="0"/>
-              <a:t>11/29/2023</a:t>
+              <a:t>11/30/2023</a:t>
             </a:fld>
             <a:endParaRPr lang="LID4096"/>
           </a:p>
@@ -1644,7 +1644,7 @@
           <a:p>
             <a:fld id="{72520918-6668-4200-834B-DD6D224E903E}" type="datetimeFigureOut">
               <a:rPr lang="LID4096" smtClean="0"/>
-              <a:t>11/29/2023</a:t>
+              <a:t>11/30/2023</a:t>
             </a:fld>
             <a:endParaRPr lang="LID4096"/>
           </a:p>
@@ -1890,7 +1890,7 @@
           <a:p>
             <a:fld id="{72520918-6668-4200-834B-DD6D224E903E}" type="datetimeFigureOut">
               <a:rPr lang="LID4096" smtClean="0"/>
-              <a:t>11/29/2023</a:t>
+              <a:t>11/30/2023</a:t>
             </a:fld>
             <a:endParaRPr lang="LID4096"/>
           </a:p>
@@ -2122,7 +2122,7 @@
           <a:p>
             <a:fld id="{72520918-6668-4200-834B-DD6D224E903E}" type="datetimeFigureOut">
               <a:rPr lang="LID4096" smtClean="0"/>
-              <a:t>11/29/2023</a:t>
+              <a:t>11/30/2023</a:t>
             </a:fld>
             <a:endParaRPr lang="LID4096"/>
           </a:p>
@@ -2489,7 +2489,7 @@
           <a:p>
             <a:fld id="{72520918-6668-4200-834B-DD6D224E903E}" type="datetimeFigureOut">
               <a:rPr lang="LID4096" smtClean="0"/>
-              <a:t>11/29/2023</a:t>
+              <a:t>11/30/2023</a:t>
             </a:fld>
             <a:endParaRPr lang="LID4096"/>
           </a:p>
@@ -2607,7 +2607,7 @@
           <a:p>
             <a:fld id="{72520918-6668-4200-834B-DD6D224E903E}" type="datetimeFigureOut">
               <a:rPr lang="LID4096" smtClean="0"/>
-              <a:t>11/29/2023</a:t>
+              <a:t>11/30/2023</a:t>
             </a:fld>
             <a:endParaRPr lang="LID4096"/>
           </a:p>
@@ -2702,7 +2702,7 @@
           <a:p>
             <a:fld id="{72520918-6668-4200-834B-DD6D224E903E}" type="datetimeFigureOut">
               <a:rPr lang="LID4096" smtClean="0"/>
-              <a:t>11/29/2023</a:t>
+              <a:t>11/30/2023</a:t>
             </a:fld>
             <a:endParaRPr lang="LID4096"/>
           </a:p>
@@ -2979,7 +2979,7 @@
           <a:p>
             <a:fld id="{72520918-6668-4200-834B-DD6D224E903E}" type="datetimeFigureOut">
               <a:rPr lang="LID4096" smtClean="0"/>
-              <a:t>11/29/2023</a:t>
+              <a:t>11/30/2023</a:t>
             </a:fld>
             <a:endParaRPr lang="LID4096"/>
           </a:p>
@@ -3236,7 +3236,7 @@
           <a:p>
             <a:fld id="{72520918-6668-4200-834B-DD6D224E903E}" type="datetimeFigureOut">
               <a:rPr lang="LID4096" smtClean="0"/>
-              <a:t>11/29/2023</a:t>
+              <a:t>11/30/2023</a:t>
             </a:fld>
             <a:endParaRPr lang="LID4096"/>
           </a:p>
@@ -3449,7 +3449,7 @@
           <a:p>
             <a:fld id="{72520918-6668-4200-834B-DD6D224E903E}" type="datetimeFigureOut">
               <a:rPr lang="LID4096" smtClean="0"/>
-              <a:t>11/29/2023</a:t>
+              <a:t>11/30/2023</a:t>
             </a:fld>
             <a:endParaRPr lang="LID4096"/>
           </a:p>
@@ -3953,26 +3953,13 @@
           <a:p>
             <a:r>
               <a:rPr lang="nl-NL" dirty="0"/>
-              <a:t>                                                                                                                            Running Yolov5 </a:t>
-            </a:r>
-            <a:r>
-              <a:rPr lang="nl-NL" dirty="0" err="1"/>
-              <a:t>using</a:t>
-            </a:r>
+              <a:t>                                                                                                                            Running Yolov5 on Surf via User interface</a:t>
+            </a:r>
+          </a:p>
+          <a:p>
             <a:r>
               <a:rPr lang="nl-NL" dirty="0"/>
-              <a:t> </a:t>
-            </a:r>
-            <a:r>
-              <a:rPr lang="nl-NL" dirty="0" err="1"/>
-              <a:t>PiCas</a:t>
-            </a:r>
-            <a:endParaRPr lang="nl-NL" dirty="0"/>
-          </a:p>
-          <a:p>
-            <a:r>
-              <a:rPr lang="nl-NL" dirty="0"/>
-              <a:t>                                                                                                                            Nov 30, 2023</a:t>
+              <a:t>                                                                                                                             Nov 30, 2023</a:t>
             </a:r>
           </a:p>
         </p:txBody>
@@ -4763,176 +4750,6 @@
   <p:clrMapOvr>
     <a:masterClrMapping/>
   </p:clrMapOvr>
-  <p:timing>
-    <p:tnLst>
-      <p:par>
-        <p:cTn id="1" dur="indefinite" restart="never" nodeType="tmRoot">
-          <p:childTnLst>
-            <p:seq concurrent="1" nextAc="seek">
-              <p:cTn id="2" dur="indefinite" nodeType="mainSeq">
-                <p:childTnLst>
-                  <p:par>
-                    <p:cTn id="3" fill="hold">
-                      <p:stCondLst>
-                        <p:cond delay="indefinite"/>
-                      </p:stCondLst>
-                      <p:childTnLst>
-                        <p:par>
-                          <p:cTn id="4" fill="hold">
-                            <p:stCondLst>
-                              <p:cond delay="0"/>
-                            </p:stCondLst>
-                            <p:childTnLst>
-                              <p:par>
-                                <p:cTn id="5" presetID="1" presetClass="entr" presetSubtype="0" fill="hold" grpId="0" nodeType="clickEffect">
-                                  <p:stCondLst>
-                                    <p:cond delay="0"/>
-                                  </p:stCondLst>
-                                  <p:childTnLst>
-                                    <p:set>
-                                      <p:cBhvr>
-                                        <p:cTn id="6" dur="1" fill="hold">
-                                          <p:stCondLst>
-                                            <p:cond delay="0"/>
-                                          </p:stCondLst>
-                                        </p:cTn>
-                                        <p:tgtEl>
-                                          <p:spTgt spid="19"/>
-                                        </p:tgtEl>
-                                        <p:attrNameLst>
-                                          <p:attrName>style.visibility</p:attrName>
-                                        </p:attrNameLst>
-                                      </p:cBhvr>
-                                      <p:to>
-                                        <p:strVal val="visible"/>
-                                      </p:to>
-                                    </p:set>
-                                  </p:childTnLst>
-                                </p:cTn>
-                              </p:par>
-                            </p:childTnLst>
-                          </p:cTn>
-                        </p:par>
-                      </p:childTnLst>
-                    </p:cTn>
-                  </p:par>
-                  <p:par>
-                    <p:cTn id="7" fill="hold">
-                      <p:stCondLst>
-                        <p:cond delay="indefinite"/>
-                      </p:stCondLst>
-                      <p:childTnLst>
-                        <p:par>
-                          <p:cTn id="8" fill="hold">
-                            <p:stCondLst>
-                              <p:cond delay="0"/>
-                            </p:stCondLst>
-                            <p:childTnLst>
-                              <p:par>
-                                <p:cTn id="9" presetID="1" presetClass="entr" presetSubtype="0" fill="hold" grpId="0" nodeType="clickEffect">
-                                  <p:stCondLst>
-                                    <p:cond delay="0"/>
-                                  </p:stCondLst>
-                                  <p:childTnLst>
-                                    <p:set>
-                                      <p:cBhvr>
-                                        <p:cTn id="10" dur="1" fill="hold">
-                                          <p:stCondLst>
-                                            <p:cond delay="0"/>
-                                          </p:stCondLst>
-                                        </p:cTn>
-                                        <p:tgtEl>
-                                          <p:spTgt spid="6"/>
-                                        </p:tgtEl>
-                                        <p:attrNameLst>
-                                          <p:attrName>style.visibility</p:attrName>
-                                        </p:attrNameLst>
-                                      </p:cBhvr>
-                                      <p:to>
-                                        <p:strVal val="visible"/>
-                                      </p:to>
-                                    </p:set>
-                                  </p:childTnLst>
-                                </p:cTn>
-                              </p:par>
-                            </p:childTnLst>
-                          </p:cTn>
-                        </p:par>
-                      </p:childTnLst>
-                    </p:cTn>
-                  </p:par>
-                  <p:par>
-                    <p:cTn id="11" fill="hold">
-                      <p:stCondLst>
-                        <p:cond delay="indefinite"/>
-                      </p:stCondLst>
-                      <p:childTnLst>
-                        <p:par>
-                          <p:cTn id="12" fill="hold">
-                            <p:stCondLst>
-                              <p:cond delay="0"/>
-                            </p:stCondLst>
-                            <p:childTnLst>
-                              <p:par>
-                                <p:cTn id="13" presetID="1" presetClass="entr" presetSubtype="0" fill="hold" grpId="0" nodeType="clickEffect">
-                                  <p:stCondLst>
-                                    <p:cond delay="0"/>
-                                  </p:stCondLst>
-                                  <p:childTnLst>
-                                    <p:set>
-                                      <p:cBhvr>
-                                        <p:cTn id="14" dur="1" fill="hold">
-                                          <p:stCondLst>
-                                            <p:cond delay="0"/>
-                                          </p:stCondLst>
-                                        </p:cTn>
-                                        <p:tgtEl>
-                                          <p:spTgt spid="14"/>
-                                        </p:tgtEl>
-                                        <p:attrNameLst>
-                                          <p:attrName>style.visibility</p:attrName>
-                                        </p:attrNameLst>
-                                      </p:cBhvr>
-                                      <p:to>
-                                        <p:strVal val="visible"/>
-                                      </p:to>
-                                    </p:set>
-                                  </p:childTnLst>
-                                </p:cTn>
-                              </p:par>
-                            </p:childTnLst>
-                          </p:cTn>
-                        </p:par>
-                      </p:childTnLst>
-                    </p:cTn>
-                  </p:par>
-                </p:childTnLst>
-              </p:cTn>
-              <p:prevCondLst>
-                <p:cond evt="onPrev" delay="0">
-                  <p:tgtEl>
-                    <p:sldTgt/>
-                  </p:tgtEl>
-                </p:cond>
-              </p:prevCondLst>
-              <p:nextCondLst>
-                <p:cond evt="onNext" delay="0">
-                  <p:tgtEl>
-                    <p:sldTgt/>
-                  </p:tgtEl>
-                </p:cond>
-              </p:nextCondLst>
-            </p:seq>
-          </p:childTnLst>
-        </p:cTn>
-      </p:par>
-    </p:tnLst>
-    <p:bldLst>
-      <p:bldP spid="6" grpId="0"/>
-      <p:bldP spid="14" grpId="0"/>
-      <p:bldP spid="19" grpId="0"/>
-    </p:bldLst>
-  </p:timing>
 </p:sld>
 </file>
 
@@ -6081,47 +5898,6 @@
           </a:p>
         </p:txBody>
       </p:sp>
-      <p:cxnSp>
-        <p:nvCxnSpPr>
-          <p:cNvPr id="30" name="Straight Connector 29">
-            <a:extLst>
-              <a:ext uri="{FF2B5EF4-FFF2-40B4-BE49-F238E27FC236}">
-                <a16:creationId xmlns:a16="http://schemas.microsoft.com/office/drawing/2014/main" id="{93455165-5982-A671-EC96-FAA8C8BB6376}"/>
-              </a:ext>
-            </a:extLst>
-          </p:cNvPr>
-          <p:cNvCxnSpPr>
-            <a:cxnSpLocks/>
-          </p:cNvCxnSpPr>
-          <p:nvPr/>
-        </p:nvCxnSpPr>
-        <p:spPr>
-          <a:xfrm>
-            <a:off x="7170495" y="662450"/>
-            <a:ext cx="0" cy="6106172"/>
-          </a:xfrm>
-          <a:prstGeom prst="line">
-            <a:avLst/>
-          </a:prstGeom>
-          <a:ln w="28575">
-            <a:prstDash val="lgDashDot"/>
-          </a:ln>
-        </p:spPr>
-        <p:style>
-          <a:lnRef idx="1">
-            <a:schemeClr val="accent1"/>
-          </a:lnRef>
-          <a:fillRef idx="0">
-            <a:schemeClr val="accent1"/>
-          </a:fillRef>
-          <a:effectRef idx="0">
-            <a:schemeClr val="accent1"/>
-          </a:effectRef>
-          <a:fontRef idx="minor">
-            <a:schemeClr val="tx1"/>
-          </a:fontRef>
-        </p:style>
-      </p:cxnSp>
     </p:spTree>
     <p:extLst>
       <p:ext uri="{BB962C8B-B14F-4D97-AF65-F5344CB8AC3E}">
@@ -6924,51 +6700,6 @@
                       </p:childTnLst>
                     </p:cTn>
                   </p:par>
-                  <p:par>
-                    <p:cTn id="63" fill="hold">
-                      <p:stCondLst>
-                        <p:cond delay="indefinite"/>
-                      </p:stCondLst>
-                      <p:childTnLst>
-                        <p:par>
-                          <p:cTn id="64" fill="hold">
-                            <p:stCondLst>
-                              <p:cond delay="0"/>
-                            </p:stCondLst>
-                            <p:childTnLst>
-                              <p:par>
-                                <p:cTn id="65" presetID="1" presetClass="entr" presetSubtype="0" fill="hold" nodeType="clickEffect">
-                                  <p:stCondLst>
-                                    <p:cond delay="0"/>
-                                  </p:stCondLst>
-                                  <p:childTnLst>
-                                    <p:set>
-                                      <p:cBhvr>
-                                        <p:cTn id="66" dur="1" fill="hold">
-                                          <p:stCondLst>
-                                            <p:cond delay="0"/>
-                                          </p:stCondLst>
-                                        </p:cTn>
-                                        <p:tgtEl>
-                                          <p:spTgt spid="30"/>
-                                        </p:tgtEl>
-                                        <p:attrNameLst>
-                                          <p:attrName>style.visibility</p:attrName>
-                                        </p:attrNameLst>
-                                      </p:cBhvr>
-                                      <p:to>
-                                        <p:strVal val="visible"/>
-                                      </p:to>
-                                    </p:set>
-                                  </p:childTnLst>
-                                </p:cTn>
-                              </p:par>
-                            </p:childTnLst>
-                          </p:cTn>
-                        </p:par>
-                      </p:childTnLst>
-                    </p:cTn>
-                  </p:par>
                 </p:childTnLst>
               </p:cTn>
               <p:prevCondLst>
@@ -7077,7 +6808,7 @@
         <p:spPr>
           <a:xfrm>
             <a:off x="1152890" y="1062067"/>
-            <a:ext cx="10172248" cy="716399"/>
+            <a:ext cx="9954132" cy="716399"/>
           </a:xfrm>
           <a:prstGeom prst="roundRect">
             <a:avLst/>
@@ -7677,8 +7408,8 @@
         </p:nvSpPr>
         <p:spPr>
           <a:xfrm>
-            <a:off x="1999388" y="3405340"/>
-            <a:ext cx="1442908" cy="830997"/>
+            <a:off x="2042030" y="3349730"/>
+            <a:ext cx="1442908" cy="1077218"/>
           </a:xfrm>
           <a:prstGeom prst="rect">
             <a:avLst/>
@@ -7706,6 +7437,12 @@
             <a:r>
               <a:rPr lang="en-US" sz="1600" dirty="0"/>
               <a:t>with pipeline</a:t>
+            </a:r>
+          </a:p>
+          <a:p>
+            <a:r>
+              <a:rPr lang="en-US" sz="1600" dirty="0"/>
+              <a:t>     via UI</a:t>
             </a:r>
             <a:endParaRPr lang="LID4096" sz="1600" dirty="0"/>
           </a:p>
@@ -8631,81 +8368,6 @@
       </p:transition>
     </mc:Fallback>
   </mc:AlternateContent>
-  <p:timing>
-    <p:tnLst>
-      <p:par>
-        <p:cTn id="1" dur="indefinite" restart="never" nodeType="tmRoot">
-          <p:childTnLst>
-            <p:seq concurrent="1" nextAc="seek">
-              <p:cTn id="2" dur="indefinite" nodeType="mainSeq">
-                <p:childTnLst>
-                  <p:par>
-                    <p:cTn id="3" fill="hold">
-                      <p:stCondLst>
-                        <p:cond delay="indefinite"/>
-                      </p:stCondLst>
-                      <p:childTnLst>
-                        <p:par>
-                          <p:cTn id="4" fill="hold">
-                            <p:stCondLst>
-                              <p:cond delay="0"/>
-                            </p:stCondLst>
-                            <p:childTnLst>
-                              <p:par>
-                                <p:cTn id="5" presetID="1" presetClass="entr" presetSubtype="0" fill="hold" nodeType="clickEffect">
-                                  <p:stCondLst>
-                                    <p:cond delay="0"/>
-                                  </p:stCondLst>
-                                  <p:childTnLst>
-                                    <p:set>
-                                      <p:cBhvr>
-                                        <p:cTn id="6" dur="1" fill="hold">
-                                          <p:stCondLst>
-                                            <p:cond delay="0"/>
-                                          </p:stCondLst>
-                                        </p:cTn>
-                                        <p:tgtEl>
-                                          <p:spTgt spid="12"/>
-                                        </p:tgtEl>
-                                        <p:attrNameLst>
-                                          <p:attrName>style.visibility</p:attrName>
-                                        </p:attrNameLst>
-                                      </p:cBhvr>
-                                      <p:to>
-                                        <p:strVal val="visible"/>
-                                      </p:to>
-                                    </p:set>
-                                  </p:childTnLst>
-                                </p:cTn>
-                              </p:par>
-                            </p:childTnLst>
-                          </p:cTn>
-                        </p:par>
-                      </p:childTnLst>
-                    </p:cTn>
-                  </p:par>
-                </p:childTnLst>
-              </p:cTn>
-              <p:prevCondLst>
-                <p:cond evt="onPrev" delay="0">
-                  <p:tgtEl>
-                    <p:sldTgt/>
-                  </p:tgtEl>
-                </p:cond>
-              </p:prevCondLst>
-              <p:nextCondLst>
-                <p:cond evt="onNext" delay="0">
-                  <p:tgtEl>
-                    <p:sldTgt/>
-                  </p:tgtEl>
-                </p:cond>
-              </p:nextCondLst>
-            </p:seq>
-          </p:childTnLst>
-        </p:cTn>
-      </p:par>
-    </p:tnLst>
-  </p:timing>
 </p:sld>
 </file>
 
@@ -8812,36 +8474,6 @@
           </a:p>
         </p:txBody>
       </p:sp>
-      <p:pic>
-        <p:nvPicPr>
-          <p:cNvPr id="12" name="Picture 11">
-            <a:extLst>
-              <a:ext uri="{FF2B5EF4-FFF2-40B4-BE49-F238E27FC236}">
-                <a16:creationId xmlns:a16="http://schemas.microsoft.com/office/drawing/2014/main" id="{E8F8F9A5-F407-2AA6-D9B5-9BF053D3359D}"/>
-              </a:ext>
-            </a:extLst>
-          </p:cNvPr>
-          <p:cNvPicPr>
-            <a:picLocks noChangeAspect="1"/>
-          </p:cNvPicPr>
-          <p:nvPr/>
-        </p:nvPicPr>
-        <p:blipFill>
-          <a:blip r:embed="rId3"/>
-          <a:stretch>
-            <a:fillRect/>
-          </a:stretch>
-        </p:blipFill>
-        <p:spPr>
-          <a:xfrm>
-            <a:off x="5257800" y="50451"/>
-            <a:ext cx="7763080" cy="1098957"/>
-          </a:xfrm>
-          <a:prstGeom prst="rect">
-            <a:avLst/>
-          </a:prstGeom>
-        </p:spPr>
-      </p:pic>
       <p:sp>
         <p:nvSpPr>
           <p:cNvPr id="16" name="Flowchart: Connector 15">
@@ -9424,7 +9056,7 @@
           <p:nvPr/>
         </p:nvPicPr>
         <p:blipFill>
-          <a:blip r:embed="rId4">
+          <a:blip r:embed="rId3">
             <a:extLst>
               <a:ext uri="{28A0092B-C50C-407E-A947-70E740481C1C}">
                 <a14:useLocalDpi xmlns:a14="http://schemas.microsoft.com/office/drawing/2010/main" val="0"/>
@@ -9471,7 +9103,7 @@
           <p:nvPr/>
         </p:nvPicPr>
         <p:blipFill>
-          <a:blip r:embed="rId5">
+          <a:blip r:embed="rId4">
             <a:extLst>
               <a:ext uri="{28A0092B-C50C-407E-A947-70E740481C1C}">
                 <a14:useLocalDpi xmlns:a14="http://schemas.microsoft.com/office/drawing/2010/main" val="0"/>
@@ -9518,7 +9150,7 @@
           <p:nvPr/>
         </p:nvPicPr>
         <p:blipFill>
-          <a:blip r:embed="rId6">
+          <a:blip r:embed="rId5">
             <a:extLst>
               <a:ext uri="{28A0092B-C50C-407E-A947-70E740481C1C}">
                 <a14:useLocalDpi xmlns:a14="http://schemas.microsoft.com/office/drawing/2010/main" val="0"/>
@@ -12093,7 +11725,7 @@
         <p:spPr>
           <a:xfrm>
             <a:off x="545938" y="1233182"/>
-            <a:ext cx="2326471" cy="1477328"/>
+            <a:ext cx="2326471" cy="1200329"/>
           </a:xfrm>
           <a:prstGeom prst="rect">
             <a:avLst/>
@@ -12133,16 +11765,6 @@
             <a:r>
               <a:rPr lang="en-US" dirty="0"/>
               <a:t>Demo</a:t>
-            </a:r>
-          </a:p>
-          <a:p>
-            <a:pPr marL="285750" indent="-285750">
-              <a:buFont typeface="Arial" panose="020B0604020202020204" pitchFamily="34" charset="0"/>
-              <a:buChar char="•"/>
-            </a:pPr>
-            <a:r>
-              <a:rPr lang="en-US" dirty="0"/>
-              <a:t>Requirements</a:t>
             </a:r>
           </a:p>
           <a:p>
@@ -12665,7 +12287,7 @@
         </p:blipFill>
         <p:spPr bwMode="auto">
           <a:xfrm>
-            <a:off x="3328819" y="3876474"/>
+            <a:off x="3328817" y="4164669"/>
             <a:ext cx="420211" cy="420211"/>
           </a:xfrm>
           <a:prstGeom prst="rect">
@@ -12817,6 +12439,56 @@
               <a:t>User 1</a:t>
             </a:r>
             <a:endParaRPr lang="LID4096" dirty="0"/>
+          </a:p>
+        </p:txBody>
+      </p:sp>
+      <p:sp>
+        <p:nvSpPr>
+          <p:cNvPr id="4" name="Rectangle 3">
+            <a:extLst>
+              <a:ext uri="{FF2B5EF4-FFF2-40B4-BE49-F238E27FC236}">
+                <a16:creationId xmlns:a16="http://schemas.microsoft.com/office/drawing/2014/main" id="{A6BBDAB6-1BBC-6FEA-2D08-6FC8A249843C}"/>
+              </a:ext>
+            </a:extLst>
+          </p:cNvPr>
+          <p:cNvSpPr/>
+          <p:nvPr/>
+        </p:nvSpPr>
+        <p:spPr>
+          <a:xfrm>
+            <a:off x="943405" y="2066225"/>
+            <a:ext cx="5105057" cy="1887777"/>
+          </a:xfrm>
+          <a:prstGeom prst="rect">
+            <a:avLst/>
+          </a:prstGeom>
+          <a:noFill/>
+          <a:ln w="19050">
+            <a:prstDash val="dashDot"/>
+          </a:ln>
+        </p:spPr>
+        <p:style>
+          <a:lnRef idx="2">
+            <a:schemeClr val="accent1">
+              <a:shade val="15000"/>
+            </a:schemeClr>
+          </a:lnRef>
+          <a:fillRef idx="1">
+            <a:schemeClr val="accent1"/>
+          </a:fillRef>
+          <a:effectRef idx="0">
+            <a:schemeClr val="accent1"/>
+          </a:effectRef>
+          <a:fontRef idx="minor">
+            <a:schemeClr val="lt1"/>
+          </a:fontRef>
+        </p:style>
+        <p:txBody>
+          <a:bodyPr rtlCol="0" anchor="ctr"/>
+          <a:lstStyle/>
+          <a:p>
+            <a:pPr algn="ctr"/>
+            <a:endParaRPr lang="LID4096"/>
           </a:p>
         </p:txBody>
       </p:sp>
@@ -13338,8 +13010,8 @@
         </p:blipFill>
         <p:spPr bwMode="auto">
           <a:xfrm>
-            <a:off x="11343417" y="3734795"/>
-            <a:ext cx="338108" cy="338108"/>
+            <a:off x="11343416" y="3734794"/>
+            <a:ext cx="395225" cy="395225"/>
           </a:xfrm>
           <a:prstGeom prst="rect">
             <a:avLst/>
@@ -13385,8 +13057,8 @@
         </p:blipFill>
         <p:spPr bwMode="auto">
           <a:xfrm>
-            <a:off x="6780111" y="3699304"/>
-            <a:ext cx="300675" cy="300675"/>
+            <a:off x="6819715" y="3772228"/>
+            <a:ext cx="357792" cy="357792"/>
           </a:xfrm>
           <a:prstGeom prst="rect">
             <a:avLst/>
@@ -13846,6 +13518,106 @@
               <a:t>User 3</a:t>
             </a:r>
             <a:endParaRPr lang="LID4096" dirty="0"/>
+          </a:p>
+        </p:txBody>
+      </p:sp>
+      <p:sp>
+        <p:nvSpPr>
+          <p:cNvPr id="7" name="Rectangle 6">
+            <a:extLst>
+              <a:ext uri="{FF2B5EF4-FFF2-40B4-BE49-F238E27FC236}">
+                <a16:creationId xmlns:a16="http://schemas.microsoft.com/office/drawing/2014/main" id="{2C4235CD-FAAE-27EE-A1DE-D81E654CB423}"/>
+              </a:ext>
+            </a:extLst>
+          </p:cNvPr>
+          <p:cNvSpPr/>
+          <p:nvPr/>
+        </p:nvSpPr>
+        <p:spPr>
+          <a:xfrm>
+            <a:off x="4666259" y="1565269"/>
+            <a:ext cx="3915679" cy="1887777"/>
+          </a:xfrm>
+          <a:prstGeom prst="rect">
+            <a:avLst/>
+          </a:prstGeom>
+          <a:noFill/>
+          <a:ln w="19050">
+            <a:prstDash val="dashDot"/>
+          </a:ln>
+        </p:spPr>
+        <p:style>
+          <a:lnRef idx="2">
+            <a:schemeClr val="accent1">
+              <a:shade val="15000"/>
+            </a:schemeClr>
+          </a:lnRef>
+          <a:fillRef idx="1">
+            <a:schemeClr val="accent1"/>
+          </a:fillRef>
+          <a:effectRef idx="0">
+            <a:schemeClr val="accent1"/>
+          </a:effectRef>
+          <a:fontRef idx="minor">
+            <a:schemeClr val="lt1"/>
+          </a:fontRef>
+        </p:style>
+        <p:txBody>
+          <a:bodyPr rtlCol="0" anchor="ctr"/>
+          <a:lstStyle/>
+          <a:p>
+            <a:pPr algn="ctr"/>
+            <a:endParaRPr lang="LID4096"/>
+          </a:p>
+        </p:txBody>
+      </p:sp>
+      <p:sp>
+        <p:nvSpPr>
+          <p:cNvPr id="8" name="Rectangle 7">
+            <a:extLst>
+              <a:ext uri="{FF2B5EF4-FFF2-40B4-BE49-F238E27FC236}">
+                <a16:creationId xmlns:a16="http://schemas.microsoft.com/office/drawing/2014/main" id="{30B1AE75-D088-DE32-E4CD-9602A3ABE2A3}"/>
+              </a:ext>
+            </a:extLst>
+          </p:cNvPr>
+          <p:cNvSpPr/>
+          <p:nvPr/>
+        </p:nvSpPr>
+        <p:spPr>
+          <a:xfrm>
+            <a:off x="9411764" y="1509905"/>
+            <a:ext cx="3486131" cy="1762737"/>
+          </a:xfrm>
+          <a:prstGeom prst="rect">
+            <a:avLst/>
+          </a:prstGeom>
+          <a:noFill/>
+          <a:ln w="19050">
+            <a:prstDash val="dashDot"/>
+          </a:ln>
+        </p:spPr>
+        <p:style>
+          <a:lnRef idx="2">
+            <a:schemeClr val="accent1">
+              <a:shade val="15000"/>
+            </a:schemeClr>
+          </a:lnRef>
+          <a:fillRef idx="1">
+            <a:schemeClr val="accent1"/>
+          </a:fillRef>
+          <a:effectRef idx="0">
+            <a:schemeClr val="accent1"/>
+          </a:effectRef>
+          <a:fontRef idx="minor">
+            <a:schemeClr val="lt1"/>
+          </a:fontRef>
+        </p:style>
+        <p:txBody>
+          <a:bodyPr rtlCol="0" anchor="ctr"/>
+          <a:lstStyle/>
+          <a:p>
+            <a:pPr algn="ctr"/>
+            <a:endParaRPr lang="LID4096"/>
           </a:p>
         </p:txBody>
       </p:sp>
@@ -13880,7 +13652,7 @@
                             </p:stCondLst>
                             <p:childTnLst>
                               <p:par>
-                                <p:cTn id="5" presetID="1" presetClass="entr" presetSubtype="0" fill="hold" nodeType="clickEffect">
+                                <p:cTn id="5" presetID="1" presetClass="entr" presetSubtype="0" fill="hold" grpId="0" nodeType="clickEffect">
                                   <p:stCondLst>
                                     <p:cond delay="0"/>
                                   </p:stCondLst>
@@ -13893,7 +13665,7 @@
                                           </p:stCondLst>
                                         </p:cTn>
                                         <p:tgtEl>
-                                          <p:spTgt spid="9"/>
+                                          <p:spTgt spid="43"/>
                                         </p:tgtEl>
                                         <p:attrNameLst>
                                           <p:attrName>style.visibility</p:attrName>
@@ -13920,7 +13692,7 @@
                                           </p:stCondLst>
                                         </p:cTn>
                                         <p:tgtEl>
-                                          <p:spTgt spid="10"/>
+                                          <p:spTgt spid="42"/>
                                         </p:tgtEl>
                                         <p:attrNameLst>
                                           <p:attrName>style.visibility</p:attrName>
@@ -13947,7 +13719,7 @@
                                           </p:stCondLst>
                                         </p:cTn>
                                         <p:tgtEl>
-                                          <p:spTgt spid="11"/>
+                                          <p:spTgt spid="3078"/>
                                         </p:tgtEl>
                                         <p:attrNameLst>
                                           <p:attrName>style.visibility</p:attrName>
@@ -13961,7 +13733,7 @@
                                 </p:cTn>
                               </p:par>
                               <p:par>
-                                <p:cTn id="11" presetID="1" presetClass="entr" presetSubtype="0" fill="hold" nodeType="withEffect">
+                                <p:cTn id="11" presetID="1" presetClass="entr" presetSubtype="0" fill="hold" grpId="0" nodeType="withEffect">
                                   <p:stCondLst>
                                     <p:cond delay="0"/>
                                   </p:stCondLst>
@@ -13974,7 +13746,7 @@
                                           </p:stCondLst>
                                         </p:cTn>
                                         <p:tgtEl>
-                                          <p:spTgt spid="40"/>
+                                          <p:spTgt spid="41"/>
                                         </p:tgtEl>
                                         <p:attrNameLst>
                                           <p:attrName>style.visibility</p:attrName>
@@ -14001,7 +13773,7 @@
                                           </p:stCondLst>
                                         </p:cTn>
                                         <p:tgtEl>
-                                          <p:spTgt spid="1060"/>
+                                          <p:spTgt spid="50"/>
                                         </p:tgtEl>
                                         <p:attrNameLst>
                                           <p:attrName>style.visibility</p:attrName>
@@ -14028,367 +13800,7 @@
                                           </p:stCondLst>
                                         </p:cTn>
                                         <p:tgtEl>
-                                          <p:spTgt spid="2"/>
-                                        </p:tgtEl>
-                                        <p:attrNameLst>
-                                          <p:attrName>style.visibility</p:attrName>
-                                        </p:attrNameLst>
-                                      </p:cBhvr>
-                                      <p:to>
-                                        <p:strVal val="visible"/>
-                                      </p:to>
-                                    </p:set>
-                                  </p:childTnLst>
-                                </p:cTn>
-                              </p:par>
-                              <p:par>
-                                <p:cTn id="17" presetID="1" presetClass="entr" presetSubtype="0" fill="hold" nodeType="withEffect">
-                                  <p:stCondLst>
-                                    <p:cond delay="0"/>
-                                  </p:stCondLst>
-                                  <p:childTnLst>
-                                    <p:set>
-                                      <p:cBhvr>
-                                        <p:cTn id="18" dur="1" fill="hold">
-                                          <p:stCondLst>
-                                            <p:cond delay="0"/>
-                                          </p:stCondLst>
-                                        </p:cTn>
-                                        <p:tgtEl>
-                                          <p:spTgt spid="1058"/>
-                                        </p:tgtEl>
-                                        <p:attrNameLst>
-                                          <p:attrName>style.visibility</p:attrName>
-                                        </p:attrNameLst>
-                                      </p:cBhvr>
-                                      <p:to>
-                                        <p:strVal val="visible"/>
-                                      </p:to>
-                                    </p:set>
-                                  </p:childTnLst>
-                                </p:cTn>
-                              </p:par>
-                              <p:par>
-                                <p:cTn id="19" presetID="1" presetClass="entr" presetSubtype="0" fill="hold" grpId="0" nodeType="withEffect">
-                                  <p:stCondLst>
-                                    <p:cond delay="0"/>
-                                  </p:stCondLst>
-                                  <p:childTnLst>
-                                    <p:set>
-                                      <p:cBhvr>
-                                        <p:cTn id="20" dur="1" fill="hold">
-                                          <p:stCondLst>
-                                            <p:cond delay="0"/>
-                                          </p:stCondLst>
-                                        </p:cTn>
-                                        <p:tgtEl>
-                                          <p:spTgt spid="6"/>
-                                        </p:tgtEl>
-                                        <p:attrNameLst>
-                                          <p:attrName>style.visibility</p:attrName>
-                                        </p:attrNameLst>
-                                      </p:cBhvr>
-                                      <p:to>
-                                        <p:strVal val="visible"/>
-                                      </p:to>
-                                    </p:set>
-                                  </p:childTnLst>
-                                </p:cTn>
-                              </p:par>
-                              <p:par>
-                                <p:cTn id="21" presetID="1" presetClass="entr" presetSubtype="0" fill="hold" nodeType="withEffect">
-                                  <p:stCondLst>
-                                    <p:cond delay="0"/>
-                                  </p:stCondLst>
-                                  <p:childTnLst>
-                                    <p:set>
-                                      <p:cBhvr>
-                                        <p:cTn id="22" dur="1" fill="hold">
-                                          <p:stCondLst>
-                                            <p:cond delay="0"/>
-                                          </p:stCondLst>
-                                        </p:cTn>
-                                        <p:tgtEl>
-                                          <p:spTgt spid="3076"/>
-                                        </p:tgtEl>
-                                        <p:attrNameLst>
-                                          <p:attrName>style.visibility</p:attrName>
-                                        </p:attrNameLst>
-                                      </p:cBhvr>
-                                      <p:to>
-                                        <p:strVal val="visible"/>
-                                      </p:to>
-                                    </p:set>
-                                  </p:childTnLst>
-                                </p:cTn>
-                              </p:par>
-                              <p:par>
-                                <p:cTn id="23" presetID="1" presetClass="entr" presetSubtype="0" fill="hold" nodeType="withEffect">
-                                  <p:stCondLst>
-                                    <p:cond delay="0"/>
-                                  </p:stCondLst>
-                                  <p:childTnLst>
-                                    <p:set>
-                                      <p:cBhvr>
-                                        <p:cTn id="24" dur="1" fill="hold">
-                                          <p:stCondLst>
-                                            <p:cond delay="0"/>
-                                          </p:stCondLst>
-                                        </p:cTn>
-                                        <p:tgtEl>
-                                          <p:spTgt spid="3"/>
-                                        </p:tgtEl>
-                                        <p:attrNameLst>
-                                          <p:attrName>style.visibility</p:attrName>
-                                        </p:attrNameLst>
-                                      </p:cBhvr>
-                                      <p:to>
-                                        <p:strVal val="visible"/>
-                                      </p:to>
-                                    </p:set>
-                                  </p:childTnLst>
-                                </p:cTn>
-                              </p:par>
-                              <p:par>
-                                <p:cTn id="25" presetID="1" presetClass="entr" presetSubtype="0" fill="hold" nodeType="withEffect">
-                                  <p:stCondLst>
-                                    <p:cond delay="0"/>
-                                  </p:stCondLst>
-                                  <p:childTnLst>
-                                    <p:set>
-                                      <p:cBhvr>
-                                        <p:cTn id="26" dur="1" fill="hold">
-                                          <p:stCondLst>
-                                            <p:cond delay="0"/>
-                                          </p:stCondLst>
-                                        </p:cTn>
-                                        <p:tgtEl>
-                                          <p:spTgt spid="4"/>
-                                        </p:tgtEl>
-                                        <p:attrNameLst>
-                                          <p:attrName>style.visibility</p:attrName>
-                                        </p:attrNameLst>
-                                      </p:cBhvr>
-                                      <p:to>
-                                        <p:strVal val="visible"/>
-                                      </p:to>
-                                    </p:set>
-                                  </p:childTnLst>
-                                </p:cTn>
-                              </p:par>
-                              <p:par>
-                                <p:cTn id="27" presetID="1" presetClass="entr" presetSubtype="0" fill="hold" nodeType="withEffect">
-                                  <p:stCondLst>
-                                    <p:cond delay="0"/>
-                                  </p:stCondLst>
-                                  <p:childTnLst>
-                                    <p:set>
-                                      <p:cBhvr>
-                                        <p:cTn id="28" dur="1" fill="hold">
-                                          <p:stCondLst>
-                                            <p:cond delay="0"/>
-                                          </p:stCondLst>
-                                        </p:cTn>
-                                        <p:tgtEl>
-                                          <p:spTgt spid="5"/>
-                                        </p:tgtEl>
-                                        <p:attrNameLst>
-                                          <p:attrName>style.visibility</p:attrName>
-                                        </p:attrNameLst>
-                                      </p:cBhvr>
-                                      <p:to>
-                                        <p:strVal val="visible"/>
-                                      </p:to>
-                                    </p:set>
-                                  </p:childTnLst>
-                                </p:cTn>
-                              </p:par>
-                            </p:childTnLst>
-                          </p:cTn>
-                        </p:par>
-                      </p:childTnLst>
-                    </p:cTn>
-                  </p:par>
-                  <p:par>
-                    <p:cTn id="29" fill="hold">
-                      <p:stCondLst>
-                        <p:cond delay="indefinite"/>
-                      </p:stCondLst>
-                      <p:childTnLst>
-                        <p:par>
-                          <p:cTn id="30" fill="hold">
-                            <p:stCondLst>
-                              <p:cond delay="0"/>
-                            </p:stCondLst>
-                            <p:childTnLst>
-                              <p:par>
-                                <p:cTn id="31" presetID="1" presetClass="entr" presetSubtype="0" fill="hold" grpId="0" nodeType="clickEffect">
-                                  <p:stCondLst>
-                                    <p:cond delay="0"/>
-                                  </p:stCondLst>
-                                  <p:childTnLst>
-                                    <p:set>
-                                      <p:cBhvr>
-                                        <p:cTn id="32" dur="1" fill="hold">
-                                          <p:stCondLst>
-                                            <p:cond delay="0"/>
-                                          </p:stCondLst>
-                                        </p:cTn>
-                                        <p:tgtEl>
-                                          <p:spTgt spid="43"/>
-                                        </p:tgtEl>
-                                        <p:attrNameLst>
-                                          <p:attrName>style.visibility</p:attrName>
-                                        </p:attrNameLst>
-                                      </p:cBhvr>
-                                      <p:to>
-                                        <p:strVal val="visible"/>
-                                      </p:to>
-                                    </p:set>
-                                  </p:childTnLst>
-                                </p:cTn>
-                              </p:par>
-                              <p:par>
-                                <p:cTn id="33" presetID="1" presetClass="entr" presetSubtype="0" fill="hold" nodeType="withEffect">
-                                  <p:stCondLst>
-                                    <p:cond delay="0"/>
-                                  </p:stCondLst>
-                                  <p:childTnLst>
-                                    <p:set>
-                                      <p:cBhvr>
-                                        <p:cTn id="34" dur="1" fill="hold">
-                                          <p:stCondLst>
-                                            <p:cond delay="0"/>
-                                          </p:stCondLst>
-                                        </p:cTn>
-                                        <p:tgtEl>
-                                          <p:spTgt spid="42"/>
-                                        </p:tgtEl>
-                                        <p:attrNameLst>
-                                          <p:attrName>style.visibility</p:attrName>
-                                        </p:attrNameLst>
-                                      </p:cBhvr>
-                                      <p:to>
-                                        <p:strVal val="visible"/>
-                                      </p:to>
-                                    </p:set>
-                                  </p:childTnLst>
-                                </p:cTn>
-                              </p:par>
-                            </p:childTnLst>
-                          </p:cTn>
-                        </p:par>
-                      </p:childTnLst>
-                    </p:cTn>
-                  </p:par>
-                  <p:par>
-                    <p:cTn id="35" fill="hold">
-                      <p:stCondLst>
-                        <p:cond delay="indefinite"/>
-                      </p:stCondLst>
-                      <p:childTnLst>
-                        <p:par>
-                          <p:cTn id="36" fill="hold">
-                            <p:stCondLst>
-                              <p:cond delay="0"/>
-                            </p:stCondLst>
-                            <p:childTnLst>
-                              <p:par>
-                                <p:cTn id="37" presetID="1" presetClass="entr" presetSubtype="0" fill="hold" grpId="0" nodeType="clickEffect">
-                                  <p:stCondLst>
-                                    <p:cond delay="0"/>
-                                  </p:stCondLst>
-                                  <p:childTnLst>
-                                    <p:set>
-                                      <p:cBhvr>
-                                        <p:cTn id="38" dur="1" fill="hold">
-                                          <p:stCondLst>
-                                            <p:cond delay="0"/>
-                                          </p:stCondLst>
-                                        </p:cTn>
-                                        <p:tgtEl>
-                                          <p:spTgt spid="41"/>
-                                        </p:tgtEl>
-                                        <p:attrNameLst>
-                                          <p:attrName>style.visibility</p:attrName>
-                                        </p:attrNameLst>
-                                      </p:cBhvr>
-                                      <p:to>
-                                        <p:strVal val="visible"/>
-                                      </p:to>
-                                    </p:set>
-                                  </p:childTnLst>
-                                </p:cTn>
-                              </p:par>
-                              <p:par>
-                                <p:cTn id="39" presetID="1" presetClass="entr" presetSubtype="0" fill="hold" nodeType="withEffect">
-                                  <p:stCondLst>
-                                    <p:cond delay="0"/>
-                                  </p:stCondLst>
-                                  <p:childTnLst>
-                                    <p:set>
-                                      <p:cBhvr>
-                                        <p:cTn id="40" dur="1" fill="hold">
-                                          <p:stCondLst>
-                                            <p:cond delay="0"/>
-                                          </p:stCondLst>
-                                        </p:cTn>
-                                        <p:tgtEl>
-                                          <p:spTgt spid="3078"/>
-                                        </p:tgtEl>
-                                        <p:attrNameLst>
-                                          <p:attrName>style.visibility</p:attrName>
-                                        </p:attrNameLst>
-                                      </p:cBhvr>
-                                      <p:to>
-                                        <p:strVal val="visible"/>
-                                      </p:to>
-                                    </p:set>
-                                  </p:childTnLst>
-                                </p:cTn>
-                              </p:par>
-                              <p:par>
-                                <p:cTn id="41" presetID="1" presetClass="entr" presetSubtype="0" fill="hold" grpId="0" nodeType="withEffect">
-                                  <p:stCondLst>
-                                    <p:cond delay="0"/>
-                                  </p:stCondLst>
-                                  <p:childTnLst>
-                                    <p:set>
-                                      <p:cBhvr>
-                                        <p:cTn id="42" dur="1" fill="hold">
-                                          <p:stCondLst>
-                                            <p:cond delay="0"/>
-                                          </p:stCondLst>
-                                        </p:cTn>
-                                        <p:tgtEl>
                                           <p:spTgt spid="51"/>
-                                        </p:tgtEl>
-                                        <p:attrNameLst>
-                                          <p:attrName>style.visibility</p:attrName>
-                                        </p:attrNameLst>
-                                      </p:cBhvr>
-                                      <p:to>
-                                        <p:strVal val="visible"/>
-                                      </p:to>
-                                    </p:set>
-                                  </p:childTnLst>
-                                </p:cTn>
-                              </p:par>
-                              <p:par>
-                                <p:cTn id="43" presetID="1" presetClass="entr" presetSubtype="0" fill="hold" nodeType="withEffect">
-                                  <p:stCondLst>
-                                    <p:cond delay="0"/>
-                                  </p:stCondLst>
-                                  <p:childTnLst>
-                                    <p:set>
-                                      <p:cBhvr>
-                                        <p:cTn id="44" dur="1" fill="hold">
-                                          <p:stCondLst>
-                                            <p:cond delay="0"/>
-                                          </p:stCondLst>
-                                        </p:cTn>
-                                        <p:tgtEl>
-                                          <p:spTgt spid="50"/>
                                         </p:tgtEl>
                                         <p:attrNameLst>
                                           <p:attrName>style.visibility</p:attrName>
@@ -14432,8 +13844,6 @@
       <p:bldP spid="41" grpId="0"/>
       <p:bldP spid="43" grpId="0"/>
       <p:bldP spid="51" grpId="0"/>
-      <p:bldP spid="2" grpId="0"/>
-      <p:bldP spid="6" grpId="0"/>
     </p:bldLst>
   </p:timing>
 </p:sld>
@@ -14950,7 +14360,7 @@
             </a:pPr>
             <a:r>
               <a:rPr lang="en-US" sz="1615" dirty="0"/>
-              <a:t>Container artifacts includes everything the app/source code needs.</a:t>
+              <a:t>Container artifacts includes everything the source code needs.</a:t>
             </a:r>
           </a:p>
           <a:p>
@@ -15082,7 +14492,7 @@
             </a:pPr>
             <a:r>
               <a:rPr lang="en-US" sz="1615" dirty="0"/>
-              <a:t>Containerization includes all dependencies (frameworks, libraries), configuration files, and runtime environments required to run an application.</a:t>
+              <a:t>Containerization bundles all dependencies (frameworks, libraries), configuration files, and runtime environments required to run a model.</a:t>
             </a:r>
           </a:p>
           <a:p>
@@ -15101,378 +14511,6 @@
   <p:clrMapOvr>
     <a:masterClrMapping/>
   </p:clrMapOvr>
-  <p:timing>
-    <p:tnLst>
-      <p:par>
-        <p:cTn id="1" dur="indefinite" restart="never" nodeType="tmRoot">
-          <p:childTnLst>
-            <p:seq concurrent="1" nextAc="seek">
-              <p:cTn id="2" dur="indefinite" nodeType="mainSeq">
-                <p:childTnLst>
-                  <p:par>
-                    <p:cTn id="3" fill="hold">
-                      <p:stCondLst>
-                        <p:cond delay="indefinite"/>
-                      </p:stCondLst>
-                      <p:childTnLst>
-                        <p:par>
-                          <p:cTn id="4" fill="hold">
-                            <p:stCondLst>
-                              <p:cond delay="0"/>
-                            </p:stCondLst>
-                            <p:childTnLst>
-                              <p:par>
-                                <p:cTn id="5" presetID="1" presetClass="entr" presetSubtype="0" fill="hold" grpId="0" nodeType="clickEffect">
-                                  <p:stCondLst>
-                                    <p:cond delay="0"/>
-                                  </p:stCondLst>
-                                  <p:childTnLst>
-                                    <p:set>
-                                      <p:cBhvr>
-                                        <p:cTn id="6" dur="1" fill="hold">
-                                          <p:stCondLst>
-                                            <p:cond delay="0"/>
-                                          </p:stCondLst>
-                                        </p:cTn>
-                                        <p:tgtEl>
-                                          <p:spTgt spid="2"/>
-                                        </p:tgtEl>
-                                        <p:attrNameLst>
-                                          <p:attrName>style.visibility</p:attrName>
-                                        </p:attrNameLst>
-                                      </p:cBhvr>
-                                      <p:to>
-                                        <p:strVal val="visible"/>
-                                      </p:to>
-                                    </p:set>
-                                  </p:childTnLst>
-                                </p:cTn>
-                              </p:par>
-                              <p:par>
-                                <p:cTn id="7" presetID="1" presetClass="entr" presetSubtype="0" fill="hold" grpId="0" nodeType="withEffect">
-                                  <p:stCondLst>
-                                    <p:cond delay="0"/>
-                                  </p:stCondLst>
-                                  <p:childTnLst>
-                                    <p:set>
-                                      <p:cBhvr>
-                                        <p:cTn id="8" dur="1" fill="hold">
-                                          <p:stCondLst>
-                                            <p:cond delay="0"/>
-                                          </p:stCondLst>
-                                        </p:cTn>
-                                        <p:tgtEl>
-                                          <p:spTgt spid="6"/>
-                                        </p:tgtEl>
-                                        <p:attrNameLst>
-                                          <p:attrName>style.visibility</p:attrName>
-                                        </p:attrNameLst>
-                                      </p:cBhvr>
-                                      <p:to>
-                                        <p:strVal val="visible"/>
-                                      </p:to>
-                                    </p:set>
-                                  </p:childTnLst>
-                                </p:cTn>
-                              </p:par>
-                              <p:par>
-                                <p:cTn id="9" presetID="1" presetClass="entr" presetSubtype="0" fill="hold" nodeType="withEffect">
-                                  <p:stCondLst>
-                                    <p:cond delay="0"/>
-                                  </p:stCondLst>
-                                  <p:childTnLst>
-                                    <p:set>
-                                      <p:cBhvr>
-                                        <p:cTn id="10" dur="1" fill="hold">
-                                          <p:stCondLst>
-                                            <p:cond delay="0"/>
-                                          </p:stCondLst>
-                                        </p:cTn>
-                                        <p:tgtEl>
-                                          <p:spTgt spid="4098"/>
-                                        </p:tgtEl>
-                                        <p:attrNameLst>
-                                          <p:attrName>style.visibility</p:attrName>
-                                        </p:attrNameLst>
-                                      </p:cBhvr>
-                                      <p:to>
-                                        <p:strVal val="visible"/>
-                                      </p:to>
-                                    </p:set>
-                                  </p:childTnLst>
-                                </p:cTn>
-                              </p:par>
-                              <p:par>
-                                <p:cTn id="11" presetID="1" presetClass="entr" presetSubtype="0" fill="hold" nodeType="withEffect">
-                                  <p:stCondLst>
-                                    <p:cond delay="0"/>
-                                  </p:stCondLst>
-                                  <p:childTnLst>
-                                    <p:set>
-                                      <p:cBhvr>
-                                        <p:cTn id="12" dur="1" fill="hold">
-                                          <p:stCondLst>
-                                            <p:cond delay="0"/>
-                                          </p:stCondLst>
-                                        </p:cTn>
-                                        <p:tgtEl>
-                                          <p:spTgt spid="4104"/>
-                                        </p:tgtEl>
-                                        <p:attrNameLst>
-                                          <p:attrName>style.visibility</p:attrName>
-                                        </p:attrNameLst>
-                                      </p:cBhvr>
-                                      <p:to>
-                                        <p:strVal val="visible"/>
-                                      </p:to>
-                                    </p:set>
-                                  </p:childTnLst>
-                                </p:cTn>
-                              </p:par>
-                              <p:par>
-                                <p:cTn id="13" presetID="1" presetClass="entr" presetSubtype="0" fill="hold" grpId="0" nodeType="withEffect">
-                                  <p:stCondLst>
-                                    <p:cond delay="0"/>
-                                  </p:stCondLst>
-                                  <p:childTnLst>
-                                    <p:set>
-                                      <p:cBhvr>
-                                        <p:cTn id="14" dur="1" fill="hold">
-                                          <p:stCondLst>
-                                            <p:cond delay="0"/>
-                                          </p:stCondLst>
-                                        </p:cTn>
-                                        <p:tgtEl>
-                                          <p:spTgt spid="8"/>
-                                        </p:tgtEl>
-                                        <p:attrNameLst>
-                                          <p:attrName>style.visibility</p:attrName>
-                                        </p:attrNameLst>
-                                      </p:cBhvr>
-                                      <p:to>
-                                        <p:strVal val="visible"/>
-                                      </p:to>
-                                    </p:set>
-                                  </p:childTnLst>
-                                </p:cTn>
-                              </p:par>
-                              <p:par>
-                                <p:cTn id="15" presetID="1" presetClass="entr" presetSubtype="0" fill="hold" grpId="0" nodeType="withEffect">
-                                  <p:stCondLst>
-                                    <p:cond delay="0"/>
-                                  </p:stCondLst>
-                                  <p:childTnLst>
-                                    <p:set>
-                                      <p:cBhvr>
-                                        <p:cTn id="16" dur="1" fill="hold">
-                                          <p:stCondLst>
-                                            <p:cond delay="0"/>
-                                          </p:stCondLst>
-                                        </p:cTn>
-                                        <p:tgtEl>
-                                          <p:spTgt spid="7"/>
-                                        </p:tgtEl>
-                                        <p:attrNameLst>
-                                          <p:attrName>style.visibility</p:attrName>
-                                        </p:attrNameLst>
-                                      </p:cBhvr>
-                                      <p:to>
-                                        <p:strVal val="visible"/>
-                                      </p:to>
-                                    </p:set>
-                                  </p:childTnLst>
-                                </p:cTn>
-                              </p:par>
-                              <p:par>
-                                <p:cTn id="17" presetID="1" presetClass="entr" presetSubtype="0" fill="hold" nodeType="withEffect">
-                                  <p:stCondLst>
-                                    <p:cond delay="0"/>
-                                  </p:stCondLst>
-                                  <p:childTnLst>
-                                    <p:set>
-                                      <p:cBhvr>
-                                        <p:cTn id="18" dur="1" fill="hold">
-                                          <p:stCondLst>
-                                            <p:cond delay="0"/>
-                                          </p:stCondLst>
-                                        </p:cTn>
-                                        <p:tgtEl>
-                                          <p:spTgt spid="4102"/>
-                                        </p:tgtEl>
-                                        <p:attrNameLst>
-                                          <p:attrName>style.visibility</p:attrName>
-                                        </p:attrNameLst>
-                                      </p:cBhvr>
-                                      <p:to>
-                                        <p:strVal val="visible"/>
-                                      </p:to>
-                                    </p:set>
-                                  </p:childTnLst>
-                                </p:cTn>
-                              </p:par>
-                            </p:childTnLst>
-                          </p:cTn>
-                        </p:par>
-                      </p:childTnLst>
-                    </p:cTn>
-                  </p:par>
-                  <p:par>
-                    <p:cTn id="19" fill="hold">
-                      <p:stCondLst>
-                        <p:cond delay="indefinite"/>
-                      </p:stCondLst>
-                      <p:childTnLst>
-                        <p:par>
-                          <p:cTn id="20" fill="hold">
-                            <p:stCondLst>
-                              <p:cond delay="0"/>
-                            </p:stCondLst>
-                            <p:childTnLst>
-                              <p:par>
-                                <p:cTn id="21" presetID="1" presetClass="entr" presetSubtype="0" fill="hold" grpId="0" nodeType="clickEffect">
-                                  <p:stCondLst>
-                                    <p:cond delay="0"/>
-                                  </p:stCondLst>
-                                  <p:childTnLst>
-                                    <p:set>
-                                      <p:cBhvr>
-                                        <p:cTn id="22" dur="1" fill="hold">
-                                          <p:stCondLst>
-                                            <p:cond delay="0"/>
-                                          </p:stCondLst>
-                                        </p:cTn>
-                                        <p:tgtEl>
-                                          <p:spTgt spid="16"/>
-                                        </p:tgtEl>
-                                        <p:attrNameLst>
-                                          <p:attrName>style.visibility</p:attrName>
-                                        </p:attrNameLst>
-                                      </p:cBhvr>
-                                      <p:to>
-                                        <p:strVal val="visible"/>
-                                      </p:to>
-                                    </p:set>
-                                  </p:childTnLst>
-                                </p:cTn>
-                              </p:par>
-                              <p:par>
-                                <p:cTn id="23" presetID="1" presetClass="entr" presetSubtype="0" fill="hold" nodeType="withEffect">
-                                  <p:stCondLst>
-                                    <p:cond delay="0"/>
-                                  </p:stCondLst>
-                                  <p:childTnLst>
-                                    <p:set>
-                                      <p:cBhvr>
-                                        <p:cTn id="24" dur="1" fill="hold">
-                                          <p:stCondLst>
-                                            <p:cond delay="0"/>
-                                          </p:stCondLst>
-                                        </p:cTn>
-                                        <p:tgtEl>
-                                          <p:spTgt spid="4108"/>
-                                        </p:tgtEl>
-                                        <p:attrNameLst>
-                                          <p:attrName>style.visibility</p:attrName>
-                                        </p:attrNameLst>
-                                      </p:cBhvr>
-                                      <p:to>
-                                        <p:strVal val="visible"/>
-                                      </p:to>
-                                    </p:set>
-                                  </p:childTnLst>
-                                </p:cTn>
-                              </p:par>
-                              <p:par>
-                                <p:cTn id="25" presetID="1" presetClass="entr" presetSubtype="0" fill="hold" grpId="0" nodeType="withEffect">
-                                  <p:stCondLst>
-                                    <p:cond delay="0"/>
-                                  </p:stCondLst>
-                                  <p:childTnLst>
-                                    <p:set>
-                                      <p:cBhvr>
-                                        <p:cTn id="26" dur="1" fill="hold">
-                                          <p:stCondLst>
-                                            <p:cond delay="0"/>
-                                          </p:stCondLst>
-                                        </p:cTn>
-                                        <p:tgtEl>
-                                          <p:spTgt spid="18"/>
-                                        </p:tgtEl>
-                                        <p:attrNameLst>
-                                          <p:attrName>style.visibility</p:attrName>
-                                        </p:attrNameLst>
-                                      </p:cBhvr>
-                                      <p:to>
-                                        <p:strVal val="visible"/>
-                                      </p:to>
-                                    </p:set>
-                                  </p:childTnLst>
-                                </p:cTn>
-                              </p:par>
-                              <p:par>
-                                <p:cTn id="27" presetID="1" presetClass="entr" presetSubtype="0" fill="hold" grpId="0" nodeType="withEffect">
-                                  <p:stCondLst>
-                                    <p:cond delay="0"/>
-                                  </p:stCondLst>
-                                  <p:childTnLst>
-                                    <p:set>
-                                      <p:cBhvr>
-                                        <p:cTn id="28" dur="1" fill="hold">
-                                          <p:stCondLst>
-                                            <p:cond delay="0"/>
-                                          </p:stCondLst>
-                                        </p:cTn>
-                                        <p:tgtEl>
-                                          <p:spTgt spid="12"/>
-                                        </p:tgtEl>
-                                        <p:attrNameLst>
-                                          <p:attrName>style.visibility</p:attrName>
-                                        </p:attrNameLst>
-                                      </p:cBhvr>
-                                      <p:to>
-                                        <p:strVal val="visible"/>
-                                      </p:to>
-                                    </p:set>
-                                  </p:childTnLst>
-                                </p:cTn>
-                              </p:par>
-                            </p:childTnLst>
-                          </p:cTn>
-                        </p:par>
-                      </p:childTnLst>
-                    </p:cTn>
-                  </p:par>
-                </p:childTnLst>
-              </p:cTn>
-              <p:prevCondLst>
-                <p:cond evt="onPrev" delay="0">
-                  <p:tgtEl>
-                    <p:sldTgt/>
-                  </p:tgtEl>
-                </p:cond>
-              </p:prevCondLst>
-              <p:nextCondLst>
-                <p:cond evt="onNext" delay="0">
-                  <p:tgtEl>
-                    <p:sldTgt/>
-                  </p:tgtEl>
-                </p:cond>
-              </p:nextCondLst>
-            </p:seq>
-          </p:childTnLst>
-        </p:cTn>
-      </p:par>
-    </p:tnLst>
-    <p:bldLst>
-      <p:bldP spid="2" grpId="0" animBg="1"/>
-      <p:bldP spid="6" grpId="0"/>
-      <p:bldP spid="7" grpId="0"/>
-      <p:bldP spid="8" grpId="0"/>
-      <p:bldP spid="12" grpId="0"/>
-      <p:bldP spid="16" grpId="0" animBg="1"/>
-      <p:bldP spid="18" grpId="0"/>
-    </p:bldLst>
-  </p:timing>
 </p:sld>
 </file>
 
@@ -15565,7 +14603,7 @@
             </a:pPr>
             <a:r>
               <a:rPr lang="en-US" sz="1615" dirty="0"/>
-              <a:t>Containerization includes all dependencies (frameworks, libraries), configuration files, and runtime environments required to run an application.</a:t>
+              <a:t>Containerization bundles all dependencies (frameworks, libraries), configuration files, and runtime environments required to run a model.</a:t>
             </a:r>
           </a:p>
           <a:p>
@@ -16122,6 +15160,114 @@
           </a:p>
         </p:txBody>
       </p:sp>
+      <p:sp>
+        <p:nvSpPr>
+          <p:cNvPr id="2" name="TextBox 1">
+            <a:extLst>
+              <a:ext uri="{FF2B5EF4-FFF2-40B4-BE49-F238E27FC236}">
+                <a16:creationId xmlns:a16="http://schemas.microsoft.com/office/drawing/2014/main" id="{8FDC33AA-493F-8830-BDC0-38584059F1B7}"/>
+              </a:ext>
+            </a:extLst>
+          </p:cNvPr>
+          <p:cNvSpPr txBox="1"/>
+          <p:nvPr/>
+        </p:nvSpPr>
+        <p:spPr>
+          <a:xfrm>
+            <a:off x="6021390" y="6149564"/>
+            <a:ext cx="787395" cy="369332"/>
+          </a:xfrm>
+          <a:prstGeom prst="rect">
+            <a:avLst/>
+          </a:prstGeom>
+          <a:noFill/>
+        </p:spPr>
+        <p:txBody>
+          <a:bodyPr wrap="none" rtlCol="0">
+            <a:spAutoFit/>
+          </a:bodyPr>
+          <a:lstStyle/>
+          <a:p>
+            <a:r>
+              <a:rPr lang="en-US" dirty="0"/>
+              <a:t>User 2</a:t>
+            </a:r>
+            <a:endParaRPr lang="LID4096" dirty="0"/>
+          </a:p>
+        </p:txBody>
+      </p:sp>
+      <p:sp>
+        <p:nvSpPr>
+          <p:cNvPr id="3" name="TextBox 2">
+            <a:extLst>
+              <a:ext uri="{FF2B5EF4-FFF2-40B4-BE49-F238E27FC236}">
+                <a16:creationId xmlns:a16="http://schemas.microsoft.com/office/drawing/2014/main" id="{9B347362-287D-B818-77A2-5A157831E38D}"/>
+              </a:ext>
+            </a:extLst>
+          </p:cNvPr>
+          <p:cNvSpPr txBox="1"/>
+          <p:nvPr/>
+        </p:nvSpPr>
+        <p:spPr>
+          <a:xfrm>
+            <a:off x="10189727" y="6026163"/>
+            <a:ext cx="787395" cy="369332"/>
+          </a:xfrm>
+          <a:prstGeom prst="rect">
+            <a:avLst/>
+          </a:prstGeom>
+          <a:noFill/>
+        </p:spPr>
+        <p:txBody>
+          <a:bodyPr wrap="none" rtlCol="0">
+            <a:spAutoFit/>
+          </a:bodyPr>
+          <a:lstStyle/>
+          <a:p>
+            <a:r>
+              <a:rPr lang="en-US" dirty="0"/>
+              <a:t>User 3</a:t>
+            </a:r>
+            <a:endParaRPr lang="LID4096" dirty="0"/>
+          </a:p>
+        </p:txBody>
+      </p:sp>
+      <p:sp>
+        <p:nvSpPr>
+          <p:cNvPr id="4" name="TextBox 3">
+            <a:extLst>
+              <a:ext uri="{FF2B5EF4-FFF2-40B4-BE49-F238E27FC236}">
+                <a16:creationId xmlns:a16="http://schemas.microsoft.com/office/drawing/2014/main" id="{C71A1A5C-5B38-3357-1AC1-AC9E5F068802}"/>
+              </a:ext>
+            </a:extLst>
+          </p:cNvPr>
+          <p:cNvSpPr txBox="1"/>
+          <p:nvPr/>
+        </p:nvSpPr>
+        <p:spPr>
+          <a:xfrm>
+            <a:off x="1133436" y="4871254"/>
+            <a:ext cx="787395" cy="369332"/>
+          </a:xfrm>
+          <a:prstGeom prst="rect">
+            <a:avLst/>
+          </a:prstGeom>
+          <a:noFill/>
+        </p:spPr>
+        <p:txBody>
+          <a:bodyPr wrap="none" rtlCol="0">
+            <a:spAutoFit/>
+          </a:bodyPr>
+          <a:lstStyle/>
+          <a:p>
+            <a:r>
+              <a:rPr lang="en-US" dirty="0"/>
+              <a:t>User 1</a:t>
+            </a:r>
+            <a:endParaRPr lang="LID4096" dirty="0"/>
+          </a:p>
+        </p:txBody>
+      </p:sp>
     </p:spTree>
     <p:extLst>
       <p:ext uri="{BB962C8B-B14F-4D97-AF65-F5344CB8AC3E}">
@@ -16132,320 +15278,6 @@
   <p:clrMapOvr>
     <a:masterClrMapping/>
   </p:clrMapOvr>
-  <p:timing>
-    <p:tnLst>
-      <p:par>
-        <p:cTn id="1" dur="indefinite" restart="never" nodeType="tmRoot">
-          <p:childTnLst>
-            <p:seq concurrent="1" nextAc="seek">
-              <p:cTn id="2" dur="indefinite" nodeType="mainSeq">
-                <p:childTnLst>
-                  <p:par>
-                    <p:cTn id="3" fill="hold">
-                      <p:stCondLst>
-                        <p:cond delay="indefinite"/>
-                      </p:stCondLst>
-                      <p:childTnLst>
-                        <p:par>
-                          <p:cTn id="4" fill="hold">
-                            <p:stCondLst>
-                              <p:cond delay="0"/>
-                            </p:stCondLst>
-                            <p:childTnLst>
-                              <p:par>
-                                <p:cTn id="5" presetID="1" presetClass="entr" presetSubtype="0" fill="hold" grpId="0" nodeType="clickEffect">
-                                  <p:stCondLst>
-                                    <p:cond delay="0"/>
-                                  </p:stCondLst>
-                                  <p:childTnLst>
-                                    <p:set>
-                                      <p:cBhvr>
-                                        <p:cTn id="6" dur="1" fill="hold">
-                                          <p:stCondLst>
-                                            <p:cond delay="0"/>
-                                          </p:stCondLst>
-                                        </p:cTn>
-                                        <p:tgtEl>
-                                          <p:spTgt spid="19"/>
-                                        </p:tgtEl>
-                                        <p:attrNameLst>
-                                          <p:attrName>style.visibility</p:attrName>
-                                        </p:attrNameLst>
-                                      </p:cBhvr>
-                                      <p:to>
-                                        <p:strVal val="visible"/>
-                                      </p:to>
-                                    </p:set>
-                                  </p:childTnLst>
-                                </p:cTn>
-                              </p:par>
-                              <p:par>
-                                <p:cTn id="7" presetID="1" presetClass="entr" presetSubtype="0" fill="hold" nodeType="withEffect">
-                                  <p:stCondLst>
-                                    <p:cond delay="0"/>
-                                  </p:stCondLst>
-                                  <p:childTnLst>
-                                    <p:set>
-                                      <p:cBhvr>
-                                        <p:cTn id="8" dur="1" fill="hold">
-                                          <p:stCondLst>
-                                            <p:cond delay="0"/>
-                                          </p:stCondLst>
-                                        </p:cTn>
-                                        <p:tgtEl>
-                                          <p:spTgt spid="18"/>
-                                        </p:tgtEl>
-                                        <p:attrNameLst>
-                                          <p:attrName>style.visibility</p:attrName>
-                                        </p:attrNameLst>
-                                      </p:cBhvr>
-                                      <p:to>
-                                        <p:strVal val="visible"/>
-                                      </p:to>
-                                    </p:set>
-                                  </p:childTnLst>
-                                </p:cTn>
-                              </p:par>
-                              <p:par>
-                                <p:cTn id="9" presetID="1" presetClass="entr" presetSubtype="0" fill="hold" nodeType="withEffect">
-                                  <p:stCondLst>
-                                    <p:cond delay="0"/>
-                                  </p:stCondLst>
-                                  <p:childTnLst>
-                                    <p:set>
-                                      <p:cBhvr>
-                                        <p:cTn id="10" dur="1" fill="hold">
-                                          <p:stCondLst>
-                                            <p:cond delay="0"/>
-                                          </p:stCondLst>
-                                        </p:cTn>
-                                        <p:tgtEl>
-                                          <p:spTgt spid="11"/>
-                                        </p:tgtEl>
-                                        <p:attrNameLst>
-                                          <p:attrName>style.visibility</p:attrName>
-                                        </p:attrNameLst>
-                                      </p:cBhvr>
-                                      <p:to>
-                                        <p:strVal val="visible"/>
-                                      </p:to>
-                                    </p:set>
-                                  </p:childTnLst>
-                                </p:cTn>
-                              </p:par>
-                            </p:childTnLst>
-                          </p:cTn>
-                        </p:par>
-                      </p:childTnLst>
-                    </p:cTn>
-                  </p:par>
-                  <p:par>
-                    <p:cTn id="11" fill="hold">
-                      <p:stCondLst>
-                        <p:cond delay="indefinite"/>
-                      </p:stCondLst>
-                      <p:childTnLst>
-                        <p:par>
-                          <p:cTn id="12" fill="hold">
-                            <p:stCondLst>
-                              <p:cond delay="0"/>
-                            </p:stCondLst>
-                            <p:childTnLst>
-                              <p:par>
-                                <p:cTn id="13" presetID="1" presetClass="entr" presetSubtype="0" fill="hold" grpId="0" nodeType="clickEffect">
-                                  <p:stCondLst>
-                                    <p:cond delay="0"/>
-                                  </p:stCondLst>
-                                  <p:childTnLst>
-                                    <p:set>
-                                      <p:cBhvr>
-                                        <p:cTn id="14" dur="1" fill="hold">
-                                          <p:stCondLst>
-                                            <p:cond delay="0"/>
-                                          </p:stCondLst>
-                                        </p:cTn>
-                                        <p:tgtEl>
-                                          <p:spTgt spid="33"/>
-                                        </p:tgtEl>
-                                        <p:attrNameLst>
-                                          <p:attrName>style.visibility</p:attrName>
-                                        </p:attrNameLst>
-                                      </p:cBhvr>
-                                      <p:to>
-                                        <p:strVal val="visible"/>
-                                      </p:to>
-                                    </p:set>
-                                  </p:childTnLst>
-                                </p:cTn>
-                              </p:par>
-                              <p:par>
-                                <p:cTn id="15" presetID="1" presetClass="entr" presetSubtype="0" fill="hold" nodeType="withEffect">
-                                  <p:stCondLst>
-                                    <p:cond delay="0"/>
-                                  </p:stCondLst>
-                                  <p:childTnLst>
-                                    <p:set>
-                                      <p:cBhvr>
-                                        <p:cTn id="16" dur="1" fill="hold">
-                                          <p:stCondLst>
-                                            <p:cond delay="0"/>
-                                          </p:stCondLst>
-                                        </p:cTn>
-                                        <p:tgtEl>
-                                          <p:spTgt spid="22"/>
-                                        </p:tgtEl>
-                                        <p:attrNameLst>
-                                          <p:attrName>style.visibility</p:attrName>
-                                        </p:attrNameLst>
-                                      </p:cBhvr>
-                                      <p:to>
-                                        <p:strVal val="visible"/>
-                                      </p:to>
-                                    </p:set>
-                                  </p:childTnLst>
-                                </p:cTn>
-                              </p:par>
-                              <p:par>
-                                <p:cTn id="17" presetID="1" presetClass="entr" presetSubtype="0" fill="hold" nodeType="withEffect">
-                                  <p:stCondLst>
-                                    <p:cond delay="0"/>
-                                  </p:stCondLst>
-                                  <p:childTnLst>
-                                    <p:set>
-                                      <p:cBhvr>
-                                        <p:cTn id="18" dur="1" fill="hold">
-                                          <p:stCondLst>
-                                            <p:cond delay="0"/>
-                                          </p:stCondLst>
-                                        </p:cTn>
-                                        <p:tgtEl>
-                                          <p:spTgt spid="25"/>
-                                        </p:tgtEl>
-                                        <p:attrNameLst>
-                                          <p:attrName>style.visibility</p:attrName>
-                                        </p:attrNameLst>
-                                      </p:cBhvr>
-                                      <p:to>
-                                        <p:strVal val="visible"/>
-                                      </p:to>
-                                    </p:set>
-                                  </p:childTnLst>
-                                </p:cTn>
-                              </p:par>
-                              <p:par>
-                                <p:cTn id="19" presetID="1" presetClass="entr" presetSubtype="0" fill="hold" grpId="0" nodeType="withEffect">
-                                  <p:stCondLst>
-                                    <p:cond delay="0"/>
-                                  </p:stCondLst>
-                                  <p:childTnLst>
-                                    <p:set>
-                                      <p:cBhvr>
-                                        <p:cTn id="20" dur="1" fill="hold">
-                                          <p:stCondLst>
-                                            <p:cond delay="0"/>
-                                          </p:stCondLst>
-                                        </p:cTn>
-                                        <p:tgtEl>
-                                          <p:spTgt spid="35"/>
-                                        </p:tgtEl>
-                                        <p:attrNameLst>
-                                          <p:attrName>style.visibility</p:attrName>
-                                        </p:attrNameLst>
-                                      </p:cBhvr>
-                                      <p:to>
-                                        <p:strVal val="visible"/>
-                                      </p:to>
-                                    </p:set>
-                                  </p:childTnLst>
-                                </p:cTn>
-                              </p:par>
-                              <p:par>
-                                <p:cTn id="21" presetID="1" presetClass="entr" presetSubtype="0" fill="hold" nodeType="withEffect">
-                                  <p:stCondLst>
-                                    <p:cond delay="0"/>
-                                  </p:stCondLst>
-                                  <p:childTnLst>
-                                    <p:set>
-                                      <p:cBhvr>
-                                        <p:cTn id="22" dur="1" fill="hold">
-                                          <p:stCondLst>
-                                            <p:cond delay="0"/>
-                                          </p:stCondLst>
-                                        </p:cTn>
-                                        <p:tgtEl>
-                                          <p:spTgt spid="9"/>
-                                        </p:tgtEl>
-                                        <p:attrNameLst>
-                                          <p:attrName>style.visibility</p:attrName>
-                                        </p:attrNameLst>
-                                      </p:cBhvr>
-                                      <p:to>
-                                        <p:strVal val="visible"/>
-                                      </p:to>
-                                    </p:set>
-                                  </p:childTnLst>
-                                </p:cTn>
-                              </p:par>
-                              <p:par>
-                                <p:cTn id="23" presetID="1" presetClass="entr" presetSubtype="0" fill="hold" nodeType="withEffect">
-                                  <p:stCondLst>
-                                    <p:cond delay="0"/>
-                                  </p:stCondLst>
-                                  <p:childTnLst>
-                                    <p:set>
-                                      <p:cBhvr>
-                                        <p:cTn id="24" dur="1" fill="hold">
-                                          <p:stCondLst>
-                                            <p:cond delay="0"/>
-                                          </p:stCondLst>
-                                        </p:cTn>
-                                        <p:tgtEl>
-                                          <p:spTgt spid="8"/>
-                                        </p:tgtEl>
-                                        <p:attrNameLst>
-                                          <p:attrName>style.visibility</p:attrName>
-                                        </p:attrNameLst>
-                                      </p:cBhvr>
-                                      <p:to>
-                                        <p:strVal val="visible"/>
-                                      </p:to>
-                                    </p:set>
-                                  </p:childTnLst>
-                                </p:cTn>
-                              </p:par>
-                            </p:childTnLst>
-                          </p:cTn>
-                        </p:par>
-                      </p:childTnLst>
-                    </p:cTn>
-                  </p:par>
-                </p:childTnLst>
-              </p:cTn>
-              <p:prevCondLst>
-                <p:cond evt="onPrev" delay="0">
-                  <p:tgtEl>
-                    <p:sldTgt/>
-                  </p:tgtEl>
-                </p:cond>
-              </p:prevCondLst>
-              <p:nextCondLst>
-                <p:cond evt="onNext" delay="0">
-                  <p:tgtEl>
-                    <p:sldTgt/>
-                  </p:tgtEl>
-                </p:cond>
-              </p:nextCondLst>
-            </p:seq>
-          </p:childTnLst>
-        </p:cTn>
-      </p:par>
-    </p:tnLst>
-    <p:bldLst>
-      <p:bldP spid="19" grpId="0"/>
-      <p:bldP spid="33" grpId="0"/>
-      <p:bldP spid="35" grpId="0"/>
-    </p:bldLst>
-  </p:timing>
 </p:sld>
 </file>
 
@@ -16583,8 +15415,8 @@
         </p:nvSpPr>
         <p:spPr>
           <a:xfrm>
-            <a:off x="1152889" y="1062067"/>
-            <a:ext cx="10910479" cy="716399"/>
+            <a:off x="1152890" y="1062067"/>
+            <a:ext cx="9551461" cy="716399"/>
           </a:xfrm>
           <a:prstGeom prst="roundRect">
             <a:avLst/>
@@ -17170,143 +16002,6 @@
           </a:extLst>
         </p:spPr>
       </p:pic>
-      <p:cxnSp>
-        <p:nvCxnSpPr>
-          <p:cNvPr id="26" name="Straight Connector 25">
-            <a:extLst>
-              <a:ext uri="{FF2B5EF4-FFF2-40B4-BE49-F238E27FC236}">
-                <a16:creationId xmlns:a16="http://schemas.microsoft.com/office/drawing/2014/main" id="{A7386D55-8887-0740-0EF7-593F0278186A}"/>
-              </a:ext>
-            </a:extLst>
-          </p:cNvPr>
-          <p:cNvCxnSpPr>
-            <a:cxnSpLocks/>
-          </p:cNvCxnSpPr>
-          <p:nvPr/>
-        </p:nvCxnSpPr>
-        <p:spPr>
-          <a:xfrm>
-            <a:off x="11570783" y="1796104"/>
-            <a:ext cx="0" cy="1374935"/>
-          </a:xfrm>
-          <a:prstGeom prst="line">
-            <a:avLst/>
-          </a:prstGeom>
-        </p:spPr>
-        <p:style>
-          <a:lnRef idx="1">
-            <a:schemeClr val="accent1"/>
-          </a:lnRef>
-          <a:fillRef idx="0">
-            <a:schemeClr val="accent1"/>
-          </a:fillRef>
-          <a:effectRef idx="0">
-            <a:schemeClr val="accent1"/>
-          </a:effectRef>
-          <a:fontRef idx="minor">
-            <a:schemeClr val="tx1"/>
-          </a:fontRef>
-        </p:style>
-      </p:cxnSp>
-      <p:sp>
-        <p:nvSpPr>
-          <p:cNvPr id="28" name="Flowchart: Connector 27">
-            <a:extLst>
-              <a:ext uri="{FF2B5EF4-FFF2-40B4-BE49-F238E27FC236}">
-                <a16:creationId xmlns:a16="http://schemas.microsoft.com/office/drawing/2014/main" id="{6178B1ED-9A43-C453-11DA-C3C227A1047A}"/>
-              </a:ext>
-            </a:extLst>
-          </p:cNvPr>
-          <p:cNvSpPr/>
-          <p:nvPr/>
-        </p:nvSpPr>
-        <p:spPr>
-          <a:xfrm>
-            <a:off x="10849328" y="3188677"/>
-            <a:ext cx="1442908" cy="1411449"/>
-          </a:xfrm>
-          <a:prstGeom prst="flowChartConnector">
-            <a:avLst/>
-          </a:prstGeom>
-          <a:noFill/>
-          <a:ln w="57150">
-            <a:solidFill>
-              <a:srgbClr val="00B0F0"/>
-            </a:solidFill>
-          </a:ln>
-        </p:spPr>
-        <p:style>
-          <a:lnRef idx="2">
-            <a:schemeClr val="accent1">
-              <a:shade val="15000"/>
-            </a:schemeClr>
-          </a:lnRef>
-          <a:fillRef idx="1">
-            <a:schemeClr val="accent1"/>
-          </a:fillRef>
-          <a:effectRef idx="0">
-            <a:schemeClr val="accent1"/>
-          </a:effectRef>
-          <a:fontRef idx="minor">
-            <a:schemeClr val="lt1"/>
-          </a:fontRef>
-        </p:style>
-        <p:txBody>
-          <a:bodyPr rtlCol="0" anchor="ctr"/>
-          <a:lstStyle/>
-          <a:p>
-            <a:pPr algn="ctr"/>
-            <a:endParaRPr lang="LID4096"/>
-          </a:p>
-        </p:txBody>
-      </p:sp>
-      <p:pic>
-        <p:nvPicPr>
-          <p:cNvPr id="29" name="Picture 8" descr="Paper Clip Icon Office Graphic by wienscollection · Creative Fabrica">
-            <a:extLst>
-              <a:ext uri="{FF2B5EF4-FFF2-40B4-BE49-F238E27FC236}">
-                <a16:creationId xmlns:a16="http://schemas.microsoft.com/office/drawing/2014/main" id="{AF3B1BDA-1293-7041-3558-B7DC9215971A}"/>
-              </a:ext>
-            </a:extLst>
-          </p:cNvPr>
-          <p:cNvPicPr>
-            <a:picLocks noChangeAspect="1" noChangeArrowheads="1"/>
-          </p:cNvPicPr>
-          <p:nvPr/>
-        </p:nvPicPr>
-        <p:blipFill>
-          <a:blip r:embed="rId3">
-            <a:extLst>
-              <a:ext uri="{28A0092B-C50C-407E-A947-70E740481C1C}">
-                <a14:useLocalDpi xmlns:a14="http://schemas.microsoft.com/office/drawing/2010/main" val="0"/>
-              </a:ext>
-            </a:extLst>
-          </a:blip>
-          <a:srcRect/>
-          <a:stretch>
-            <a:fillRect/>
-          </a:stretch>
-        </p:blipFill>
-        <p:spPr bwMode="auto">
-          <a:xfrm>
-            <a:off x="11270910" y="2903385"/>
-            <a:ext cx="599745" cy="399830"/>
-          </a:xfrm>
-          <a:prstGeom prst="rect">
-            <a:avLst/>
-          </a:prstGeom>
-          <a:noFill/>
-          <a:extLst>
-            <a:ext uri="{909E8E84-426E-40DD-AFC4-6F175D3DCCD1}">
-              <a14:hiddenFill xmlns:a14="http://schemas.microsoft.com/office/drawing/2010/main">
-                <a:solidFill>
-                  <a:srgbClr val="FFFFFF"/>
-                </a:solidFill>
-              </a14:hiddenFill>
-            </a:ext>
-          </a:extLst>
-        </p:spPr>
-      </p:pic>
       <p:sp>
         <p:nvSpPr>
           <p:cNvPr id="30" name="TextBox 29">
@@ -17357,8 +16052,8 @@
         </p:nvSpPr>
         <p:spPr>
           <a:xfrm>
-            <a:off x="3853275" y="3685134"/>
-            <a:ext cx="988860" cy="369332"/>
+            <a:off x="3656276" y="3685133"/>
+            <a:ext cx="1447384" cy="369332"/>
           </a:xfrm>
           <a:prstGeom prst="rect">
             <a:avLst/>
@@ -17373,7 +16068,7 @@
           <a:p>
             <a:r>
               <a:rPr lang="en-US" dirty="0"/>
-              <a:t>Isolation</a:t>
+              <a:t>Collaboration</a:t>
             </a:r>
             <a:endParaRPr lang="LID4096" dirty="0"/>
           </a:p>
@@ -17381,10 +16076,10 @@
       </p:sp>
       <p:sp>
         <p:nvSpPr>
-          <p:cNvPr id="32" name="TextBox 31">
-            <a:extLst>
-              <a:ext uri="{FF2B5EF4-FFF2-40B4-BE49-F238E27FC236}">
-                <a16:creationId xmlns:a16="http://schemas.microsoft.com/office/drawing/2014/main" id="{D6B0914C-7868-3E6A-C619-C44DB55DCF75}"/>
+          <p:cNvPr id="33" name="TextBox 32">
+            <a:extLst>
+              <a:ext uri="{FF2B5EF4-FFF2-40B4-BE49-F238E27FC236}">
+                <a16:creationId xmlns:a16="http://schemas.microsoft.com/office/drawing/2014/main" id="{B8D9B39A-5905-1344-8C67-1AFDBEDF335F}"/>
               </a:ext>
             </a:extLst>
           </p:cNvPr>
@@ -17393,8 +16088,8 @@
         </p:nvSpPr>
         <p:spPr>
           <a:xfrm>
-            <a:off x="11149450" y="3712776"/>
-            <a:ext cx="939681" cy="369332"/>
+            <a:off x="6158989" y="3546634"/>
+            <a:ext cx="1317861" cy="646331"/>
           </a:xfrm>
           <a:prstGeom prst="rect">
             <a:avLst/>
@@ -17409,7 +16104,13 @@
           <a:p>
             <a:r>
               <a:rPr lang="en-US" dirty="0"/>
-              <a:t>Security</a:t>
+              <a:t>      Fast </a:t>
+            </a:r>
+          </a:p>
+          <a:p>
+            <a:r>
+              <a:rPr lang="en-US" dirty="0"/>
+              <a:t>deployment</a:t>
             </a:r>
             <a:endParaRPr lang="LID4096" dirty="0"/>
           </a:p>
@@ -17417,10 +16118,10 @@
       </p:sp>
       <p:sp>
         <p:nvSpPr>
-          <p:cNvPr id="33" name="TextBox 32">
-            <a:extLst>
-              <a:ext uri="{FF2B5EF4-FFF2-40B4-BE49-F238E27FC236}">
-                <a16:creationId xmlns:a16="http://schemas.microsoft.com/office/drawing/2014/main" id="{B8D9B39A-5905-1344-8C67-1AFDBEDF335F}"/>
+          <p:cNvPr id="34" name="TextBox 33">
+            <a:extLst>
+              <a:ext uri="{FF2B5EF4-FFF2-40B4-BE49-F238E27FC236}">
+                <a16:creationId xmlns:a16="http://schemas.microsoft.com/office/drawing/2014/main" id="{1251A0DA-1B70-8801-AA6C-DBB23920FCF0}"/>
               </a:ext>
             </a:extLst>
           </p:cNvPr>
@@ -17429,8 +16130,8 @@
         </p:nvSpPr>
         <p:spPr>
           <a:xfrm>
-            <a:off x="6158989" y="3546634"/>
-            <a:ext cx="1317861" cy="646331"/>
+            <a:off x="8879450" y="3617190"/>
+            <a:ext cx="988860" cy="369332"/>
           </a:xfrm>
           <a:prstGeom prst="rect">
             <a:avLst/>
@@ -17445,49 +16146,7 @@
           <a:p>
             <a:r>
               <a:rPr lang="en-US" dirty="0"/>
-              <a:t>      Fast </a:t>
-            </a:r>
-          </a:p>
-          <a:p>
-            <a:r>
-              <a:rPr lang="en-US" dirty="0"/>
-              <a:t>deployment</a:t>
-            </a:r>
-            <a:endParaRPr lang="LID4096" dirty="0"/>
-          </a:p>
-        </p:txBody>
-      </p:sp>
-      <p:sp>
-        <p:nvSpPr>
-          <p:cNvPr id="34" name="TextBox 33">
-            <a:extLst>
-              <a:ext uri="{FF2B5EF4-FFF2-40B4-BE49-F238E27FC236}">
-                <a16:creationId xmlns:a16="http://schemas.microsoft.com/office/drawing/2014/main" id="{1251A0DA-1B70-8801-AA6C-DBB23920FCF0}"/>
-              </a:ext>
-            </a:extLst>
-          </p:cNvPr>
-          <p:cNvSpPr txBox="1"/>
-          <p:nvPr/>
-        </p:nvSpPr>
-        <p:spPr>
-          <a:xfrm>
-            <a:off x="8652425" y="3627946"/>
-            <a:ext cx="1447384" cy="369332"/>
-          </a:xfrm>
-          <a:prstGeom prst="rect">
-            <a:avLst/>
-          </a:prstGeom>
-          <a:noFill/>
-        </p:spPr>
-        <p:txBody>
-          <a:bodyPr wrap="none" rtlCol="0">
-            <a:spAutoFit/>
-          </a:bodyPr>
-          <a:lstStyle/>
-          <a:p>
-            <a:r>
-              <a:rPr lang="en-US" dirty="0"/>
-              <a:t>Collaboration</a:t>
+              <a:t>Isolation</a:t>
             </a:r>
             <a:endParaRPr lang="LID4096" dirty="0"/>
           </a:p>
@@ -18294,7 +16953,7 @@
         <p:spPr>
           <a:xfrm>
             <a:off x="-89852" y="508052"/>
-            <a:ext cx="6800964" cy="866391"/>
+            <a:ext cx="6511719" cy="866391"/>
           </a:xfrm>
           <a:prstGeom prst="rect">
             <a:avLst/>
@@ -18316,7 +16975,7 @@
             </a:pPr>
             <a:r>
               <a:rPr lang="en-US" sz="1615" dirty="0"/>
-              <a:t>Let’s say we want to run a task(model) on a cluster/supercomputer  </a:t>
+              <a:t>Let’s say we want to run a model on a cluster/supercomputer  </a:t>
             </a:r>
           </a:p>
           <a:p>
@@ -18346,479 +17005,6 @@
       <p:transition/>
     </mc:Fallback>
   </mc:AlternateContent>
-  <p:timing>
-    <p:tnLst>
-      <p:par>
-        <p:cTn id="1" dur="indefinite" restart="never" nodeType="tmRoot">
-          <p:childTnLst>
-            <p:seq concurrent="1" nextAc="seek">
-              <p:cTn id="2" dur="indefinite" nodeType="mainSeq">
-                <p:childTnLst>
-                  <p:par>
-                    <p:cTn id="3" fill="hold">
-                      <p:stCondLst>
-                        <p:cond delay="indefinite"/>
-                      </p:stCondLst>
-                      <p:childTnLst>
-                        <p:par>
-                          <p:cTn id="4" fill="hold">
-                            <p:stCondLst>
-                              <p:cond delay="0"/>
-                            </p:stCondLst>
-                            <p:childTnLst>
-                              <p:par>
-                                <p:cTn id="5" presetID="1" presetClass="entr" presetSubtype="0" fill="hold" grpId="0" nodeType="clickEffect">
-                                  <p:stCondLst>
-                                    <p:cond delay="0"/>
-                                  </p:stCondLst>
-                                  <p:childTnLst>
-                                    <p:set>
-                                      <p:cBhvr>
-                                        <p:cTn id="6" dur="1" fill="hold">
-                                          <p:stCondLst>
-                                            <p:cond delay="0"/>
-                                          </p:stCondLst>
-                                        </p:cTn>
-                                        <p:tgtEl>
-                                          <p:spTgt spid="14"/>
-                                        </p:tgtEl>
-                                        <p:attrNameLst>
-                                          <p:attrName>style.visibility</p:attrName>
-                                        </p:attrNameLst>
-                                      </p:cBhvr>
-                                      <p:to>
-                                        <p:strVal val="visible"/>
-                                      </p:to>
-                                    </p:set>
-                                  </p:childTnLst>
-                                </p:cTn>
-                              </p:par>
-                              <p:par>
-                                <p:cTn id="7" presetID="1" presetClass="entr" presetSubtype="0" fill="hold" nodeType="withEffect">
-                                  <p:stCondLst>
-                                    <p:cond delay="0"/>
-                                  </p:stCondLst>
-                                  <p:childTnLst>
-                                    <p:set>
-                                      <p:cBhvr>
-                                        <p:cTn id="8" dur="1" fill="hold">
-                                          <p:stCondLst>
-                                            <p:cond delay="0"/>
-                                          </p:stCondLst>
-                                        </p:cTn>
-                                        <p:tgtEl>
-                                          <p:spTgt spid="18"/>
-                                        </p:tgtEl>
-                                        <p:attrNameLst>
-                                          <p:attrName>style.visibility</p:attrName>
-                                        </p:attrNameLst>
-                                      </p:cBhvr>
-                                      <p:to>
-                                        <p:strVal val="visible"/>
-                                      </p:to>
-                                    </p:set>
-                                  </p:childTnLst>
-                                </p:cTn>
-                              </p:par>
-                              <p:par>
-                                <p:cTn id="9" presetID="1" presetClass="entr" presetSubtype="0" fill="hold" grpId="0" nodeType="withEffect">
-                                  <p:stCondLst>
-                                    <p:cond delay="0"/>
-                                  </p:stCondLst>
-                                  <p:childTnLst>
-                                    <p:set>
-                                      <p:cBhvr>
-                                        <p:cTn id="10" dur="1" fill="hold">
-                                          <p:stCondLst>
-                                            <p:cond delay="0"/>
-                                          </p:stCondLst>
-                                        </p:cTn>
-                                        <p:tgtEl>
-                                          <p:spTgt spid="21"/>
-                                        </p:tgtEl>
-                                        <p:attrNameLst>
-                                          <p:attrName>style.visibility</p:attrName>
-                                        </p:attrNameLst>
-                                      </p:cBhvr>
-                                      <p:to>
-                                        <p:strVal val="visible"/>
-                                      </p:to>
-                                    </p:set>
-                                  </p:childTnLst>
-                                </p:cTn>
-                              </p:par>
-                              <p:par>
-                                <p:cTn id="11" presetID="1" presetClass="entr" presetSubtype="0" fill="hold" nodeType="withEffect">
-                                  <p:stCondLst>
-                                    <p:cond delay="0"/>
-                                  </p:stCondLst>
-                                  <p:childTnLst>
-                                    <p:set>
-                                      <p:cBhvr>
-                                        <p:cTn id="12" dur="1" fill="hold">
-                                          <p:stCondLst>
-                                            <p:cond delay="0"/>
-                                          </p:stCondLst>
-                                        </p:cTn>
-                                        <p:tgtEl>
-                                          <p:spTgt spid="22"/>
-                                        </p:tgtEl>
-                                        <p:attrNameLst>
-                                          <p:attrName>style.visibility</p:attrName>
-                                        </p:attrNameLst>
-                                      </p:cBhvr>
-                                      <p:to>
-                                        <p:strVal val="visible"/>
-                                      </p:to>
-                                    </p:set>
-                                  </p:childTnLst>
-                                </p:cTn>
-                              </p:par>
-                              <p:par>
-                                <p:cTn id="13" presetID="1" presetClass="entr" presetSubtype="0" fill="hold" nodeType="withEffect">
-                                  <p:stCondLst>
-                                    <p:cond delay="0"/>
-                                  </p:stCondLst>
-                                  <p:childTnLst>
-                                    <p:set>
-                                      <p:cBhvr>
-                                        <p:cTn id="14" dur="1" fill="hold">
-                                          <p:stCondLst>
-                                            <p:cond delay="0"/>
-                                          </p:stCondLst>
-                                        </p:cTn>
-                                        <p:tgtEl>
-                                          <p:spTgt spid="23"/>
-                                        </p:tgtEl>
-                                        <p:attrNameLst>
-                                          <p:attrName>style.visibility</p:attrName>
-                                        </p:attrNameLst>
-                                      </p:cBhvr>
-                                      <p:to>
-                                        <p:strVal val="visible"/>
-                                      </p:to>
-                                    </p:set>
-                                  </p:childTnLst>
-                                </p:cTn>
-                              </p:par>
-                              <p:par>
-                                <p:cTn id="15" presetID="1" presetClass="entr" presetSubtype="0" fill="hold" grpId="0" nodeType="withEffect">
-                                  <p:stCondLst>
-                                    <p:cond delay="0"/>
-                                  </p:stCondLst>
-                                  <p:childTnLst>
-                                    <p:set>
-                                      <p:cBhvr>
-                                        <p:cTn id="16" dur="1" fill="hold">
-                                          <p:stCondLst>
-                                            <p:cond delay="0"/>
-                                          </p:stCondLst>
-                                        </p:cTn>
-                                        <p:tgtEl>
-                                          <p:spTgt spid="26"/>
-                                        </p:tgtEl>
-                                        <p:attrNameLst>
-                                          <p:attrName>style.visibility</p:attrName>
-                                        </p:attrNameLst>
-                                      </p:cBhvr>
-                                      <p:to>
-                                        <p:strVal val="visible"/>
-                                      </p:to>
-                                    </p:set>
-                                  </p:childTnLst>
-                                </p:cTn>
-                              </p:par>
-                              <p:par>
-                                <p:cTn id="17" presetID="1" presetClass="entr" presetSubtype="0" fill="hold" nodeType="withEffect">
-                                  <p:stCondLst>
-                                    <p:cond delay="0"/>
-                                  </p:stCondLst>
-                                  <p:childTnLst>
-                                    <p:set>
-                                      <p:cBhvr>
-                                        <p:cTn id="18" dur="1" fill="hold">
-                                          <p:stCondLst>
-                                            <p:cond delay="0"/>
-                                          </p:stCondLst>
-                                        </p:cTn>
-                                        <p:tgtEl>
-                                          <p:spTgt spid="27"/>
-                                        </p:tgtEl>
-                                        <p:attrNameLst>
-                                          <p:attrName>style.visibility</p:attrName>
-                                        </p:attrNameLst>
-                                      </p:cBhvr>
-                                      <p:to>
-                                        <p:strVal val="visible"/>
-                                      </p:to>
-                                    </p:set>
-                                  </p:childTnLst>
-                                </p:cTn>
-                              </p:par>
-                              <p:par>
-                                <p:cTn id="19" presetID="1" presetClass="entr" presetSubtype="0" fill="hold" grpId="0" nodeType="withEffect">
-                                  <p:stCondLst>
-                                    <p:cond delay="0"/>
-                                  </p:stCondLst>
-                                  <p:childTnLst>
-                                    <p:set>
-                                      <p:cBhvr>
-                                        <p:cTn id="20" dur="1" fill="hold">
-                                          <p:stCondLst>
-                                            <p:cond delay="0"/>
-                                          </p:stCondLst>
-                                        </p:cTn>
-                                        <p:tgtEl>
-                                          <p:spTgt spid="29"/>
-                                        </p:tgtEl>
-                                        <p:attrNameLst>
-                                          <p:attrName>style.visibility</p:attrName>
-                                        </p:attrNameLst>
-                                      </p:cBhvr>
-                                      <p:to>
-                                        <p:strVal val="visible"/>
-                                      </p:to>
-                                    </p:set>
-                                  </p:childTnLst>
-                                </p:cTn>
-                              </p:par>
-                              <p:par>
-                                <p:cTn id="21" presetID="1" presetClass="entr" presetSubtype="0" fill="hold" grpId="0" nodeType="withEffect">
-                                  <p:stCondLst>
-                                    <p:cond delay="0"/>
-                                  </p:stCondLst>
-                                  <p:childTnLst>
-                                    <p:set>
-                                      <p:cBhvr>
-                                        <p:cTn id="22" dur="1" fill="hold">
-                                          <p:stCondLst>
-                                            <p:cond delay="0"/>
-                                          </p:stCondLst>
-                                        </p:cTn>
-                                        <p:tgtEl>
-                                          <p:spTgt spid="35"/>
-                                        </p:tgtEl>
-                                        <p:attrNameLst>
-                                          <p:attrName>style.visibility</p:attrName>
-                                        </p:attrNameLst>
-                                      </p:cBhvr>
-                                      <p:to>
-                                        <p:strVal val="visible"/>
-                                      </p:to>
-                                    </p:set>
-                                  </p:childTnLst>
-                                </p:cTn>
-                              </p:par>
-                              <p:par>
-                                <p:cTn id="23" presetID="1" presetClass="entr" presetSubtype="0" fill="hold" nodeType="withEffect">
-                                  <p:stCondLst>
-                                    <p:cond delay="0"/>
-                                  </p:stCondLst>
-                                  <p:childTnLst>
-                                    <p:set>
-                                      <p:cBhvr>
-                                        <p:cTn id="24" dur="1" fill="hold">
-                                          <p:stCondLst>
-                                            <p:cond delay="0"/>
-                                          </p:stCondLst>
-                                        </p:cTn>
-                                        <p:tgtEl>
-                                          <p:spTgt spid="39"/>
-                                        </p:tgtEl>
-                                        <p:attrNameLst>
-                                          <p:attrName>style.visibility</p:attrName>
-                                        </p:attrNameLst>
-                                      </p:cBhvr>
-                                      <p:to>
-                                        <p:strVal val="visible"/>
-                                      </p:to>
-                                    </p:set>
-                                  </p:childTnLst>
-                                </p:cTn>
-                              </p:par>
-                              <p:par>
-                                <p:cTn id="25" presetID="1" presetClass="entr" presetSubtype="0" fill="hold" grpId="0" nodeType="withEffect">
-                                  <p:stCondLst>
-                                    <p:cond delay="0"/>
-                                  </p:stCondLst>
-                                  <p:childTnLst>
-                                    <p:set>
-                                      <p:cBhvr>
-                                        <p:cTn id="26" dur="1" fill="hold">
-                                          <p:stCondLst>
-                                            <p:cond delay="0"/>
-                                          </p:stCondLst>
-                                        </p:cTn>
-                                        <p:tgtEl>
-                                          <p:spTgt spid="2"/>
-                                        </p:tgtEl>
-                                        <p:attrNameLst>
-                                          <p:attrName>style.visibility</p:attrName>
-                                        </p:attrNameLst>
-                                      </p:cBhvr>
-                                      <p:to>
-                                        <p:strVal val="visible"/>
-                                      </p:to>
-                                    </p:set>
-                                  </p:childTnLst>
-                                </p:cTn>
-                              </p:par>
-                              <p:par>
-                                <p:cTn id="27" presetID="1" presetClass="entr" presetSubtype="0" fill="hold" grpId="0" nodeType="withEffect">
-                                  <p:stCondLst>
-                                    <p:cond delay="0"/>
-                                  </p:stCondLst>
-                                  <p:childTnLst>
-                                    <p:set>
-                                      <p:cBhvr>
-                                        <p:cTn id="28" dur="1" fill="hold">
-                                          <p:stCondLst>
-                                            <p:cond delay="0"/>
-                                          </p:stCondLst>
-                                        </p:cTn>
-                                        <p:tgtEl>
-                                          <p:spTgt spid="3"/>
-                                        </p:tgtEl>
-                                        <p:attrNameLst>
-                                          <p:attrName>style.visibility</p:attrName>
-                                        </p:attrNameLst>
-                                      </p:cBhvr>
-                                      <p:to>
-                                        <p:strVal val="visible"/>
-                                      </p:to>
-                                    </p:set>
-                                  </p:childTnLst>
-                                </p:cTn>
-                              </p:par>
-                            </p:childTnLst>
-                          </p:cTn>
-                        </p:par>
-                      </p:childTnLst>
-                    </p:cTn>
-                  </p:par>
-                  <p:par>
-                    <p:cTn id="29" fill="hold">
-                      <p:stCondLst>
-                        <p:cond delay="indefinite"/>
-                      </p:stCondLst>
-                      <p:childTnLst>
-                        <p:par>
-                          <p:cTn id="30" fill="hold">
-                            <p:stCondLst>
-                              <p:cond delay="0"/>
-                            </p:stCondLst>
-                            <p:childTnLst>
-                              <p:par>
-                                <p:cTn id="31" presetID="1" presetClass="entr" presetSubtype="0" fill="hold" grpId="0" nodeType="clickEffect">
-                                  <p:stCondLst>
-                                    <p:cond delay="0"/>
-                                  </p:stCondLst>
-                                  <p:childTnLst>
-                                    <p:set>
-                                      <p:cBhvr>
-                                        <p:cTn id="32" dur="1" fill="hold">
-                                          <p:stCondLst>
-                                            <p:cond delay="0"/>
-                                          </p:stCondLst>
-                                        </p:cTn>
-                                        <p:tgtEl>
-                                          <p:spTgt spid="51"/>
-                                        </p:tgtEl>
-                                        <p:attrNameLst>
-                                          <p:attrName>style.visibility</p:attrName>
-                                        </p:attrNameLst>
-                                      </p:cBhvr>
-                                      <p:to>
-                                        <p:strVal val="visible"/>
-                                      </p:to>
-                                    </p:set>
-                                  </p:childTnLst>
-                                </p:cTn>
-                              </p:par>
-                            </p:childTnLst>
-                          </p:cTn>
-                        </p:par>
-                      </p:childTnLst>
-                    </p:cTn>
-                  </p:par>
-                  <p:par>
-                    <p:cTn id="33" fill="hold">
-                      <p:stCondLst>
-                        <p:cond delay="indefinite"/>
-                      </p:stCondLst>
-                      <p:childTnLst>
-                        <p:par>
-                          <p:cTn id="34" fill="hold">
-                            <p:stCondLst>
-                              <p:cond delay="0"/>
-                            </p:stCondLst>
-                            <p:childTnLst>
-                              <p:par>
-                                <p:cTn id="35" presetID="1" presetClass="entr" presetSubtype="0" fill="hold" grpId="0" nodeType="clickEffect">
-                                  <p:stCondLst>
-                                    <p:cond delay="0"/>
-                                  </p:stCondLst>
-                                  <p:childTnLst>
-                                    <p:set>
-                                      <p:cBhvr>
-                                        <p:cTn id="36" dur="1" fill="hold">
-                                          <p:stCondLst>
-                                            <p:cond delay="0"/>
-                                          </p:stCondLst>
-                                        </p:cTn>
-                                        <p:tgtEl>
-                                          <p:spTgt spid="10"/>
-                                        </p:tgtEl>
-                                        <p:attrNameLst>
-                                          <p:attrName>style.visibility</p:attrName>
-                                        </p:attrNameLst>
-                                      </p:cBhvr>
-                                      <p:to>
-                                        <p:strVal val="visible"/>
-                                      </p:to>
-                                    </p:set>
-                                  </p:childTnLst>
-                                </p:cTn>
-                              </p:par>
-                            </p:childTnLst>
-                          </p:cTn>
-                        </p:par>
-                      </p:childTnLst>
-                    </p:cTn>
-                  </p:par>
-                </p:childTnLst>
-              </p:cTn>
-              <p:prevCondLst>
-                <p:cond evt="onPrev" delay="0">
-                  <p:tgtEl>
-                    <p:sldTgt/>
-                  </p:tgtEl>
-                </p:cond>
-              </p:prevCondLst>
-              <p:nextCondLst>
-                <p:cond evt="onNext" delay="0">
-                  <p:tgtEl>
-                    <p:sldTgt/>
-                  </p:tgtEl>
-                </p:cond>
-              </p:nextCondLst>
-            </p:seq>
-          </p:childTnLst>
-        </p:cTn>
-      </p:par>
-    </p:tnLst>
-    <p:bldLst>
-      <p:bldP spid="14" grpId="0" animBg="1"/>
-      <p:bldP spid="21" grpId="0" animBg="1"/>
-      <p:bldP spid="26" grpId="0"/>
-      <p:bldP spid="29" grpId="0" animBg="1"/>
-      <p:bldP spid="35" grpId="0"/>
-      <p:bldP spid="51" grpId="0"/>
-      <p:bldP spid="2" grpId="0"/>
-      <p:bldP spid="3" grpId="0"/>
-      <p:bldP spid="10" grpId="0"/>
-    </p:bldLst>
-  </p:timing>
 </p:sld>
 </file>
 
@@ -19331,7 +17517,7 @@
         <p:spPr>
           <a:xfrm>
             <a:off x="863166" y="3515620"/>
-            <a:ext cx="5204758" cy="866391"/>
+            <a:ext cx="4140364" cy="866391"/>
           </a:xfrm>
           <a:prstGeom prst="rect">
             <a:avLst/>
@@ -19356,13 +17542,8 @@
             </a:pPr>
             <a:r>
               <a:rPr lang="en-US" sz="1615" dirty="0"/>
-              <a:t>User need to know technical details about </a:t>
-            </a:r>
-            <a:r>
-              <a:rPr lang="en-US" sz="1615" dirty="0" err="1"/>
-              <a:t>slurm</a:t>
-            </a:r>
-            <a:endParaRPr lang="en-US" sz="1615" dirty="0"/>
+              <a:t>User need to know technical details</a:t>
+            </a:r>
           </a:p>
           <a:p>
             <a:pPr marL="954279" lvl="1" indent="-329698">
@@ -19439,7 +17620,7 @@
           <a:p>
             <a:r>
               <a:rPr lang="en-US" sz="1154" dirty="0"/>
-              <a:t>Worker Nodes</a:t>
+              <a:t>Compute Nodes</a:t>
             </a:r>
             <a:endParaRPr lang="LID4096" sz="1154" dirty="0"/>
           </a:p>
@@ -19524,7 +17705,7 @@
         </p:nvSpPr>
         <p:spPr>
           <a:xfrm>
-            <a:off x="6555221" y="3494837"/>
+            <a:off x="5823059" y="3495470"/>
             <a:ext cx="804900" cy="1323439"/>
           </a:xfrm>
           <a:prstGeom prst="rect">
@@ -19663,7 +17844,7 @@
         </p:nvSpPr>
         <p:spPr>
           <a:xfrm>
-            <a:off x="6405260" y="3429000"/>
+            <a:off x="5673098" y="3429633"/>
             <a:ext cx="299922" cy="1434998"/>
           </a:xfrm>
           <a:prstGeom prst="leftBrace">
@@ -19780,158 +17961,6 @@
       <p:transition/>
     </mc:Fallback>
   </mc:AlternateContent>
-  <p:timing>
-    <p:tnLst>
-      <p:par>
-        <p:cTn id="1" dur="indefinite" restart="never" nodeType="tmRoot">
-          <p:childTnLst>
-            <p:seq concurrent="1" nextAc="seek">
-              <p:cTn id="2" dur="indefinite" nodeType="mainSeq">
-                <p:childTnLst>
-                  <p:par>
-                    <p:cTn id="3" fill="hold">
-                      <p:stCondLst>
-                        <p:cond delay="indefinite"/>
-                      </p:stCondLst>
-                      <p:childTnLst>
-                        <p:par>
-                          <p:cTn id="4" fill="hold">
-                            <p:stCondLst>
-                              <p:cond delay="0"/>
-                            </p:stCondLst>
-                            <p:childTnLst>
-                              <p:par>
-                                <p:cTn id="5" presetID="1" presetClass="entr" presetSubtype="0" fill="hold" grpId="0" nodeType="clickEffect">
-                                  <p:stCondLst>
-                                    <p:cond delay="0"/>
-                                  </p:stCondLst>
-                                  <p:childTnLst>
-                                    <p:set>
-                                      <p:cBhvr>
-                                        <p:cTn id="6" dur="1" fill="hold">
-                                          <p:stCondLst>
-                                            <p:cond delay="0"/>
-                                          </p:stCondLst>
-                                        </p:cTn>
-                                        <p:tgtEl>
-                                          <p:spTgt spid="9"/>
-                                        </p:tgtEl>
-                                        <p:attrNameLst>
-                                          <p:attrName>style.visibility</p:attrName>
-                                        </p:attrNameLst>
-                                      </p:cBhvr>
-                                      <p:to>
-                                        <p:strVal val="visible"/>
-                                      </p:to>
-                                    </p:set>
-                                  </p:childTnLst>
-                                </p:cTn>
-                              </p:par>
-                              <p:par>
-                                <p:cTn id="7" presetID="1" presetClass="entr" presetSubtype="0" fill="hold" grpId="0" nodeType="withEffect">
-                                  <p:stCondLst>
-                                    <p:cond delay="0"/>
-                                  </p:stCondLst>
-                                  <p:childTnLst>
-                                    <p:set>
-                                      <p:cBhvr>
-                                        <p:cTn id="8" dur="1" fill="hold">
-                                          <p:stCondLst>
-                                            <p:cond delay="0"/>
-                                          </p:stCondLst>
-                                        </p:cTn>
-                                        <p:tgtEl>
-                                          <p:spTgt spid="8"/>
-                                        </p:tgtEl>
-                                        <p:attrNameLst>
-                                          <p:attrName>style.visibility</p:attrName>
-                                        </p:attrNameLst>
-                                      </p:cBhvr>
-                                      <p:to>
-                                        <p:strVal val="visible"/>
-                                      </p:to>
-                                    </p:set>
-                                  </p:childTnLst>
-                                </p:cTn>
-                              </p:par>
-                            </p:childTnLst>
-                          </p:cTn>
-                        </p:par>
-                      </p:childTnLst>
-                    </p:cTn>
-                  </p:par>
-                  <p:par>
-                    <p:cTn id="9" fill="hold">
-                      <p:stCondLst>
-                        <p:cond delay="indefinite"/>
-                      </p:stCondLst>
-                      <p:childTnLst>
-                        <p:par>
-                          <p:cTn id="10" fill="hold">
-                            <p:stCondLst>
-                              <p:cond delay="0"/>
-                            </p:stCondLst>
-                            <p:childTnLst>
-                              <p:par>
-                                <p:cTn id="11" presetID="1" presetClass="entr" presetSubtype="0" fill="hold" grpId="0" nodeType="clickEffect">
-                                  <p:stCondLst>
-                                    <p:cond delay="0"/>
-                                  </p:stCondLst>
-                                  <p:childTnLst>
-                                    <p:set>
-                                      <p:cBhvr>
-                                        <p:cTn id="12" dur="1" fill="hold">
-                                          <p:stCondLst>
-                                            <p:cond delay="0"/>
-                                          </p:stCondLst>
-                                        </p:cTn>
-                                        <p:tgtEl>
-                                          <p:spTgt spid="5"/>
-                                        </p:tgtEl>
-                                        <p:attrNameLst>
-                                          <p:attrName>style.visibility</p:attrName>
-                                        </p:attrNameLst>
-                                      </p:cBhvr>
-                                      <p:to>
-                                        <p:strVal val="visible"/>
-                                      </p:to>
-                                    </p:set>
-                                  </p:childTnLst>
-                                </p:cTn>
-                              </p:par>
-                            </p:childTnLst>
-                          </p:cTn>
-                        </p:par>
-                      </p:childTnLst>
-                    </p:cTn>
-                  </p:par>
-                </p:childTnLst>
-              </p:cTn>
-              <p:prevCondLst>
-                <p:cond evt="onPrev" delay="0">
-                  <p:tgtEl>
-                    <p:sldTgt/>
-                  </p:tgtEl>
-                </p:cond>
-              </p:prevCondLst>
-              <p:nextCondLst>
-                <p:cond evt="onNext" delay="0">
-                  <p:tgtEl>
-                    <p:sldTgt/>
-                  </p:tgtEl>
-                </p:cond>
-              </p:nextCondLst>
-            </p:seq>
-          </p:childTnLst>
-        </p:cTn>
-      </p:par>
-    </p:tnLst>
-    <p:bldLst>
-      <p:bldP spid="8" grpId="0"/>
-      <p:bldP spid="9" grpId="0" animBg="1"/>
-      <p:bldP spid="5" grpId="0"/>
-    </p:bldLst>
-  </p:timing>
 </p:sld>
 </file>
 

</xml_diff>